<commit_message>
Added slides in pptx
</commit_message>
<xml_diff>
--- a/optimization-methods-for-artificial-intelligence/introduction.pptx
+++ b/optimization-methods-for-artificial-intelligence/introduction.pptx
@@ -4,19 +4,33 @@
   <p:sldMasterIdLst>
     <p:sldMasterId id="2147483648" r:id="rId1"/>
   </p:sldMasterIdLst>
+  <p:notesMasterIdLst>
+    <p:notesMasterId r:id="rId25"/>
+  </p:notesMasterIdLst>
   <p:sldIdLst>
     <p:sldId id="257" r:id="rId2"/>
     <p:sldId id="258" r:id="rId3"/>
     <p:sldId id="259" r:id="rId4"/>
-    <p:sldId id="260" r:id="rId5"/>
-    <p:sldId id="261" r:id="rId6"/>
-    <p:sldId id="262" r:id="rId7"/>
-    <p:sldId id="263" r:id="rId8"/>
-    <p:sldId id="268" r:id="rId9"/>
-    <p:sldId id="264" r:id="rId10"/>
-    <p:sldId id="267" r:id="rId11"/>
-    <p:sldId id="265" r:id="rId12"/>
-    <p:sldId id="266" r:id="rId13"/>
+    <p:sldId id="273" r:id="rId5"/>
+    <p:sldId id="260" r:id="rId6"/>
+    <p:sldId id="261" r:id="rId7"/>
+    <p:sldId id="262" r:id="rId8"/>
+    <p:sldId id="263" r:id="rId9"/>
+    <p:sldId id="268" r:id="rId10"/>
+    <p:sldId id="264" r:id="rId11"/>
+    <p:sldId id="267" r:id="rId12"/>
+    <p:sldId id="265" r:id="rId13"/>
+    <p:sldId id="266" r:id="rId14"/>
+    <p:sldId id="269" r:id="rId15"/>
+    <p:sldId id="270" r:id="rId16"/>
+    <p:sldId id="275" r:id="rId17"/>
+    <p:sldId id="272" r:id="rId18"/>
+    <p:sldId id="271" r:id="rId19"/>
+    <p:sldId id="274" r:id="rId20"/>
+    <p:sldId id="277" r:id="rId21"/>
+    <p:sldId id="278" r:id="rId22"/>
+    <p:sldId id="279" r:id="rId23"/>
+    <p:sldId id="276" r:id="rId24"/>
   </p:sldIdLst>
   <p:sldSz cx="12192000" cy="6858000"/>
   <p:notesSz cx="6858000" cy="9144000"/>
@@ -123,6 +137,447 @@
 </p:presentation>
 </file>
 
+<file path=ppt/notesMasters/notesMaster1.xml><?xml version="1.0" encoding="utf-8"?>
+<p:notesMaster xmlns:a="http://schemas.openxmlformats.org/drawingml/2006/main" xmlns:r="http://schemas.openxmlformats.org/officeDocument/2006/relationships" xmlns:p="http://schemas.openxmlformats.org/presentationml/2006/main">
+  <p:cSld>
+    <p:bg>
+      <p:bgRef idx="1001">
+        <a:schemeClr val="bg1"/>
+      </p:bgRef>
+    </p:bg>
+    <p:spTree>
+      <p:nvGrpSpPr>
+        <p:cNvPr id="1" name=""/>
+        <p:cNvGrpSpPr/>
+        <p:nvPr/>
+      </p:nvGrpSpPr>
+      <p:grpSpPr>
+        <a:xfrm>
+          <a:off x="0" y="0"/>
+          <a:ext cx="0" cy="0"/>
+          <a:chOff x="0" y="0"/>
+          <a:chExt cx="0" cy="0"/>
+        </a:xfrm>
+      </p:grpSpPr>
+      <p:sp>
+        <p:nvSpPr>
+          <p:cNvPr id="2" name="Espace réservé de l'en-tête 1"/>
+          <p:cNvSpPr>
+            <a:spLocks noGrp="1"/>
+          </p:cNvSpPr>
+          <p:nvPr>
+            <p:ph type="hdr" sz="quarter"/>
+          </p:nvPr>
+        </p:nvSpPr>
+        <p:spPr>
+          <a:xfrm>
+            <a:off x="0" y="0"/>
+            <a:ext cx="2971800" cy="458788"/>
+          </a:xfrm>
+          <a:prstGeom prst="rect">
+            <a:avLst/>
+          </a:prstGeom>
+        </p:spPr>
+        <p:txBody>
+          <a:bodyPr vert="horz" lIns="91440" tIns="45720" rIns="91440" bIns="45720" rtlCol="0"/>
+          <a:lstStyle>
+            <a:lvl1pPr algn="l">
+              <a:defRPr sz="1200"/>
+            </a:lvl1pPr>
+          </a:lstStyle>
+          <a:p>
+            <a:endParaRPr lang="en-US"/>
+          </a:p>
+        </p:txBody>
+      </p:sp>
+      <p:sp>
+        <p:nvSpPr>
+          <p:cNvPr id="3" name="Espace réservé de la date 2"/>
+          <p:cNvSpPr>
+            <a:spLocks noGrp="1"/>
+          </p:cNvSpPr>
+          <p:nvPr>
+            <p:ph type="dt" idx="1"/>
+          </p:nvPr>
+        </p:nvSpPr>
+        <p:spPr>
+          <a:xfrm>
+            <a:off x="3884613" y="0"/>
+            <a:ext cx="2971800" cy="458788"/>
+          </a:xfrm>
+          <a:prstGeom prst="rect">
+            <a:avLst/>
+          </a:prstGeom>
+        </p:spPr>
+        <p:txBody>
+          <a:bodyPr vert="horz" lIns="91440" tIns="45720" rIns="91440" bIns="45720" rtlCol="0"/>
+          <a:lstStyle>
+            <a:lvl1pPr algn="r">
+              <a:defRPr sz="1200"/>
+            </a:lvl1pPr>
+          </a:lstStyle>
+          <a:p>
+            <a:fld id="{4AAA8967-1584-49FE-8FA4-B9793DEB31AA}" type="datetimeFigureOut">
+              <a:rPr lang="en-US" smtClean="0"/>
+              <a:t>6/8/2023</a:t>
+            </a:fld>
+            <a:endParaRPr lang="en-US"/>
+          </a:p>
+        </p:txBody>
+      </p:sp>
+      <p:sp>
+        <p:nvSpPr>
+          <p:cNvPr id="4" name="Espace réservé de l'image des diapositives 3"/>
+          <p:cNvSpPr>
+            <a:spLocks noGrp="1" noRot="1" noChangeAspect="1"/>
+          </p:cNvSpPr>
+          <p:nvPr>
+            <p:ph type="sldImg" idx="2"/>
+          </p:nvPr>
+        </p:nvSpPr>
+        <p:spPr>
+          <a:xfrm>
+            <a:off x="685800" y="1143000"/>
+            <a:ext cx="5486400" cy="3086100"/>
+          </a:xfrm>
+          <a:prstGeom prst="rect">
+            <a:avLst/>
+          </a:prstGeom>
+          <a:noFill/>
+          <a:ln w="12700">
+            <a:solidFill>
+              <a:prstClr val="black"/>
+            </a:solidFill>
+          </a:ln>
+        </p:spPr>
+        <p:txBody>
+          <a:bodyPr vert="horz" lIns="91440" tIns="45720" rIns="91440" bIns="45720" rtlCol="0" anchor="ctr"/>
+          <a:lstStyle/>
+          <a:p>
+            <a:endParaRPr lang="en-US"/>
+          </a:p>
+        </p:txBody>
+      </p:sp>
+      <p:sp>
+        <p:nvSpPr>
+          <p:cNvPr id="5" name="Espace réservé des notes 4"/>
+          <p:cNvSpPr>
+            <a:spLocks noGrp="1"/>
+          </p:cNvSpPr>
+          <p:nvPr>
+            <p:ph type="body" sz="quarter" idx="3"/>
+          </p:nvPr>
+        </p:nvSpPr>
+        <p:spPr>
+          <a:xfrm>
+            <a:off x="685800" y="4400550"/>
+            <a:ext cx="5486400" cy="3600450"/>
+          </a:xfrm>
+          <a:prstGeom prst="rect">
+            <a:avLst/>
+          </a:prstGeom>
+        </p:spPr>
+        <p:txBody>
+          <a:bodyPr vert="horz" lIns="91440" tIns="45720" rIns="91440" bIns="45720" rtlCol="0"/>
+          <a:lstStyle/>
+          <a:p>
+            <a:pPr lvl="0"/>
+            <a:r>
+              <a:rPr lang="fr-FR"/>
+              <a:t>Cliquez pour modifier les styles du texte du masque</a:t>
+            </a:r>
+          </a:p>
+          <a:p>
+            <a:pPr lvl="1"/>
+            <a:r>
+              <a:rPr lang="fr-FR"/>
+              <a:t>Deuxième niveau</a:t>
+            </a:r>
+          </a:p>
+          <a:p>
+            <a:pPr lvl="2"/>
+            <a:r>
+              <a:rPr lang="fr-FR"/>
+              <a:t>Troisième niveau</a:t>
+            </a:r>
+          </a:p>
+          <a:p>
+            <a:pPr lvl="3"/>
+            <a:r>
+              <a:rPr lang="fr-FR"/>
+              <a:t>Quatrième niveau</a:t>
+            </a:r>
+          </a:p>
+          <a:p>
+            <a:pPr lvl="4"/>
+            <a:r>
+              <a:rPr lang="fr-FR"/>
+              <a:t>Cinquième niveau</a:t>
+            </a:r>
+            <a:endParaRPr lang="en-US"/>
+          </a:p>
+        </p:txBody>
+      </p:sp>
+      <p:sp>
+        <p:nvSpPr>
+          <p:cNvPr id="6" name="Espace réservé du pied de page 5"/>
+          <p:cNvSpPr>
+            <a:spLocks noGrp="1"/>
+          </p:cNvSpPr>
+          <p:nvPr>
+            <p:ph type="ftr" sz="quarter" idx="4"/>
+          </p:nvPr>
+        </p:nvSpPr>
+        <p:spPr>
+          <a:xfrm>
+            <a:off x="0" y="8685213"/>
+            <a:ext cx="2971800" cy="458787"/>
+          </a:xfrm>
+          <a:prstGeom prst="rect">
+            <a:avLst/>
+          </a:prstGeom>
+        </p:spPr>
+        <p:txBody>
+          <a:bodyPr vert="horz" lIns="91440" tIns="45720" rIns="91440" bIns="45720" rtlCol="0" anchor="b"/>
+          <a:lstStyle>
+            <a:lvl1pPr algn="l">
+              <a:defRPr sz="1200"/>
+            </a:lvl1pPr>
+          </a:lstStyle>
+          <a:p>
+            <a:endParaRPr lang="en-US"/>
+          </a:p>
+        </p:txBody>
+      </p:sp>
+      <p:sp>
+        <p:nvSpPr>
+          <p:cNvPr id="7" name="Espace réservé du numéro de diapositive 6"/>
+          <p:cNvSpPr>
+            <a:spLocks noGrp="1"/>
+          </p:cNvSpPr>
+          <p:nvPr>
+            <p:ph type="sldNum" sz="quarter" idx="5"/>
+          </p:nvPr>
+        </p:nvSpPr>
+        <p:spPr>
+          <a:xfrm>
+            <a:off x="3884613" y="8685213"/>
+            <a:ext cx="2971800" cy="458787"/>
+          </a:xfrm>
+          <a:prstGeom prst="rect">
+            <a:avLst/>
+          </a:prstGeom>
+        </p:spPr>
+        <p:txBody>
+          <a:bodyPr vert="horz" lIns="91440" tIns="45720" rIns="91440" bIns="45720" rtlCol="0" anchor="b"/>
+          <a:lstStyle>
+            <a:lvl1pPr algn="r">
+              <a:defRPr sz="1200"/>
+            </a:lvl1pPr>
+          </a:lstStyle>
+          <a:p>
+            <a:fld id="{5A4CDC94-00AE-4940-AE94-0065ADD8401E}" type="slidenum">
+              <a:rPr lang="en-US" smtClean="0"/>
+              <a:t>‹N°›</a:t>
+            </a:fld>
+            <a:endParaRPr lang="en-US"/>
+          </a:p>
+        </p:txBody>
+      </p:sp>
+    </p:spTree>
+    <p:extLst>
+      <p:ext uri="{BB962C8B-B14F-4D97-AF65-F5344CB8AC3E}">
+        <p14:creationId xmlns:p14="http://schemas.microsoft.com/office/powerpoint/2010/main" val="923697175"/>
+      </p:ext>
+    </p:extLst>
+  </p:cSld>
+  <p:clrMap bg1="lt1" tx1="dk1" bg2="lt2" tx2="dk2" accent1="accent1" accent2="accent2" accent3="accent3" accent4="accent4" accent5="accent5" accent6="accent6" hlink="hlink" folHlink="folHlink"/>
+  <p:notesStyle>
+    <a:lvl1pPr marL="0" algn="l" defTabSz="914400" rtl="0" eaLnBrk="1" latinLnBrk="0" hangingPunct="1">
+      <a:defRPr sz="1200" kern="1200">
+        <a:solidFill>
+          <a:schemeClr val="tx1"/>
+        </a:solidFill>
+        <a:latin typeface="+mn-lt"/>
+        <a:ea typeface="+mn-ea"/>
+        <a:cs typeface="+mn-cs"/>
+      </a:defRPr>
+    </a:lvl1pPr>
+    <a:lvl2pPr marL="457200" algn="l" defTabSz="914400" rtl="0" eaLnBrk="1" latinLnBrk="0" hangingPunct="1">
+      <a:defRPr sz="1200" kern="1200">
+        <a:solidFill>
+          <a:schemeClr val="tx1"/>
+        </a:solidFill>
+        <a:latin typeface="+mn-lt"/>
+        <a:ea typeface="+mn-ea"/>
+        <a:cs typeface="+mn-cs"/>
+      </a:defRPr>
+    </a:lvl2pPr>
+    <a:lvl3pPr marL="914400" algn="l" defTabSz="914400" rtl="0" eaLnBrk="1" latinLnBrk="0" hangingPunct="1">
+      <a:defRPr sz="1200" kern="1200">
+        <a:solidFill>
+          <a:schemeClr val="tx1"/>
+        </a:solidFill>
+        <a:latin typeface="+mn-lt"/>
+        <a:ea typeface="+mn-ea"/>
+        <a:cs typeface="+mn-cs"/>
+      </a:defRPr>
+    </a:lvl3pPr>
+    <a:lvl4pPr marL="1371600" algn="l" defTabSz="914400" rtl="0" eaLnBrk="1" latinLnBrk="0" hangingPunct="1">
+      <a:defRPr sz="1200" kern="1200">
+        <a:solidFill>
+          <a:schemeClr val="tx1"/>
+        </a:solidFill>
+        <a:latin typeface="+mn-lt"/>
+        <a:ea typeface="+mn-ea"/>
+        <a:cs typeface="+mn-cs"/>
+      </a:defRPr>
+    </a:lvl4pPr>
+    <a:lvl5pPr marL="1828800" algn="l" defTabSz="914400" rtl="0" eaLnBrk="1" latinLnBrk="0" hangingPunct="1">
+      <a:defRPr sz="1200" kern="1200">
+        <a:solidFill>
+          <a:schemeClr val="tx1"/>
+        </a:solidFill>
+        <a:latin typeface="+mn-lt"/>
+        <a:ea typeface="+mn-ea"/>
+        <a:cs typeface="+mn-cs"/>
+      </a:defRPr>
+    </a:lvl5pPr>
+    <a:lvl6pPr marL="2286000" algn="l" defTabSz="914400" rtl="0" eaLnBrk="1" latinLnBrk="0" hangingPunct="1">
+      <a:defRPr sz="1200" kern="1200">
+        <a:solidFill>
+          <a:schemeClr val="tx1"/>
+        </a:solidFill>
+        <a:latin typeface="+mn-lt"/>
+        <a:ea typeface="+mn-ea"/>
+        <a:cs typeface="+mn-cs"/>
+      </a:defRPr>
+    </a:lvl6pPr>
+    <a:lvl7pPr marL="2743200" algn="l" defTabSz="914400" rtl="0" eaLnBrk="1" latinLnBrk="0" hangingPunct="1">
+      <a:defRPr sz="1200" kern="1200">
+        <a:solidFill>
+          <a:schemeClr val="tx1"/>
+        </a:solidFill>
+        <a:latin typeface="+mn-lt"/>
+        <a:ea typeface="+mn-ea"/>
+        <a:cs typeface="+mn-cs"/>
+      </a:defRPr>
+    </a:lvl7pPr>
+    <a:lvl8pPr marL="3200400" algn="l" defTabSz="914400" rtl="0" eaLnBrk="1" latinLnBrk="0" hangingPunct="1">
+      <a:defRPr sz="1200" kern="1200">
+        <a:solidFill>
+          <a:schemeClr val="tx1"/>
+        </a:solidFill>
+        <a:latin typeface="+mn-lt"/>
+        <a:ea typeface="+mn-ea"/>
+        <a:cs typeface="+mn-cs"/>
+      </a:defRPr>
+    </a:lvl8pPr>
+    <a:lvl9pPr marL="3657600" algn="l" defTabSz="914400" rtl="0" eaLnBrk="1" latinLnBrk="0" hangingPunct="1">
+      <a:defRPr sz="1200" kern="1200">
+        <a:solidFill>
+          <a:schemeClr val="tx1"/>
+        </a:solidFill>
+        <a:latin typeface="+mn-lt"/>
+        <a:ea typeface="+mn-ea"/>
+        <a:cs typeface="+mn-cs"/>
+      </a:defRPr>
+    </a:lvl9pPr>
+  </p:notesStyle>
+</p:notesMaster>
+</file>
+
+<file path=ppt/notesSlides/notesSlide1.xml><?xml version="1.0" encoding="utf-8"?>
+<p:notes xmlns:a="http://schemas.openxmlformats.org/drawingml/2006/main" xmlns:r="http://schemas.openxmlformats.org/officeDocument/2006/relationships" xmlns:p="http://schemas.openxmlformats.org/presentationml/2006/main">
+  <p:cSld>
+    <p:spTree>
+      <p:nvGrpSpPr>
+        <p:cNvPr id="1" name=""/>
+        <p:cNvGrpSpPr/>
+        <p:nvPr/>
+      </p:nvGrpSpPr>
+      <p:grpSpPr>
+        <a:xfrm>
+          <a:off x="0" y="0"/>
+          <a:ext cx="0" cy="0"/>
+          <a:chOff x="0" y="0"/>
+          <a:chExt cx="0" cy="0"/>
+        </a:xfrm>
+      </p:grpSpPr>
+      <p:sp>
+        <p:nvSpPr>
+          <p:cNvPr id="2" name="Espace réservé de l'image des diapositives 1"/>
+          <p:cNvSpPr>
+            <a:spLocks noGrp="1" noRot="1" noChangeAspect="1"/>
+          </p:cNvSpPr>
+          <p:nvPr>
+            <p:ph type="sldImg"/>
+          </p:nvPr>
+        </p:nvSpPr>
+        <p:spPr/>
+      </p:sp>
+      <p:sp>
+        <p:nvSpPr>
+          <p:cNvPr id="3" name="Espace réservé des notes 2"/>
+          <p:cNvSpPr>
+            <a:spLocks noGrp="1"/>
+          </p:cNvSpPr>
+          <p:nvPr>
+            <p:ph type="body" idx="1"/>
+          </p:nvPr>
+        </p:nvSpPr>
+        <p:spPr/>
+        <p:txBody>
+          <a:bodyPr/>
+          <a:lstStyle/>
+          <a:p>
+            <a:r>
+              <a:rPr lang="en-US" dirty="0"/>
+              <a:t>There is one possible exception</a:t>
+            </a:r>
+            <a:r>
+              <a:rPr lang="en-US"/>
+              <a:t>, ontologies</a:t>
+            </a:r>
+          </a:p>
+        </p:txBody>
+      </p:sp>
+      <p:sp>
+        <p:nvSpPr>
+          <p:cNvPr id="4" name="Espace réservé du numéro de diapositive 3"/>
+          <p:cNvSpPr>
+            <a:spLocks noGrp="1"/>
+          </p:cNvSpPr>
+          <p:nvPr>
+            <p:ph type="sldNum" sz="quarter" idx="5"/>
+          </p:nvPr>
+        </p:nvSpPr>
+        <p:spPr/>
+        <p:txBody>
+          <a:bodyPr/>
+          <a:lstStyle/>
+          <a:p>
+            <a:fld id="{5A4CDC94-00AE-4940-AE94-0065ADD8401E}" type="slidenum">
+              <a:rPr lang="en-US" smtClean="0"/>
+              <a:t>22</a:t>
+            </a:fld>
+            <a:endParaRPr lang="en-US"/>
+          </a:p>
+        </p:txBody>
+      </p:sp>
+    </p:spTree>
+    <p:extLst>
+      <p:ext uri="{BB962C8B-B14F-4D97-AF65-F5344CB8AC3E}">
+        <p14:creationId xmlns:p14="http://schemas.microsoft.com/office/powerpoint/2010/main" val="2051950392"/>
+      </p:ext>
+    </p:extLst>
+  </p:cSld>
+  <p:clrMapOvr>
+    <a:masterClrMapping/>
+  </p:clrMapOvr>
+</p:notes>
+</file>
+
 <file path=ppt/slideLayouts/slideLayout1.xml><?xml version="1.0" encoding="utf-8"?>
 <p:sldLayout xmlns:a="http://schemas.openxmlformats.org/drawingml/2006/main" xmlns:r="http://schemas.openxmlformats.org/officeDocument/2006/relationships" xmlns:p="http://schemas.openxmlformats.org/presentationml/2006/main" preserve="1" userDrawn="1">
   <p:cSld name="Diapositive de titre - Version 1">
@@ -1231,22 +1686,13 @@
           <a:lstStyle/>
           <a:p>
             <a:r>
-              <a:rPr lang="it-IT" sz="1000" dirty="0">
+              <a:rPr lang="en-US" sz="1000" dirty="0">
                 <a:solidFill>
                   <a:srgbClr val="275662"/>
                 </a:solidFill>
                 <a:latin typeface="+mn-lt"/>
               </a:rPr>
-              <a:t>TITLE OF THE PRESENTATION HERE (MODIFY IN VIEW -&gt; MASK</a:t>
-            </a:r>
-            <a:r>
-              <a:rPr lang="it-IT" sz="1000" baseline="0" dirty="0">
-                <a:solidFill>
-                  <a:srgbClr val="275662"/>
-                </a:solidFill>
-                <a:latin typeface="+mn-lt"/>
-              </a:rPr>
-              <a:t> / AFFICHAGE -&gt; MASQUE DE DIAPOSITIVES) </a:t>
+              <a:t>Optimization methods for Artificial Intelligence: Introduction</a:t>
             </a:r>
             <a:endParaRPr lang="fr-FR" sz="1000" dirty="0">
               <a:solidFill>
@@ -1729,6 +2175,13 @@
               <a:rPr lang="fr-FR" i="1" dirty="0"/>
               <a:t>INRAE, AgroParisTech, Université Paris-Saclay</a:t>
             </a:r>
+            <a:br>
+              <a:rPr lang="fr-FR" i="1" dirty="0"/>
+            </a:br>
+            <a:r>
+              <a:rPr lang="fr-FR" i="1" dirty="0"/>
+              <a:t>Institut des Systèmes Complexes, Paris-Ile-de-France</a:t>
+            </a:r>
           </a:p>
         </p:txBody>
       </p:sp>
@@ -1746,6 +2199,161 @@
 </file>
 
 <file path=ppt/slides/slide10.xml><?xml version="1.0" encoding="utf-8"?>
+<p:sld xmlns:a="http://schemas.openxmlformats.org/drawingml/2006/main" xmlns:r="http://schemas.openxmlformats.org/officeDocument/2006/relationships" xmlns:p="http://schemas.openxmlformats.org/presentationml/2006/main">
+  <p:cSld>
+    <p:spTree>
+      <p:nvGrpSpPr>
+        <p:cNvPr id="1" name=""/>
+        <p:cNvGrpSpPr/>
+        <p:nvPr/>
+      </p:nvGrpSpPr>
+      <p:grpSpPr>
+        <a:xfrm>
+          <a:off x="0" y="0"/>
+          <a:ext cx="0" cy="0"/>
+          <a:chOff x="0" y="0"/>
+          <a:chExt cx="0" cy="0"/>
+        </a:xfrm>
+      </p:grpSpPr>
+      <p:sp>
+        <p:nvSpPr>
+          <p:cNvPr id="2" name="Titre 1">
+            <a:extLst>
+              <a:ext uri="{FF2B5EF4-FFF2-40B4-BE49-F238E27FC236}">
+                <a16:creationId xmlns:a16="http://schemas.microsoft.com/office/drawing/2014/main" id="{D8D4BB81-C1DD-432E-93C3-887461AA44D9}"/>
+              </a:ext>
+            </a:extLst>
+          </p:cNvPr>
+          <p:cNvSpPr>
+            <a:spLocks noGrp="1"/>
+          </p:cNvSpPr>
+          <p:nvPr>
+            <p:ph type="title"/>
+          </p:nvPr>
+        </p:nvSpPr>
+        <p:spPr/>
+        <p:txBody>
+          <a:bodyPr/>
+          <a:lstStyle/>
+          <a:p>
+            <a:r>
+              <a:rPr lang="it-IT" dirty="0"/>
+              <a:t>What is Artificial Intelligence?</a:t>
+            </a:r>
+            <a:endParaRPr lang="en-US" dirty="0"/>
+          </a:p>
+        </p:txBody>
+      </p:sp>
+      <p:sp>
+        <p:nvSpPr>
+          <p:cNvPr id="3" name="Espace réservé du texte 2">
+            <a:extLst>
+              <a:ext uri="{FF2B5EF4-FFF2-40B4-BE49-F238E27FC236}">
+                <a16:creationId xmlns:a16="http://schemas.microsoft.com/office/drawing/2014/main" id="{9F050655-F2E6-48B2-90E3-A6E11C511879}"/>
+              </a:ext>
+            </a:extLst>
+          </p:cNvPr>
+          <p:cNvSpPr>
+            <a:spLocks noGrp="1"/>
+          </p:cNvSpPr>
+          <p:nvPr>
+            <p:ph type="body" sz="quarter" idx="10"/>
+          </p:nvPr>
+        </p:nvSpPr>
+        <p:spPr/>
+        <p:txBody>
+          <a:bodyPr/>
+          <a:lstStyle/>
+          <a:p>
+            <a:r>
+              <a:rPr lang="it-IT" dirty="0"/>
+              <a:t>Short answer, there is no clear definition</a:t>
+            </a:r>
+          </a:p>
+          <a:p>
+            <a:pPr lvl="1"/>
+            <a:r>
+              <a:rPr lang="it-IT" dirty="0"/>
+              <a:t>We do not have a good definition of </a:t>
+            </a:r>
+            <a:r>
+              <a:rPr lang="it-IT" i="1" dirty="0"/>
+              <a:t>intelligence</a:t>
+            </a:r>
+            <a:r>
+              <a:rPr lang="it-IT" dirty="0"/>
+              <a:t>, so...</a:t>
+            </a:r>
+          </a:p>
+          <a:p>
+            <a:pPr lvl="1"/>
+            <a:r>
+              <a:rPr lang="it-IT" dirty="0"/>
+              <a:t>Broadly speaking, AI defines a </a:t>
+            </a:r>
+            <a:r>
+              <a:rPr lang="it-IT" i="1" dirty="0"/>
+              <a:t>field</a:t>
+            </a:r>
+            <a:r>
+              <a:rPr lang="it-IT" dirty="0"/>
+              <a:t> more than a </a:t>
+            </a:r>
+            <a:r>
+              <a:rPr lang="it-IT" i="1" dirty="0"/>
+              <a:t>method</a:t>
+            </a:r>
+          </a:p>
+          <a:p>
+            <a:pPr lvl="1"/>
+            <a:r>
+              <a:rPr lang="it-IT" dirty="0"/>
+              <a:t>Machine learning, reinforcement learning, symbolic AI, ...</a:t>
+            </a:r>
+          </a:p>
+          <a:p>
+            <a:r>
+              <a:rPr lang="it-IT" dirty="0"/>
+              <a:t>When a non-biological being successfully completes a task commonly believed to require biological intelligence</a:t>
+            </a:r>
+          </a:p>
+          <a:p>
+            <a:r>
+              <a:rPr lang="it-IT" dirty="0"/>
+              <a:t>Perceiving, synthesizing, and inferring information</a:t>
+            </a:r>
+          </a:p>
+          <a:p>
+            <a:r>
+              <a:rPr lang="it-IT" dirty="0"/>
+              <a:t>How do we </a:t>
+            </a:r>
+            <a:r>
+              <a:rPr lang="it-IT" i="1" dirty="0"/>
+              <a:t>measure</a:t>
+            </a:r>
+            <a:r>
+              <a:rPr lang="it-IT" dirty="0"/>
+              <a:t> intelligence?</a:t>
+            </a:r>
+            <a:endParaRPr lang="en-US" dirty="0"/>
+          </a:p>
+        </p:txBody>
+      </p:sp>
+    </p:spTree>
+    <p:extLst>
+      <p:ext uri="{BB962C8B-B14F-4D97-AF65-F5344CB8AC3E}">
+        <p14:creationId xmlns:p14="http://schemas.microsoft.com/office/powerpoint/2010/main" val="1304693269"/>
+      </p:ext>
+    </p:extLst>
+  </p:cSld>
+  <p:clrMapOvr>
+    <a:masterClrMapping/>
+  </p:clrMapOvr>
+</p:sld>
+</file>
+
+<file path=ppt/slides/slide11.xml><?xml version="1.0" encoding="utf-8"?>
 <p:sld xmlns:a="http://schemas.openxmlformats.org/drawingml/2006/main" xmlns:r="http://schemas.openxmlformats.org/officeDocument/2006/relationships" xmlns:p="http://schemas.openxmlformats.org/presentationml/2006/main">
   <p:cSld>
     <p:spTree>
@@ -1869,13 +2477,13 @@
             </a:r>
           </a:p>
           <a:p>
-            <a:pPr marL="285750" indent="-285750">
+            <a:pPr marL="742950" lvl="1" indent="-285750">
               <a:buFontTx/>
               <a:buChar char="-"/>
             </a:pPr>
             <a:r>
               <a:rPr lang="it-IT" sz="2400" dirty="0"/>
-              <a:t>Rule-based systems</a:t>
+              <a:t>E.g. rule-based systems</a:t>
             </a:r>
           </a:p>
           <a:p>
@@ -2170,7 +2778,7 @@
 </p:sld>
 </file>
 
-<file path=ppt/slides/slide11.xml><?xml version="1.0" encoding="utf-8"?>
+<file path=ppt/slides/slide12.xml><?xml version="1.0" encoding="utf-8"?>
 <p:sld xmlns:a="http://schemas.openxmlformats.org/drawingml/2006/main" xmlns:r="http://schemas.openxmlformats.org/officeDocument/2006/relationships" xmlns:p="http://schemas.openxmlformats.org/presentationml/2006/main">
   <p:cSld>
     <p:spTree>
@@ -2210,7 +2818,7 @@
           <a:p>
             <a:r>
               <a:rPr lang="it-IT" dirty="0"/>
-              <a:t>What is Artificial Intelligence?</a:t>
+              <a:t>Symbolic AI</a:t>
             </a:r>
             <a:endParaRPr lang="en-US" dirty="0"/>
           </a:p>
@@ -2365,7 +2973,7 @@
 </p:sld>
 </file>
 
-<file path=ppt/slides/slide12.xml><?xml version="1.0" encoding="utf-8"?>
+<file path=ppt/slides/slide13.xml><?xml version="1.0" encoding="utf-8"?>
 <p:sld xmlns:a="http://schemas.openxmlformats.org/drawingml/2006/main" xmlns:r="http://schemas.openxmlformats.org/officeDocument/2006/relationships" xmlns:p="http://schemas.openxmlformats.org/presentationml/2006/main">
   <p:cSld>
     <p:spTree>
@@ -2405,7 +3013,7 @@
           <a:p>
             <a:r>
               <a:rPr lang="it-IT" dirty="0"/>
-              <a:t>What is Artificial Intelligence?</a:t>
+              <a:t>Symbolic AI</a:t>
             </a:r>
             <a:endParaRPr lang="en-US" dirty="0"/>
           </a:p>
@@ -2436,7 +3044,7 @@
           <a:p>
             <a:r>
               <a:rPr lang="it-IT" dirty="0"/>
-              <a:t>Symbols seem normal and natural, map into the real world (in linguistic, it’s called </a:t>
+              <a:t>Symbols seem normal and natural, map into the real world (in linguistics, it’s called </a:t>
             </a:r>
             <a:r>
               <a:rPr lang="it-IT" i="1" dirty="0"/>
@@ -2502,18 +3110,6 @@
             <a:r>
               <a:rPr lang="en-US" dirty="0"/>
               <a:t>?</a:t>
-            </a:r>
-          </a:p>
-          <a:p>
-            <a:r>
-              <a:rPr lang="en-US" dirty="0"/>
-              <a:t>In general, really hard to define, but we grasp it intuitively</a:t>
-            </a:r>
-          </a:p>
-          <a:p>
-            <a:r>
-              <a:rPr lang="en-US" dirty="0"/>
-              <a:t>Entire fields of research on this (neuroscience, cognitive, …)</a:t>
             </a:r>
           </a:p>
         </p:txBody>
@@ -2522,6 +3118,821 @@
     <p:extLst>
       <p:ext uri="{BB962C8B-B14F-4D97-AF65-F5344CB8AC3E}">
         <p14:creationId xmlns:p14="http://schemas.microsoft.com/office/powerpoint/2010/main" val="3221690410"/>
+      </p:ext>
+    </p:extLst>
+  </p:cSld>
+  <p:clrMapOvr>
+    <a:masterClrMapping/>
+  </p:clrMapOvr>
+</p:sld>
+</file>
+
+<file path=ppt/slides/slide14.xml><?xml version="1.0" encoding="utf-8"?>
+<p:sld xmlns:a="http://schemas.openxmlformats.org/drawingml/2006/main" xmlns:r="http://schemas.openxmlformats.org/officeDocument/2006/relationships" xmlns:p="http://schemas.openxmlformats.org/presentationml/2006/main">
+  <p:cSld>
+    <p:spTree>
+      <p:nvGrpSpPr>
+        <p:cNvPr id="1" name=""/>
+        <p:cNvGrpSpPr/>
+        <p:nvPr/>
+      </p:nvGrpSpPr>
+      <p:grpSpPr>
+        <a:xfrm>
+          <a:off x="0" y="0"/>
+          <a:ext cx="0" cy="0"/>
+          <a:chOff x="0" y="0"/>
+          <a:chExt cx="0" cy="0"/>
+        </a:xfrm>
+      </p:grpSpPr>
+      <p:pic>
+        <p:nvPicPr>
+          <p:cNvPr id="1028" name="Picture 4" descr="Virgin Plato vs Chad Diogenes : r/HistoryMemes">
+            <a:extLst>
+              <a:ext uri="{FF2B5EF4-FFF2-40B4-BE49-F238E27FC236}">
+                <a16:creationId xmlns:a16="http://schemas.microsoft.com/office/drawing/2014/main" id="{3CB9DF6F-E03D-4F1F-BE6B-535071A8DB7E}"/>
+              </a:ext>
+            </a:extLst>
+          </p:cNvPr>
+          <p:cNvPicPr>
+            <a:picLocks noChangeAspect="1" noChangeArrowheads="1"/>
+          </p:cNvPicPr>
+          <p:nvPr/>
+        </p:nvPicPr>
+        <p:blipFill>
+          <a:blip r:embed="rId2" cstate="print">
+            <a:extLst>
+              <a:ext uri="{28A0092B-C50C-407E-A947-70E740481C1C}">
+                <a14:useLocalDpi xmlns:a14="http://schemas.microsoft.com/office/drawing/2010/main" val="0"/>
+              </a:ext>
+            </a:extLst>
+          </a:blip>
+          <a:srcRect/>
+          <a:stretch>
+            <a:fillRect/>
+          </a:stretch>
+        </p:blipFill>
+        <p:spPr bwMode="auto">
+          <a:xfrm>
+            <a:off x="6109355" y="3278008"/>
+            <a:ext cx="5244445" cy="2950000"/>
+          </a:xfrm>
+          <a:prstGeom prst="rect">
+            <a:avLst/>
+          </a:prstGeom>
+          <a:noFill/>
+          <a:extLst>
+            <a:ext uri="{909E8E84-426E-40DD-AFC4-6F175D3DCCD1}">
+              <a14:hiddenFill xmlns:a14="http://schemas.microsoft.com/office/drawing/2010/main">
+                <a:solidFill>
+                  <a:srgbClr val="FFFFFF"/>
+                </a:solidFill>
+              </a14:hiddenFill>
+            </a:ext>
+          </a:extLst>
+        </p:spPr>
+      </p:pic>
+      <p:sp>
+        <p:nvSpPr>
+          <p:cNvPr id="2" name="Titre 1">
+            <a:extLst>
+              <a:ext uri="{FF2B5EF4-FFF2-40B4-BE49-F238E27FC236}">
+                <a16:creationId xmlns:a16="http://schemas.microsoft.com/office/drawing/2014/main" id="{B32FF59C-468F-45B7-8590-1E54FBF357D4}"/>
+              </a:ext>
+            </a:extLst>
+          </p:cNvPr>
+          <p:cNvSpPr>
+            <a:spLocks noGrp="1"/>
+          </p:cNvSpPr>
+          <p:nvPr>
+            <p:ph type="title"/>
+          </p:nvPr>
+        </p:nvSpPr>
+        <p:spPr/>
+        <p:txBody>
+          <a:bodyPr/>
+          <a:lstStyle/>
+          <a:p>
+            <a:r>
+              <a:rPr lang="it-IT" dirty="0"/>
+              <a:t>Symbolic AI</a:t>
+            </a:r>
+            <a:endParaRPr lang="en-US" dirty="0"/>
+          </a:p>
+        </p:txBody>
+      </p:sp>
+      <p:sp>
+        <p:nvSpPr>
+          <p:cNvPr id="3" name="Espace réservé du texte 2">
+            <a:extLst>
+              <a:ext uri="{FF2B5EF4-FFF2-40B4-BE49-F238E27FC236}">
+                <a16:creationId xmlns:a16="http://schemas.microsoft.com/office/drawing/2014/main" id="{D4620115-7A3D-4E1B-A396-6F1EBC385B33}"/>
+              </a:ext>
+            </a:extLst>
+          </p:cNvPr>
+          <p:cNvSpPr>
+            <a:spLocks noGrp="1"/>
+          </p:cNvSpPr>
+          <p:nvPr>
+            <p:ph type="body" sz="quarter" idx="10"/>
+          </p:nvPr>
+        </p:nvSpPr>
+        <p:spPr/>
+        <p:txBody>
+          <a:bodyPr>
+            <a:normAutofit/>
+          </a:bodyPr>
+          <a:lstStyle/>
+          <a:p>
+            <a:r>
+              <a:rPr lang="en-US" dirty="0"/>
+              <a:t>In general, really hard to define, but we grasp it intuitively</a:t>
+            </a:r>
+          </a:p>
+          <a:p>
+            <a:pPr lvl="1"/>
+            <a:r>
+              <a:rPr lang="en-US" dirty="0"/>
+              <a:t>It’s an old, old problem: see Plato and Diogenes</a:t>
+            </a:r>
+          </a:p>
+          <a:p>
+            <a:pPr lvl="1"/>
+            <a:r>
+              <a:rPr lang="en-US" i="1" dirty="0"/>
+              <a:t>Entire fields of research </a:t>
+            </a:r>
+            <a:r>
+              <a:rPr lang="en-US" dirty="0"/>
+              <a:t>on this (neuroscience, cognitive sciences, neurolinguistics, …)</a:t>
+            </a:r>
+          </a:p>
+          <a:p>
+            <a:r>
+              <a:rPr lang="en-US" dirty="0"/>
+              <a:t>“Explaining” symbols to AI is harder yet</a:t>
+            </a:r>
+          </a:p>
+          <a:p>
+            <a:r>
+              <a:rPr lang="en-US" dirty="0"/>
+              <a:t>Issues with “common sense”</a:t>
+            </a:r>
+          </a:p>
+          <a:p>
+            <a:r>
+              <a:rPr lang="en-US" dirty="0"/>
+              <a:t>Reached limits in the 1980s</a:t>
+            </a:r>
+          </a:p>
+        </p:txBody>
+      </p:sp>
+    </p:spTree>
+    <p:extLst>
+      <p:ext uri="{BB962C8B-B14F-4D97-AF65-F5344CB8AC3E}">
+        <p14:creationId xmlns:p14="http://schemas.microsoft.com/office/powerpoint/2010/main" val="2524681181"/>
+      </p:ext>
+    </p:extLst>
+  </p:cSld>
+  <p:clrMapOvr>
+    <a:masterClrMapping/>
+  </p:clrMapOvr>
+</p:sld>
+</file>
+
+<file path=ppt/slides/slide15.xml><?xml version="1.0" encoding="utf-8"?>
+<p:sld xmlns:a="http://schemas.openxmlformats.org/drawingml/2006/main" xmlns:r="http://schemas.openxmlformats.org/officeDocument/2006/relationships" xmlns:p="http://schemas.openxmlformats.org/presentationml/2006/main">
+  <p:cSld>
+    <p:spTree>
+      <p:nvGrpSpPr>
+        <p:cNvPr id="1" name=""/>
+        <p:cNvGrpSpPr/>
+        <p:nvPr/>
+      </p:nvGrpSpPr>
+      <p:grpSpPr>
+        <a:xfrm>
+          <a:off x="0" y="0"/>
+          <a:ext cx="0" cy="0"/>
+          <a:chOff x="0" y="0"/>
+          <a:chExt cx="0" cy="0"/>
+        </a:xfrm>
+      </p:grpSpPr>
+      <p:sp>
+        <p:nvSpPr>
+          <p:cNvPr id="2" name="Titre 1">
+            <a:extLst>
+              <a:ext uri="{FF2B5EF4-FFF2-40B4-BE49-F238E27FC236}">
+                <a16:creationId xmlns:a16="http://schemas.microsoft.com/office/drawing/2014/main" id="{B32FF59C-468F-45B7-8590-1E54FBF357D4}"/>
+              </a:ext>
+            </a:extLst>
+          </p:cNvPr>
+          <p:cNvSpPr>
+            <a:spLocks noGrp="1"/>
+          </p:cNvSpPr>
+          <p:nvPr>
+            <p:ph type="title"/>
+          </p:nvPr>
+        </p:nvSpPr>
+        <p:spPr/>
+        <p:txBody>
+          <a:bodyPr/>
+          <a:lstStyle/>
+          <a:p>
+            <a:r>
+              <a:rPr lang="it-IT" dirty="0"/>
+              <a:t>Machine learning</a:t>
+            </a:r>
+            <a:endParaRPr lang="en-US" dirty="0"/>
+          </a:p>
+        </p:txBody>
+      </p:sp>
+      <p:sp>
+        <p:nvSpPr>
+          <p:cNvPr id="3" name="Espace réservé du texte 2">
+            <a:extLst>
+              <a:ext uri="{FF2B5EF4-FFF2-40B4-BE49-F238E27FC236}">
+                <a16:creationId xmlns:a16="http://schemas.microsoft.com/office/drawing/2014/main" id="{D4620115-7A3D-4E1B-A396-6F1EBC385B33}"/>
+              </a:ext>
+            </a:extLst>
+          </p:cNvPr>
+          <p:cNvSpPr>
+            <a:spLocks noGrp="1"/>
+          </p:cNvSpPr>
+          <p:nvPr>
+            <p:ph type="body" sz="quarter" idx="10"/>
+          </p:nvPr>
+        </p:nvSpPr>
+        <p:spPr/>
+        <p:txBody>
+          <a:bodyPr>
+            <a:normAutofit lnSpcReduction="10000"/>
+          </a:bodyPr>
+          <a:lstStyle/>
+          <a:p>
+            <a:r>
+              <a:rPr lang="en-US" dirty="0"/>
+              <a:t>Learn a task directly from examples</a:t>
+            </a:r>
+          </a:p>
+          <a:p>
+            <a:pPr lvl="1"/>
+            <a:r>
+              <a:rPr lang="en-US" dirty="0"/>
+              <a:t>No need for symbols, just large quantities of data</a:t>
+            </a:r>
+          </a:p>
+          <a:p>
+            <a:pPr lvl="1"/>
+            <a:r>
+              <a:rPr lang="en-US" i="1" dirty="0"/>
+              <a:t>Samples</a:t>
+            </a:r>
+            <a:r>
+              <a:rPr lang="en-US" dirty="0"/>
+              <a:t> (rows) and </a:t>
+            </a:r>
+            <a:r>
+              <a:rPr lang="en-US" i="1" dirty="0"/>
+              <a:t>features</a:t>
+            </a:r>
+            <a:r>
+              <a:rPr lang="en-US" dirty="0"/>
+              <a:t> (columns)</a:t>
+            </a:r>
+          </a:p>
+          <a:p>
+            <a:pPr marL="457200" lvl="1" indent="0">
+              <a:buNone/>
+            </a:pPr>
+            <a:endParaRPr lang="en-US" dirty="0"/>
+          </a:p>
+          <a:p>
+            <a:r>
+              <a:rPr lang="en-US" dirty="0"/>
+              <a:t>Dominant paradigm since the 90s</a:t>
+            </a:r>
+          </a:p>
+          <a:p>
+            <a:r>
+              <a:rPr lang="en-US" dirty="0"/>
+              <a:t>Feature engineering</a:t>
+            </a:r>
+          </a:p>
+          <a:p>
+            <a:r>
+              <a:rPr lang="en-US" dirty="0"/>
+              <a:t>Trade-off between effectiveness and interpretability</a:t>
+            </a:r>
+          </a:p>
+          <a:p>
+            <a:r>
+              <a:rPr lang="en-US" dirty="0"/>
+              <a:t>Black-box effects</a:t>
+            </a:r>
+          </a:p>
+          <a:p>
+            <a:r>
+              <a:rPr lang="en-US"/>
+              <a:t>Deep learning</a:t>
+            </a:r>
+            <a:endParaRPr lang="en-US" dirty="0"/>
+          </a:p>
+        </p:txBody>
+      </p:sp>
+    </p:spTree>
+    <p:extLst>
+      <p:ext uri="{BB962C8B-B14F-4D97-AF65-F5344CB8AC3E}">
+        <p14:creationId xmlns:p14="http://schemas.microsoft.com/office/powerpoint/2010/main" val="721429470"/>
+      </p:ext>
+    </p:extLst>
+  </p:cSld>
+  <p:clrMapOvr>
+    <a:masterClrMapping/>
+  </p:clrMapOvr>
+</p:sld>
+</file>
+
+<file path=ppt/slides/slide16.xml><?xml version="1.0" encoding="utf-8"?>
+<p:sld xmlns:a="http://schemas.openxmlformats.org/drawingml/2006/main" xmlns:r="http://schemas.openxmlformats.org/officeDocument/2006/relationships" xmlns:p="http://schemas.openxmlformats.org/presentationml/2006/main">
+  <p:cSld>
+    <p:spTree>
+      <p:nvGrpSpPr>
+        <p:cNvPr id="1" name=""/>
+        <p:cNvGrpSpPr/>
+        <p:nvPr/>
+      </p:nvGrpSpPr>
+      <p:grpSpPr>
+        <a:xfrm>
+          <a:off x="0" y="0"/>
+          <a:ext cx="0" cy="0"/>
+          <a:chOff x="0" y="0"/>
+          <a:chExt cx="0" cy="0"/>
+        </a:xfrm>
+      </p:grpSpPr>
+      <p:sp>
+        <p:nvSpPr>
+          <p:cNvPr id="2" name="Titre 1">
+            <a:extLst>
+              <a:ext uri="{FF2B5EF4-FFF2-40B4-BE49-F238E27FC236}">
+                <a16:creationId xmlns:a16="http://schemas.microsoft.com/office/drawing/2014/main" id="{EBF2B6A1-6B5B-4608-B847-4CC61EE0D57D}"/>
+              </a:ext>
+            </a:extLst>
+          </p:cNvPr>
+          <p:cNvSpPr>
+            <a:spLocks noGrp="1"/>
+          </p:cNvSpPr>
+          <p:nvPr>
+            <p:ph type="title"/>
+          </p:nvPr>
+        </p:nvSpPr>
+        <p:spPr/>
+        <p:txBody>
+          <a:bodyPr/>
+          <a:lstStyle/>
+          <a:p>
+            <a:r>
+              <a:rPr lang="en-US" dirty="0"/>
+              <a:t>Reinforcement learning</a:t>
+            </a:r>
+          </a:p>
+        </p:txBody>
+      </p:sp>
+      <p:sp>
+        <p:nvSpPr>
+          <p:cNvPr id="3" name="Espace réservé du texte 2">
+            <a:extLst>
+              <a:ext uri="{FF2B5EF4-FFF2-40B4-BE49-F238E27FC236}">
+                <a16:creationId xmlns:a16="http://schemas.microsoft.com/office/drawing/2014/main" id="{ADB2DD4C-65CD-47DD-AF86-CBFD75ABACB5}"/>
+              </a:ext>
+            </a:extLst>
+          </p:cNvPr>
+          <p:cNvSpPr>
+            <a:spLocks noGrp="1"/>
+          </p:cNvSpPr>
+          <p:nvPr>
+            <p:ph type="body" sz="quarter" idx="10"/>
+          </p:nvPr>
+        </p:nvSpPr>
+        <p:spPr/>
+        <p:txBody>
+          <a:bodyPr/>
+          <a:lstStyle/>
+          <a:p>
+            <a:r>
+              <a:rPr lang="en-US" dirty="0"/>
+              <a:t>Similar to ML, but not exactly</a:t>
+            </a:r>
+          </a:p>
+          <a:p>
+            <a:pPr lvl="1"/>
+            <a:r>
+              <a:rPr lang="en-US" dirty="0"/>
+              <a:t>No value associated to a single decision</a:t>
+            </a:r>
+          </a:p>
+          <a:p>
+            <a:pPr lvl="1"/>
+            <a:r>
+              <a:rPr lang="en-US" dirty="0"/>
+              <a:t>Reward is consequence of a </a:t>
+            </a:r>
+            <a:r>
+              <a:rPr lang="en-US" i="1" dirty="0"/>
+              <a:t>series</a:t>
+            </a:r>
+            <a:r>
+              <a:rPr lang="en-US" dirty="0"/>
+              <a:t> of decisions</a:t>
+            </a:r>
+          </a:p>
+          <a:p>
+            <a:pPr lvl="1"/>
+            <a:r>
+              <a:rPr lang="en-US" dirty="0"/>
+              <a:t>Example: chess game; is trading a Queen for a Knight good? Well, it depends on the board state</a:t>
+            </a:r>
+          </a:p>
+          <a:p>
+            <a:pPr lvl="1"/>
+            <a:endParaRPr lang="en-US" dirty="0"/>
+          </a:p>
+        </p:txBody>
+      </p:sp>
+    </p:spTree>
+    <p:extLst>
+      <p:ext uri="{BB962C8B-B14F-4D97-AF65-F5344CB8AC3E}">
+        <p14:creationId xmlns:p14="http://schemas.microsoft.com/office/powerpoint/2010/main" val="1214248259"/>
+      </p:ext>
+    </p:extLst>
+  </p:cSld>
+  <p:clrMapOvr>
+    <a:masterClrMapping/>
+  </p:clrMapOvr>
+</p:sld>
+</file>
+
+<file path=ppt/slides/slide17.xml><?xml version="1.0" encoding="utf-8"?>
+<p:sld xmlns:a="http://schemas.openxmlformats.org/drawingml/2006/main" xmlns:r="http://schemas.openxmlformats.org/officeDocument/2006/relationships" xmlns:p="http://schemas.openxmlformats.org/presentationml/2006/main">
+  <p:cSld>
+    <p:spTree>
+      <p:nvGrpSpPr>
+        <p:cNvPr id="1" name=""/>
+        <p:cNvGrpSpPr/>
+        <p:nvPr/>
+      </p:nvGrpSpPr>
+      <p:grpSpPr>
+        <a:xfrm>
+          <a:off x="0" y="0"/>
+          <a:ext cx="0" cy="0"/>
+          <a:chOff x="0" y="0"/>
+          <a:chExt cx="0" cy="0"/>
+        </a:xfrm>
+      </p:grpSpPr>
+      <p:sp>
+        <p:nvSpPr>
+          <p:cNvPr id="2" name="Titre 1">
+            <a:extLst>
+              <a:ext uri="{FF2B5EF4-FFF2-40B4-BE49-F238E27FC236}">
+                <a16:creationId xmlns:a16="http://schemas.microsoft.com/office/drawing/2014/main" id="{40A95C8A-6E61-4586-AE10-B5D51600B4B0}"/>
+              </a:ext>
+            </a:extLst>
+          </p:cNvPr>
+          <p:cNvSpPr>
+            <a:spLocks noGrp="1"/>
+          </p:cNvSpPr>
+          <p:nvPr>
+            <p:ph type="title"/>
+          </p:nvPr>
+        </p:nvSpPr>
+        <p:spPr/>
+        <p:txBody>
+          <a:bodyPr/>
+          <a:lstStyle/>
+          <a:p>
+            <a:r>
+              <a:rPr lang="en-US" dirty="0"/>
+              <a:t>Neuro-symbolic AI</a:t>
+            </a:r>
+          </a:p>
+        </p:txBody>
+      </p:sp>
+      <p:sp>
+        <p:nvSpPr>
+          <p:cNvPr id="3" name="Espace réservé du texte 2">
+            <a:extLst>
+              <a:ext uri="{FF2B5EF4-FFF2-40B4-BE49-F238E27FC236}">
+                <a16:creationId xmlns:a16="http://schemas.microsoft.com/office/drawing/2014/main" id="{DD173D4B-1221-4D29-96A0-68CF7052176D}"/>
+              </a:ext>
+            </a:extLst>
+          </p:cNvPr>
+          <p:cNvSpPr>
+            <a:spLocks noGrp="1"/>
+          </p:cNvSpPr>
+          <p:nvPr>
+            <p:ph type="body" sz="quarter" idx="10"/>
+          </p:nvPr>
+        </p:nvSpPr>
+        <p:spPr/>
+        <p:txBody>
+          <a:bodyPr/>
+          <a:lstStyle/>
+          <a:p>
+            <a:r>
+              <a:rPr lang="en-US" dirty="0"/>
+              <a:t>Might look complex, but the general idea is intuitive</a:t>
+            </a:r>
+          </a:p>
+          <a:p>
+            <a:pPr lvl="1"/>
+            <a:r>
+              <a:rPr lang="en-US" dirty="0"/>
+              <a:t>Use neural/ML approach to map from data to symbols</a:t>
+            </a:r>
+          </a:p>
+          <a:p>
+            <a:pPr lvl="1"/>
+            <a:r>
+              <a:rPr lang="en-US" dirty="0"/>
+              <a:t>Use symbolic AI to reason on symbols</a:t>
+            </a:r>
+          </a:p>
+          <a:p>
+            <a:pPr lvl="1"/>
+            <a:r>
+              <a:rPr lang="en-US" dirty="0"/>
+              <a:t>(possibly) Go back to data using another neural/ML approach</a:t>
+            </a:r>
+          </a:p>
+          <a:p>
+            <a:r>
+              <a:rPr lang="en-US" dirty="0"/>
+              <a:t>Interestingly, some of the biggest ML successes are </a:t>
+            </a:r>
+            <a:r>
+              <a:rPr lang="en-US" dirty="0" err="1"/>
+              <a:t>NeSy</a:t>
+            </a:r>
+            <a:endParaRPr lang="en-US" dirty="0"/>
+          </a:p>
+          <a:p>
+            <a:pPr lvl="1"/>
+            <a:r>
+              <a:rPr lang="en-US" dirty="0"/>
+              <a:t>AlphaGo uses a mix of symbolic </a:t>
+            </a:r>
+          </a:p>
+        </p:txBody>
+      </p:sp>
+    </p:spTree>
+    <p:extLst>
+      <p:ext uri="{BB962C8B-B14F-4D97-AF65-F5344CB8AC3E}">
+        <p14:creationId xmlns:p14="http://schemas.microsoft.com/office/powerpoint/2010/main" val="3820875688"/>
+      </p:ext>
+    </p:extLst>
+  </p:cSld>
+  <p:clrMapOvr>
+    <a:masterClrMapping/>
+  </p:clrMapOvr>
+</p:sld>
+</file>
+
+<file path=ppt/slides/slide18.xml><?xml version="1.0" encoding="utf-8"?>
+<p:sld xmlns:a="http://schemas.openxmlformats.org/drawingml/2006/main" xmlns:r="http://schemas.openxmlformats.org/officeDocument/2006/relationships" xmlns:p="http://schemas.openxmlformats.org/presentationml/2006/main">
+  <p:cSld>
+    <p:spTree>
+      <p:nvGrpSpPr>
+        <p:cNvPr id="1" name=""/>
+        <p:cNvGrpSpPr/>
+        <p:nvPr/>
+      </p:nvGrpSpPr>
+      <p:grpSpPr>
+        <a:xfrm>
+          <a:off x="0" y="0"/>
+          <a:ext cx="0" cy="0"/>
+          <a:chOff x="0" y="0"/>
+          <a:chExt cx="0" cy="0"/>
+        </a:xfrm>
+      </p:grpSpPr>
+      <p:sp>
+        <p:nvSpPr>
+          <p:cNvPr id="2" name="Titre 1">
+            <a:extLst>
+              <a:ext uri="{FF2B5EF4-FFF2-40B4-BE49-F238E27FC236}">
+                <a16:creationId xmlns:a16="http://schemas.microsoft.com/office/drawing/2014/main" id="{B707CEDE-7FA4-4ED4-93BB-5C912FFFA40A}"/>
+              </a:ext>
+            </a:extLst>
+          </p:cNvPr>
+          <p:cNvSpPr>
+            <a:spLocks noGrp="1"/>
+          </p:cNvSpPr>
+          <p:nvPr>
+            <p:ph type="title"/>
+          </p:nvPr>
+        </p:nvSpPr>
+        <p:spPr/>
+        <p:txBody>
+          <a:bodyPr/>
+          <a:lstStyle/>
+          <a:p>
+            <a:r>
+              <a:rPr lang="en-US" dirty="0"/>
+              <a:t>Artificial General Intelligence</a:t>
+            </a:r>
+          </a:p>
+        </p:txBody>
+      </p:sp>
+      <p:sp>
+        <p:nvSpPr>
+          <p:cNvPr id="3" name="Espace réservé du texte 2">
+            <a:extLst>
+              <a:ext uri="{FF2B5EF4-FFF2-40B4-BE49-F238E27FC236}">
+                <a16:creationId xmlns:a16="http://schemas.microsoft.com/office/drawing/2014/main" id="{E159C557-5AEC-4E1D-8D18-CDB966C95939}"/>
+              </a:ext>
+            </a:extLst>
+          </p:cNvPr>
+          <p:cNvSpPr>
+            <a:spLocks noGrp="1"/>
+          </p:cNvSpPr>
+          <p:nvPr>
+            <p:ph type="body" sz="quarter" idx="10"/>
+          </p:nvPr>
+        </p:nvSpPr>
+        <p:spPr/>
+        <p:txBody>
+          <a:bodyPr/>
+          <a:lstStyle/>
+          <a:p>
+            <a:r>
+              <a:rPr lang="en-US" dirty="0"/>
+              <a:t>Hypothetical artificial intelligent agent</a:t>
+            </a:r>
+          </a:p>
+          <a:p>
+            <a:pPr lvl="1"/>
+            <a:r>
+              <a:rPr lang="en-US" dirty="0"/>
+              <a:t>“It can learn (rapidly and cheaply) to perform any task that a human or another animal could perform, with minimal amounts of errors”</a:t>
+            </a:r>
+          </a:p>
+          <a:p>
+            <a:pPr lvl="1"/>
+            <a:r>
+              <a:rPr lang="en-US" dirty="0"/>
+              <a:t>It does not exist</a:t>
+            </a:r>
+          </a:p>
+        </p:txBody>
+      </p:sp>
+    </p:spTree>
+    <p:extLst>
+      <p:ext uri="{BB962C8B-B14F-4D97-AF65-F5344CB8AC3E}">
+        <p14:creationId xmlns:p14="http://schemas.microsoft.com/office/powerpoint/2010/main" val="2533195174"/>
+      </p:ext>
+    </p:extLst>
+  </p:cSld>
+  <p:clrMapOvr>
+    <a:masterClrMapping/>
+  </p:clrMapOvr>
+</p:sld>
+</file>
+
+<file path=ppt/slides/slide19.xml><?xml version="1.0" encoding="utf-8"?>
+<p:sld xmlns:a="http://schemas.openxmlformats.org/drawingml/2006/main" xmlns:r="http://schemas.openxmlformats.org/officeDocument/2006/relationships" xmlns:p="http://schemas.openxmlformats.org/presentationml/2006/main">
+  <p:cSld>
+    <p:spTree>
+      <p:nvGrpSpPr>
+        <p:cNvPr id="1" name=""/>
+        <p:cNvGrpSpPr/>
+        <p:nvPr/>
+      </p:nvGrpSpPr>
+      <p:grpSpPr>
+        <a:xfrm>
+          <a:off x="0" y="0"/>
+          <a:ext cx="0" cy="0"/>
+          <a:chOff x="0" y="0"/>
+          <a:chExt cx="0" cy="0"/>
+        </a:xfrm>
+      </p:grpSpPr>
+      <p:sp>
+        <p:nvSpPr>
+          <p:cNvPr id="2" name="Titre 1">
+            <a:extLst>
+              <a:ext uri="{FF2B5EF4-FFF2-40B4-BE49-F238E27FC236}">
+                <a16:creationId xmlns:a16="http://schemas.microsoft.com/office/drawing/2014/main" id="{276AB8AB-556E-4BAF-A232-9DAA8149E817}"/>
+              </a:ext>
+            </a:extLst>
+          </p:cNvPr>
+          <p:cNvSpPr>
+            <a:spLocks noGrp="1"/>
+          </p:cNvSpPr>
+          <p:nvPr>
+            <p:ph type="title"/>
+          </p:nvPr>
+        </p:nvSpPr>
+        <p:spPr/>
+        <p:txBody>
+          <a:bodyPr/>
+          <a:lstStyle/>
+          <a:p>
+            <a:r>
+              <a:rPr lang="en-US" dirty="0"/>
+              <a:t>Is optimization a kind of AI?</a:t>
+            </a:r>
+          </a:p>
+        </p:txBody>
+      </p:sp>
+      <p:sp>
+        <p:nvSpPr>
+          <p:cNvPr id="3" name="Espace réservé du texte 2">
+            <a:extLst>
+              <a:ext uri="{FF2B5EF4-FFF2-40B4-BE49-F238E27FC236}">
+                <a16:creationId xmlns:a16="http://schemas.microsoft.com/office/drawing/2014/main" id="{CAB251DF-4F3B-449B-8038-5CBB1B85649E}"/>
+              </a:ext>
+            </a:extLst>
+          </p:cNvPr>
+          <p:cNvSpPr>
+            <a:spLocks noGrp="1"/>
+          </p:cNvSpPr>
+          <p:nvPr>
+            <p:ph type="body" sz="quarter" idx="10"/>
+          </p:nvPr>
+        </p:nvSpPr>
+        <p:spPr/>
+        <p:txBody>
+          <a:bodyPr/>
+          <a:lstStyle/>
+          <a:p>
+            <a:r>
+              <a:rPr lang="en-US" dirty="0"/>
+              <a:t>Debatable, some experts would say “yes”</a:t>
+            </a:r>
+          </a:p>
+          <a:p>
+            <a:r>
+              <a:rPr lang="en-US" dirty="0"/>
+              <a:t>My opinion: optimization is the </a:t>
+            </a:r>
+            <a:r>
+              <a:rPr lang="en-US" b="1" dirty="0"/>
+              <a:t>engine</a:t>
+            </a:r>
+            <a:r>
+              <a:rPr lang="en-US" dirty="0"/>
+              <a:t> of AI</a:t>
+            </a:r>
+          </a:p>
+        </p:txBody>
+      </p:sp>
+      <p:pic>
+        <p:nvPicPr>
+          <p:cNvPr id="1026" name="Picture 2" descr="15 Beast Photos Of Muscle Cars With Oversized Engines">
+            <a:extLst>
+              <a:ext uri="{FF2B5EF4-FFF2-40B4-BE49-F238E27FC236}">
+                <a16:creationId xmlns:a16="http://schemas.microsoft.com/office/drawing/2014/main" id="{D4A1D447-8214-4ECF-A252-F7A5198A864D}"/>
+              </a:ext>
+            </a:extLst>
+          </p:cNvPr>
+          <p:cNvPicPr>
+            <a:picLocks noChangeAspect="1" noChangeArrowheads="1"/>
+          </p:cNvPicPr>
+          <p:nvPr/>
+        </p:nvPicPr>
+        <p:blipFill>
+          <a:blip r:embed="rId2" cstate="print">
+            <a:extLst>
+              <a:ext uri="{28A0092B-C50C-407E-A947-70E740481C1C}">
+                <a14:useLocalDpi xmlns:a14="http://schemas.microsoft.com/office/drawing/2010/main" val="0"/>
+              </a:ext>
+            </a:extLst>
+          </a:blip>
+          <a:srcRect/>
+          <a:stretch>
+            <a:fillRect/>
+          </a:stretch>
+        </p:blipFill>
+        <p:spPr bwMode="auto">
+          <a:xfrm>
+            <a:off x="5854045" y="3221113"/>
+            <a:ext cx="5499755" cy="2878062"/>
+          </a:xfrm>
+          <a:prstGeom prst="rect">
+            <a:avLst/>
+          </a:prstGeom>
+          <a:noFill/>
+          <a:extLst>
+            <a:ext uri="{909E8E84-426E-40DD-AFC4-6F175D3DCCD1}">
+              <a14:hiddenFill xmlns:a14="http://schemas.microsoft.com/office/drawing/2010/main">
+                <a:solidFill>
+                  <a:srgbClr val="FFFFFF"/>
+                </a:solidFill>
+              </a14:hiddenFill>
+            </a:ext>
+          </a:extLst>
+        </p:spPr>
+      </p:pic>
+    </p:spTree>
+    <p:extLst>
+      <p:ext uri="{BB962C8B-B14F-4D97-AF65-F5344CB8AC3E}">
+        <p14:creationId xmlns:p14="http://schemas.microsoft.com/office/powerpoint/2010/main" val="1312803982"/>
       </p:ext>
     </p:extLst>
   </p:cSld>
@@ -2614,7 +4025,7 @@
           <a:p>
             <a:r>
               <a:rPr lang="it-IT" dirty="0"/>
-              <a:t>Is optimization a type of Artificial Intelligence?</a:t>
+              <a:t>Is optimization a kind of Artificial Intelligence?</a:t>
             </a:r>
           </a:p>
           <a:p>
@@ -2652,6 +4063,523 @@
     <p:extLst>
       <p:ext uri="{BB962C8B-B14F-4D97-AF65-F5344CB8AC3E}">
         <p14:creationId xmlns:p14="http://schemas.microsoft.com/office/powerpoint/2010/main" val="454349701"/>
+      </p:ext>
+    </p:extLst>
+  </p:cSld>
+  <p:clrMapOvr>
+    <a:masterClrMapping/>
+  </p:clrMapOvr>
+</p:sld>
+</file>
+
+<file path=ppt/slides/slide20.xml><?xml version="1.0" encoding="utf-8"?>
+<p:sld xmlns:a="http://schemas.openxmlformats.org/drawingml/2006/main" xmlns:r="http://schemas.openxmlformats.org/officeDocument/2006/relationships" xmlns:p="http://schemas.openxmlformats.org/presentationml/2006/main">
+  <p:cSld>
+    <p:spTree>
+      <p:nvGrpSpPr>
+        <p:cNvPr id="1" name=""/>
+        <p:cNvGrpSpPr/>
+        <p:nvPr/>
+      </p:nvGrpSpPr>
+      <p:grpSpPr>
+        <a:xfrm>
+          <a:off x="0" y="0"/>
+          <a:ext cx="0" cy="0"/>
+          <a:chOff x="0" y="0"/>
+          <a:chExt cx="0" cy="0"/>
+        </a:xfrm>
+      </p:grpSpPr>
+      <p:sp>
+        <p:nvSpPr>
+          <p:cNvPr id="2" name="Titre 1">
+            <a:extLst>
+              <a:ext uri="{FF2B5EF4-FFF2-40B4-BE49-F238E27FC236}">
+                <a16:creationId xmlns:a16="http://schemas.microsoft.com/office/drawing/2014/main" id="{ECECB326-6D55-4011-BF4F-AD05E1FB780C}"/>
+              </a:ext>
+            </a:extLst>
+          </p:cNvPr>
+          <p:cNvSpPr>
+            <a:spLocks noGrp="1"/>
+          </p:cNvSpPr>
+          <p:nvPr>
+            <p:ph type="title"/>
+          </p:nvPr>
+        </p:nvSpPr>
+        <p:spPr/>
+        <p:txBody>
+          <a:bodyPr>
+            <a:normAutofit/>
+          </a:bodyPr>
+          <a:lstStyle/>
+          <a:p>
+            <a:r>
+              <a:rPr lang="it-IT" dirty="0"/>
+              <a:t>Relationship between AI and optimization?</a:t>
+            </a:r>
+          </a:p>
+        </p:txBody>
+      </p:sp>
+      <p:sp>
+        <p:nvSpPr>
+          <p:cNvPr id="3" name="Espace réservé du texte 2">
+            <a:extLst>
+              <a:ext uri="{FF2B5EF4-FFF2-40B4-BE49-F238E27FC236}">
+                <a16:creationId xmlns:a16="http://schemas.microsoft.com/office/drawing/2014/main" id="{2B8B208A-023A-4A17-A5C6-0D8B4915411E}"/>
+              </a:ext>
+            </a:extLst>
+          </p:cNvPr>
+          <p:cNvSpPr>
+            <a:spLocks noGrp="1"/>
+          </p:cNvSpPr>
+          <p:nvPr>
+            <p:ph type="body" sz="quarter" idx="10"/>
+          </p:nvPr>
+        </p:nvSpPr>
+        <p:spPr/>
+        <p:txBody>
+          <a:bodyPr/>
+          <a:lstStyle/>
+          <a:p>
+            <a:r>
+              <a:rPr lang="en-US" dirty="0"/>
+              <a:t>Most “Intelligence” requires making </a:t>
+            </a:r>
+            <a:r>
+              <a:rPr lang="en-US" u="sng" dirty="0"/>
+              <a:t>good choices</a:t>
+            </a:r>
+          </a:p>
+          <a:p>
+            <a:pPr lvl="1"/>
+            <a:r>
+              <a:rPr lang="en-US" dirty="0"/>
+              <a:t>Predict the next value in a time series, as precisely as possible</a:t>
+            </a:r>
+          </a:p>
+          <a:p>
+            <a:pPr lvl="1"/>
+            <a:r>
+              <a:rPr lang="en-US" dirty="0"/>
+              <a:t>Correctly identify the human poses in a video</a:t>
+            </a:r>
+          </a:p>
+          <a:p>
+            <a:pPr lvl="1"/>
+            <a:r>
+              <a:rPr lang="en-US" dirty="0"/>
+              <a:t>Make the best possible chess move, given the situation</a:t>
+            </a:r>
+          </a:p>
+          <a:p>
+            <a:pPr lvl="1"/>
+            <a:r>
+              <a:rPr lang="en-US" dirty="0"/>
+              <a:t>Maximize your score in Super Mario</a:t>
+            </a:r>
+          </a:p>
+          <a:p>
+            <a:pPr lvl="1"/>
+            <a:r>
+              <a:rPr lang="en-US" dirty="0"/>
+              <a:t>Generate a sequence of words that best follows the input</a:t>
+            </a:r>
+          </a:p>
+          <a:p>
+            <a:pPr lvl="1"/>
+            <a:r>
+              <a:rPr lang="en-US" dirty="0"/>
+              <a:t>Create the painting that best corresponds to a written prompt</a:t>
+            </a:r>
+          </a:p>
+          <a:p>
+            <a:pPr lvl="1"/>
+            <a:endParaRPr lang="en-US" dirty="0"/>
+          </a:p>
+          <a:p>
+            <a:pPr lvl="1"/>
+            <a:endParaRPr lang="en-US" dirty="0"/>
+          </a:p>
+        </p:txBody>
+      </p:sp>
+    </p:spTree>
+    <p:extLst>
+      <p:ext uri="{BB962C8B-B14F-4D97-AF65-F5344CB8AC3E}">
+        <p14:creationId xmlns:p14="http://schemas.microsoft.com/office/powerpoint/2010/main" val="1571733551"/>
+      </p:ext>
+    </p:extLst>
+  </p:cSld>
+  <p:clrMapOvr>
+    <a:masterClrMapping/>
+  </p:clrMapOvr>
+</p:sld>
+</file>
+
+<file path=ppt/slides/slide21.xml><?xml version="1.0" encoding="utf-8"?>
+<p:sld xmlns:a="http://schemas.openxmlformats.org/drawingml/2006/main" xmlns:r="http://schemas.openxmlformats.org/officeDocument/2006/relationships" xmlns:p="http://schemas.openxmlformats.org/presentationml/2006/main">
+  <p:cSld>
+    <p:spTree>
+      <p:nvGrpSpPr>
+        <p:cNvPr id="1" name=""/>
+        <p:cNvGrpSpPr/>
+        <p:nvPr/>
+      </p:nvGrpSpPr>
+      <p:grpSpPr>
+        <a:xfrm>
+          <a:off x="0" y="0"/>
+          <a:ext cx="0" cy="0"/>
+          <a:chOff x="0" y="0"/>
+          <a:chExt cx="0" cy="0"/>
+        </a:xfrm>
+      </p:grpSpPr>
+      <p:sp>
+        <p:nvSpPr>
+          <p:cNvPr id="2" name="Titre 1">
+            <a:extLst>
+              <a:ext uri="{FF2B5EF4-FFF2-40B4-BE49-F238E27FC236}">
+                <a16:creationId xmlns:a16="http://schemas.microsoft.com/office/drawing/2014/main" id="{ECECB326-6D55-4011-BF4F-AD05E1FB780C}"/>
+              </a:ext>
+            </a:extLst>
+          </p:cNvPr>
+          <p:cNvSpPr>
+            <a:spLocks noGrp="1"/>
+          </p:cNvSpPr>
+          <p:nvPr>
+            <p:ph type="title"/>
+          </p:nvPr>
+        </p:nvSpPr>
+        <p:spPr/>
+        <p:txBody>
+          <a:bodyPr>
+            <a:normAutofit/>
+          </a:bodyPr>
+          <a:lstStyle/>
+          <a:p>
+            <a:r>
+              <a:rPr lang="it-IT" dirty="0"/>
+              <a:t>Relationship between AI and optimization?</a:t>
+            </a:r>
+          </a:p>
+        </p:txBody>
+      </p:sp>
+      <p:sp>
+        <p:nvSpPr>
+          <p:cNvPr id="3" name="Espace réservé du texte 2">
+            <a:extLst>
+              <a:ext uri="{FF2B5EF4-FFF2-40B4-BE49-F238E27FC236}">
+                <a16:creationId xmlns:a16="http://schemas.microsoft.com/office/drawing/2014/main" id="{2B8B208A-023A-4A17-A5C6-0D8B4915411E}"/>
+              </a:ext>
+            </a:extLst>
+          </p:cNvPr>
+          <p:cNvSpPr>
+            <a:spLocks noGrp="1"/>
+          </p:cNvSpPr>
+          <p:nvPr>
+            <p:ph type="body" sz="quarter" idx="10"/>
+          </p:nvPr>
+        </p:nvSpPr>
+        <p:spPr/>
+        <p:txBody>
+          <a:bodyPr/>
+          <a:lstStyle/>
+          <a:p>
+            <a:r>
+              <a:rPr lang="en-US" dirty="0"/>
+              <a:t>Most “Intelligence” requires making </a:t>
+            </a:r>
+            <a:r>
+              <a:rPr lang="en-US" u="sng" dirty="0"/>
+              <a:t>good choices</a:t>
+            </a:r>
+          </a:p>
+          <a:p>
+            <a:pPr lvl="1"/>
+            <a:r>
+              <a:rPr lang="en-US" dirty="0"/>
+              <a:t>Predict the next value in a time series, </a:t>
+            </a:r>
+            <a:r>
+              <a:rPr lang="en-US" b="1" dirty="0"/>
+              <a:t>as precisely as possible</a:t>
+            </a:r>
+          </a:p>
+          <a:p>
+            <a:pPr lvl="1"/>
+            <a:r>
+              <a:rPr lang="en-US" b="1" dirty="0"/>
+              <a:t>Correctly</a:t>
+            </a:r>
+            <a:r>
+              <a:rPr lang="en-US" dirty="0"/>
+              <a:t> identify the human poses in a video</a:t>
+            </a:r>
+          </a:p>
+          <a:p>
+            <a:pPr lvl="1"/>
+            <a:r>
+              <a:rPr lang="en-US" dirty="0"/>
+              <a:t>Make the </a:t>
+            </a:r>
+            <a:r>
+              <a:rPr lang="en-US" b="1" dirty="0"/>
+              <a:t>best possible</a:t>
+            </a:r>
+            <a:r>
+              <a:rPr lang="en-US" dirty="0"/>
+              <a:t> chess move, given the situation</a:t>
+            </a:r>
+          </a:p>
+          <a:p>
+            <a:pPr lvl="1"/>
+            <a:r>
+              <a:rPr lang="en-US" b="1" dirty="0"/>
+              <a:t>Maximize</a:t>
+            </a:r>
+            <a:r>
+              <a:rPr lang="en-US" dirty="0"/>
+              <a:t> your score in Super Mario</a:t>
+            </a:r>
+          </a:p>
+          <a:p>
+            <a:pPr lvl="1"/>
+            <a:r>
+              <a:rPr lang="en-US" dirty="0"/>
+              <a:t>Generate a sequence of words that </a:t>
+            </a:r>
+            <a:r>
+              <a:rPr lang="en-US" b="1" dirty="0"/>
+              <a:t>best follows the input</a:t>
+            </a:r>
+          </a:p>
+          <a:p>
+            <a:pPr lvl="1"/>
+            <a:r>
+              <a:rPr lang="en-US" dirty="0"/>
+              <a:t>Create the painting that </a:t>
+            </a:r>
+            <a:r>
+              <a:rPr lang="en-US" b="1" dirty="0"/>
+              <a:t>best corresponds</a:t>
+            </a:r>
+            <a:r>
+              <a:rPr lang="en-US" dirty="0"/>
+              <a:t> to a written prompt</a:t>
+            </a:r>
+          </a:p>
+          <a:p>
+            <a:pPr lvl="1"/>
+            <a:endParaRPr lang="en-US" dirty="0"/>
+          </a:p>
+          <a:p>
+            <a:pPr lvl="1"/>
+            <a:endParaRPr lang="en-US" dirty="0"/>
+          </a:p>
+        </p:txBody>
+      </p:sp>
+    </p:spTree>
+    <p:extLst>
+      <p:ext uri="{BB962C8B-B14F-4D97-AF65-F5344CB8AC3E}">
+        <p14:creationId xmlns:p14="http://schemas.microsoft.com/office/powerpoint/2010/main" val="2060198537"/>
+      </p:ext>
+    </p:extLst>
+  </p:cSld>
+  <p:clrMapOvr>
+    <a:masterClrMapping/>
+  </p:clrMapOvr>
+</p:sld>
+</file>
+
+<file path=ppt/slides/slide22.xml><?xml version="1.0" encoding="utf-8"?>
+<p:sld xmlns:a="http://schemas.openxmlformats.org/drawingml/2006/main" xmlns:r="http://schemas.openxmlformats.org/officeDocument/2006/relationships" xmlns:p="http://schemas.openxmlformats.org/presentationml/2006/main">
+  <p:cSld>
+    <p:spTree>
+      <p:nvGrpSpPr>
+        <p:cNvPr id="1" name=""/>
+        <p:cNvGrpSpPr/>
+        <p:nvPr/>
+      </p:nvGrpSpPr>
+      <p:grpSpPr>
+        <a:xfrm>
+          <a:off x="0" y="0"/>
+          <a:ext cx="0" cy="0"/>
+          <a:chOff x="0" y="0"/>
+          <a:chExt cx="0" cy="0"/>
+        </a:xfrm>
+      </p:grpSpPr>
+      <p:sp>
+        <p:nvSpPr>
+          <p:cNvPr id="2" name="Titre 1">
+            <a:extLst>
+              <a:ext uri="{FF2B5EF4-FFF2-40B4-BE49-F238E27FC236}">
+                <a16:creationId xmlns:a16="http://schemas.microsoft.com/office/drawing/2014/main" id="{0AD7C835-BCBB-4CDE-A4B9-CBD6867DA959}"/>
+              </a:ext>
+            </a:extLst>
+          </p:cNvPr>
+          <p:cNvSpPr>
+            <a:spLocks noGrp="1"/>
+          </p:cNvSpPr>
+          <p:nvPr>
+            <p:ph type="title"/>
+          </p:nvPr>
+        </p:nvSpPr>
+        <p:spPr/>
+        <p:txBody>
+          <a:bodyPr/>
+          <a:lstStyle/>
+          <a:p>
+            <a:r>
+              <a:rPr lang="en-US" dirty="0"/>
+              <a:t>Relationship between AI and optimization?</a:t>
+            </a:r>
+          </a:p>
+        </p:txBody>
+      </p:sp>
+      <p:sp>
+        <p:nvSpPr>
+          <p:cNvPr id="3" name="Espace réservé du texte 2">
+            <a:extLst>
+              <a:ext uri="{FF2B5EF4-FFF2-40B4-BE49-F238E27FC236}">
+                <a16:creationId xmlns:a16="http://schemas.microsoft.com/office/drawing/2014/main" id="{3586AAC0-F49F-42BD-B72C-328EDEAC1CF5}"/>
+              </a:ext>
+            </a:extLst>
+          </p:cNvPr>
+          <p:cNvSpPr>
+            <a:spLocks noGrp="1"/>
+          </p:cNvSpPr>
+          <p:nvPr>
+            <p:ph type="body" sz="quarter" idx="10"/>
+          </p:nvPr>
+        </p:nvSpPr>
+        <p:spPr/>
+        <p:txBody>
+          <a:bodyPr/>
+          <a:lstStyle/>
+          <a:p>
+            <a:r>
+              <a:rPr lang="en-US" dirty="0"/>
+              <a:t>AI: from many (many!!!) possible choices, pick the best</a:t>
+            </a:r>
+          </a:p>
+          <a:p>
+            <a:r>
+              <a:rPr lang="en-US" dirty="0"/>
+              <a:t>If you can evaluate your choices, you can optimize</a:t>
+            </a:r>
+          </a:p>
+          <a:p>
+            <a:r>
+              <a:rPr lang="en-US" dirty="0"/>
+              <a:t>(</a:t>
+            </a:r>
+            <a:r>
+              <a:rPr lang="en-US" b="1" dirty="0">
+                <a:solidFill>
+                  <a:srgbClr val="FF0000"/>
+                </a:solidFill>
+              </a:rPr>
+              <a:t>AFAIK</a:t>
+            </a:r>
+            <a:r>
+              <a:rPr lang="en-US" dirty="0"/>
+              <a:t>) </a:t>
+            </a:r>
+            <a:r>
+              <a:rPr lang="en-US" b="1" dirty="0"/>
+              <a:t>All AI systems</a:t>
+            </a:r>
+            <a:r>
+              <a:rPr lang="en-US" dirty="0"/>
+              <a:t> include some type of optimization</a:t>
+            </a:r>
+          </a:p>
+        </p:txBody>
+      </p:sp>
+    </p:spTree>
+    <p:extLst>
+      <p:ext uri="{BB962C8B-B14F-4D97-AF65-F5344CB8AC3E}">
+        <p14:creationId xmlns:p14="http://schemas.microsoft.com/office/powerpoint/2010/main" val="3233463855"/>
+      </p:ext>
+    </p:extLst>
+  </p:cSld>
+  <p:clrMapOvr>
+    <a:masterClrMapping/>
+  </p:clrMapOvr>
+</p:sld>
+</file>
+
+<file path=ppt/slides/slide23.xml><?xml version="1.0" encoding="utf-8"?>
+<p:sld xmlns:a="http://schemas.openxmlformats.org/drawingml/2006/main" xmlns:r="http://schemas.openxmlformats.org/officeDocument/2006/relationships" xmlns:p="http://schemas.openxmlformats.org/presentationml/2006/main">
+  <p:cSld>
+    <p:spTree>
+      <p:nvGrpSpPr>
+        <p:cNvPr id="1" name=""/>
+        <p:cNvGrpSpPr/>
+        <p:nvPr/>
+      </p:nvGrpSpPr>
+      <p:grpSpPr>
+        <a:xfrm>
+          <a:off x="0" y="0"/>
+          <a:ext cx="0" cy="0"/>
+          <a:chOff x="0" y="0"/>
+          <a:chExt cx="0" cy="0"/>
+        </a:xfrm>
+      </p:grpSpPr>
+      <p:sp>
+        <p:nvSpPr>
+          <p:cNvPr id="4" name="Titre 3">
+            <a:extLst>
+              <a:ext uri="{FF2B5EF4-FFF2-40B4-BE49-F238E27FC236}">
+                <a16:creationId xmlns:a16="http://schemas.microsoft.com/office/drawing/2014/main" id="{6BEAEF10-6F05-46A4-8D9E-0BFA69A33914}"/>
+              </a:ext>
+            </a:extLst>
+          </p:cNvPr>
+          <p:cNvSpPr>
+            <a:spLocks noGrp="1"/>
+          </p:cNvSpPr>
+          <p:nvPr>
+            <p:ph type="ctrTitle"/>
+          </p:nvPr>
+        </p:nvSpPr>
+        <p:spPr/>
+        <p:txBody>
+          <a:bodyPr/>
+          <a:lstStyle/>
+          <a:p>
+            <a:r>
+              <a:rPr lang="en-US" dirty="0"/>
+              <a:t>Questions?</a:t>
+            </a:r>
+          </a:p>
+        </p:txBody>
+      </p:sp>
+      <p:sp>
+        <p:nvSpPr>
+          <p:cNvPr id="5" name="Sous-titre 4">
+            <a:extLst>
+              <a:ext uri="{FF2B5EF4-FFF2-40B4-BE49-F238E27FC236}">
+                <a16:creationId xmlns:a16="http://schemas.microsoft.com/office/drawing/2014/main" id="{55A84D86-426F-472B-B50C-533D94D44711}"/>
+              </a:ext>
+            </a:extLst>
+          </p:cNvPr>
+          <p:cNvSpPr>
+            <a:spLocks noGrp="1"/>
+          </p:cNvSpPr>
+          <p:nvPr>
+            <p:ph type="subTitle" idx="1"/>
+          </p:nvPr>
+        </p:nvSpPr>
+        <p:spPr/>
+        <p:txBody>
+          <a:bodyPr/>
+          <a:lstStyle/>
+          <a:p>
+            <a:endParaRPr lang="en-US"/>
+          </a:p>
+        </p:txBody>
+      </p:sp>
+    </p:spTree>
+    <p:extLst>
+      <p:ext uri="{BB962C8B-B14F-4D97-AF65-F5344CB8AC3E}">
+        <p14:creationId xmlns:p14="http://schemas.microsoft.com/office/powerpoint/2010/main" val="2539717365"/>
       </p:ext>
     </p:extLst>
   </p:cSld>
@@ -2766,7 +4694,7 @@
             <a:pPr lvl="1"/>
             <a:r>
               <a:rPr lang="it-IT" dirty="0"/>
-              <a:t>What kind of technique is more appriopriate to different kinds of problems</a:t>
+              <a:t>What techniques are more appriopriate for different problems</a:t>
             </a:r>
           </a:p>
           <a:p>
@@ -2780,7 +4708,14 @@
             <a:pPr lvl="1"/>
             <a:r>
               <a:rPr lang="it-IT" dirty="0"/>
-              <a:t>How to perform hyperparameter optimization for your AI applications</a:t>
+              <a:t>Hyperparameter optimization for your AI applications</a:t>
+            </a:r>
+          </a:p>
+          <a:p>
+            <a:pPr lvl="1"/>
+            <a:r>
+              <a:rPr lang="it-IT" dirty="0"/>
+              <a:t>Keywords to perform further research (e.g. Neuro-symbolic, AutoML)</a:t>
             </a:r>
           </a:p>
           <a:p>
@@ -2802,6 +4737,238 @@
 </file>
 
 <file path=ppt/slides/slide4.xml><?xml version="1.0" encoding="utf-8"?>
+<p:sld xmlns:a="http://schemas.openxmlformats.org/drawingml/2006/main" xmlns:r="http://schemas.openxmlformats.org/officeDocument/2006/relationships" xmlns:p="http://schemas.openxmlformats.org/presentationml/2006/main">
+  <p:cSld>
+    <p:spTree>
+      <p:nvGrpSpPr>
+        <p:cNvPr id="1" name=""/>
+        <p:cNvGrpSpPr/>
+        <p:nvPr/>
+      </p:nvGrpSpPr>
+      <p:grpSpPr>
+        <a:xfrm>
+          <a:off x="0" y="0"/>
+          <a:ext cx="0" cy="0"/>
+          <a:chOff x="0" y="0"/>
+          <a:chExt cx="0" cy="0"/>
+        </a:xfrm>
+      </p:grpSpPr>
+      <p:sp>
+        <p:nvSpPr>
+          <p:cNvPr id="2" name="Titre 1">
+            <a:extLst>
+              <a:ext uri="{FF2B5EF4-FFF2-40B4-BE49-F238E27FC236}">
+                <a16:creationId xmlns:a16="http://schemas.microsoft.com/office/drawing/2014/main" id="{5FC4A858-CA64-44B1-922B-4F94EAD12CCB}"/>
+              </a:ext>
+            </a:extLst>
+          </p:cNvPr>
+          <p:cNvSpPr>
+            <a:spLocks noGrp="1"/>
+          </p:cNvSpPr>
+          <p:nvPr>
+            <p:ph type="title"/>
+          </p:nvPr>
+        </p:nvSpPr>
+        <p:spPr/>
+        <p:txBody>
+          <a:bodyPr/>
+          <a:lstStyle/>
+          <a:p>
+            <a:r>
+              <a:rPr lang="it-IT" dirty="0"/>
+              <a:t>What is this class about?</a:t>
+            </a:r>
+            <a:endParaRPr lang="en-US" dirty="0"/>
+          </a:p>
+        </p:txBody>
+      </p:sp>
+      <p:sp>
+        <p:nvSpPr>
+          <p:cNvPr id="3" name="Espace réservé du texte 2">
+            <a:extLst>
+              <a:ext uri="{FF2B5EF4-FFF2-40B4-BE49-F238E27FC236}">
+                <a16:creationId xmlns:a16="http://schemas.microsoft.com/office/drawing/2014/main" id="{BB5606FD-04C9-4630-A9A9-4BAC26946C2C}"/>
+              </a:ext>
+            </a:extLst>
+          </p:cNvPr>
+          <p:cNvSpPr>
+            <a:spLocks noGrp="1"/>
+          </p:cNvSpPr>
+          <p:nvPr>
+            <p:ph type="body" sz="quarter" idx="10"/>
+          </p:nvPr>
+        </p:nvSpPr>
+        <p:spPr/>
+        <p:txBody>
+          <a:bodyPr>
+            <a:normAutofit/>
+          </a:bodyPr>
+          <a:lstStyle/>
+          <a:p>
+            <a:r>
+              <a:rPr lang="it-IT" dirty="0"/>
+              <a:t>Optimization!</a:t>
+            </a:r>
+          </a:p>
+          <a:p>
+            <a:pPr lvl="1"/>
+            <a:r>
+              <a:rPr lang="it-IT" b="1" dirty="0"/>
+              <a:t>Overview of optimization techniques, when/how to use them</a:t>
+            </a:r>
+          </a:p>
+          <a:p>
+            <a:pPr lvl="1"/>
+            <a:r>
+              <a:rPr lang="it-IT" dirty="0"/>
+              <a:t>How these techniques power modern Artificial Intelligence</a:t>
+            </a:r>
+          </a:p>
+          <a:p>
+            <a:pPr lvl="1"/>
+            <a:r>
+              <a:rPr lang="it-IT" b="1" dirty="0"/>
+              <a:t>Optimization to improve performance of AI methods</a:t>
+            </a:r>
+          </a:p>
+          <a:p>
+            <a:r>
+              <a:rPr lang="it-IT" dirty="0"/>
+              <a:t>At the end of the class, you should know</a:t>
+            </a:r>
+          </a:p>
+          <a:p>
+            <a:pPr lvl="1"/>
+            <a:r>
+              <a:rPr lang="it-IT" dirty="0"/>
+              <a:t>What techniques are more appriopriate for different problems</a:t>
+            </a:r>
+          </a:p>
+          <a:p>
+            <a:pPr lvl="1"/>
+            <a:r>
+              <a:rPr lang="it-IT" dirty="0"/>
+              <a:t>How (several) AI systems work, especially for Machine Learning</a:t>
+            </a:r>
+          </a:p>
+          <a:p>
+            <a:pPr lvl="1"/>
+            <a:r>
+              <a:rPr lang="it-IT" dirty="0"/>
+              <a:t>Hyperparameter optimization for your AI applications</a:t>
+            </a:r>
+          </a:p>
+          <a:p>
+            <a:endParaRPr lang="en-US" dirty="0"/>
+          </a:p>
+        </p:txBody>
+      </p:sp>
+      <p:sp>
+        <p:nvSpPr>
+          <p:cNvPr id="4" name="Flèche : droite 3">
+            <a:extLst>
+              <a:ext uri="{FF2B5EF4-FFF2-40B4-BE49-F238E27FC236}">
+                <a16:creationId xmlns:a16="http://schemas.microsoft.com/office/drawing/2014/main" id="{28B78CCC-2FD7-466A-9F23-3857E21A2FB8}"/>
+              </a:ext>
+            </a:extLst>
+          </p:cNvPr>
+          <p:cNvSpPr/>
+          <p:nvPr/>
+        </p:nvSpPr>
+        <p:spPr>
+          <a:xfrm>
+            <a:off x="641022" y="1932495"/>
+            <a:ext cx="603316" cy="414779"/>
+          </a:xfrm>
+          <a:prstGeom prst="rightArrow">
+            <a:avLst/>
+          </a:prstGeom>
+        </p:spPr>
+        <p:style>
+          <a:lnRef idx="1">
+            <a:schemeClr val="accent6"/>
+          </a:lnRef>
+          <a:fillRef idx="2">
+            <a:schemeClr val="accent6"/>
+          </a:fillRef>
+          <a:effectRef idx="1">
+            <a:schemeClr val="accent6"/>
+          </a:effectRef>
+          <a:fontRef idx="minor">
+            <a:schemeClr val="dk1"/>
+          </a:fontRef>
+        </p:style>
+        <p:txBody>
+          <a:bodyPr rtlCol="0" anchor="ctr"/>
+          <a:lstStyle/>
+          <a:p>
+            <a:pPr algn="ctr"/>
+            <a:endParaRPr lang="en-US">
+              <a:solidFill>
+                <a:schemeClr val="dk1"/>
+              </a:solidFill>
+            </a:endParaRPr>
+          </a:p>
+        </p:txBody>
+      </p:sp>
+      <p:sp>
+        <p:nvSpPr>
+          <p:cNvPr id="5" name="Flèche : droite 4">
+            <a:extLst>
+              <a:ext uri="{FF2B5EF4-FFF2-40B4-BE49-F238E27FC236}">
+                <a16:creationId xmlns:a16="http://schemas.microsoft.com/office/drawing/2014/main" id="{5161A449-136D-4FE0-88D8-B33DCC2E4CBC}"/>
+              </a:ext>
+            </a:extLst>
+          </p:cNvPr>
+          <p:cNvSpPr/>
+          <p:nvPr/>
+        </p:nvSpPr>
+        <p:spPr>
+          <a:xfrm>
+            <a:off x="641022" y="2838801"/>
+            <a:ext cx="603316" cy="414779"/>
+          </a:xfrm>
+          <a:prstGeom prst="rightArrow">
+            <a:avLst/>
+          </a:prstGeom>
+        </p:spPr>
+        <p:style>
+          <a:lnRef idx="1">
+            <a:schemeClr val="accent6"/>
+          </a:lnRef>
+          <a:fillRef idx="2">
+            <a:schemeClr val="accent6"/>
+          </a:fillRef>
+          <a:effectRef idx="1">
+            <a:schemeClr val="accent6"/>
+          </a:effectRef>
+          <a:fontRef idx="minor">
+            <a:schemeClr val="dk1"/>
+          </a:fontRef>
+        </p:style>
+        <p:txBody>
+          <a:bodyPr rtlCol="0" anchor="ctr"/>
+          <a:lstStyle/>
+          <a:p>
+            <a:pPr algn="ctr"/>
+            <a:endParaRPr lang="en-US"/>
+          </a:p>
+        </p:txBody>
+      </p:sp>
+    </p:spTree>
+    <p:extLst>
+      <p:ext uri="{BB962C8B-B14F-4D97-AF65-F5344CB8AC3E}">
+        <p14:creationId xmlns:p14="http://schemas.microsoft.com/office/powerpoint/2010/main" val="296601071"/>
+      </p:ext>
+    </p:extLst>
+  </p:cSld>
+  <p:clrMapOvr>
+    <a:masterClrMapping/>
+  </p:clrMapOvr>
+</p:sld>
+</file>
+
+<file path=ppt/slides/slide5.xml><?xml version="1.0" encoding="utf-8"?>
 <p:sld xmlns:a="http://schemas.openxmlformats.org/drawingml/2006/main" xmlns:r="http://schemas.openxmlformats.org/officeDocument/2006/relationships" xmlns:p="http://schemas.openxmlformats.org/presentationml/2006/main">
   <p:cSld>
     <p:spTree>
@@ -3005,7 +5172,7 @@
 </p:sld>
 </file>
 
-<file path=ppt/slides/slide5.xml><?xml version="1.0" encoding="utf-8"?>
+<file path=ppt/slides/slide6.xml><?xml version="1.0" encoding="utf-8"?>
 <p:sld xmlns:a="http://schemas.openxmlformats.org/drawingml/2006/main" xmlns:r="http://schemas.openxmlformats.org/officeDocument/2006/relationships" xmlns:p="http://schemas.openxmlformats.org/presentationml/2006/main">
   <p:cSld>
     <p:spTree>
@@ -3142,7 +5309,7 @@
 </p:sld>
 </file>
 
-<file path=ppt/slides/slide6.xml><?xml version="1.0" encoding="utf-8"?>
+<file path=ppt/slides/slide7.xml><?xml version="1.0" encoding="utf-8"?>
 <p:sld xmlns:a="http://schemas.openxmlformats.org/drawingml/2006/main" xmlns:r="http://schemas.openxmlformats.org/officeDocument/2006/relationships" xmlns:p="http://schemas.openxmlformats.org/presentationml/2006/main">
   <p:cSld>
     <p:spTree>
@@ -3363,7 +5530,7 @@
 </p:sld>
 </file>
 
-<file path=ppt/slides/slide7.xml><?xml version="1.0" encoding="utf-8"?>
+<file path=ppt/slides/slide8.xml><?xml version="1.0" encoding="utf-8"?>
 <p:sld xmlns:a="http://schemas.openxmlformats.org/drawingml/2006/main" xmlns:r="http://schemas.openxmlformats.org/officeDocument/2006/relationships" xmlns:p="http://schemas.openxmlformats.org/presentationml/2006/main">
   <p:cSld>
     <p:spTree>
@@ -3585,13 +5752,13 @@
         </p:nvSpPr>
         <p:spPr>
           <a:xfrm>
-            <a:off x="9846691" y="4911365"/>
+            <a:off x="9846691" y="4529579"/>
             <a:ext cx="1791092" cy="763572"/>
           </a:xfrm>
           <a:prstGeom prst="wedgeRectCallout">
             <a:avLst>
-              <a:gd name="adj1" fmla="val -108728"/>
-              <a:gd name="adj2" fmla="val -20216"/>
+              <a:gd name="adj1" fmla="val -110307"/>
+              <a:gd name="adj2" fmla="val 30401"/>
             </a:avLst>
           </a:prstGeom>
           <a:solidFill>
@@ -3646,13 +5813,13 @@
         </p:nvSpPr>
         <p:spPr>
           <a:xfrm>
-            <a:off x="311085" y="5316718"/>
+            <a:off x="311085" y="5194167"/>
             <a:ext cx="2048758" cy="763572"/>
           </a:xfrm>
           <a:prstGeom prst="wedgeRectCallout">
             <a:avLst>
-              <a:gd name="adj1" fmla="val 104956"/>
-              <a:gd name="adj2" fmla="val 13118"/>
+              <a:gd name="adj1" fmla="val 99435"/>
+              <a:gd name="adj2" fmla="val -15277"/>
             </a:avLst>
           </a:prstGeom>
           <a:ln w="28575">
@@ -3692,138 +5859,82 @@
           </a:p>
         </p:txBody>
       </p:sp>
+      <p:sp>
+        <p:nvSpPr>
+          <p:cNvPr id="7" name="Bulle narrative : rectangle 6">
+            <a:extLst>
+              <a:ext uri="{FF2B5EF4-FFF2-40B4-BE49-F238E27FC236}">
+                <a16:creationId xmlns:a16="http://schemas.microsoft.com/office/drawing/2014/main" id="{3EE912F6-B404-497A-A6B7-A9EBD46D9736}"/>
+              </a:ext>
+            </a:extLst>
+          </p:cNvPr>
+          <p:cNvSpPr/>
+          <p:nvPr/>
+        </p:nvSpPr>
+        <p:spPr>
+          <a:xfrm>
+            <a:off x="9846691" y="5649029"/>
+            <a:ext cx="1791092" cy="763572"/>
+          </a:xfrm>
+          <a:prstGeom prst="wedgeRectCallout">
+            <a:avLst>
+              <a:gd name="adj1" fmla="val -107149"/>
+              <a:gd name="adj2" fmla="val -31327"/>
+            </a:avLst>
+          </a:prstGeom>
+          <a:solidFill>
+            <a:schemeClr val="accent6">
+              <a:lumMod val="20000"/>
+              <a:lumOff val="80000"/>
+            </a:schemeClr>
+          </a:solidFill>
+          <a:ln w="28575">
+            <a:solidFill>
+              <a:schemeClr val="accent6">
+                <a:lumMod val="50000"/>
+              </a:schemeClr>
+            </a:solidFill>
+          </a:ln>
+        </p:spPr>
+        <p:style>
+          <a:lnRef idx="3">
+            <a:schemeClr val="lt1"/>
+          </a:lnRef>
+          <a:fillRef idx="1">
+            <a:schemeClr val="accent6"/>
+          </a:fillRef>
+          <a:effectRef idx="1">
+            <a:schemeClr val="accent6"/>
+          </a:effectRef>
+          <a:fontRef idx="minor">
+            <a:schemeClr val="lt1"/>
+          </a:fontRef>
+        </p:style>
+        <p:txBody>
+          <a:bodyPr rtlCol="0" anchor="ctr"/>
+          <a:lstStyle/>
+          <a:p>
+            <a:pPr algn="ctr"/>
+            <a:r>
+              <a:rPr lang="it-IT" dirty="0">
+                <a:solidFill>
+                  <a:schemeClr val="tx1"/>
+                </a:solidFill>
+              </a:rPr>
+              <a:t>LOSS FUNCTION</a:t>
+            </a:r>
+            <a:endParaRPr lang="en-US" dirty="0">
+              <a:solidFill>
+                <a:schemeClr val="tx1"/>
+              </a:solidFill>
+            </a:endParaRPr>
+          </a:p>
+        </p:txBody>
+      </p:sp>
     </p:spTree>
     <p:extLst>
       <p:ext uri="{BB962C8B-B14F-4D97-AF65-F5344CB8AC3E}">
         <p14:creationId xmlns:p14="http://schemas.microsoft.com/office/powerpoint/2010/main" val="845854091"/>
-      </p:ext>
-    </p:extLst>
-  </p:cSld>
-  <p:clrMapOvr>
-    <a:masterClrMapping/>
-  </p:clrMapOvr>
-</p:sld>
-</file>
-
-<file path=ppt/slides/slide8.xml><?xml version="1.0" encoding="utf-8"?>
-<p:sld xmlns:a="http://schemas.openxmlformats.org/drawingml/2006/main" xmlns:r="http://schemas.openxmlformats.org/officeDocument/2006/relationships" xmlns:p="http://schemas.openxmlformats.org/presentationml/2006/main">
-  <p:cSld>
-    <p:spTree>
-      <p:nvGrpSpPr>
-        <p:cNvPr id="1" name=""/>
-        <p:cNvGrpSpPr/>
-        <p:nvPr/>
-      </p:nvGrpSpPr>
-      <p:grpSpPr>
-        <a:xfrm>
-          <a:off x="0" y="0"/>
-          <a:ext cx="0" cy="0"/>
-          <a:chOff x="0" y="0"/>
-          <a:chExt cx="0" cy="0"/>
-        </a:xfrm>
-      </p:grpSpPr>
-      <p:sp>
-        <p:nvSpPr>
-          <p:cNvPr id="2" name="Titre 1">
-            <a:extLst>
-              <a:ext uri="{FF2B5EF4-FFF2-40B4-BE49-F238E27FC236}">
-                <a16:creationId xmlns:a16="http://schemas.microsoft.com/office/drawing/2014/main" id="{193234B6-6DE7-4400-B38B-559A02222C52}"/>
-              </a:ext>
-            </a:extLst>
-          </p:cNvPr>
-          <p:cNvSpPr>
-            <a:spLocks noGrp="1"/>
-          </p:cNvSpPr>
-          <p:nvPr>
-            <p:ph type="title"/>
-          </p:nvPr>
-        </p:nvSpPr>
-        <p:spPr/>
-        <p:txBody>
-          <a:bodyPr/>
-          <a:lstStyle/>
-          <a:p>
-            <a:r>
-              <a:rPr lang="it-IT" dirty="0"/>
-              <a:t>What is optimization?</a:t>
-            </a:r>
-            <a:endParaRPr lang="en-US" dirty="0"/>
-          </a:p>
-        </p:txBody>
-      </p:sp>
-      <p:sp>
-        <p:nvSpPr>
-          <p:cNvPr id="3" name="Espace réservé du texte 2">
-            <a:extLst>
-              <a:ext uri="{FF2B5EF4-FFF2-40B4-BE49-F238E27FC236}">
-                <a16:creationId xmlns:a16="http://schemas.microsoft.com/office/drawing/2014/main" id="{5067E361-E602-45DA-BEE8-E06A55F756B2}"/>
-              </a:ext>
-            </a:extLst>
-          </p:cNvPr>
-          <p:cNvSpPr>
-            <a:spLocks noGrp="1"/>
-          </p:cNvSpPr>
-          <p:nvPr>
-            <p:ph type="body" sz="quarter" idx="10"/>
-          </p:nvPr>
-        </p:nvSpPr>
-        <p:spPr/>
-        <p:txBody>
-          <a:bodyPr/>
-          <a:lstStyle/>
-          <a:p>
-            <a:r>
-              <a:rPr lang="it-IT" dirty="0"/>
-              <a:t>Objective function</a:t>
-            </a:r>
-          </a:p>
-          <a:p>
-            <a:pPr lvl="1"/>
-            <a:r>
-              <a:rPr lang="it-IT" dirty="0"/>
-              <a:t>Measure of goodness of a candidate solution</a:t>
-            </a:r>
-          </a:p>
-          <a:p>
-            <a:pPr lvl="1"/>
-            <a:r>
-              <a:rPr lang="it-IT" dirty="0"/>
-              <a:t>Quantitative, not qualitative (unless we can somehow sort it)</a:t>
-            </a:r>
-          </a:p>
-          <a:p>
-            <a:pPr lvl="1"/>
-            <a:r>
-              <a:rPr lang="it-IT" dirty="0"/>
-              <a:t>Good candidate solutions are usually close to other good solutions</a:t>
-            </a:r>
-          </a:p>
-          <a:p>
-            <a:r>
-              <a:rPr lang="it-IT" dirty="0"/>
-              <a:t>Candidate solutions</a:t>
-            </a:r>
-          </a:p>
-          <a:p>
-            <a:pPr lvl="1"/>
-            <a:r>
-              <a:rPr lang="it-IT" dirty="0"/>
-              <a:t>Possible inputs of the objective function</a:t>
-            </a:r>
-          </a:p>
-          <a:p>
-            <a:pPr lvl="1"/>
-            <a:r>
-              <a:rPr lang="it-IT" dirty="0"/>
-              <a:t>High-level description that includes all possible solutions</a:t>
-            </a:r>
-          </a:p>
-        </p:txBody>
-      </p:sp>
-    </p:spTree>
-    <p:extLst>
-      <p:ext uri="{BB962C8B-B14F-4D97-AF65-F5344CB8AC3E}">
-        <p14:creationId xmlns:p14="http://schemas.microsoft.com/office/powerpoint/2010/main" val="960008844"/>
       </p:ext>
     </p:extLst>
   </p:cSld>
@@ -3855,7 +5966,7 @@
           <p:cNvPr id="2" name="Titre 1">
             <a:extLst>
               <a:ext uri="{FF2B5EF4-FFF2-40B4-BE49-F238E27FC236}">
-                <a16:creationId xmlns:a16="http://schemas.microsoft.com/office/drawing/2014/main" id="{D8D4BB81-C1DD-432E-93C3-887461AA44D9}"/>
+                <a16:creationId xmlns:a16="http://schemas.microsoft.com/office/drawing/2014/main" id="{193234B6-6DE7-4400-B38B-559A02222C52}"/>
               </a:ext>
             </a:extLst>
           </p:cNvPr>
@@ -3873,112 +5984,302 @@
           <a:p>
             <a:r>
               <a:rPr lang="it-IT" dirty="0"/>
-              <a:t>What is Artificial Intelligence?</a:t>
+              <a:t>What is optimization?</a:t>
             </a:r>
             <a:endParaRPr lang="en-US" dirty="0"/>
           </a:p>
         </p:txBody>
       </p:sp>
-      <p:sp>
-        <p:nvSpPr>
-          <p:cNvPr id="3" name="Espace réservé du texte 2">
-            <a:extLst>
-              <a:ext uri="{FF2B5EF4-FFF2-40B4-BE49-F238E27FC236}">
-                <a16:creationId xmlns:a16="http://schemas.microsoft.com/office/drawing/2014/main" id="{9F050655-F2E6-48B2-90E3-A6E11C511879}"/>
-              </a:ext>
-            </a:extLst>
-          </p:cNvPr>
-          <p:cNvSpPr>
-            <a:spLocks noGrp="1"/>
-          </p:cNvSpPr>
-          <p:nvPr>
-            <p:ph type="body" sz="quarter" idx="10"/>
-          </p:nvPr>
-        </p:nvSpPr>
-        <p:spPr/>
-        <p:txBody>
-          <a:bodyPr/>
-          <a:lstStyle/>
-          <a:p>
-            <a:r>
-              <a:rPr lang="it-IT" dirty="0"/>
-              <a:t>Short answer, there is no clear definition</a:t>
-            </a:r>
-          </a:p>
-          <a:p>
-            <a:pPr lvl="1"/>
-            <a:r>
-              <a:rPr lang="it-IT" dirty="0"/>
-              <a:t>We do not have a good definition of </a:t>
-            </a:r>
-            <a:r>
-              <a:rPr lang="it-IT" i="1" dirty="0"/>
-              <a:t>intelligence</a:t>
-            </a:r>
-            <a:r>
-              <a:rPr lang="it-IT" dirty="0"/>
-              <a:t>, so...</a:t>
-            </a:r>
-          </a:p>
-          <a:p>
-            <a:pPr lvl="1"/>
-            <a:r>
-              <a:rPr lang="it-IT" dirty="0"/>
-              <a:t>Broadly speaking, AI defines a </a:t>
-            </a:r>
-            <a:r>
-              <a:rPr lang="it-IT" i="1" dirty="0"/>
-              <a:t>field</a:t>
-            </a:r>
-            <a:r>
-              <a:rPr lang="it-IT" dirty="0"/>
-              <a:t> more than a </a:t>
-            </a:r>
-            <a:r>
-              <a:rPr lang="it-IT" i="1" dirty="0"/>
-              <a:t>method</a:t>
-            </a:r>
-          </a:p>
-          <a:p>
-            <a:pPr lvl="1"/>
-            <a:r>
-              <a:rPr lang="it-IT" dirty="0"/>
-              <a:t>Machine learning, reinforcement learning, symbolic AI, ...</a:t>
-            </a:r>
-          </a:p>
-          <a:p>
-            <a:r>
-              <a:rPr lang="it-IT" dirty="0"/>
-              <a:t>When a non-biological being successfully completes a task commonly believed to require biological intelligence</a:t>
-            </a:r>
-          </a:p>
-          <a:p>
-            <a:r>
-              <a:rPr lang="it-IT" dirty="0"/>
-              <a:t>Perceiving, synthesizing, and inferring information</a:t>
-            </a:r>
-          </a:p>
-          <a:p>
-            <a:r>
-              <a:rPr lang="it-IT" dirty="0"/>
-              <a:t>How do we </a:t>
-            </a:r>
-            <a:r>
-              <a:rPr lang="it-IT" i="1" dirty="0"/>
-              <a:t>measure</a:t>
-            </a:r>
-            <a:r>
-              <a:rPr lang="it-IT" dirty="0"/>
-              <a:t> intelligence?</a:t>
-            </a:r>
-            <a:endParaRPr lang="en-US" dirty="0"/>
-          </a:p>
-        </p:txBody>
-      </p:sp>
+      <mc:AlternateContent xmlns:mc="http://schemas.openxmlformats.org/markup-compatibility/2006" xmlns:a14="http://schemas.microsoft.com/office/drawing/2010/main">
+        <mc:Choice Requires="a14">
+          <p:sp>
+            <p:nvSpPr>
+              <p:cNvPr id="3" name="Espace réservé du texte 2">
+                <a:extLst>
+                  <a:ext uri="{FF2B5EF4-FFF2-40B4-BE49-F238E27FC236}">
+                    <a16:creationId xmlns:a16="http://schemas.microsoft.com/office/drawing/2014/main" id="{5067E361-E602-45DA-BEE8-E06A55F756B2}"/>
+                  </a:ext>
+                </a:extLst>
+              </p:cNvPr>
+              <p:cNvSpPr>
+                <a:spLocks noGrp="1"/>
+              </p:cNvSpPr>
+              <p:nvPr>
+                <p:ph type="body" sz="quarter" idx="10"/>
+              </p:nvPr>
+            </p:nvSpPr>
+            <p:spPr/>
+            <p:txBody>
+              <a:bodyPr>
+                <a:normAutofit/>
+              </a:bodyPr>
+              <a:lstStyle/>
+              <a:p>
+                <a:r>
+                  <a:rPr lang="it-IT" dirty="0"/>
+                  <a:t>Objective function</a:t>
+                </a:r>
+              </a:p>
+              <a:p>
+                <a:pPr lvl="1"/>
+                <a:r>
+                  <a:rPr lang="it-IT" dirty="0"/>
+                  <a:t>Measure of goodness of a candidate solution</a:t>
+                </a:r>
+              </a:p>
+              <a:p>
+                <a:pPr lvl="1"/>
+                <a:r>
+                  <a:rPr lang="it-IT" dirty="0"/>
+                  <a:t>Quantitative, not qualitative (unless we can somehow sort it)</a:t>
+                </a:r>
+              </a:p>
+              <a:p>
+                <a:pPr lvl="1"/>
+                <a:r>
+                  <a:rPr lang="it-IT" dirty="0"/>
+                  <a:t>Good candidate solutions are usually close to other good solutions</a:t>
+                </a:r>
+              </a:p>
+              <a:p>
+                <a:pPr lvl="1"/>
+                <a:r>
+                  <a:rPr lang="it-IT" dirty="0"/>
+                  <a:t>If you pick the wrong objective function, you are screwed</a:t>
+                </a:r>
+              </a:p>
+              <a:p>
+                <a:r>
+                  <a:rPr lang="it-IT" dirty="0"/>
+                  <a:t>Candidate solutions</a:t>
+                </a:r>
+              </a:p>
+              <a:p>
+                <a:pPr lvl="1"/>
+                <a:r>
+                  <a:rPr lang="it-IT" dirty="0"/>
+                  <a:t>Possible inputs of the objective function</a:t>
+                </a:r>
+              </a:p>
+              <a:p>
+                <a:pPr lvl="1"/>
+                <a:r>
+                  <a:rPr lang="it-IT" dirty="0"/>
+                  <a:t>High-level representation that includes all possible solutions</a:t>
+                </a:r>
+              </a:p>
+              <a:p>
+                <a:pPr lvl="1"/>
+                <a:r>
+                  <a:rPr lang="it-IT" dirty="0"/>
+                  <a:t>Example: </a:t>
+                </a:r>
+                <a14:m>
+                  <m:oMath xmlns:m="http://schemas.openxmlformats.org/officeDocument/2006/math">
+                    <m:r>
+                      <a:rPr lang="it-IT" b="0" i="1" smtClean="0">
+                        <a:latin typeface="Cambria Math" panose="02040503050406030204" pitchFamily="18" charset="0"/>
+                      </a:rPr>
+                      <m:t>{</m:t>
+                    </m:r>
+                    <m:sSub>
+                      <m:sSubPr>
+                        <m:ctrlPr>
+                          <a:rPr lang="it-IT" b="0" i="1" smtClean="0">
+                            <a:latin typeface="Cambria Math" panose="02040503050406030204" pitchFamily="18" charset="0"/>
+                          </a:rPr>
+                        </m:ctrlPr>
+                      </m:sSubPr>
+                      <m:e>
+                        <m:r>
+                          <a:rPr lang="it-IT" b="0" i="1" smtClean="0">
+                            <a:latin typeface="Cambria Math" panose="02040503050406030204" pitchFamily="18" charset="0"/>
+                          </a:rPr>
+                          <m:t>𝑥</m:t>
+                        </m:r>
+                      </m:e>
+                      <m:sub>
+                        <m:r>
+                          <a:rPr lang="it-IT" b="0" i="1" smtClean="0">
+                            <a:latin typeface="Cambria Math" panose="02040503050406030204" pitchFamily="18" charset="0"/>
+                          </a:rPr>
+                          <m:t>0</m:t>
+                        </m:r>
+                      </m:sub>
+                    </m:sSub>
+                    <m:r>
+                      <a:rPr lang="it-IT" b="0" i="1" smtClean="0">
+                        <a:latin typeface="Cambria Math" panose="02040503050406030204" pitchFamily="18" charset="0"/>
+                      </a:rPr>
+                      <m:t>,</m:t>
+                    </m:r>
+                    <m:sSub>
+                      <m:sSubPr>
+                        <m:ctrlPr>
+                          <a:rPr lang="it-IT" b="0" i="1" smtClean="0">
+                            <a:latin typeface="Cambria Math" panose="02040503050406030204" pitchFamily="18" charset="0"/>
+                          </a:rPr>
+                        </m:ctrlPr>
+                      </m:sSubPr>
+                      <m:e>
+                        <m:r>
+                          <a:rPr lang="it-IT" b="0" i="1" smtClean="0">
+                            <a:latin typeface="Cambria Math" panose="02040503050406030204" pitchFamily="18" charset="0"/>
+                          </a:rPr>
+                          <m:t>𝑥</m:t>
+                        </m:r>
+                      </m:e>
+                      <m:sub>
+                        <m:r>
+                          <a:rPr lang="it-IT" b="0" i="1" smtClean="0">
+                            <a:latin typeface="Cambria Math" panose="02040503050406030204" pitchFamily="18" charset="0"/>
+                          </a:rPr>
+                          <m:t>1</m:t>
+                        </m:r>
+                      </m:sub>
+                    </m:sSub>
+                    <m:r>
+                      <a:rPr lang="it-IT" b="0" i="1" smtClean="0">
+                        <a:latin typeface="Cambria Math" panose="02040503050406030204" pitchFamily="18" charset="0"/>
+                      </a:rPr>
+                      <m:t>, …, </m:t>
+                    </m:r>
+                    <m:sSub>
+                      <m:sSubPr>
+                        <m:ctrlPr>
+                          <a:rPr lang="it-IT" b="0" i="1" smtClean="0">
+                            <a:latin typeface="Cambria Math" panose="02040503050406030204" pitchFamily="18" charset="0"/>
+                          </a:rPr>
+                        </m:ctrlPr>
+                      </m:sSubPr>
+                      <m:e>
+                        <m:r>
+                          <a:rPr lang="it-IT" b="0" i="1" smtClean="0">
+                            <a:latin typeface="Cambria Math" panose="02040503050406030204" pitchFamily="18" charset="0"/>
+                          </a:rPr>
+                          <m:t>𝑥</m:t>
+                        </m:r>
+                      </m:e>
+                      <m:sub>
+                        <m:r>
+                          <a:rPr lang="it-IT" b="0" i="1" smtClean="0">
+                            <a:latin typeface="Cambria Math" panose="02040503050406030204" pitchFamily="18" charset="0"/>
+                          </a:rPr>
+                          <m:t>𝑛</m:t>
+                        </m:r>
+                      </m:sub>
+                    </m:sSub>
+                    <m:r>
+                      <a:rPr lang="it-IT" b="0" i="1" smtClean="0">
+                        <a:latin typeface="Cambria Math" panose="02040503050406030204" pitchFamily="18" charset="0"/>
+                      </a:rPr>
+                      <m:t>}</m:t>
+                    </m:r>
+                  </m:oMath>
+                </a14:m>
+                <a:r>
+                  <a:rPr lang="it-IT" dirty="0"/>
+                  <a:t> with </a:t>
+                </a:r>
+                <a14:m>
+                  <m:oMath xmlns:m="http://schemas.openxmlformats.org/officeDocument/2006/math">
+                    <m:sSub>
+                      <m:sSubPr>
+                        <m:ctrlPr>
+                          <a:rPr lang="it-IT" i="1" smtClean="0">
+                            <a:latin typeface="Cambria Math" panose="02040503050406030204" pitchFamily="18" charset="0"/>
+                          </a:rPr>
+                        </m:ctrlPr>
+                      </m:sSubPr>
+                      <m:e>
+                        <m:r>
+                          <a:rPr lang="it-IT" b="0" i="1" smtClean="0">
+                            <a:latin typeface="Cambria Math" panose="02040503050406030204" pitchFamily="18" charset="0"/>
+                          </a:rPr>
+                          <m:t>𝑥</m:t>
+                        </m:r>
+                      </m:e>
+                      <m:sub>
+                        <m:r>
+                          <a:rPr lang="it-IT" b="0" i="1" smtClean="0">
+                            <a:latin typeface="Cambria Math" panose="02040503050406030204" pitchFamily="18" charset="0"/>
+                          </a:rPr>
+                          <m:t>𝑖</m:t>
+                        </m:r>
+                      </m:sub>
+                    </m:sSub>
+                    <m:r>
+                      <a:rPr lang="it-IT" i="1" smtClean="0">
+                        <a:latin typeface="Cambria Math" panose="02040503050406030204" pitchFamily="18" charset="0"/>
+                        <a:ea typeface="Cambria Math" panose="02040503050406030204" pitchFamily="18" charset="0"/>
+                      </a:rPr>
+                      <m:t>∈</m:t>
+                    </m:r>
+                    <m:r>
+                      <a:rPr lang="it-IT" b="0" i="1" smtClean="0">
+                        <a:latin typeface="Cambria Math" panose="02040503050406030204" pitchFamily="18" charset="0"/>
+                        <a:ea typeface="Cambria Math" panose="02040503050406030204" pitchFamily="18" charset="0"/>
+                      </a:rPr>
+                      <m:t>(0,1)∩</m:t>
+                    </m:r>
+                    <m:r>
+                      <a:rPr lang="it-IT" b="0" i="1" smtClean="0">
+                        <a:latin typeface="Cambria Math" panose="02040503050406030204" pitchFamily="18" charset="0"/>
+                        <a:ea typeface="Cambria Math" panose="02040503050406030204" pitchFamily="18" charset="0"/>
+                      </a:rPr>
+                      <m:t>ℝ</m:t>
+                    </m:r>
+                  </m:oMath>
+                </a14:m>
+                <a:endParaRPr lang="it-IT" dirty="0"/>
+              </a:p>
+            </p:txBody>
+          </p:sp>
+        </mc:Choice>
+        <mc:Fallback xmlns="">
+          <p:sp>
+            <p:nvSpPr>
+              <p:cNvPr id="3" name="Espace réservé du texte 2">
+                <a:extLst>
+                  <a:ext uri="{FF2B5EF4-FFF2-40B4-BE49-F238E27FC236}">
+                    <a16:creationId xmlns:a16="http://schemas.microsoft.com/office/drawing/2014/main" id="{5067E361-E602-45DA-BEE8-E06A55F756B2}"/>
+                  </a:ext>
+                </a:extLst>
+              </p:cNvPr>
+              <p:cNvSpPr>
+                <a:spLocks noGrp="1" noRot="1" noChangeAspect="1" noMove="1" noResize="1" noEditPoints="1" noAdjustHandles="1" noChangeArrowheads="1" noChangeShapeType="1" noTextEdit="1"/>
+              </p:cNvSpPr>
+              <p:nvPr>
+                <p:ph type="body" sz="quarter" idx="10"/>
+              </p:nvPr>
+            </p:nvSpPr>
+            <p:spPr>
+              <a:blipFill>
+                <a:blip r:embed="rId2"/>
+                <a:stretch>
+                  <a:fillRect l="-1333" t="-2734" r="-464"/>
+                </a:stretch>
+              </a:blipFill>
+            </p:spPr>
+            <p:txBody>
+              <a:bodyPr/>
+              <a:lstStyle/>
+              <a:p>
+                <a:r>
+                  <a:rPr lang="en-US">
+                    <a:noFill/>
+                  </a:rPr>
+                  <a:t> </a:t>
+                </a:r>
+              </a:p>
+            </p:txBody>
+          </p:sp>
+        </mc:Fallback>
+      </mc:AlternateContent>
     </p:spTree>
     <p:extLst>
       <p:ext uri="{BB962C8B-B14F-4D97-AF65-F5344CB8AC3E}">
-        <p14:creationId xmlns:p14="http://schemas.microsoft.com/office/powerpoint/2010/main" val="1304693269"/>
+        <p14:creationId xmlns:p14="http://schemas.microsoft.com/office/powerpoint/2010/main" val="960008844"/>
       </p:ext>
     </p:extLst>
   </p:cSld>
@@ -4247,4 +6548,299 @@
     </a:ext>
   </a:extLst>
 </a:theme>
+</file>
+
+<file path=ppt/theme/theme2.xml><?xml version="1.0" encoding="utf-8"?>
+<a:theme xmlns:a="http://schemas.openxmlformats.org/drawingml/2006/main" name="Thème Office">
+  <a:themeElements>
+    <a:clrScheme name="Office">
+      <a:dk1>
+        <a:sysClr val="windowText" lastClr="000000"/>
+      </a:dk1>
+      <a:lt1>
+        <a:sysClr val="window" lastClr="FFFFFF"/>
+      </a:lt1>
+      <a:dk2>
+        <a:srgbClr val="44546A"/>
+      </a:dk2>
+      <a:lt2>
+        <a:srgbClr val="E7E6E6"/>
+      </a:lt2>
+      <a:accent1>
+        <a:srgbClr val="4472C4"/>
+      </a:accent1>
+      <a:accent2>
+        <a:srgbClr val="ED7D31"/>
+      </a:accent2>
+      <a:accent3>
+        <a:srgbClr val="A5A5A5"/>
+      </a:accent3>
+      <a:accent4>
+        <a:srgbClr val="FFC000"/>
+      </a:accent4>
+      <a:accent5>
+        <a:srgbClr val="5B9BD5"/>
+      </a:accent5>
+      <a:accent6>
+        <a:srgbClr val="70AD47"/>
+      </a:accent6>
+      <a:hlink>
+        <a:srgbClr val="0563C1"/>
+      </a:hlink>
+      <a:folHlink>
+        <a:srgbClr val="954F72"/>
+      </a:folHlink>
+    </a:clrScheme>
+    <a:fontScheme name="Office">
+      <a:majorFont>
+        <a:latin typeface="Calibri Light" panose="020F0302020204030204"/>
+        <a:ea typeface=""/>
+        <a:cs typeface=""/>
+        <a:font script="Jpan" typeface="游ゴシック Light"/>
+        <a:font script="Hang" typeface="맑은 고딕"/>
+        <a:font script="Hans" typeface="等线 Light"/>
+        <a:font script="Hant" typeface="新細明體"/>
+        <a:font script="Arab" typeface="Times New Roman"/>
+        <a:font script="Hebr" typeface="Times New Roman"/>
+        <a:font script="Thai" typeface="Angsana New"/>
+        <a:font script="Ethi" typeface="Nyala"/>
+        <a:font script="Beng" typeface="Vrinda"/>
+        <a:font script="Gujr" typeface="Shruti"/>
+        <a:font script="Khmr" typeface="MoolBoran"/>
+        <a:font script="Knda" typeface="Tunga"/>
+        <a:font script="Guru" typeface="Raavi"/>
+        <a:font script="Cans" typeface="Euphemia"/>
+        <a:font script="Cher" typeface="Plantagenet Cherokee"/>
+        <a:font script="Yiii" typeface="Microsoft Yi Baiti"/>
+        <a:font script="Tibt" typeface="Microsoft Himalaya"/>
+        <a:font script="Thaa" typeface="MV Boli"/>
+        <a:font script="Deva" typeface="Mangal"/>
+        <a:font script="Telu" typeface="Gautami"/>
+        <a:font script="Taml" typeface="Latha"/>
+        <a:font script="Syrc" typeface="Estrangelo Edessa"/>
+        <a:font script="Orya" typeface="Kalinga"/>
+        <a:font script="Mlym" typeface="Kartika"/>
+        <a:font script="Laoo" typeface="DokChampa"/>
+        <a:font script="Sinh" typeface="Iskoola Pota"/>
+        <a:font script="Mong" typeface="Mongolian Baiti"/>
+        <a:font script="Viet" typeface="Times New Roman"/>
+        <a:font script="Uigh" typeface="Microsoft Uighur"/>
+        <a:font script="Geor" typeface="Sylfaen"/>
+        <a:font script="Armn" typeface="Arial"/>
+        <a:font script="Bugi" typeface="Leelawadee UI"/>
+        <a:font script="Bopo" typeface="Microsoft JhengHei"/>
+        <a:font script="Java" typeface="Javanese Text"/>
+        <a:font script="Lisu" typeface="Segoe UI"/>
+        <a:font script="Mymr" typeface="Myanmar Text"/>
+        <a:font script="Nkoo" typeface="Ebrima"/>
+        <a:font script="Olck" typeface="Nirmala UI"/>
+        <a:font script="Osma" typeface="Ebrima"/>
+        <a:font script="Phag" typeface="Phagspa"/>
+        <a:font script="Syrn" typeface="Estrangelo Edessa"/>
+        <a:font script="Syrj" typeface="Estrangelo Edessa"/>
+        <a:font script="Syre" typeface="Estrangelo Edessa"/>
+        <a:font script="Sora" typeface="Nirmala UI"/>
+        <a:font script="Tale" typeface="Microsoft Tai Le"/>
+        <a:font script="Talu" typeface="Microsoft New Tai Lue"/>
+        <a:font script="Tfng" typeface="Ebrima"/>
+      </a:majorFont>
+      <a:minorFont>
+        <a:latin typeface="Calibri" panose="020F0502020204030204"/>
+        <a:ea typeface=""/>
+        <a:cs typeface=""/>
+        <a:font script="Jpan" typeface="游ゴシック"/>
+        <a:font script="Hang" typeface="맑은 고딕"/>
+        <a:font script="Hans" typeface="等线"/>
+        <a:font script="Hant" typeface="新細明體"/>
+        <a:font script="Arab" typeface="Arial"/>
+        <a:font script="Hebr" typeface="Arial"/>
+        <a:font script="Thai" typeface="Cordia New"/>
+        <a:font script="Ethi" typeface="Nyala"/>
+        <a:font script="Beng" typeface="Vrinda"/>
+        <a:font script="Gujr" typeface="Shruti"/>
+        <a:font script="Khmr" typeface="DaunPenh"/>
+        <a:font script="Knda" typeface="Tunga"/>
+        <a:font script="Guru" typeface="Raavi"/>
+        <a:font script="Cans" typeface="Euphemia"/>
+        <a:font script="Cher" typeface="Plantagenet Cherokee"/>
+        <a:font script="Yiii" typeface="Microsoft Yi Baiti"/>
+        <a:font script="Tibt" typeface="Microsoft Himalaya"/>
+        <a:font script="Thaa" typeface="MV Boli"/>
+        <a:font script="Deva" typeface="Mangal"/>
+        <a:font script="Telu" typeface="Gautami"/>
+        <a:font script="Taml" typeface="Latha"/>
+        <a:font script="Syrc" typeface="Estrangelo Edessa"/>
+        <a:font script="Orya" typeface="Kalinga"/>
+        <a:font script="Mlym" typeface="Kartika"/>
+        <a:font script="Laoo" typeface="DokChampa"/>
+        <a:font script="Sinh" typeface="Iskoola Pota"/>
+        <a:font script="Mong" typeface="Mongolian Baiti"/>
+        <a:font script="Viet" typeface="Arial"/>
+        <a:font script="Uigh" typeface="Microsoft Uighur"/>
+        <a:font script="Geor" typeface="Sylfaen"/>
+        <a:font script="Armn" typeface="Arial"/>
+        <a:font script="Bugi" typeface="Leelawadee UI"/>
+        <a:font script="Bopo" typeface="Microsoft JhengHei"/>
+        <a:font script="Java" typeface="Javanese Text"/>
+        <a:font script="Lisu" typeface="Segoe UI"/>
+        <a:font script="Mymr" typeface="Myanmar Text"/>
+        <a:font script="Nkoo" typeface="Ebrima"/>
+        <a:font script="Olck" typeface="Nirmala UI"/>
+        <a:font script="Osma" typeface="Ebrima"/>
+        <a:font script="Phag" typeface="Phagspa"/>
+        <a:font script="Syrn" typeface="Estrangelo Edessa"/>
+        <a:font script="Syrj" typeface="Estrangelo Edessa"/>
+        <a:font script="Syre" typeface="Estrangelo Edessa"/>
+        <a:font script="Sora" typeface="Nirmala UI"/>
+        <a:font script="Tale" typeface="Microsoft Tai Le"/>
+        <a:font script="Talu" typeface="Microsoft New Tai Lue"/>
+        <a:font script="Tfng" typeface="Ebrima"/>
+      </a:minorFont>
+    </a:fontScheme>
+    <a:fmtScheme name="Office">
+      <a:fillStyleLst>
+        <a:solidFill>
+          <a:schemeClr val="phClr"/>
+        </a:solidFill>
+        <a:gradFill rotWithShape="1">
+          <a:gsLst>
+            <a:gs pos="0">
+              <a:schemeClr val="phClr">
+                <a:lumMod val="110000"/>
+                <a:satMod val="105000"/>
+                <a:tint val="67000"/>
+              </a:schemeClr>
+            </a:gs>
+            <a:gs pos="50000">
+              <a:schemeClr val="phClr">
+                <a:lumMod val="105000"/>
+                <a:satMod val="103000"/>
+                <a:tint val="73000"/>
+              </a:schemeClr>
+            </a:gs>
+            <a:gs pos="100000">
+              <a:schemeClr val="phClr">
+                <a:lumMod val="105000"/>
+                <a:satMod val="109000"/>
+                <a:tint val="81000"/>
+              </a:schemeClr>
+            </a:gs>
+          </a:gsLst>
+          <a:lin ang="5400000" scaled="0"/>
+        </a:gradFill>
+        <a:gradFill rotWithShape="1">
+          <a:gsLst>
+            <a:gs pos="0">
+              <a:schemeClr val="phClr">
+                <a:satMod val="103000"/>
+                <a:lumMod val="102000"/>
+                <a:tint val="94000"/>
+              </a:schemeClr>
+            </a:gs>
+            <a:gs pos="50000">
+              <a:schemeClr val="phClr">
+                <a:satMod val="110000"/>
+                <a:lumMod val="100000"/>
+                <a:shade val="100000"/>
+              </a:schemeClr>
+            </a:gs>
+            <a:gs pos="100000">
+              <a:schemeClr val="phClr">
+                <a:lumMod val="99000"/>
+                <a:satMod val="120000"/>
+                <a:shade val="78000"/>
+              </a:schemeClr>
+            </a:gs>
+          </a:gsLst>
+          <a:lin ang="5400000" scaled="0"/>
+        </a:gradFill>
+      </a:fillStyleLst>
+      <a:lnStyleLst>
+        <a:ln w="6350" cap="flat" cmpd="sng" algn="ctr">
+          <a:solidFill>
+            <a:schemeClr val="phClr"/>
+          </a:solidFill>
+          <a:prstDash val="solid"/>
+          <a:miter lim="800000"/>
+        </a:ln>
+        <a:ln w="12700" cap="flat" cmpd="sng" algn="ctr">
+          <a:solidFill>
+            <a:schemeClr val="phClr"/>
+          </a:solidFill>
+          <a:prstDash val="solid"/>
+          <a:miter lim="800000"/>
+        </a:ln>
+        <a:ln w="19050" cap="flat" cmpd="sng" algn="ctr">
+          <a:solidFill>
+            <a:schemeClr val="phClr"/>
+          </a:solidFill>
+          <a:prstDash val="solid"/>
+          <a:miter lim="800000"/>
+        </a:ln>
+      </a:lnStyleLst>
+      <a:effectStyleLst>
+        <a:effectStyle>
+          <a:effectLst/>
+        </a:effectStyle>
+        <a:effectStyle>
+          <a:effectLst/>
+        </a:effectStyle>
+        <a:effectStyle>
+          <a:effectLst>
+            <a:outerShdw blurRad="57150" dist="19050" dir="5400000" algn="ctr" rotWithShape="0">
+              <a:srgbClr val="000000">
+                <a:alpha val="63000"/>
+              </a:srgbClr>
+            </a:outerShdw>
+          </a:effectLst>
+        </a:effectStyle>
+      </a:effectStyleLst>
+      <a:bgFillStyleLst>
+        <a:solidFill>
+          <a:schemeClr val="phClr"/>
+        </a:solidFill>
+        <a:solidFill>
+          <a:schemeClr val="phClr">
+            <a:tint val="95000"/>
+            <a:satMod val="170000"/>
+          </a:schemeClr>
+        </a:solidFill>
+        <a:gradFill rotWithShape="1">
+          <a:gsLst>
+            <a:gs pos="0">
+              <a:schemeClr val="phClr">
+                <a:tint val="93000"/>
+                <a:satMod val="150000"/>
+                <a:shade val="98000"/>
+                <a:lumMod val="102000"/>
+              </a:schemeClr>
+            </a:gs>
+            <a:gs pos="50000">
+              <a:schemeClr val="phClr">
+                <a:tint val="98000"/>
+                <a:satMod val="130000"/>
+                <a:shade val="90000"/>
+                <a:lumMod val="103000"/>
+              </a:schemeClr>
+            </a:gs>
+            <a:gs pos="100000">
+              <a:schemeClr val="phClr">
+                <a:shade val="63000"/>
+                <a:satMod val="120000"/>
+              </a:schemeClr>
+            </a:gs>
+          </a:gsLst>
+          <a:lin ang="5400000" scaled="0"/>
+        </a:gradFill>
+      </a:bgFillStyleLst>
+    </a:fmtScheme>
+  </a:themeElements>
+  <a:objectDefaults/>
+  <a:extraClrSchemeLst/>
+  <a:extLst>
+    <a:ext uri="{05A4C25C-085E-4340-85A3-A5531E510DB2}">
+      <thm15:themeFamily xmlns:thm15="http://schemas.microsoft.com/office/thememl/2012/main" name="Office Theme" id="{62F939B6-93AF-4DB8-9C6B-D6C7DFDC589F}" vid="{4A3C46E8-61CC-4603-A589-7422A47A8E4A}"/>
+    </a:ext>
+  </a:extLst>
+</a:theme>
 </file>
</xml_diff>

<commit_message>
Slides and scripts updated
</commit_message>
<xml_diff>
--- a/optimization-methods-for-artificial-intelligence/introduction.pptx
+++ b/optimization-methods-for-artificial-intelligence/introduction.pptx
@@ -5,7 +5,7 @@
     <p:sldMasterId id="2147483648" r:id="rId1"/>
   </p:sldMasterIdLst>
   <p:notesMasterIdLst>
-    <p:notesMasterId r:id="rId30"/>
+    <p:notesMasterId r:id="rId32"/>
   </p:notesMasterIdLst>
   <p:sldIdLst>
     <p:sldId id="257" r:id="rId2"/>
@@ -24,18 +24,20 @@
     <p:sldId id="265" r:id="rId15"/>
     <p:sldId id="266" r:id="rId16"/>
     <p:sldId id="269" r:id="rId17"/>
-    <p:sldId id="270" r:id="rId18"/>
-    <p:sldId id="283" r:id="rId19"/>
-    <p:sldId id="282" r:id="rId20"/>
-    <p:sldId id="275" r:id="rId21"/>
-    <p:sldId id="272" r:id="rId22"/>
-    <p:sldId id="271" r:id="rId23"/>
-    <p:sldId id="274" r:id="rId24"/>
-    <p:sldId id="277" r:id="rId25"/>
-    <p:sldId id="278" r:id="rId26"/>
-    <p:sldId id="279" r:id="rId27"/>
-    <p:sldId id="280" r:id="rId28"/>
-    <p:sldId id="276" r:id="rId29"/>
+    <p:sldId id="285" r:id="rId18"/>
+    <p:sldId id="270" r:id="rId19"/>
+    <p:sldId id="283" r:id="rId20"/>
+    <p:sldId id="282" r:id="rId21"/>
+    <p:sldId id="286" r:id="rId22"/>
+    <p:sldId id="275" r:id="rId23"/>
+    <p:sldId id="272" r:id="rId24"/>
+    <p:sldId id="271" r:id="rId25"/>
+    <p:sldId id="274" r:id="rId26"/>
+    <p:sldId id="277" r:id="rId27"/>
+    <p:sldId id="278" r:id="rId28"/>
+    <p:sldId id="279" r:id="rId29"/>
+    <p:sldId id="280" r:id="rId30"/>
+    <p:sldId id="276" r:id="rId31"/>
   </p:sldIdLst>
   <p:sldSz cx="12192000" cy="6858000"/>
   <p:notesSz cx="6858000" cy="9144000"/>
@@ -224,7 +226,7 @@
           <a:p>
             <a:fld id="{4AAA8967-1584-49FE-8FA4-B9793DEB31AA}" type="datetimeFigureOut">
               <a:rPr lang="en-US" smtClean="0"/>
-              <a:t>7/1/2023</a:t>
+              <a:t>7/5/2023</a:t>
             </a:fld>
             <a:endParaRPr lang="en-US"/>
           </a:p>
@@ -538,11 +540,7 @@
           <a:p>
             <a:r>
               <a:rPr lang="en-US" dirty="0"/>
-              <a:t>There is one possible exception</a:t>
-            </a:r>
-            <a:r>
-              <a:rPr lang="en-US"/>
-              <a:t>, ontologies</a:t>
+              <a:t>I am NOT an expert of ALL methods that I am going to present.</a:t>
             </a:r>
           </a:p>
         </p:txBody>
@@ -564,7 +562,98 @@
           <a:p>
             <a:fld id="{5A4CDC94-00AE-4940-AE94-0065ADD8401E}" type="slidenum">
               <a:rPr lang="en-US" smtClean="0"/>
-              <a:t>26</a:t>
+              <a:t>7</a:t>
+            </a:fld>
+            <a:endParaRPr lang="en-US"/>
+          </a:p>
+        </p:txBody>
+      </p:sp>
+    </p:spTree>
+    <p:extLst>
+      <p:ext uri="{BB962C8B-B14F-4D97-AF65-F5344CB8AC3E}">
+        <p14:creationId xmlns:p14="http://schemas.microsoft.com/office/powerpoint/2010/main" val="1467895713"/>
+      </p:ext>
+    </p:extLst>
+  </p:cSld>
+  <p:clrMapOvr>
+    <a:masterClrMapping/>
+  </p:clrMapOvr>
+</p:notes>
+</file>
+
+<file path=ppt/notesSlides/notesSlide2.xml><?xml version="1.0" encoding="utf-8"?>
+<p:notes xmlns:a="http://schemas.openxmlformats.org/drawingml/2006/main" xmlns:r="http://schemas.openxmlformats.org/officeDocument/2006/relationships" xmlns:p="http://schemas.openxmlformats.org/presentationml/2006/main">
+  <p:cSld>
+    <p:spTree>
+      <p:nvGrpSpPr>
+        <p:cNvPr id="1" name=""/>
+        <p:cNvGrpSpPr/>
+        <p:nvPr/>
+      </p:nvGrpSpPr>
+      <p:grpSpPr>
+        <a:xfrm>
+          <a:off x="0" y="0"/>
+          <a:ext cx="0" cy="0"/>
+          <a:chOff x="0" y="0"/>
+          <a:chExt cx="0" cy="0"/>
+        </a:xfrm>
+      </p:grpSpPr>
+      <p:sp>
+        <p:nvSpPr>
+          <p:cNvPr id="2" name="Espace réservé de l'image des diapositives 1"/>
+          <p:cNvSpPr>
+            <a:spLocks noGrp="1" noRot="1" noChangeAspect="1"/>
+          </p:cNvSpPr>
+          <p:nvPr>
+            <p:ph type="sldImg"/>
+          </p:nvPr>
+        </p:nvSpPr>
+        <p:spPr/>
+      </p:sp>
+      <p:sp>
+        <p:nvSpPr>
+          <p:cNvPr id="3" name="Espace réservé des notes 2"/>
+          <p:cNvSpPr>
+            <a:spLocks noGrp="1"/>
+          </p:cNvSpPr>
+          <p:nvPr>
+            <p:ph type="body" idx="1"/>
+          </p:nvPr>
+        </p:nvSpPr>
+        <p:spPr/>
+        <p:txBody>
+          <a:bodyPr/>
+          <a:lstStyle/>
+          <a:p>
+            <a:r>
+              <a:rPr lang="en-US" dirty="0"/>
+              <a:t>There is one possible exception</a:t>
+            </a:r>
+            <a:r>
+              <a:rPr lang="en-US"/>
+              <a:t>, ontologies</a:t>
+            </a:r>
+          </a:p>
+        </p:txBody>
+      </p:sp>
+      <p:sp>
+        <p:nvSpPr>
+          <p:cNvPr id="4" name="Espace réservé du numéro de diapositive 3"/>
+          <p:cNvSpPr>
+            <a:spLocks noGrp="1"/>
+          </p:cNvSpPr>
+          <p:nvPr>
+            <p:ph type="sldNum" sz="quarter" idx="5"/>
+          </p:nvPr>
+        </p:nvSpPr>
+        <p:spPr/>
+        <p:txBody>
+          <a:bodyPr/>
+          <a:lstStyle/>
+          <a:p>
+            <a:fld id="{5A4CDC94-00AE-4940-AE94-0065ADD8401E}" type="slidenum">
+              <a:rPr lang="en-US" smtClean="0"/>
+              <a:t>28</a:t>
             </a:fld>
             <a:endParaRPr lang="en-US"/>
           </a:p>
@@ -2190,6 +2279,90 @@
           </a:p>
         </p:txBody>
       </p:sp>
+      <p:pic>
+        <p:nvPicPr>
+          <p:cNvPr id="6" name="Picture 2">
+            <a:extLst>
+              <a:ext uri="{FF2B5EF4-FFF2-40B4-BE49-F238E27FC236}">
+                <a16:creationId xmlns:a16="http://schemas.microsoft.com/office/drawing/2014/main" id="{2031D9A1-6D3C-45B3-8263-8AC93C954088}"/>
+              </a:ext>
+            </a:extLst>
+          </p:cNvPr>
+          <p:cNvPicPr>
+            <a:picLocks noChangeAspect="1" noChangeArrowheads="1"/>
+          </p:cNvPicPr>
+          <p:nvPr/>
+        </p:nvPicPr>
+        <p:blipFill rotWithShape="1">
+          <a:blip r:embed="rId2">
+            <a:extLst>
+              <a:ext uri="{BEBA8EAE-BF5A-486C-A8C5-ECC9F3942E4B}">
+                <a14:imgProps xmlns:a14="http://schemas.microsoft.com/office/drawing/2010/main">
+                  <a14:imgLayer r:embed="rId3">
+                    <a14:imgEffect>
+                      <a14:backgroundRemoval t="22283" b="75673" l="54554" r="90983"/>
+                    </a14:imgEffect>
+                  </a14:imgLayer>
+                </a14:imgProps>
+              </a:ext>
+              <a:ext uri="{28A0092B-C50C-407E-A947-70E740481C1C}">
+                <a14:useLocalDpi xmlns:a14="http://schemas.microsoft.com/office/drawing/2010/main" val="0"/>
+              </a:ext>
+            </a:extLst>
+          </a:blip>
+          <a:srcRect l="50000" t="15610" r="4463" b="17653"/>
+          <a:stretch/>
+        </p:blipFill>
+        <p:spPr bwMode="auto">
+          <a:xfrm>
+            <a:off x="4938382" y="1037974"/>
+            <a:ext cx="1295445" cy="884352"/>
+          </a:xfrm>
+          <a:prstGeom prst="rect">
+            <a:avLst/>
+          </a:prstGeom>
+          <a:noFill/>
+          <a:extLst>
+            <a:ext uri="{909E8E84-426E-40DD-AFC4-6F175D3DCCD1}">
+              <a14:hiddenFill xmlns:a14="http://schemas.microsoft.com/office/drawing/2010/main">
+                <a:solidFill>
+                  <a:srgbClr val="FFFFFF"/>
+                </a:solidFill>
+              </a14:hiddenFill>
+            </a:ext>
+          </a:extLst>
+        </p:spPr>
+      </p:pic>
+      <p:pic>
+        <p:nvPicPr>
+          <p:cNvPr id="7" name="Image 6">
+            <a:extLst>
+              <a:ext uri="{FF2B5EF4-FFF2-40B4-BE49-F238E27FC236}">
+                <a16:creationId xmlns:a16="http://schemas.microsoft.com/office/drawing/2014/main" id="{F95A0A41-C781-4B3D-B43D-3A2410568152}"/>
+              </a:ext>
+            </a:extLst>
+          </p:cNvPr>
+          <p:cNvPicPr>
+            <a:picLocks noChangeAspect="1"/>
+          </p:cNvPicPr>
+          <p:nvPr/>
+        </p:nvPicPr>
+        <p:blipFill>
+          <a:blip r:embed="rId4"/>
+          <a:stretch>
+            <a:fillRect/>
+          </a:stretch>
+        </p:blipFill>
+        <p:spPr>
+          <a:xfrm>
+            <a:off x="6383826" y="1073027"/>
+            <a:ext cx="1642424" cy="574848"/>
+          </a:xfrm>
+          <a:prstGeom prst="rect">
+            <a:avLst/>
+          </a:prstGeom>
+        </p:spPr>
+      </p:pic>
     </p:spTree>
     <p:extLst>
       <p:ext uri="{BB962C8B-B14F-4D97-AF65-F5344CB8AC3E}">
@@ -3078,13 +3251,21 @@
           <a:p>
             <a:r>
               <a:rPr lang="it-IT" dirty="0"/>
+              <a:t>Tentative definitions (there is no agreement)</a:t>
+            </a:r>
+          </a:p>
+          <a:p>
+            <a:pPr lvl="1"/>
+            <a:r>
+              <a:rPr lang="it-IT" dirty="0"/>
               <a:t>«When a non-biological being successfully completes a task commonly believed to require biological intelligence»</a:t>
             </a:r>
           </a:p>
           <a:p>
+            <a:pPr lvl="1"/>
             <a:r>
               <a:rPr lang="it-IT" dirty="0"/>
-              <a:t>Perceiving, synthesizing, and inferring information</a:t>
+              <a:t>«Perceiving, synthesizing, and inferring information»</a:t>
             </a:r>
           </a:p>
           <a:p>
@@ -4071,6 +4252,136 @@
 </file>
 
 <file path=ppt/slides/slide17.xml><?xml version="1.0" encoding="utf-8"?>
+<p:sld xmlns:a="http://schemas.openxmlformats.org/drawingml/2006/main" xmlns:r="http://schemas.openxmlformats.org/officeDocument/2006/relationships" xmlns:p="http://schemas.openxmlformats.org/presentationml/2006/main">
+  <p:cSld>
+    <p:spTree>
+      <p:nvGrpSpPr>
+        <p:cNvPr id="1" name=""/>
+        <p:cNvGrpSpPr/>
+        <p:nvPr/>
+      </p:nvGrpSpPr>
+      <p:grpSpPr>
+        <a:xfrm>
+          <a:off x="0" y="0"/>
+          <a:ext cx="0" cy="0"/>
+          <a:chOff x="0" y="0"/>
+          <a:chExt cx="0" cy="0"/>
+        </a:xfrm>
+      </p:grpSpPr>
+      <p:sp>
+        <p:nvSpPr>
+          <p:cNvPr id="2" name="Titre 1">
+            <a:extLst>
+              <a:ext uri="{FF2B5EF4-FFF2-40B4-BE49-F238E27FC236}">
+                <a16:creationId xmlns:a16="http://schemas.microsoft.com/office/drawing/2014/main" id="{2AA5667A-8233-4FF4-BDC4-BF7CDB973192}"/>
+              </a:ext>
+            </a:extLst>
+          </p:cNvPr>
+          <p:cNvSpPr>
+            <a:spLocks noGrp="1"/>
+          </p:cNvSpPr>
+          <p:nvPr>
+            <p:ph type="title"/>
+          </p:nvPr>
+        </p:nvSpPr>
+        <p:spPr/>
+        <p:txBody>
+          <a:bodyPr/>
+          <a:lstStyle/>
+          <a:p>
+            <a:r>
+              <a:rPr lang="en-US" dirty="0"/>
+              <a:t>Symbolic AI</a:t>
+            </a:r>
+          </a:p>
+        </p:txBody>
+      </p:sp>
+      <p:sp>
+        <p:nvSpPr>
+          <p:cNvPr id="3" name="Espace réservé du texte 2">
+            <a:extLst>
+              <a:ext uri="{FF2B5EF4-FFF2-40B4-BE49-F238E27FC236}">
+                <a16:creationId xmlns:a16="http://schemas.microsoft.com/office/drawing/2014/main" id="{71361AEC-0B07-41D5-90ED-23C63DB25559}"/>
+              </a:ext>
+            </a:extLst>
+          </p:cNvPr>
+          <p:cNvSpPr>
+            <a:spLocks noGrp="1"/>
+          </p:cNvSpPr>
+          <p:nvPr>
+            <p:ph type="body" sz="quarter" idx="10"/>
+          </p:nvPr>
+        </p:nvSpPr>
+        <p:spPr/>
+        <p:txBody>
+          <a:bodyPr/>
+          <a:lstStyle/>
+          <a:p>
+            <a:r>
+              <a:rPr lang="en-US" dirty="0"/>
+              <a:t>In practice, find or exploit human-readable rules</a:t>
+            </a:r>
+          </a:p>
+          <a:p>
+            <a:pPr lvl="1"/>
+            <a:r>
+              <a:rPr lang="en-US" dirty="0"/>
+              <a:t>Expert systems (“if-then-else” rules</a:t>
+            </a:r>
+          </a:p>
+          <a:p>
+            <a:pPr lvl="1"/>
+            <a:r>
+              <a:rPr lang="en-US" dirty="0"/>
+              <a:t>Knowledge graphs, linking entities with relationships</a:t>
+            </a:r>
+          </a:p>
+          <a:p>
+            <a:pPr lvl="1"/>
+            <a:r>
+              <a:rPr lang="en-US" dirty="0"/>
+              <a:t>First-order logic rules</a:t>
+            </a:r>
+          </a:p>
+          <a:p>
+            <a:pPr lvl="1"/>
+            <a:r>
+              <a:rPr lang="en-US" dirty="0"/>
+              <a:t>Decision trees (!)</a:t>
+            </a:r>
+          </a:p>
+          <a:p>
+            <a:pPr lvl="1"/>
+            <a:endParaRPr lang="en-US" dirty="0"/>
+          </a:p>
+          <a:p>
+            <a:r>
+              <a:rPr lang="en-US" dirty="0"/>
+              <a:t>Before the advent of ML, considerable success stories</a:t>
+            </a:r>
+          </a:p>
+          <a:p>
+            <a:r>
+              <a:rPr lang="en-US" dirty="0"/>
+              <a:t>Symbolic AI is still in use, paired with ML</a:t>
+            </a:r>
+          </a:p>
+        </p:txBody>
+      </p:sp>
+    </p:spTree>
+    <p:extLst>
+      <p:ext uri="{BB962C8B-B14F-4D97-AF65-F5344CB8AC3E}">
+        <p14:creationId xmlns:p14="http://schemas.microsoft.com/office/powerpoint/2010/main" val="424388314"/>
+      </p:ext>
+    </p:extLst>
+  </p:cSld>
+  <p:clrMapOvr>
+    <a:masterClrMapping/>
+  </p:clrMapOvr>
+</p:sld>
+</file>
+
+<file path=ppt/slides/slide18.xml><?xml version="1.0" encoding="utf-8"?>
 <p:sld xmlns:a="http://schemas.openxmlformats.org/drawingml/2006/main" xmlns:r="http://schemas.openxmlformats.org/officeDocument/2006/relationships" xmlns:p="http://schemas.openxmlformats.org/presentationml/2006/main">
   <p:cSld>
     <p:spTree>
@@ -4440,7 +4751,7 @@
 </p:sld>
 </file>
 
-<file path=ppt/slides/slide18.xml><?xml version="1.0" encoding="utf-8"?>
+<file path=ppt/slides/slide19.xml><?xml version="1.0" encoding="utf-8"?>
 <p:sld xmlns:a="http://schemas.openxmlformats.org/drawingml/2006/main" xmlns:r="http://schemas.openxmlformats.org/officeDocument/2006/relationships" xmlns:p="http://schemas.openxmlformats.org/presentationml/2006/main">
   <p:cSld>
     <p:spTree>
@@ -4480,33 +4791,8 @@
           <a:p>
             <a:r>
               <a:rPr lang="en-US" dirty="0"/>
-              <a:t>Machine learning</a:t>
-            </a:r>
-          </a:p>
-        </p:txBody>
-      </p:sp>
-      <p:sp>
-        <p:nvSpPr>
-          <p:cNvPr id="3" name="Espace réservé du texte 2">
-            <a:extLst>
-              <a:ext uri="{FF2B5EF4-FFF2-40B4-BE49-F238E27FC236}">
-                <a16:creationId xmlns:a16="http://schemas.microsoft.com/office/drawing/2014/main" id="{86906271-83A6-4970-ACD1-1D1DE4451C73}"/>
-              </a:ext>
-            </a:extLst>
-          </p:cNvPr>
-          <p:cNvSpPr>
-            <a:spLocks noGrp="1"/>
-          </p:cNvSpPr>
-          <p:nvPr>
-            <p:ph type="body" sz="quarter" idx="10"/>
-          </p:nvPr>
-        </p:nvSpPr>
-        <p:spPr/>
-        <p:txBody>
-          <a:bodyPr/>
-          <a:lstStyle/>
-          <a:p>
-            <a:endParaRPr lang="en-US" dirty="0"/>
+              <a:t>Machine learning (supervised)</a:t>
+            </a:r>
           </a:p>
         </p:txBody>
       </p:sp>
@@ -4554,7 +4840,19 @@
             <a:pPr algn="ctr"/>
             <a:r>
               <a:rPr lang="en-US" sz="3200" dirty="0"/>
-              <a:t>ML algorithm (model)</a:t>
+              <a:t>ML algorithm </a:t>
+            </a:r>
+            <a:r>
+              <a:rPr lang="en-US" sz="2400" dirty="0"/>
+              <a:t>(</a:t>
+            </a:r>
+            <a:r>
+              <a:rPr lang="en-US" sz="2400" dirty="0" err="1"/>
+              <a:t>model+optimizer</a:t>
+            </a:r>
+            <a:r>
+              <a:rPr lang="en-US" sz="2400" dirty="0"/>
+              <a:t>)</a:t>
             </a:r>
           </a:p>
         </p:txBody>
@@ -4851,7 +5149,7 @@
           <p:nvPr>
             <p:extLst>
               <p:ext uri="{D42A27DB-BD31-4B8C-83A1-F6EECF244321}">
-                <p14:modId xmlns:p14="http://schemas.microsoft.com/office/powerpoint/2010/main" val="2012967353"/>
+                <p14:modId xmlns:p14="http://schemas.microsoft.com/office/powerpoint/2010/main" val="2293917946"/>
               </p:ext>
             </p:extLst>
           </p:nvPr>
@@ -4942,7 +5240,11 @@
                     <a:lstStyle/>
                     <a:p>
                       <a:r>
-                        <a:rPr lang="en-US" dirty="0"/>
+                        <a:rPr lang="en-US" b="1" dirty="0">
+                          <a:solidFill>
+                            <a:srgbClr val="FF0000"/>
+                          </a:solidFill>
+                        </a:rPr>
                         <a:t>Prediction 3</a:t>
                       </a:r>
                     </a:p>
@@ -5014,7 +5316,7 @@
           <p:nvPr>
             <p:extLst>
               <p:ext uri="{D42A27DB-BD31-4B8C-83A1-F6EECF244321}">
-                <p14:modId xmlns:p14="http://schemas.microsoft.com/office/powerpoint/2010/main" val="2076451484"/>
+                <p14:modId xmlns:p14="http://schemas.microsoft.com/office/powerpoint/2010/main" val="122320025"/>
               </p:ext>
             </p:extLst>
           </p:nvPr>
@@ -5105,7 +5407,7 @@
                     <a:lstStyle/>
                     <a:p>
                       <a:r>
-                        <a:rPr lang="en-US" dirty="0"/>
+                        <a:rPr lang="en-US" b="1" dirty="0"/>
                         <a:t>Truth 3</a:t>
                       </a:r>
                     </a:p>
@@ -5216,162 +5518,180 @@
           </a:extLst>
         </p:spPr>
       </p:pic>
+      <p:sp>
+        <p:nvSpPr>
+          <p:cNvPr id="12" name="Accolade ouvrante 11">
+            <a:extLst>
+              <a:ext uri="{FF2B5EF4-FFF2-40B4-BE49-F238E27FC236}">
+                <a16:creationId xmlns:a16="http://schemas.microsoft.com/office/drawing/2014/main" id="{1855B302-77A7-4813-A40C-E59A8571BFCA}"/>
+              </a:ext>
+            </a:extLst>
+          </p:cNvPr>
+          <p:cNvSpPr/>
+          <p:nvPr/>
+        </p:nvSpPr>
+        <p:spPr>
+          <a:xfrm rot="5400000">
+            <a:off x="2218039" y="1181747"/>
+            <a:ext cx="296894" cy="2648932"/>
+          </a:xfrm>
+          <a:prstGeom prst="leftBrace">
+            <a:avLst/>
+          </a:prstGeom>
+          <a:ln w="19050">
+            <a:solidFill>
+              <a:schemeClr val="tx1"/>
+            </a:solidFill>
+          </a:ln>
+        </p:spPr>
+        <p:style>
+          <a:lnRef idx="1">
+            <a:schemeClr val="accent1"/>
+          </a:lnRef>
+          <a:fillRef idx="0">
+            <a:schemeClr val="accent1"/>
+          </a:fillRef>
+          <a:effectRef idx="0">
+            <a:schemeClr val="accent1"/>
+          </a:effectRef>
+          <a:fontRef idx="minor">
+            <a:schemeClr val="tx1"/>
+          </a:fontRef>
+        </p:style>
+        <p:txBody>
+          <a:bodyPr rtlCol="0" anchor="ctr"/>
+          <a:lstStyle/>
+          <a:p>
+            <a:pPr algn="ctr"/>
+            <a:endParaRPr lang="en-US"/>
+          </a:p>
+        </p:txBody>
+      </p:sp>
+      <p:sp>
+        <p:nvSpPr>
+          <p:cNvPr id="13" name="ZoneTexte 12">
+            <a:extLst>
+              <a:ext uri="{FF2B5EF4-FFF2-40B4-BE49-F238E27FC236}">
+                <a16:creationId xmlns:a16="http://schemas.microsoft.com/office/drawing/2014/main" id="{6AD25F33-7182-47D5-B79E-44FC71BC618C}"/>
+              </a:ext>
+            </a:extLst>
+          </p:cNvPr>
+          <p:cNvSpPr txBox="1"/>
+          <p:nvPr/>
+        </p:nvSpPr>
+        <p:spPr>
+          <a:xfrm>
+            <a:off x="979285" y="1746095"/>
+            <a:ext cx="2903456" cy="584775"/>
+          </a:xfrm>
+          <a:prstGeom prst="rect">
+            <a:avLst/>
+          </a:prstGeom>
+          <a:noFill/>
+        </p:spPr>
+        <p:txBody>
+          <a:bodyPr wrap="square" rtlCol="0">
+            <a:spAutoFit/>
+          </a:bodyPr>
+          <a:lstStyle/>
+          <a:p>
+            <a:pPr algn="ctr"/>
+            <a:r>
+              <a:rPr lang="en-US" sz="3200" dirty="0"/>
+              <a:t>Features</a:t>
+            </a:r>
+          </a:p>
+        </p:txBody>
+      </p:sp>
+      <p:sp>
+        <p:nvSpPr>
+          <p:cNvPr id="15" name="Accolade ouvrante 14">
+            <a:extLst>
+              <a:ext uri="{FF2B5EF4-FFF2-40B4-BE49-F238E27FC236}">
+                <a16:creationId xmlns:a16="http://schemas.microsoft.com/office/drawing/2014/main" id="{A2EC7CD3-2906-48BD-9EAA-DBFC49F99916}"/>
+              </a:ext>
+            </a:extLst>
+          </p:cNvPr>
+          <p:cNvSpPr/>
+          <p:nvPr/>
+        </p:nvSpPr>
+        <p:spPr>
+          <a:xfrm>
+            <a:off x="645707" y="2772513"/>
+            <a:ext cx="296894" cy="2519083"/>
+          </a:xfrm>
+          <a:prstGeom prst="leftBrace">
+            <a:avLst/>
+          </a:prstGeom>
+          <a:ln w="19050">
+            <a:solidFill>
+              <a:schemeClr val="tx1"/>
+            </a:solidFill>
+          </a:ln>
+        </p:spPr>
+        <p:style>
+          <a:lnRef idx="1">
+            <a:schemeClr val="accent1"/>
+          </a:lnRef>
+          <a:fillRef idx="0">
+            <a:schemeClr val="accent1"/>
+          </a:fillRef>
+          <a:effectRef idx="0">
+            <a:schemeClr val="accent1"/>
+          </a:effectRef>
+          <a:fontRef idx="minor">
+            <a:schemeClr val="tx1"/>
+          </a:fontRef>
+        </p:style>
+        <p:txBody>
+          <a:bodyPr rtlCol="0" anchor="ctr"/>
+          <a:lstStyle/>
+          <a:p>
+            <a:pPr algn="ctr"/>
+            <a:endParaRPr lang="en-US"/>
+          </a:p>
+        </p:txBody>
+      </p:sp>
+      <p:sp>
+        <p:nvSpPr>
+          <p:cNvPr id="16" name="ZoneTexte 15">
+            <a:extLst>
+              <a:ext uri="{FF2B5EF4-FFF2-40B4-BE49-F238E27FC236}">
+                <a16:creationId xmlns:a16="http://schemas.microsoft.com/office/drawing/2014/main" id="{4A0BBB0E-6EE5-4922-85F8-334B1920EB8F}"/>
+              </a:ext>
+            </a:extLst>
+          </p:cNvPr>
+          <p:cNvSpPr txBox="1"/>
+          <p:nvPr/>
+        </p:nvSpPr>
+        <p:spPr>
+          <a:xfrm rot="16200000">
+            <a:off x="-1139828" y="3739666"/>
+            <a:ext cx="2903456" cy="584775"/>
+          </a:xfrm>
+          <a:prstGeom prst="rect">
+            <a:avLst/>
+          </a:prstGeom>
+          <a:noFill/>
+        </p:spPr>
+        <p:txBody>
+          <a:bodyPr wrap="square" rtlCol="0">
+            <a:spAutoFit/>
+          </a:bodyPr>
+          <a:lstStyle/>
+          <a:p>
+            <a:pPr algn="ctr"/>
+            <a:r>
+              <a:rPr lang="en-US" sz="3200" dirty="0"/>
+              <a:t>Samples</a:t>
+            </a:r>
+          </a:p>
+        </p:txBody>
+      </p:sp>
     </p:spTree>
     <p:extLst>
       <p:ext uri="{BB962C8B-B14F-4D97-AF65-F5344CB8AC3E}">
         <p14:creationId xmlns:p14="http://schemas.microsoft.com/office/powerpoint/2010/main" val="3455087570"/>
-      </p:ext>
-    </p:extLst>
-  </p:cSld>
-  <p:clrMapOvr>
-    <a:masterClrMapping/>
-  </p:clrMapOvr>
-</p:sld>
-</file>
-
-<file path=ppt/slides/slide19.xml><?xml version="1.0" encoding="utf-8"?>
-<p:sld xmlns:a="http://schemas.openxmlformats.org/drawingml/2006/main" xmlns:r="http://schemas.openxmlformats.org/officeDocument/2006/relationships" xmlns:p="http://schemas.openxmlformats.org/presentationml/2006/main">
-  <p:cSld>
-    <p:spTree>
-      <p:nvGrpSpPr>
-        <p:cNvPr id="1" name=""/>
-        <p:cNvGrpSpPr/>
-        <p:nvPr/>
-      </p:nvGrpSpPr>
-      <p:grpSpPr>
-        <a:xfrm>
-          <a:off x="0" y="0"/>
-          <a:ext cx="0" cy="0"/>
-          <a:chOff x="0" y="0"/>
-          <a:chExt cx="0" cy="0"/>
-        </a:xfrm>
-      </p:grpSpPr>
-      <p:sp>
-        <p:nvSpPr>
-          <p:cNvPr id="2" name="Titre 1">
-            <a:extLst>
-              <a:ext uri="{FF2B5EF4-FFF2-40B4-BE49-F238E27FC236}">
-                <a16:creationId xmlns:a16="http://schemas.microsoft.com/office/drawing/2014/main" id="{B32FF59C-468F-45B7-8590-1E54FBF357D4}"/>
-              </a:ext>
-            </a:extLst>
-          </p:cNvPr>
-          <p:cNvSpPr>
-            <a:spLocks noGrp="1"/>
-          </p:cNvSpPr>
-          <p:nvPr>
-            <p:ph type="title"/>
-          </p:nvPr>
-        </p:nvSpPr>
-        <p:spPr/>
-        <p:txBody>
-          <a:bodyPr/>
-          <a:lstStyle/>
-          <a:p>
-            <a:r>
-              <a:rPr lang="it-IT" dirty="0"/>
-              <a:t>Machine learning</a:t>
-            </a:r>
-            <a:endParaRPr lang="en-US" dirty="0"/>
-          </a:p>
-        </p:txBody>
-      </p:sp>
-      <p:sp>
-        <p:nvSpPr>
-          <p:cNvPr id="3" name="Espace réservé du texte 2">
-            <a:extLst>
-              <a:ext uri="{FF2B5EF4-FFF2-40B4-BE49-F238E27FC236}">
-                <a16:creationId xmlns:a16="http://schemas.microsoft.com/office/drawing/2014/main" id="{D4620115-7A3D-4E1B-A396-6F1EBC385B33}"/>
-              </a:ext>
-            </a:extLst>
-          </p:cNvPr>
-          <p:cNvSpPr>
-            <a:spLocks noGrp="1"/>
-          </p:cNvSpPr>
-          <p:nvPr>
-            <p:ph type="body" sz="quarter" idx="10"/>
-          </p:nvPr>
-        </p:nvSpPr>
-        <p:spPr/>
-        <p:txBody>
-          <a:bodyPr>
-            <a:normAutofit lnSpcReduction="10000"/>
-          </a:bodyPr>
-          <a:lstStyle/>
-          <a:p>
-            <a:r>
-              <a:rPr lang="en-US" dirty="0"/>
-              <a:t>Learn a task directly from examples</a:t>
-            </a:r>
-          </a:p>
-          <a:p>
-            <a:pPr lvl="1"/>
-            <a:r>
-              <a:rPr lang="en-US" dirty="0"/>
-              <a:t>No need for symbols, just large quantities of data</a:t>
-            </a:r>
-          </a:p>
-          <a:p>
-            <a:pPr lvl="1"/>
-            <a:r>
-              <a:rPr lang="en-US" i="1" dirty="0"/>
-              <a:t>Samples</a:t>
-            </a:r>
-            <a:r>
-              <a:rPr lang="en-US" dirty="0"/>
-              <a:t> (rows) and </a:t>
-            </a:r>
-            <a:r>
-              <a:rPr lang="en-US" i="1" dirty="0"/>
-              <a:t>features</a:t>
-            </a:r>
-            <a:r>
-              <a:rPr lang="en-US" dirty="0"/>
-              <a:t> (columns)</a:t>
-            </a:r>
-          </a:p>
-          <a:p>
-            <a:pPr marL="457200" lvl="1" indent="0">
-              <a:buNone/>
-            </a:pPr>
-            <a:endParaRPr lang="en-US" dirty="0"/>
-          </a:p>
-          <a:p>
-            <a:r>
-              <a:rPr lang="en-US" dirty="0"/>
-              <a:t>Dominant paradigm since the 90s</a:t>
-            </a:r>
-          </a:p>
-          <a:p>
-            <a:r>
-              <a:rPr lang="en-US" dirty="0"/>
-              <a:t>Feature engineering</a:t>
-            </a:r>
-          </a:p>
-          <a:p>
-            <a:r>
-              <a:rPr lang="en-US" dirty="0"/>
-              <a:t>Trade-off between effectiveness and interpretability</a:t>
-            </a:r>
-          </a:p>
-          <a:p>
-            <a:r>
-              <a:rPr lang="en-US" dirty="0"/>
-              <a:t>Black-box effects</a:t>
-            </a:r>
-          </a:p>
-          <a:p>
-            <a:r>
-              <a:rPr lang="en-US"/>
-              <a:t>Deep learning</a:t>
-            </a:r>
-            <a:endParaRPr lang="en-US" dirty="0"/>
-          </a:p>
-        </p:txBody>
-      </p:sp>
-    </p:spTree>
-    <p:extLst>
-      <p:ext uri="{BB962C8B-B14F-4D97-AF65-F5344CB8AC3E}">
-        <p14:creationId xmlns:p14="http://schemas.microsoft.com/office/powerpoint/2010/main" val="3127305854"/>
       </p:ext>
     </p:extLst>
   </p:cSld>
@@ -5533,7 +5853,7 @@
           <p:cNvPr id="2" name="Titre 1">
             <a:extLst>
               <a:ext uri="{FF2B5EF4-FFF2-40B4-BE49-F238E27FC236}">
-                <a16:creationId xmlns:a16="http://schemas.microsoft.com/office/drawing/2014/main" id="{EBF2B6A1-6B5B-4608-B847-4CC61EE0D57D}"/>
+                <a16:creationId xmlns:a16="http://schemas.microsoft.com/office/drawing/2014/main" id="{B32FF59C-468F-45B7-8590-1E54FBF357D4}"/>
               </a:ext>
             </a:extLst>
           </p:cNvPr>
@@ -5550,9 +5870,10 @@
           <a:lstStyle/>
           <a:p>
             <a:r>
-              <a:rPr lang="en-US" dirty="0"/>
-              <a:t>Reinforcement learning</a:t>
-            </a:r>
+              <a:rPr lang="it-IT" dirty="0"/>
+              <a:t>Machine learning</a:t>
+            </a:r>
+            <a:endParaRPr lang="en-US" dirty="0"/>
           </a:p>
         </p:txBody>
       </p:sp>
@@ -5561,7 +5882,7 @@
           <p:cNvPr id="3" name="Espace réservé du texte 2">
             <a:extLst>
               <a:ext uri="{FF2B5EF4-FFF2-40B4-BE49-F238E27FC236}">
-                <a16:creationId xmlns:a16="http://schemas.microsoft.com/office/drawing/2014/main" id="{ADB2DD4C-65CD-47DD-AF86-CBFD75ABACB5}"/>
+                <a16:creationId xmlns:a16="http://schemas.microsoft.com/office/drawing/2014/main" id="{D4620115-7A3D-4E1B-A396-6F1EBC385B33}"/>
               </a:ext>
             </a:extLst>
           </p:cNvPr>
@@ -5574,53 +5895,86 @@
         </p:nvSpPr>
         <p:spPr/>
         <p:txBody>
-          <a:bodyPr/>
+          <a:bodyPr>
+            <a:normAutofit/>
+          </a:bodyPr>
           <a:lstStyle/>
           <a:p>
             <a:r>
               <a:rPr lang="en-US" dirty="0"/>
-              <a:t>Similar to ML, but not exactly</a:t>
-            </a:r>
-          </a:p>
-          <a:p>
-            <a:pPr lvl="1"/>
-            <a:r>
-              <a:rPr lang="en-US" dirty="0"/>
-              <a:t>No value associated to a single decision</a:t>
-            </a:r>
-          </a:p>
-          <a:p>
-            <a:pPr lvl="1"/>
-            <a:r>
-              <a:rPr lang="en-US" dirty="0"/>
-              <a:t>Reward is consequence of a </a:t>
-            </a:r>
-            <a:r>
-              <a:rPr lang="en-US" i="1" dirty="0"/>
-              <a:t>series</a:t>
-            </a:r>
-            <a:r>
-              <a:rPr lang="en-US" dirty="0"/>
-              <a:t> of decisions</a:t>
-            </a:r>
-          </a:p>
-          <a:p>
-            <a:pPr lvl="1"/>
-            <a:r>
-              <a:rPr lang="en-US" dirty="0"/>
-              <a:t>Example: chess game; is trading a Queen for a Knight good? Well, it depends on the board state</a:t>
-            </a:r>
-          </a:p>
-          <a:p>
-            <a:pPr lvl="1"/>
-            <a:endParaRPr lang="en-US" dirty="0"/>
+              <a:t>Dominant paradigm since the 90s</a:t>
+            </a:r>
+          </a:p>
+          <a:p>
+            <a:pPr lvl="1"/>
+            <a:r>
+              <a:rPr lang="en-US" dirty="0"/>
+              <a:t>First, artificial neural networks (ANNs or NNs)</a:t>
+            </a:r>
+          </a:p>
+          <a:p>
+            <a:pPr lvl="1"/>
+            <a:r>
+              <a:rPr lang="en-US" dirty="0"/>
+              <a:t>Then, statistical learning algorithms</a:t>
+            </a:r>
+          </a:p>
+          <a:p>
+            <a:pPr lvl="1"/>
+            <a:r>
+              <a:rPr lang="en-US" dirty="0"/>
+              <a:t>Decision trees (and ensembles of) and polynomial models</a:t>
+            </a:r>
+          </a:p>
+          <a:p>
+            <a:r>
+              <a:rPr lang="en-US" dirty="0"/>
+              <a:t>Feature engineering</a:t>
+            </a:r>
+          </a:p>
+          <a:p>
+            <a:pPr lvl="1"/>
+            <a:r>
+              <a:rPr lang="en-US" dirty="0"/>
+              <a:t>Works (still) well for </a:t>
+            </a:r>
+            <a:r>
+              <a:rPr lang="en-US" b="1" dirty="0"/>
+              <a:t>tabular data</a:t>
+            </a:r>
+            <a:r>
+              <a:rPr lang="en-US" dirty="0"/>
+              <a:t> (e.g. Excel spreadsheet)</a:t>
+            </a:r>
+          </a:p>
+          <a:p>
+            <a:pPr lvl="1"/>
+            <a:r>
+              <a:rPr lang="en-US" dirty="0"/>
+              <a:t>Huge issues with </a:t>
+            </a:r>
+            <a:r>
+              <a:rPr lang="en-US" b="1" dirty="0"/>
+              <a:t>structured data</a:t>
+            </a:r>
+            <a:r>
+              <a:rPr lang="en-US" dirty="0"/>
+              <a:t> (e.g. images, text, sound…)</a:t>
+            </a:r>
+          </a:p>
+          <a:p>
+            <a:pPr lvl="1"/>
+            <a:r>
+              <a:rPr lang="en-US" dirty="0"/>
+              <a:t>Hand-crafted features (not very successful)</a:t>
+            </a:r>
           </a:p>
         </p:txBody>
       </p:sp>
     </p:spTree>
     <p:extLst>
       <p:ext uri="{BB962C8B-B14F-4D97-AF65-F5344CB8AC3E}">
-        <p14:creationId xmlns:p14="http://schemas.microsoft.com/office/powerpoint/2010/main" val="1214248259"/>
+        <p14:creationId xmlns:p14="http://schemas.microsoft.com/office/powerpoint/2010/main" val="3127305854"/>
       </p:ext>
     </p:extLst>
   </p:cSld>
@@ -5652,7 +6006,7 @@
           <p:cNvPr id="2" name="Titre 1">
             <a:extLst>
               <a:ext uri="{FF2B5EF4-FFF2-40B4-BE49-F238E27FC236}">
-                <a16:creationId xmlns:a16="http://schemas.microsoft.com/office/drawing/2014/main" id="{40A95C8A-6E61-4586-AE10-B5D51600B4B0}"/>
+                <a16:creationId xmlns:a16="http://schemas.microsoft.com/office/drawing/2014/main" id="{B32FF59C-468F-45B7-8590-1E54FBF357D4}"/>
               </a:ext>
             </a:extLst>
           </p:cNvPr>
@@ -5669,9 +6023,10 @@
           <a:lstStyle/>
           <a:p>
             <a:r>
-              <a:rPr lang="en-US" dirty="0"/>
-              <a:t>Neuro-symbolic AI</a:t>
-            </a:r>
+              <a:rPr lang="it-IT" dirty="0"/>
+              <a:t>Machine learning</a:t>
+            </a:r>
+            <a:endParaRPr lang="en-US" dirty="0"/>
           </a:p>
         </p:txBody>
       </p:sp>
@@ -5680,7 +6035,7 @@
           <p:cNvPr id="3" name="Espace réservé du texte 2">
             <a:extLst>
               <a:ext uri="{FF2B5EF4-FFF2-40B4-BE49-F238E27FC236}">
-                <a16:creationId xmlns:a16="http://schemas.microsoft.com/office/drawing/2014/main" id="{DD173D4B-1221-4D29-96A0-68CF7052176D}"/>
+                <a16:creationId xmlns:a16="http://schemas.microsoft.com/office/drawing/2014/main" id="{D4620115-7A3D-4E1B-A396-6F1EBC385B33}"/>
               </a:ext>
             </a:extLst>
           </p:cNvPr>
@@ -5693,67 +6048,82 @@
         </p:nvSpPr>
         <p:spPr/>
         <p:txBody>
-          <a:bodyPr/>
+          <a:bodyPr>
+            <a:normAutofit/>
+          </a:bodyPr>
           <a:lstStyle/>
           <a:p>
             <a:r>
               <a:rPr lang="en-US" dirty="0"/>
-              <a:t>Might look complex, but the general idea is intuitive</a:t>
-            </a:r>
-          </a:p>
-          <a:p>
-            <a:pPr lvl="1"/>
-            <a:r>
-              <a:rPr lang="en-US" dirty="0"/>
-              <a:t>Use neural/ML approach to map from data to symbols</a:t>
-            </a:r>
-          </a:p>
-          <a:p>
-            <a:pPr lvl="1"/>
-            <a:r>
-              <a:rPr lang="en-US" dirty="0"/>
-              <a:t>Use symbolic AI to reason on symbols</a:t>
-            </a:r>
-          </a:p>
-          <a:p>
-            <a:pPr lvl="1"/>
-            <a:r>
-              <a:rPr lang="en-US" dirty="0"/>
-              <a:t>(possibly) Go back to data using another neural/ML approach</a:t>
-            </a:r>
-          </a:p>
-          <a:p>
-            <a:r>
-              <a:rPr lang="en-US" dirty="0"/>
-              <a:t>Interestingly, some of the biggest ML successes are </a:t>
-            </a:r>
-            <a:r>
-              <a:rPr lang="en-US" dirty="0" err="1"/>
-              <a:t>NeSy</a:t>
-            </a:r>
-            <a:endParaRPr lang="en-US" dirty="0"/>
-          </a:p>
-          <a:p>
-            <a:pPr lvl="1"/>
-            <a:r>
-              <a:rPr lang="en-US" dirty="0"/>
-              <a:t>AlphaGo uses a mix of symbolic</a:t>
-            </a:r>
-          </a:p>
-          <a:p>
-            <a:pPr lvl="1"/>
-            <a:r>
-              <a:rPr lang="en-US" dirty="0" err="1"/>
-              <a:t>AlphaFold</a:t>
-            </a:r>
-            <a:endParaRPr lang="en-US" dirty="0"/>
+              <a:t>Trade-off effectiveness/interpretability (black-box effect)</a:t>
+            </a:r>
+          </a:p>
+          <a:p>
+            <a:pPr lvl="1"/>
+            <a:r>
+              <a:rPr lang="en-US" dirty="0"/>
+              <a:t>Good predictive models are extremely complicated</a:t>
+            </a:r>
+          </a:p>
+          <a:p>
+            <a:pPr lvl="1"/>
+            <a:r>
+              <a:rPr lang="en-US" dirty="0"/>
+              <a:t>A single decision tree can be interpreted, 300 trees cannot</a:t>
+            </a:r>
+          </a:p>
+          <a:p>
+            <a:pPr lvl="1"/>
+            <a:r>
+              <a:rPr lang="en-US" dirty="0"/>
+              <a:t>Same goes for polynomial models with 300 features</a:t>
+            </a:r>
+          </a:p>
+          <a:p>
+            <a:r>
+              <a:rPr lang="en-US" dirty="0"/>
+              <a:t>Deep learning</a:t>
+            </a:r>
+          </a:p>
+          <a:p>
+            <a:pPr lvl="1"/>
+            <a:r>
+              <a:rPr lang="en-US" dirty="0"/>
+              <a:t>General idea is that deep ANNs can automatically infer </a:t>
+            </a:r>
+            <a:r>
+              <a:rPr lang="en-US" i="1" dirty="0"/>
+              <a:t>features</a:t>
+            </a:r>
+          </a:p>
+          <a:p>
+            <a:pPr lvl="1"/>
+            <a:r>
+              <a:rPr lang="en-US" dirty="0"/>
+              <a:t>Convolutional NNs, Recurrent NNs, Transformers, …</a:t>
+            </a:r>
+          </a:p>
+          <a:p>
+            <a:pPr lvl="1"/>
+            <a:r>
+              <a:rPr lang="en-US" dirty="0"/>
+              <a:t>Fantastic success stories for </a:t>
+            </a:r>
+            <a:r>
+              <a:rPr lang="en-US" b="1" dirty="0"/>
+              <a:t>structured data</a:t>
+            </a:r>
+            <a:r>
+              <a:rPr lang="en-US" dirty="0"/>
+              <a:t>!</a:t>
+            </a:r>
           </a:p>
         </p:txBody>
       </p:sp>
     </p:spTree>
     <p:extLst>
       <p:ext uri="{BB962C8B-B14F-4D97-AF65-F5344CB8AC3E}">
-        <p14:creationId xmlns:p14="http://schemas.microsoft.com/office/powerpoint/2010/main" val="3820875688"/>
+        <p14:creationId xmlns:p14="http://schemas.microsoft.com/office/powerpoint/2010/main" val="554510162"/>
       </p:ext>
     </p:extLst>
   </p:cSld>
@@ -5785,7 +6155,7 @@
           <p:cNvPr id="2" name="Titre 1">
             <a:extLst>
               <a:ext uri="{FF2B5EF4-FFF2-40B4-BE49-F238E27FC236}">
-                <a16:creationId xmlns:a16="http://schemas.microsoft.com/office/drawing/2014/main" id="{B707CEDE-7FA4-4ED4-93BB-5C912FFFA40A}"/>
+                <a16:creationId xmlns:a16="http://schemas.microsoft.com/office/drawing/2014/main" id="{EBF2B6A1-6B5B-4608-B847-4CC61EE0D57D}"/>
               </a:ext>
             </a:extLst>
           </p:cNvPr>
@@ -5803,7 +6173,7 @@
           <a:p>
             <a:r>
               <a:rPr lang="en-US" dirty="0"/>
-              <a:t>Artificial General Intelligence</a:t>
+              <a:t>Reinforcement learning</a:t>
             </a:r>
           </a:p>
         </p:txBody>
@@ -5813,7 +6183,7 @@
           <p:cNvPr id="3" name="Espace réservé du texte 2">
             <a:extLst>
               <a:ext uri="{FF2B5EF4-FFF2-40B4-BE49-F238E27FC236}">
-                <a16:creationId xmlns:a16="http://schemas.microsoft.com/office/drawing/2014/main" id="{E159C557-5AEC-4E1D-8D18-CDB966C95939}"/>
+                <a16:creationId xmlns:a16="http://schemas.microsoft.com/office/drawing/2014/main" id="{ADB2DD4C-65CD-47DD-AF86-CBFD75ABACB5}"/>
               </a:ext>
             </a:extLst>
           </p:cNvPr>
@@ -5831,6 +6201,293 @@
           <a:p>
             <a:r>
               <a:rPr lang="en-US" dirty="0"/>
+              <a:t>Similar to ML, but not exactly</a:t>
+            </a:r>
+          </a:p>
+          <a:p>
+            <a:pPr lvl="1"/>
+            <a:r>
+              <a:rPr lang="en-US" dirty="0"/>
+              <a:t>No value associated to a single decision</a:t>
+            </a:r>
+          </a:p>
+          <a:p>
+            <a:pPr lvl="1"/>
+            <a:r>
+              <a:rPr lang="en-US" dirty="0"/>
+              <a:t>Reward is consequence of a </a:t>
+            </a:r>
+            <a:r>
+              <a:rPr lang="en-US" i="1" dirty="0"/>
+              <a:t>series</a:t>
+            </a:r>
+            <a:r>
+              <a:rPr lang="en-US" dirty="0"/>
+              <a:t> of decisions</a:t>
+            </a:r>
+          </a:p>
+          <a:p>
+            <a:pPr lvl="1"/>
+            <a:r>
+              <a:rPr lang="en-US" dirty="0"/>
+              <a:t>Example: chess game; is trading a Queen for a Knight good? Well, it depends on the board state</a:t>
+            </a:r>
+          </a:p>
+          <a:p>
+            <a:pPr lvl="1"/>
+            <a:endParaRPr lang="en-US" dirty="0"/>
+          </a:p>
+        </p:txBody>
+      </p:sp>
+    </p:spTree>
+    <p:extLst>
+      <p:ext uri="{BB962C8B-B14F-4D97-AF65-F5344CB8AC3E}">
+        <p14:creationId xmlns:p14="http://schemas.microsoft.com/office/powerpoint/2010/main" val="1214248259"/>
+      </p:ext>
+    </p:extLst>
+  </p:cSld>
+  <p:clrMapOvr>
+    <a:masterClrMapping/>
+  </p:clrMapOvr>
+</p:sld>
+</file>
+
+<file path=ppt/slides/slide23.xml><?xml version="1.0" encoding="utf-8"?>
+<p:sld xmlns:a="http://schemas.openxmlformats.org/drawingml/2006/main" xmlns:r="http://schemas.openxmlformats.org/officeDocument/2006/relationships" xmlns:p="http://schemas.openxmlformats.org/presentationml/2006/main">
+  <p:cSld>
+    <p:spTree>
+      <p:nvGrpSpPr>
+        <p:cNvPr id="1" name=""/>
+        <p:cNvGrpSpPr/>
+        <p:nvPr/>
+      </p:nvGrpSpPr>
+      <p:grpSpPr>
+        <a:xfrm>
+          <a:off x="0" y="0"/>
+          <a:ext cx="0" cy="0"/>
+          <a:chOff x="0" y="0"/>
+          <a:chExt cx="0" cy="0"/>
+        </a:xfrm>
+      </p:grpSpPr>
+      <p:sp>
+        <p:nvSpPr>
+          <p:cNvPr id="2" name="Titre 1">
+            <a:extLst>
+              <a:ext uri="{FF2B5EF4-FFF2-40B4-BE49-F238E27FC236}">
+                <a16:creationId xmlns:a16="http://schemas.microsoft.com/office/drawing/2014/main" id="{40A95C8A-6E61-4586-AE10-B5D51600B4B0}"/>
+              </a:ext>
+            </a:extLst>
+          </p:cNvPr>
+          <p:cNvSpPr>
+            <a:spLocks noGrp="1"/>
+          </p:cNvSpPr>
+          <p:nvPr>
+            <p:ph type="title"/>
+          </p:nvPr>
+        </p:nvSpPr>
+        <p:spPr/>
+        <p:txBody>
+          <a:bodyPr/>
+          <a:lstStyle/>
+          <a:p>
+            <a:r>
+              <a:rPr lang="en-US" dirty="0"/>
+              <a:t>Neuro-symbolic AI (</a:t>
+            </a:r>
+            <a:r>
+              <a:rPr lang="en-US" dirty="0" err="1"/>
+              <a:t>NeSy</a:t>
+            </a:r>
+            <a:r>
+              <a:rPr lang="en-US" dirty="0"/>
+              <a:t>)</a:t>
+            </a:r>
+          </a:p>
+        </p:txBody>
+      </p:sp>
+      <p:sp>
+        <p:nvSpPr>
+          <p:cNvPr id="3" name="Espace réservé du texte 2">
+            <a:extLst>
+              <a:ext uri="{FF2B5EF4-FFF2-40B4-BE49-F238E27FC236}">
+                <a16:creationId xmlns:a16="http://schemas.microsoft.com/office/drawing/2014/main" id="{DD173D4B-1221-4D29-96A0-68CF7052176D}"/>
+              </a:ext>
+            </a:extLst>
+          </p:cNvPr>
+          <p:cNvSpPr>
+            <a:spLocks noGrp="1"/>
+          </p:cNvSpPr>
+          <p:nvPr>
+            <p:ph type="body" sz="quarter" idx="10"/>
+          </p:nvPr>
+        </p:nvSpPr>
+        <p:spPr/>
+        <p:txBody>
+          <a:bodyPr/>
+          <a:lstStyle/>
+          <a:p>
+            <a:r>
+              <a:rPr lang="en-US" dirty="0"/>
+              <a:t>Might look complex, but the general idea is intuitive</a:t>
+            </a:r>
+          </a:p>
+          <a:p>
+            <a:pPr lvl="1"/>
+            <a:r>
+              <a:rPr lang="en-US" dirty="0"/>
+              <a:t>Use neural/ML approach to map from data to symbols</a:t>
+            </a:r>
+          </a:p>
+          <a:p>
+            <a:pPr lvl="1"/>
+            <a:r>
+              <a:rPr lang="en-US" dirty="0"/>
+              <a:t>Use symbolic AI to reason on symbols</a:t>
+            </a:r>
+          </a:p>
+          <a:p>
+            <a:pPr lvl="1"/>
+            <a:r>
+              <a:rPr lang="en-US" dirty="0"/>
+              <a:t>(possibly) Go back to data using another neural/ML approach</a:t>
+            </a:r>
+          </a:p>
+          <a:p>
+            <a:pPr lvl="1"/>
+            <a:r>
+              <a:rPr lang="en-US" dirty="0"/>
+              <a:t>Effectiveness (ML) + </a:t>
+            </a:r>
+            <a:r>
+              <a:rPr lang="en-US" dirty="0" err="1"/>
+              <a:t>Explainability</a:t>
+            </a:r>
+            <a:r>
+              <a:rPr lang="en-US" dirty="0"/>
+              <a:t> (Symbolic AI)</a:t>
+            </a:r>
+          </a:p>
+          <a:p>
+            <a:pPr lvl="1"/>
+            <a:r>
+              <a:rPr lang="en-US" dirty="0"/>
+              <a:t>However, it’s pretty hard to do, and problem-specific</a:t>
+            </a:r>
+          </a:p>
+          <a:p>
+            <a:r>
+              <a:rPr lang="en-US" dirty="0"/>
+              <a:t>Interestingly, some of the biggest ML successes are </a:t>
+            </a:r>
+            <a:r>
+              <a:rPr lang="en-US" dirty="0" err="1"/>
+              <a:t>NeSy</a:t>
+            </a:r>
+            <a:endParaRPr lang="en-US" dirty="0"/>
+          </a:p>
+          <a:p>
+            <a:pPr lvl="1"/>
+            <a:r>
+              <a:rPr lang="en-US" dirty="0"/>
+              <a:t>AlphaGo uses a mix of symbolic exploration an NN</a:t>
+            </a:r>
+          </a:p>
+          <a:p>
+            <a:pPr lvl="1"/>
+            <a:r>
+              <a:rPr lang="en-US" dirty="0" err="1"/>
+              <a:t>AlphaFold</a:t>
+            </a:r>
+            <a:r>
+              <a:rPr lang="en-US" dirty="0"/>
+              <a:t> is a mix of 30 algorithms (some Symbolic, some ML)</a:t>
+            </a:r>
+          </a:p>
+        </p:txBody>
+      </p:sp>
+    </p:spTree>
+    <p:extLst>
+      <p:ext uri="{BB962C8B-B14F-4D97-AF65-F5344CB8AC3E}">
+        <p14:creationId xmlns:p14="http://schemas.microsoft.com/office/powerpoint/2010/main" val="3820875688"/>
+      </p:ext>
+    </p:extLst>
+  </p:cSld>
+  <p:clrMapOvr>
+    <a:masterClrMapping/>
+  </p:clrMapOvr>
+</p:sld>
+</file>
+
+<file path=ppt/slides/slide24.xml><?xml version="1.0" encoding="utf-8"?>
+<p:sld xmlns:a="http://schemas.openxmlformats.org/drawingml/2006/main" xmlns:r="http://schemas.openxmlformats.org/officeDocument/2006/relationships" xmlns:p="http://schemas.openxmlformats.org/presentationml/2006/main">
+  <p:cSld>
+    <p:spTree>
+      <p:nvGrpSpPr>
+        <p:cNvPr id="1" name=""/>
+        <p:cNvGrpSpPr/>
+        <p:nvPr/>
+      </p:nvGrpSpPr>
+      <p:grpSpPr>
+        <a:xfrm>
+          <a:off x="0" y="0"/>
+          <a:ext cx="0" cy="0"/>
+          <a:chOff x="0" y="0"/>
+          <a:chExt cx="0" cy="0"/>
+        </a:xfrm>
+      </p:grpSpPr>
+      <p:sp>
+        <p:nvSpPr>
+          <p:cNvPr id="2" name="Titre 1">
+            <a:extLst>
+              <a:ext uri="{FF2B5EF4-FFF2-40B4-BE49-F238E27FC236}">
+                <a16:creationId xmlns:a16="http://schemas.microsoft.com/office/drawing/2014/main" id="{B707CEDE-7FA4-4ED4-93BB-5C912FFFA40A}"/>
+              </a:ext>
+            </a:extLst>
+          </p:cNvPr>
+          <p:cNvSpPr>
+            <a:spLocks noGrp="1"/>
+          </p:cNvSpPr>
+          <p:nvPr>
+            <p:ph type="title"/>
+          </p:nvPr>
+        </p:nvSpPr>
+        <p:spPr/>
+        <p:txBody>
+          <a:bodyPr/>
+          <a:lstStyle/>
+          <a:p>
+            <a:r>
+              <a:rPr lang="en-US" dirty="0"/>
+              <a:t>Artificial General Intelligence</a:t>
+            </a:r>
+          </a:p>
+        </p:txBody>
+      </p:sp>
+      <p:sp>
+        <p:nvSpPr>
+          <p:cNvPr id="3" name="Espace réservé du texte 2">
+            <a:extLst>
+              <a:ext uri="{FF2B5EF4-FFF2-40B4-BE49-F238E27FC236}">
+                <a16:creationId xmlns:a16="http://schemas.microsoft.com/office/drawing/2014/main" id="{E159C557-5AEC-4E1D-8D18-CDB966C95939}"/>
+              </a:ext>
+            </a:extLst>
+          </p:cNvPr>
+          <p:cNvSpPr>
+            <a:spLocks noGrp="1"/>
+          </p:cNvSpPr>
+          <p:nvPr>
+            <p:ph type="body" sz="quarter" idx="10"/>
+          </p:nvPr>
+        </p:nvSpPr>
+        <p:spPr/>
+        <p:txBody>
+          <a:bodyPr>
+            <a:normAutofit/>
+          </a:bodyPr>
+          <a:lstStyle/>
+          <a:p>
+            <a:r>
+              <a:rPr lang="en-US" dirty="0"/>
               <a:t>Hypothetical artificial intelligent agent</a:t>
             </a:r>
           </a:p>
@@ -5838,14 +6495,64 @@
             <a:pPr lvl="1"/>
             <a:r>
               <a:rPr lang="en-US" dirty="0"/>
-              <a:t>“It can learn (rapidly and cheaply) to perform any task that a human or another animal could perform, with minimal amounts of errors”</a:t>
-            </a:r>
-          </a:p>
-          <a:p>
-            <a:pPr lvl="1"/>
-            <a:r>
-              <a:rPr lang="en-US" dirty="0"/>
+              <a:t>“Can learn (rapidly and cheaply) to perform any task that a human or another animal could perform, with minimal amounts of errors”</a:t>
+            </a:r>
+          </a:p>
+          <a:p>
+            <a:pPr lvl="1"/>
+            <a:r>
+              <a:rPr lang="en-US" b="1" dirty="0"/>
               <a:t>It does not exist</a:t>
+            </a:r>
+            <a:r>
+              <a:rPr lang="en-US" dirty="0"/>
+              <a:t>, there is no clear path towards it</a:t>
+            </a:r>
+          </a:p>
+          <a:p>
+            <a:pPr lvl="1"/>
+            <a:r>
+              <a:rPr lang="en-US" dirty="0"/>
+              <a:t>Lots of people scared by apparently quick advances of AI</a:t>
+            </a:r>
+          </a:p>
+          <a:p>
+            <a:pPr lvl="1"/>
+            <a:r>
+              <a:rPr lang="en-US" dirty="0"/>
+              <a:t>Even some real experts (!!!)</a:t>
+            </a:r>
+          </a:p>
+          <a:p>
+            <a:r>
+              <a:rPr lang="en-US" b="1" dirty="0">
+                <a:solidFill>
+                  <a:srgbClr val="FF0000"/>
+                </a:solidFill>
+              </a:rPr>
+              <a:t>My opinion</a:t>
+            </a:r>
+          </a:p>
+          <a:p>
+            <a:pPr lvl="1"/>
+            <a:r>
+              <a:rPr lang="en-US" dirty="0">
+                <a:solidFill>
+                  <a:srgbClr val="FF0000"/>
+                </a:solidFill>
+              </a:rPr>
+              <a:t>Existential risk is non-existent</a:t>
+            </a:r>
+          </a:p>
+          <a:p>
+            <a:pPr lvl="1"/>
+            <a:r>
+              <a:rPr lang="en-US" dirty="0">
+                <a:solidFill>
+                  <a:srgbClr val="FF0000"/>
+                </a:solidFill>
+              </a:rPr>
+              <a:t>Real risks are already here, from misuse/misunderstanding</a:t>
             </a:r>
           </a:p>
         </p:txBody>
@@ -5863,7 +6570,7 @@
 </p:sld>
 </file>
 
-<file path=ppt/slides/slide23.xml><?xml version="1.0" encoding="utf-8"?>
+<file path=ppt/slides/slide25.xml><?xml version="1.0" encoding="utf-8"?>
 <p:sld xmlns:a="http://schemas.openxmlformats.org/drawingml/2006/main" xmlns:r="http://schemas.openxmlformats.org/officeDocument/2006/relationships" xmlns:p="http://schemas.openxmlformats.org/presentationml/2006/main">
   <p:cSld>
     <p:spTree>
@@ -6010,322 +6717,6 @@
 </p:sld>
 </file>
 
-<file path=ppt/slides/slide24.xml><?xml version="1.0" encoding="utf-8"?>
-<p:sld xmlns:a="http://schemas.openxmlformats.org/drawingml/2006/main" xmlns:r="http://schemas.openxmlformats.org/officeDocument/2006/relationships" xmlns:p="http://schemas.openxmlformats.org/presentationml/2006/main">
-  <p:cSld>
-    <p:spTree>
-      <p:nvGrpSpPr>
-        <p:cNvPr id="1" name=""/>
-        <p:cNvGrpSpPr/>
-        <p:nvPr/>
-      </p:nvGrpSpPr>
-      <p:grpSpPr>
-        <a:xfrm>
-          <a:off x="0" y="0"/>
-          <a:ext cx="0" cy="0"/>
-          <a:chOff x="0" y="0"/>
-          <a:chExt cx="0" cy="0"/>
-        </a:xfrm>
-      </p:grpSpPr>
-      <p:sp>
-        <p:nvSpPr>
-          <p:cNvPr id="2" name="Titre 1">
-            <a:extLst>
-              <a:ext uri="{FF2B5EF4-FFF2-40B4-BE49-F238E27FC236}">
-                <a16:creationId xmlns:a16="http://schemas.microsoft.com/office/drawing/2014/main" id="{ECECB326-6D55-4011-BF4F-AD05E1FB780C}"/>
-              </a:ext>
-            </a:extLst>
-          </p:cNvPr>
-          <p:cNvSpPr>
-            <a:spLocks noGrp="1"/>
-          </p:cNvSpPr>
-          <p:nvPr>
-            <p:ph type="title"/>
-          </p:nvPr>
-        </p:nvSpPr>
-        <p:spPr/>
-        <p:txBody>
-          <a:bodyPr>
-            <a:normAutofit/>
-          </a:bodyPr>
-          <a:lstStyle/>
-          <a:p>
-            <a:r>
-              <a:rPr lang="it-IT" dirty="0"/>
-              <a:t>Relationship between AI and optimization?</a:t>
-            </a:r>
-          </a:p>
-        </p:txBody>
-      </p:sp>
-      <p:sp>
-        <p:nvSpPr>
-          <p:cNvPr id="3" name="Espace réservé du texte 2">
-            <a:extLst>
-              <a:ext uri="{FF2B5EF4-FFF2-40B4-BE49-F238E27FC236}">
-                <a16:creationId xmlns:a16="http://schemas.microsoft.com/office/drawing/2014/main" id="{2B8B208A-023A-4A17-A5C6-0D8B4915411E}"/>
-              </a:ext>
-            </a:extLst>
-          </p:cNvPr>
-          <p:cNvSpPr>
-            <a:spLocks noGrp="1"/>
-          </p:cNvSpPr>
-          <p:nvPr>
-            <p:ph type="body" sz="quarter" idx="10"/>
-          </p:nvPr>
-        </p:nvSpPr>
-        <p:spPr/>
-        <p:txBody>
-          <a:bodyPr/>
-          <a:lstStyle/>
-          <a:p>
-            <a:r>
-              <a:rPr lang="en-US" dirty="0"/>
-              <a:t>Most “Intelligence” requires making </a:t>
-            </a:r>
-            <a:r>
-              <a:rPr lang="en-US" u="sng" dirty="0"/>
-              <a:t>good choices</a:t>
-            </a:r>
-          </a:p>
-          <a:p>
-            <a:pPr lvl="1"/>
-            <a:r>
-              <a:rPr lang="en-US" dirty="0"/>
-              <a:t>Predict the next value in a time series, as precisely as possible</a:t>
-            </a:r>
-          </a:p>
-          <a:p>
-            <a:pPr lvl="1"/>
-            <a:r>
-              <a:rPr lang="en-US" dirty="0"/>
-              <a:t>Correctly identify the human poses in a video</a:t>
-            </a:r>
-          </a:p>
-          <a:p>
-            <a:pPr lvl="1"/>
-            <a:r>
-              <a:rPr lang="en-US" dirty="0"/>
-              <a:t>Make the best possible chess move, given the situation</a:t>
-            </a:r>
-          </a:p>
-          <a:p>
-            <a:pPr lvl="1"/>
-            <a:r>
-              <a:rPr lang="en-US" dirty="0"/>
-              <a:t>Maximize your score in Super Mario</a:t>
-            </a:r>
-          </a:p>
-          <a:p>
-            <a:pPr lvl="1"/>
-            <a:r>
-              <a:rPr lang="en-US" dirty="0"/>
-              <a:t>Generate a sequence of words that best follows the input</a:t>
-            </a:r>
-          </a:p>
-          <a:p>
-            <a:pPr lvl="1"/>
-            <a:r>
-              <a:rPr lang="en-US" dirty="0"/>
-              <a:t>Create the painting that best corresponds to a written prompt</a:t>
-            </a:r>
-          </a:p>
-          <a:p>
-            <a:pPr lvl="1"/>
-            <a:endParaRPr lang="en-US" dirty="0"/>
-          </a:p>
-          <a:p>
-            <a:pPr lvl="1"/>
-            <a:endParaRPr lang="en-US" dirty="0"/>
-          </a:p>
-        </p:txBody>
-      </p:sp>
-    </p:spTree>
-    <p:extLst>
-      <p:ext uri="{BB962C8B-B14F-4D97-AF65-F5344CB8AC3E}">
-        <p14:creationId xmlns:p14="http://schemas.microsoft.com/office/powerpoint/2010/main" val="1571733551"/>
-      </p:ext>
-    </p:extLst>
-  </p:cSld>
-  <p:clrMapOvr>
-    <a:masterClrMapping/>
-  </p:clrMapOvr>
-</p:sld>
-</file>
-
-<file path=ppt/slides/slide25.xml><?xml version="1.0" encoding="utf-8"?>
-<p:sld xmlns:a="http://schemas.openxmlformats.org/drawingml/2006/main" xmlns:r="http://schemas.openxmlformats.org/officeDocument/2006/relationships" xmlns:p="http://schemas.openxmlformats.org/presentationml/2006/main">
-  <p:cSld>
-    <p:spTree>
-      <p:nvGrpSpPr>
-        <p:cNvPr id="1" name=""/>
-        <p:cNvGrpSpPr/>
-        <p:nvPr/>
-      </p:nvGrpSpPr>
-      <p:grpSpPr>
-        <a:xfrm>
-          <a:off x="0" y="0"/>
-          <a:ext cx="0" cy="0"/>
-          <a:chOff x="0" y="0"/>
-          <a:chExt cx="0" cy="0"/>
-        </a:xfrm>
-      </p:grpSpPr>
-      <p:sp>
-        <p:nvSpPr>
-          <p:cNvPr id="2" name="Titre 1">
-            <a:extLst>
-              <a:ext uri="{FF2B5EF4-FFF2-40B4-BE49-F238E27FC236}">
-                <a16:creationId xmlns:a16="http://schemas.microsoft.com/office/drawing/2014/main" id="{ECECB326-6D55-4011-BF4F-AD05E1FB780C}"/>
-              </a:ext>
-            </a:extLst>
-          </p:cNvPr>
-          <p:cNvSpPr>
-            <a:spLocks noGrp="1"/>
-          </p:cNvSpPr>
-          <p:nvPr>
-            <p:ph type="title"/>
-          </p:nvPr>
-        </p:nvSpPr>
-        <p:spPr/>
-        <p:txBody>
-          <a:bodyPr>
-            <a:normAutofit/>
-          </a:bodyPr>
-          <a:lstStyle/>
-          <a:p>
-            <a:r>
-              <a:rPr lang="it-IT" dirty="0"/>
-              <a:t>Relationship between AI and optimization?</a:t>
-            </a:r>
-          </a:p>
-        </p:txBody>
-      </p:sp>
-      <p:sp>
-        <p:nvSpPr>
-          <p:cNvPr id="3" name="Espace réservé du texte 2">
-            <a:extLst>
-              <a:ext uri="{FF2B5EF4-FFF2-40B4-BE49-F238E27FC236}">
-                <a16:creationId xmlns:a16="http://schemas.microsoft.com/office/drawing/2014/main" id="{2B8B208A-023A-4A17-A5C6-0D8B4915411E}"/>
-              </a:ext>
-            </a:extLst>
-          </p:cNvPr>
-          <p:cNvSpPr>
-            <a:spLocks noGrp="1"/>
-          </p:cNvSpPr>
-          <p:nvPr>
-            <p:ph type="body" sz="quarter" idx="10"/>
-          </p:nvPr>
-        </p:nvSpPr>
-        <p:spPr/>
-        <p:txBody>
-          <a:bodyPr/>
-          <a:lstStyle/>
-          <a:p>
-            <a:r>
-              <a:rPr lang="en-US" dirty="0"/>
-              <a:t>Most “Intelligence” requires making </a:t>
-            </a:r>
-            <a:r>
-              <a:rPr lang="en-US" u="sng" dirty="0"/>
-              <a:t>good choices</a:t>
-            </a:r>
-          </a:p>
-          <a:p>
-            <a:pPr lvl="1"/>
-            <a:r>
-              <a:rPr lang="en-US" dirty="0"/>
-              <a:t>Predict the next value in a time series, </a:t>
-            </a:r>
-            <a:r>
-              <a:rPr lang="en-US" b="1" dirty="0"/>
-              <a:t>as precisely as possible</a:t>
-            </a:r>
-          </a:p>
-          <a:p>
-            <a:pPr lvl="1"/>
-            <a:r>
-              <a:rPr lang="en-US" b="1" dirty="0"/>
-              <a:t>Correctly</a:t>
-            </a:r>
-            <a:r>
-              <a:rPr lang="en-US" dirty="0"/>
-              <a:t> identify the human poses in a video</a:t>
-            </a:r>
-          </a:p>
-          <a:p>
-            <a:pPr lvl="1"/>
-            <a:r>
-              <a:rPr lang="en-US" dirty="0"/>
-              <a:t>Make the </a:t>
-            </a:r>
-            <a:r>
-              <a:rPr lang="en-US" b="1" dirty="0"/>
-              <a:t>best possible</a:t>
-            </a:r>
-            <a:r>
-              <a:rPr lang="en-US" dirty="0"/>
-              <a:t> chess move, given the situation</a:t>
-            </a:r>
-          </a:p>
-          <a:p>
-            <a:pPr lvl="1"/>
-            <a:r>
-              <a:rPr lang="en-US" b="1" dirty="0"/>
-              <a:t>Maximize</a:t>
-            </a:r>
-            <a:r>
-              <a:rPr lang="en-US" dirty="0"/>
-              <a:t> your score in Super Mario</a:t>
-            </a:r>
-          </a:p>
-          <a:p>
-            <a:pPr lvl="1"/>
-            <a:r>
-              <a:rPr lang="en-US" dirty="0"/>
-              <a:t>Generate a sequence of words that </a:t>
-            </a:r>
-            <a:r>
-              <a:rPr lang="en-US" b="1" dirty="0"/>
-              <a:t>best follows the input</a:t>
-            </a:r>
-          </a:p>
-          <a:p>
-            <a:pPr lvl="1"/>
-            <a:r>
-              <a:rPr lang="en-US" dirty="0"/>
-              <a:t>Create the painting that </a:t>
-            </a:r>
-            <a:r>
-              <a:rPr lang="en-US" b="1" dirty="0"/>
-              <a:t>best corresponds</a:t>
-            </a:r>
-            <a:r>
-              <a:rPr lang="en-US" dirty="0"/>
-              <a:t> to a written prompt</a:t>
-            </a:r>
-          </a:p>
-          <a:p>
-            <a:pPr lvl="1"/>
-            <a:endParaRPr lang="en-US" dirty="0"/>
-          </a:p>
-          <a:p>
-            <a:pPr lvl="1"/>
-            <a:endParaRPr lang="en-US" dirty="0"/>
-          </a:p>
-        </p:txBody>
-      </p:sp>
-    </p:spTree>
-    <p:extLst>
-      <p:ext uri="{BB962C8B-B14F-4D97-AF65-F5344CB8AC3E}">
-        <p14:creationId xmlns:p14="http://schemas.microsoft.com/office/powerpoint/2010/main" val="2060198537"/>
-      </p:ext>
-    </p:extLst>
-  </p:cSld>
-  <p:clrMapOvr>
-    <a:masterClrMapping/>
-  </p:clrMapOvr>
-</p:sld>
-</file>
-
 <file path=ppt/slides/slide26.xml><?xml version="1.0" encoding="utf-8"?>
 <p:sld xmlns:a="http://schemas.openxmlformats.org/drawingml/2006/main" xmlns:r="http://schemas.openxmlformats.org/officeDocument/2006/relationships" xmlns:p="http://schemas.openxmlformats.org/presentationml/2006/main">
   <p:cSld>
@@ -6348,7 +6739,7 @@
           <p:cNvPr id="2" name="Titre 1">
             <a:extLst>
               <a:ext uri="{FF2B5EF4-FFF2-40B4-BE49-F238E27FC236}">
-                <a16:creationId xmlns:a16="http://schemas.microsoft.com/office/drawing/2014/main" id="{0AD7C835-BCBB-4CDE-A4B9-CBD6867DA959}"/>
+                <a16:creationId xmlns:a16="http://schemas.microsoft.com/office/drawing/2014/main" id="{ECECB326-6D55-4011-BF4F-AD05E1FB780C}"/>
               </a:ext>
             </a:extLst>
           </p:cNvPr>
@@ -6361,11 +6752,13 @@
         </p:nvSpPr>
         <p:spPr/>
         <p:txBody>
-          <a:bodyPr/>
+          <a:bodyPr>
+            <a:normAutofit/>
+          </a:bodyPr>
           <a:lstStyle/>
           <a:p>
             <a:r>
-              <a:rPr lang="en-US" dirty="0"/>
+              <a:rPr lang="it-IT" dirty="0"/>
               <a:t>Relationship between AI and optimization?</a:t>
             </a:r>
           </a:p>
@@ -6376,7 +6769,7 @@
           <p:cNvPr id="3" name="Espace réservé du texte 2">
             <a:extLst>
               <a:ext uri="{FF2B5EF4-FFF2-40B4-BE49-F238E27FC236}">
-                <a16:creationId xmlns:a16="http://schemas.microsoft.com/office/drawing/2014/main" id="{3586AAC0-F49F-42BD-B72C-328EDEAC1CF5}"/>
+                <a16:creationId xmlns:a16="http://schemas.microsoft.com/office/drawing/2014/main" id="{2B8B208A-023A-4A17-A5C6-0D8B4915411E}"/>
               </a:ext>
             </a:extLst>
           </p:cNvPr>
@@ -6394,47 +6787,69 @@
           <a:p>
             <a:r>
               <a:rPr lang="en-US" dirty="0"/>
-              <a:t>AI: from many (many!!!) possible choices, pick the best</a:t>
-            </a:r>
-          </a:p>
-          <a:p>
-            <a:r>
-              <a:rPr lang="en-US" dirty="0"/>
-              <a:t>If you can evaluate your choices, you can optimize</a:t>
-            </a:r>
-          </a:p>
-          <a:p>
-            <a:r>
-              <a:rPr lang="en-US" dirty="0"/>
-              <a:t>(</a:t>
-            </a:r>
-            <a:r>
-              <a:rPr lang="en-US" b="1" dirty="0">
-                <a:solidFill>
-                  <a:srgbClr val="FF0000"/>
-                </a:solidFill>
-              </a:rPr>
-              <a:t>AFAIK</a:t>
-            </a:r>
-            <a:r>
-              <a:rPr lang="en-US" dirty="0"/>
-              <a:t>) </a:t>
-            </a:r>
-            <a:r>
-              <a:rPr lang="en-US" b="1" dirty="0"/>
-              <a:t>All AI systems</a:t>
-            </a:r>
-            <a:r>
-              <a:rPr lang="en-US" dirty="0"/>
-              <a:t> include some type of optimization</a:t>
-            </a:r>
+              <a:t>Most “Intelligence” requires making </a:t>
+            </a:r>
+            <a:r>
+              <a:rPr lang="en-US" u="sng" dirty="0"/>
+              <a:t>good choices</a:t>
+            </a:r>
+          </a:p>
+          <a:p>
+            <a:pPr lvl="1"/>
+            <a:r>
+              <a:rPr lang="en-US" dirty="0"/>
+              <a:t>Predict the next value in a time series, as precisely as possible</a:t>
+            </a:r>
+          </a:p>
+          <a:p>
+            <a:pPr lvl="1"/>
+            <a:r>
+              <a:rPr lang="en-US" dirty="0"/>
+              <a:t>Correctly identify the human poses in a video</a:t>
+            </a:r>
+          </a:p>
+          <a:p>
+            <a:pPr lvl="1"/>
+            <a:r>
+              <a:rPr lang="en-US" dirty="0"/>
+              <a:t>Make the best possible chess move, given the situation</a:t>
+            </a:r>
+          </a:p>
+          <a:p>
+            <a:pPr lvl="1"/>
+            <a:r>
+              <a:rPr lang="en-US" dirty="0"/>
+              <a:t>Maximize your score in Super Mario</a:t>
+            </a:r>
+          </a:p>
+          <a:p>
+            <a:pPr lvl="1"/>
+            <a:r>
+              <a:rPr lang="en-US" dirty="0"/>
+              <a:t>Generate a sequence of words that best follows the input</a:t>
+            </a:r>
+          </a:p>
+          <a:p>
+            <a:pPr lvl="1"/>
+            <a:r>
+              <a:rPr lang="en-US" dirty="0"/>
+              <a:t>Create the painting that best corresponds to a written prompt</a:t>
+            </a:r>
+          </a:p>
+          <a:p>
+            <a:pPr lvl="1"/>
+            <a:endParaRPr lang="en-US" dirty="0"/>
+          </a:p>
+          <a:p>
+            <a:pPr lvl="1"/>
+            <a:endParaRPr lang="en-US" dirty="0"/>
           </a:p>
         </p:txBody>
       </p:sp>
     </p:spTree>
     <p:extLst>
       <p:ext uri="{BB962C8B-B14F-4D97-AF65-F5344CB8AC3E}">
-        <p14:creationId xmlns:p14="http://schemas.microsoft.com/office/powerpoint/2010/main" val="3233463855"/>
+        <p14:creationId xmlns:p14="http://schemas.microsoft.com/office/powerpoint/2010/main" val="1571733551"/>
       </p:ext>
     </p:extLst>
   </p:cSld>
@@ -6466,6 +6881,298 @@
           <p:cNvPr id="2" name="Titre 1">
             <a:extLst>
               <a:ext uri="{FF2B5EF4-FFF2-40B4-BE49-F238E27FC236}">
+                <a16:creationId xmlns:a16="http://schemas.microsoft.com/office/drawing/2014/main" id="{ECECB326-6D55-4011-BF4F-AD05E1FB780C}"/>
+              </a:ext>
+            </a:extLst>
+          </p:cNvPr>
+          <p:cNvSpPr>
+            <a:spLocks noGrp="1"/>
+          </p:cNvSpPr>
+          <p:nvPr>
+            <p:ph type="title"/>
+          </p:nvPr>
+        </p:nvSpPr>
+        <p:spPr/>
+        <p:txBody>
+          <a:bodyPr>
+            <a:normAutofit/>
+          </a:bodyPr>
+          <a:lstStyle/>
+          <a:p>
+            <a:r>
+              <a:rPr lang="it-IT" dirty="0"/>
+              <a:t>Relationship between AI and optimization?</a:t>
+            </a:r>
+          </a:p>
+        </p:txBody>
+      </p:sp>
+      <p:sp>
+        <p:nvSpPr>
+          <p:cNvPr id="3" name="Espace réservé du texte 2">
+            <a:extLst>
+              <a:ext uri="{FF2B5EF4-FFF2-40B4-BE49-F238E27FC236}">
+                <a16:creationId xmlns:a16="http://schemas.microsoft.com/office/drawing/2014/main" id="{2B8B208A-023A-4A17-A5C6-0D8B4915411E}"/>
+              </a:ext>
+            </a:extLst>
+          </p:cNvPr>
+          <p:cNvSpPr>
+            <a:spLocks noGrp="1"/>
+          </p:cNvSpPr>
+          <p:nvPr>
+            <p:ph type="body" sz="quarter" idx="10"/>
+          </p:nvPr>
+        </p:nvSpPr>
+        <p:spPr/>
+        <p:txBody>
+          <a:bodyPr/>
+          <a:lstStyle/>
+          <a:p>
+            <a:r>
+              <a:rPr lang="en-US" dirty="0"/>
+              <a:t>Most “Intelligence” requires making </a:t>
+            </a:r>
+            <a:r>
+              <a:rPr lang="en-US" u="sng" dirty="0"/>
+              <a:t>good choices</a:t>
+            </a:r>
+          </a:p>
+          <a:p>
+            <a:pPr lvl="1"/>
+            <a:r>
+              <a:rPr lang="en-US" dirty="0"/>
+              <a:t>Predict the next value in a time series, </a:t>
+            </a:r>
+            <a:r>
+              <a:rPr lang="en-US" b="1" dirty="0"/>
+              <a:t>as precisely as possible</a:t>
+            </a:r>
+          </a:p>
+          <a:p>
+            <a:pPr lvl="1"/>
+            <a:r>
+              <a:rPr lang="en-US" b="1" dirty="0"/>
+              <a:t>Correctly</a:t>
+            </a:r>
+            <a:r>
+              <a:rPr lang="en-US" dirty="0"/>
+              <a:t> identify the human poses in a video</a:t>
+            </a:r>
+          </a:p>
+          <a:p>
+            <a:pPr lvl="1"/>
+            <a:r>
+              <a:rPr lang="en-US" dirty="0"/>
+              <a:t>Make the </a:t>
+            </a:r>
+            <a:r>
+              <a:rPr lang="en-US" b="1" dirty="0"/>
+              <a:t>best possible</a:t>
+            </a:r>
+            <a:r>
+              <a:rPr lang="en-US" dirty="0"/>
+              <a:t> chess move, given the situation</a:t>
+            </a:r>
+          </a:p>
+          <a:p>
+            <a:pPr lvl="1"/>
+            <a:r>
+              <a:rPr lang="en-US" b="1" dirty="0"/>
+              <a:t>Maximize</a:t>
+            </a:r>
+            <a:r>
+              <a:rPr lang="en-US" dirty="0"/>
+              <a:t> your score in Super Mario</a:t>
+            </a:r>
+          </a:p>
+          <a:p>
+            <a:pPr lvl="1"/>
+            <a:r>
+              <a:rPr lang="en-US" dirty="0"/>
+              <a:t>Generate a sequence of words that </a:t>
+            </a:r>
+            <a:r>
+              <a:rPr lang="en-US" b="1" dirty="0"/>
+              <a:t>best follows the input</a:t>
+            </a:r>
+          </a:p>
+          <a:p>
+            <a:pPr lvl="1"/>
+            <a:r>
+              <a:rPr lang="en-US" dirty="0"/>
+              <a:t>Create the painting that </a:t>
+            </a:r>
+            <a:r>
+              <a:rPr lang="en-US" b="1" dirty="0"/>
+              <a:t>best corresponds</a:t>
+            </a:r>
+            <a:r>
+              <a:rPr lang="en-US" dirty="0"/>
+              <a:t> to a written prompt</a:t>
+            </a:r>
+          </a:p>
+          <a:p>
+            <a:pPr lvl="1"/>
+            <a:endParaRPr lang="en-US" dirty="0"/>
+          </a:p>
+          <a:p>
+            <a:pPr lvl="1"/>
+            <a:endParaRPr lang="en-US" dirty="0"/>
+          </a:p>
+        </p:txBody>
+      </p:sp>
+    </p:spTree>
+    <p:extLst>
+      <p:ext uri="{BB962C8B-B14F-4D97-AF65-F5344CB8AC3E}">
+        <p14:creationId xmlns:p14="http://schemas.microsoft.com/office/powerpoint/2010/main" val="2060198537"/>
+      </p:ext>
+    </p:extLst>
+  </p:cSld>
+  <p:clrMapOvr>
+    <a:masterClrMapping/>
+  </p:clrMapOvr>
+</p:sld>
+</file>
+
+<file path=ppt/slides/slide28.xml><?xml version="1.0" encoding="utf-8"?>
+<p:sld xmlns:a="http://schemas.openxmlformats.org/drawingml/2006/main" xmlns:r="http://schemas.openxmlformats.org/officeDocument/2006/relationships" xmlns:p="http://schemas.openxmlformats.org/presentationml/2006/main">
+  <p:cSld>
+    <p:spTree>
+      <p:nvGrpSpPr>
+        <p:cNvPr id="1" name=""/>
+        <p:cNvGrpSpPr/>
+        <p:nvPr/>
+      </p:nvGrpSpPr>
+      <p:grpSpPr>
+        <a:xfrm>
+          <a:off x="0" y="0"/>
+          <a:ext cx="0" cy="0"/>
+          <a:chOff x="0" y="0"/>
+          <a:chExt cx="0" cy="0"/>
+        </a:xfrm>
+      </p:grpSpPr>
+      <p:sp>
+        <p:nvSpPr>
+          <p:cNvPr id="2" name="Titre 1">
+            <a:extLst>
+              <a:ext uri="{FF2B5EF4-FFF2-40B4-BE49-F238E27FC236}">
+                <a16:creationId xmlns:a16="http://schemas.microsoft.com/office/drawing/2014/main" id="{0AD7C835-BCBB-4CDE-A4B9-CBD6867DA959}"/>
+              </a:ext>
+            </a:extLst>
+          </p:cNvPr>
+          <p:cNvSpPr>
+            <a:spLocks noGrp="1"/>
+          </p:cNvSpPr>
+          <p:nvPr>
+            <p:ph type="title"/>
+          </p:nvPr>
+        </p:nvSpPr>
+        <p:spPr/>
+        <p:txBody>
+          <a:bodyPr/>
+          <a:lstStyle/>
+          <a:p>
+            <a:r>
+              <a:rPr lang="en-US" dirty="0"/>
+              <a:t>Relationship between AI and optimization?</a:t>
+            </a:r>
+          </a:p>
+        </p:txBody>
+      </p:sp>
+      <p:sp>
+        <p:nvSpPr>
+          <p:cNvPr id="3" name="Espace réservé du texte 2">
+            <a:extLst>
+              <a:ext uri="{FF2B5EF4-FFF2-40B4-BE49-F238E27FC236}">
+                <a16:creationId xmlns:a16="http://schemas.microsoft.com/office/drawing/2014/main" id="{3586AAC0-F49F-42BD-B72C-328EDEAC1CF5}"/>
+              </a:ext>
+            </a:extLst>
+          </p:cNvPr>
+          <p:cNvSpPr>
+            <a:spLocks noGrp="1"/>
+          </p:cNvSpPr>
+          <p:nvPr>
+            <p:ph type="body" sz="quarter" idx="10"/>
+          </p:nvPr>
+        </p:nvSpPr>
+        <p:spPr/>
+        <p:txBody>
+          <a:bodyPr/>
+          <a:lstStyle/>
+          <a:p>
+            <a:r>
+              <a:rPr lang="en-US" dirty="0"/>
+              <a:t>AI: from many (many!!!) possible choices, pick the best</a:t>
+            </a:r>
+          </a:p>
+          <a:p>
+            <a:r>
+              <a:rPr lang="en-US" dirty="0"/>
+              <a:t>If you can evaluate your choices, you can optimize</a:t>
+            </a:r>
+          </a:p>
+          <a:p>
+            <a:r>
+              <a:rPr lang="en-US" dirty="0"/>
+              <a:t>(</a:t>
+            </a:r>
+            <a:r>
+              <a:rPr lang="en-US" b="1" dirty="0">
+                <a:solidFill>
+                  <a:srgbClr val="FF0000"/>
+                </a:solidFill>
+              </a:rPr>
+              <a:t>AFAIK</a:t>
+            </a:r>
+            <a:r>
+              <a:rPr lang="en-US" dirty="0"/>
+              <a:t>) </a:t>
+            </a:r>
+            <a:r>
+              <a:rPr lang="en-US" b="1" dirty="0"/>
+              <a:t>All AI systems</a:t>
+            </a:r>
+            <a:r>
+              <a:rPr lang="en-US" dirty="0"/>
+              <a:t> include some type of optimization</a:t>
+            </a:r>
+          </a:p>
+        </p:txBody>
+      </p:sp>
+    </p:spTree>
+    <p:extLst>
+      <p:ext uri="{BB962C8B-B14F-4D97-AF65-F5344CB8AC3E}">
+        <p14:creationId xmlns:p14="http://schemas.microsoft.com/office/powerpoint/2010/main" val="3233463855"/>
+      </p:ext>
+    </p:extLst>
+  </p:cSld>
+  <p:clrMapOvr>
+    <a:masterClrMapping/>
+  </p:clrMapOvr>
+</p:sld>
+</file>
+
+<file path=ppt/slides/slide29.xml><?xml version="1.0" encoding="utf-8"?>
+<p:sld xmlns:a="http://schemas.openxmlformats.org/drawingml/2006/main" xmlns:r="http://schemas.openxmlformats.org/officeDocument/2006/relationships" xmlns:p="http://schemas.openxmlformats.org/presentationml/2006/main">
+  <p:cSld>
+    <p:spTree>
+      <p:nvGrpSpPr>
+        <p:cNvPr id="1" name=""/>
+        <p:cNvGrpSpPr/>
+        <p:nvPr/>
+      </p:nvGrpSpPr>
+      <p:grpSpPr>
+        <a:xfrm>
+          <a:off x="0" y="0"/>
+          <a:ext cx="0" cy="0"/>
+          <a:chOff x="0" y="0"/>
+          <a:chExt cx="0" cy="0"/>
+        </a:xfrm>
+      </p:grpSpPr>
+      <p:sp>
+        <p:nvSpPr>
+          <p:cNvPr id="2" name="Titre 1">
+            <a:extLst>
+              <a:ext uri="{FF2B5EF4-FFF2-40B4-BE49-F238E27FC236}">
                 <a16:creationId xmlns:a16="http://schemas.microsoft.com/office/drawing/2014/main" id="{47E0961B-7852-4B74-861E-A46668C8336A}"/>
               </a:ext>
             </a:extLst>
@@ -6610,89 +7317,6 @@
 </p:sld>
 </file>
 
-<file path=ppt/slides/slide28.xml><?xml version="1.0" encoding="utf-8"?>
-<p:sld xmlns:a="http://schemas.openxmlformats.org/drawingml/2006/main" xmlns:r="http://schemas.openxmlformats.org/officeDocument/2006/relationships" xmlns:p="http://schemas.openxmlformats.org/presentationml/2006/main">
-  <p:cSld>
-    <p:spTree>
-      <p:nvGrpSpPr>
-        <p:cNvPr id="1" name=""/>
-        <p:cNvGrpSpPr/>
-        <p:nvPr/>
-      </p:nvGrpSpPr>
-      <p:grpSpPr>
-        <a:xfrm>
-          <a:off x="0" y="0"/>
-          <a:ext cx="0" cy="0"/>
-          <a:chOff x="0" y="0"/>
-          <a:chExt cx="0" cy="0"/>
-        </a:xfrm>
-      </p:grpSpPr>
-      <p:sp>
-        <p:nvSpPr>
-          <p:cNvPr id="4" name="Titre 3">
-            <a:extLst>
-              <a:ext uri="{FF2B5EF4-FFF2-40B4-BE49-F238E27FC236}">
-                <a16:creationId xmlns:a16="http://schemas.microsoft.com/office/drawing/2014/main" id="{6BEAEF10-6F05-46A4-8D9E-0BFA69A33914}"/>
-              </a:ext>
-            </a:extLst>
-          </p:cNvPr>
-          <p:cNvSpPr>
-            <a:spLocks noGrp="1"/>
-          </p:cNvSpPr>
-          <p:nvPr>
-            <p:ph type="ctrTitle"/>
-          </p:nvPr>
-        </p:nvSpPr>
-        <p:spPr/>
-        <p:txBody>
-          <a:bodyPr/>
-          <a:lstStyle/>
-          <a:p>
-            <a:r>
-              <a:rPr lang="en-US" dirty="0"/>
-              <a:t>Questions?</a:t>
-            </a:r>
-          </a:p>
-        </p:txBody>
-      </p:sp>
-      <p:sp>
-        <p:nvSpPr>
-          <p:cNvPr id="5" name="Sous-titre 4">
-            <a:extLst>
-              <a:ext uri="{FF2B5EF4-FFF2-40B4-BE49-F238E27FC236}">
-                <a16:creationId xmlns:a16="http://schemas.microsoft.com/office/drawing/2014/main" id="{55A84D86-426F-472B-B50C-533D94D44711}"/>
-              </a:ext>
-            </a:extLst>
-          </p:cNvPr>
-          <p:cNvSpPr>
-            <a:spLocks noGrp="1"/>
-          </p:cNvSpPr>
-          <p:nvPr>
-            <p:ph type="subTitle" idx="1"/>
-          </p:nvPr>
-        </p:nvSpPr>
-        <p:spPr/>
-        <p:txBody>
-          <a:bodyPr/>
-          <a:lstStyle/>
-          <a:p>
-            <a:endParaRPr lang="en-US"/>
-          </a:p>
-        </p:txBody>
-      </p:sp>
-    </p:spTree>
-    <p:extLst>
-      <p:ext uri="{BB962C8B-B14F-4D97-AF65-F5344CB8AC3E}">
-        <p14:creationId xmlns:p14="http://schemas.microsoft.com/office/powerpoint/2010/main" val="2539717365"/>
-      </p:ext>
-    </p:extLst>
-  </p:cSld>
-  <p:clrMapOvr>
-    <a:masterClrMapping/>
-  </p:clrMapOvr>
-</p:sld>
-</file>
-
 <file path=ppt/slides/slide3.xml><?xml version="1.0" encoding="utf-8"?>
 <p:sld xmlns:a="http://schemas.openxmlformats.org/drawingml/2006/main" xmlns:r="http://schemas.openxmlformats.org/officeDocument/2006/relationships" xmlns:p="http://schemas.openxmlformats.org/presentationml/2006/main">
   <p:cSld>
@@ -6831,6 +7455,173 @@
     <p:extLst>
       <p:ext uri="{BB962C8B-B14F-4D97-AF65-F5344CB8AC3E}">
         <p14:creationId xmlns:p14="http://schemas.microsoft.com/office/powerpoint/2010/main" val="491872556"/>
+      </p:ext>
+    </p:extLst>
+  </p:cSld>
+  <p:clrMapOvr>
+    <a:masterClrMapping/>
+  </p:clrMapOvr>
+</p:sld>
+</file>
+
+<file path=ppt/slides/slide30.xml><?xml version="1.0" encoding="utf-8"?>
+<p:sld xmlns:a="http://schemas.openxmlformats.org/drawingml/2006/main" xmlns:r="http://schemas.openxmlformats.org/officeDocument/2006/relationships" xmlns:p="http://schemas.openxmlformats.org/presentationml/2006/main">
+  <p:cSld>
+    <p:spTree>
+      <p:nvGrpSpPr>
+        <p:cNvPr id="1" name=""/>
+        <p:cNvGrpSpPr/>
+        <p:nvPr/>
+      </p:nvGrpSpPr>
+      <p:grpSpPr>
+        <a:xfrm>
+          <a:off x="0" y="0"/>
+          <a:ext cx="0" cy="0"/>
+          <a:chOff x="0" y="0"/>
+          <a:chExt cx="0" cy="0"/>
+        </a:xfrm>
+      </p:grpSpPr>
+      <p:sp>
+        <p:nvSpPr>
+          <p:cNvPr id="4" name="Titre 3">
+            <a:extLst>
+              <a:ext uri="{FF2B5EF4-FFF2-40B4-BE49-F238E27FC236}">
+                <a16:creationId xmlns:a16="http://schemas.microsoft.com/office/drawing/2014/main" id="{6BEAEF10-6F05-46A4-8D9E-0BFA69A33914}"/>
+              </a:ext>
+            </a:extLst>
+          </p:cNvPr>
+          <p:cNvSpPr>
+            <a:spLocks noGrp="1"/>
+          </p:cNvSpPr>
+          <p:nvPr>
+            <p:ph type="ctrTitle"/>
+          </p:nvPr>
+        </p:nvSpPr>
+        <p:spPr/>
+        <p:txBody>
+          <a:bodyPr/>
+          <a:lstStyle/>
+          <a:p>
+            <a:r>
+              <a:rPr lang="en-US" dirty="0"/>
+              <a:t>Questions?</a:t>
+            </a:r>
+          </a:p>
+        </p:txBody>
+      </p:sp>
+      <p:sp>
+        <p:nvSpPr>
+          <p:cNvPr id="5" name="Sous-titre 4">
+            <a:extLst>
+              <a:ext uri="{FF2B5EF4-FFF2-40B4-BE49-F238E27FC236}">
+                <a16:creationId xmlns:a16="http://schemas.microsoft.com/office/drawing/2014/main" id="{55A84D86-426F-472B-B50C-533D94D44711}"/>
+              </a:ext>
+            </a:extLst>
+          </p:cNvPr>
+          <p:cNvSpPr>
+            <a:spLocks noGrp="1"/>
+          </p:cNvSpPr>
+          <p:nvPr>
+            <p:ph type="subTitle" idx="1"/>
+          </p:nvPr>
+        </p:nvSpPr>
+        <p:spPr/>
+        <p:txBody>
+          <a:bodyPr/>
+          <a:lstStyle/>
+          <a:p>
+            <a:endParaRPr lang="en-US"/>
+          </a:p>
+        </p:txBody>
+      </p:sp>
+      <p:pic>
+        <p:nvPicPr>
+          <p:cNvPr id="6" name="Picture 2">
+            <a:extLst>
+              <a:ext uri="{FF2B5EF4-FFF2-40B4-BE49-F238E27FC236}">
+                <a16:creationId xmlns:a16="http://schemas.microsoft.com/office/drawing/2014/main" id="{EF7D4DDC-A4EC-4258-AED5-574DF4B09A55}"/>
+              </a:ext>
+            </a:extLst>
+          </p:cNvPr>
+          <p:cNvPicPr>
+            <a:picLocks noChangeAspect="1" noChangeArrowheads="1"/>
+          </p:cNvPicPr>
+          <p:nvPr/>
+        </p:nvPicPr>
+        <p:blipFill rotWithShape="1">
+          <a:blip r:embed="rId2">
+            <a:extLst>
+              <a:ext uri="{BEBA8EAE-BF5A-486C-A8C5-ECC9F3942E4B}">
+                <a14:imgProps xmlns:a14="http://schemas.microsoft.com/office/drawing/2010/main">
+                  <a14:imgLayer r:embed="rId3">
+                    <a14:imgEffect>
+                      <a14:backgroundRemoval t="22283" b="75673" l="54554" r="90983"/>
+                    </a14:imgEffect>
+                  </a14:imgLayer>
+                </a14:imgProps>
+              </a:ext>
+              <a:ext uri="{28A0092B-C50C-407E-A947-70E740481C1C}">
+                <a14:useLocalDpi xmlns:a14="http://schemas.microsoft.com/office/drawing/2010/main" val="0"/>
+              </a:ext>
+            </a:extLst>
+          </a:blip>
+          <a:srcRect l="50000" t="15610" r="4463" b="17653"/>
+          <a:stretch/>
+        </p:blipFill>
+        <p:spPr bwMode="auto">
+          <a:xfrm>
+            <a:off x="4938382" y="1037974"/>
+            <a:ext cx="1295445" cy="884352"/>
+          </a:xfrm>
+          <a:prstGeom prst="rect">
+            <a:avLst/>
+          </a:prstGeom>
+          <a:noFill/>
+          <a:extLst>
+            <a:ext uri="{909E8E84-426E-40DD-AFC4-6F175D3DCCD1}">
+              <a14:hiddenFill xmlns:a14="http://schemas.microsoft.com/office/drawing/2010/main">
+                <a:solidFill>
+                  <a:srgbClr val="FFFFFF"/>
+                </a:solidFill>
+              </a14:hiddenFill>
+            </a:ext>
+          </a:extLst>
+        </p:spPr>
+      </p:pic>
+      <p:pic>
+        <p:nvPicPr>
+          <p:cNvPr id="7" name="Image 6">
+            <a:extLst>
+              <a:ext uri="{FF2B5EF4-FFF2-40B4-BE49-F238E27FC236}">
+                <a16:creationId xmlns:a16="http://schemas.microsoft.com/office/drawing/2014/main" id="{285FF89A-09DA-43FA-B600-707CE1F6262D}"/>
+              </a:ext>
+            </a:extLst>
+          </p:cNvPr>
+          <p:cNvPicPr>
+            <a:picLocks noChangeAspect="1"/>
+          </p:cNvPicPr>
+          <p:nvPr/>
+        </p:nvPicPr>
+        <p:blipFill>
+          <a:blip r:embed="rId4"/>
+          <a:stretch>
+            <a:fillRect/>
+          </a:stretch>
+        </p:blipFill>
+        <p:spPr>
+          <a:xfrm>
+            <a:off x="6383826" y="1073027"/>
+            <a:ext cx="1642424" cy="574848"/>
+          </a:xfrm>
+          <a:prstGeom prst="rect">
+            <a:avLst/>
+          </a:prstGeom>
+        </p:spPr>
+      </p:pic>
+    </p:spTree>
+    <p:extLst>
+      <p:ext uri="{BB962C8B-B14F-4D97-AF65-F5344CB8AC3E}">
+        <p14:creationId xmlns:p14="http://schemas.microsoft.com/office/powerpoint/2010/main" val="2539717365"/>
       </p:ext>
     </p:extLst>
   </p:cSld>
@@ -7842,8 +8633,64 @@
               <a:t> are complicated and require longer study</a:t>
             </a:r>
           </a:p>
+          <a:p>
+            <a:r>
+              <a:rPr lang="en-US" dirty="0"/>
+              <a:t>Get the general idea, try to understand if it fits your problem</a:t>
+            </a:r>
+          </a:p>
+          <a:p>
+            <a:endParaRPr lang="en-US" dirty="0"/>
+          </a:p>
         </p:txBody>
       </p:sp>
+      <p:pic>
+        <p:nvPicPr>
+          <p:cNvPr id="1026" name="Picture 2" descr="How to Assess Attention to Detail in Job Applicants | Toggl Hire">
+            <a:extLst>
+              <a:ext uri="{FF2B5EF4-FFF2-40B4-BE49-F238E27FC236}">
+                <a16:creationId xmlns:a16="http://schemas.microsoft.com/office/drawing/2014/main" id="{2D546C60-A4BA-4F7B-8934-0D5F2D39A628}"/>
+              </a:ext>
+            </a:extLst>
+          </p:cNvPr>
+          <p:cNvPicPr>
+            <a:picLocks noChangeAspect="1" noChangeArrowheads="1"/>
+          </p:cNvPicPr>
+          <p:nvPr/>
+        </p:nvPicPr>
+        <p:blipFill>
+          <a:blip r:embed="rId2" cstate="print">
+            <a:extLst>
+              <a:ext uri="{28A0092B-C50C-407E-A947-70E740481C1C}">
+                <a14:useLocalDpi xmlns:a14="http://schemas.microsoft.com/office/drawing/2010/main" val="0"/>
+              </a:ext>
+            </a:extLst>
+          </a:blip>
+          <a:srcRect/>
+          <a:stretch>
+            <a:fillRect/>
+          </a:stretch>
+        </p:blipFill>
+        <p:spPr bwMode="auto">
+          <a:xfrm>
+            <a:off x="8531258" y="3276633"/>
+            <a:ext cx="2822542" cy="2822542"/>
+          </a:xfrm>
+          <a:prstGeom prst="rect">
+            <a:avLst/>
+          </a:prstGeom>
+          <a:noFill/>
+          <a:extLst>
+            <a:ext uri="{909E8E84-426E-40DD-AFC4-6F175D3DCCD1}">
+              <a14:hiddenFill xmlns:a14="http://schemas.microsoft.com/office/drawing/2010/main">
+                <a:solidFill>
+                  <a:srgbClr val="FFFFFF"/>
+                </a:solidFill>
+              </a14:hiddenFill>
+            </a:ext>
+          </a:extLst>
+        </p:spPr>
+      </p:pic>
     </p:spTree>
     <p:extLst>
       <p:ext uri="{BB962C8B-B14F-4D97-AF65-F5344CB8AC3E}">
@@ -7957,7 +8804,7 @@
             <a:pPr lvl="1"/>
             <a:r>
               <a:rPr lang="en-US" dirty="0"/>
-              <a:t>Permanent researcher in France since 2012 (INRAE)</a:t>
+              <a:t>Permanent researcher in France since late 2012 (INRAE)</a:t>
             </a:r>
           </a:p>
           <a:p>
@@ -7998,7 +8845,7 @@
             <a:pPr lvl="1"/>
             <a:r>
               <a:rPr lang="en-US" dirty="0"/>
-              <a:t>Mostly applied research</a:t>
+              <a:t>Research: applied + algorithms</a:t>
             </a:r>
           </a:p>
         </p:txBody>
@@ -8018,7 +8865,7 @@
           <p:nvPr/>
         </p:nvPicPr>
         <p:blipFill rotWithShape="1">
-          <a:blip r:embed="rId2" cstate="print">
+          <a:blip r:embed="rId3" cstate="print">
             <a:extLst>
               <a:ext uri="{28A0092B-C50C-407E-A947-70E740481C1C}">
                 <a14:useLocalDpi xmlns:a14="http://schemas.microsoft.com/office/drawing/2010/main" val="0"/>

</xml_diff>

<commit_message>
Working on continuous optimization
</commit_message>
<xml_diff>
--- a/optimization-methods-for-artificial-intelligence/introduction.pptx
+++ b/optimization-methods-for-artificial-intelligence/introduction.pptx
@@ -5,7 +5,7 @@
     <p:sldMasterId id="2147483648" r:id="rId1"/>
   </p:sldMasterIdLst>
   <p:notesMasterIdLst>
-    <p:notesMasterId r:id="rId32"/>
+    <p:notesMasterId r:id="rId33"/>
   </p:notesMasterIdLst>
   <p:sldIdLst>
     <p:sldId id="257" r:id="rId2"/>
@@ -29,15 +29,16 @@
     <p:sldId id="283" r:id="rId20"/>
     <p:sldId id="282" r:id="rId21"/>
     <p:sldId id="286" r:id="rId22"/>
-    <p:sldId id="275" r:id="rId23"/>
-    <p:sldId id="272" r:id="rId24"/>
-    <p:sldId id="271" r:id="rId25"/>
-    <p:sldId id="274" r:id="rId26"/>
-    <p:sldId id="277" r:id="rId27"/>
-    <p:sldId id="278" r:id="rId28"/>
-    <p:sldId id="279" r:id="rId29"/>
-    <p:sldId id="280" r:id="rId30"/>
-    <p:sldId id="276" r:id="rId31"/>
+    <p:sldId id="287" r:id="rId23"/>
+    <p:sldId id="275" r:id="rId24"/>
+    <p:sldId id="272" r:id="rId25"/>
+    <p:sldId id="271" r:id="rId26"/>
+    <p:sldId id="274" r:id="rId27"/>
+    <p:sldId id="277" r:id="rId28"/>
+    <p:sldId id="278" r:id="rId29"/>
+    <p:sldId id="279" r:id="rId30"/>
+    <p:sldId id="280" r:id="rId31"/>
+    <p:sldId id="276" r:id="rId32"/>
   </p:sldIdLst>
   <p:sldSz cx="12192000" cy="6858000"/>
   <p:notesSz cx="6858000" cy="9144000"/>
@@ -653,7 +654,7 @@
           <a:p>
             <a:fld id="{5A4CDC94-00AE-4940-AE94-0065ADD8401E}" type="slidenum">
               <a:rPr lang="en-US" smtClean="0"/>
-              <a:t>28</a:t>
+              <a:t>29</a:t>
             </a:fld>
             <a:endParaRPr lang="en-US"/>
           </a:p>
@@ -6155,7 +6156,7 @@
           <p:cNvPr id="2" name="Titre 1">
             <a:extLst>
               <a:ext uri="{FF2B5EF4-FFF2-40B4-BE49-F238E27FC236}">
-                <a16:creationId xmlns:a16="http://schemas.microsoft.com/office/drawing/2014/main" id="{EBF2B6A1-6B5B-4608-B847-4CC61EE0D57D}"/>
+                <a16:creationId xmlns:a16="http://schemas.microsoft.com/office/drawing/2014/main" id="{7A645179-8568-4B0F-9FFB-EA4918CC3EB9}"/>
               </a:ext>
             </a:extLst>
           </p:cNvPr>
@@ -6173,7 +6174,7 @@
           <a:p>
             <a:r>
               <a:rPr lang="en-US" dirty="0"/>
-              <a:t>Reinforcement learning</a:t>
+              <a:t>Machine learning</a:t>
             </a:r>
           </a:p>
         </p:txBody>
@@ -6183,7 +6184,7 @@
           <p:cNvPr id="3" name="Espace réservé du texte 2">
             <a:extLst>
               <a:ext uri="{FF2B5EF4-FFF2-40B4-BE49-F238E27FC236}">
-                <a16:creationId xmlns:a16="http://schemas.microsoft.com/office/drawing/2014/main" id="{ADB2DD4C-65CD-47DD-AF86-CBFD75ABACB5}"/>
+                <a16:creationId xmlns:a16="http://schemas.microsoft.com/office/drawing/2014/main" id="{B2710BF6-5013-4689-87B2-2F1C523EF3AB}"/>
               </a:ext>
             </a:extLst>
           </p:cNvPr>
@@ -6199,50 +6200,44 @@
           <a:bodyPr/>
           <a:lstStyle/>
           <a:p>
-            <a:r>
-              <a:rPr lang="en-US" dirty="0"/>
-              <a:t>Similar to ML, but not exactly</a:t>
-            </a:r>
-          </a:p>
-          <a:p>
-            <a:pPr lvl="1"/>
-            <a:r>
-              <a:rPr lang="en-US" dirty="0"/>
-              <a:t>No value associated to a single decision</a:t>
-            </a:r>
-          </a:p>
-          <a:p>
-            <a:pPr lvl="1"/>
-            <a:r>
-              <a:rPr lang="en-US" dirty="0"/>
-              <a:t>Reward is consequence of a </a:t>
-            </a:r>
-            <a:r>
-              <a:rPr lang="en-US" i="1" dirty="0"/>
-              <a:t>series</a:t>
-            </a:r>
-            <a:r>
-              <a:rPr lang="en-US" dirty="0"/>
-              <a:t> of decisions</a:t>
-            </a:r>
-          </a:p>
-          <a:p>
-            <a:pPr lvl="1"/>
-            <a:r>
-              <a:rPr lang="en-US" dirty="0"/>
-              <a:t>Example: chess game; is trading a Queen for a Knight good? Well, it depends on the board state</a:t>
-            </a:r>
-          </a:p>
-          <a:p>
-            <a:pPr lvl="1"/>
-            <a:endParaRPr lang="en-US" dirty="0"/>
-          </a:p>
-        </p:txBody>
-      </p:sp>
+            <a:endParaRPr lang="en-US"/>
+          </a:p>
+        </p:txBody>
+      </p:sp>
+      <p:pic>
+        <p:nvPicPr>
+          <p:cNvPr id="5" name="Image 4">
+            <a:extLst>
+              <a:ext uri="{FF2B5EF4-FFF2-40B4-BE49-F238E27FC236}">
+                <a16:creationId xmlns:a16="http://schemas.microsoft.com/office/drawing/2014/main" id="{CCBD9F9C-29AB-40CA-A2B8-569028798508}"/>
+              </a:ext>
+            </a:extLst>
+          </p:cNvPr>
+          <p:cNvPicPr>
+            <a:picLocks noChangeAspect="1"/>
+          </p:cNvPicPr>
+          <p:nvPr/>
+        </p:nvPicPr>
+        <p:blipFill>
+          <a:blip r:embed="rId2"/>
+          <a:stretch>
+            <a:fillRect/>
+          </a:stretch>
+        </p:blipFill>
+        <p:spPr>
+          <a:xfrm>
+            <a:off x="1255707" y="1423358"/>
+            <a:ext cx="9680586" cy="4675817"/>
+          </a:xfrm>
+          <a:prstGeom prst="rect">
+            <a:avLst/>
+          </a:prstGeom>
+        </p:spPr>
+      </p:pic>
     </p:spTree>
     <p:extLst>
       <p:ext uri="{BB962C8B-B14F-4D97-AF65-F5344CB8AC3E}">
-        <p14:creationId xmlns:p14="http://schemas.microsoft.com/office/powerpoint/2010/main" val="1214248259"/>
+        <p14:creationId xmlns:p14="http://schemas.microsoft.com/office/powerpoint/2010/main" val="841000199"/>
       </p:ext>
     </p:extLst>
   </p:cSld>
@@ -6274,7 +6269,7 @@
           <p:cNvPr id="2" name="Titre 1">
             <a:extLst>
               <a:ext uri="{FF2B5EF4-FFF2-40B4-BE49-F238E27FC236}">
-                <a16:creationId xmlns:a16="http://schemas.microsoft.com/office/drawing/2014/main" id="{40A95C8A-6E61-4586-AE10-B5D51600B4B0}"/>
+                <a16:creationId xmlns:a16="http://schemas.microsoft.com/office/drawing/2014/main" id="{EBF2B6A1-6B5B-4608-B847-4CC61EE0D57D}"/>
               </a:ext>
             </a:extLst>
           </p:cNvPr>
@@ -6292,15 +6287,7 @@
           <a:p>
             <a:r>
               <a:rPr lang="en-US" dirty="0"/>
-              <a:t>Neuro-symbolic AI (</a:t>
-            </a:r>
-            <a:r>
-              <a:rPr lang="en-US" dirty="0" err="1"/>
-              <a:t>NeSy</a:t>
-            </a:r>
-            <a:r>
-              <a:rPr lang="en-US" dirty="0"/>
-              <a:t>)</a:t>
+              <a:t>Reinforcement learning</a:t>
             </a:r>
           </a:p>
         </p:txBody>
@@ -6310,7 +6297,7 @@
           <p:cNvPr id="3" name="Espace réservé du texte 2">
             <a:extLst>
               <a:ext uri="{FF2B5EF4-FFF2-40B4-BE49-F238E27FC236}">
-                <a16:creationId xmlns:a16="http://schemas.microsoft.com/office/drawing/2014/main" id="{DD173D4B-1221-4D29-96A0-68CF7052176D}"/>
+                <a16:creationId xmlns:a16="http://schemas.microsoft.com/office/drawing/2014/main" id="{ADB2DD4C-65CD-47DD-AF86-CBFD75ABACB5}"/>
               </a:ext>
             </a:extLst>
           </p:cNvPr>
@@ -6328,87 +6315,95 @@
           <a:p>
             <a:r>
               <a:rPr lang="en-US" dirty="0"/>
-              <a:t>Might look complex, but the general idea is intuitive</a:t>
-            </a:r>
-          </a:p>
-          <a:p>
-            <a:pPr lvl="1"/>
-            <a:r>
-              <a:rPr lang="en-US" dirty="0"/>
-              <a:t>Use neural/ML approach to map from data to symbols</a:t>
-            </a:r>
-          </a:p>
-          <a:p>
-            <a:pPr lvl="1"/>
-            <a:r>
-              <a:rPr lang="en-US" dirty="0"/>
-              <a:t>Use symbolic AI to reason on symbols</a:t>
-            </a:r>
-          </a:p>
-          <a:p>
-            <a:pPr lvl="1"/>
-            <a:r>
-              <a:rPr lang="en-US" dirty="0"/>
-              <a:t>(possibly) Go back to data using another neural/ML approach</a:t>
-            </a:r>
-          </a:p>
-          <a:p>
-            <a:pPr lvl="1"/>
-            <a:r>
-              <a:rPr lang="en-US" dirty="0"/>
-              <a:t>Effectiveness (ML) + </a:t>
-            </a:r>
-            <a:r>
-              <a:rPr lang="en-US" dirty="0" err="1"/>
-              <a:t>Explainability</a:t>
-            </a:r>
-            <a:r>
-              <a:rPr lang="en-US" dirty="0"/>
-              <a:t> (Symbolic AI)</a:t>
-            </a:r>
-          </a:p>
-          <a:p>
-            <a:pPr lvl="1"/>
-            <a:r>
-              <a:rPr lang="en-US" dirty="0"/>
-              <a:t>However, it’s pretty hard to do, and problem-specific</a:t>
-            </a:r>
-          </a:p>
-          <a:p>
-            <a:r>
-              <a:rPr lang="en-US" dirty="0"/>
-              <a:t>Interestingly, some of the biggest ML successes are </a:t>
-            </a:r>
-            <a:r>
-              <a:rPr lang="en-US" dirty="0" err="1"/>
-              <a:t>NeSy</a:t>
-            </a:r>
+              <a:t>Similar to ML, but not exactly</a:t>
+            </a:r>
+          </a:p>
+          <a:p>
+            <a:pPr lvl="1"/>
+            <a:r>
+              <a:rPr lang="en-US" dirty="0"/>
+              <a:t>No value associated to a single decision</a:t>
+            </a:r>
+          </a:p>
+          <a:p>
+            <a:pPr lvl="1"/>
+            <a:r>
+              <a:rPr lang="en-US" dirty="0"/>
+              <a:t>Reward is consequence of a </a:t>
+            </a:r>
+            <a:r>
+              <a:rPr lang="en-US" i="1" dirty="0"/>
+              <a:t>series</a:t>
+            </a:r>
+            <a:r>
+              <a:rPr lang="en-US" dirty="0"/>
+              <a:t> of decisions</a:t>
+            </a:r>
+          </a:p>
+          <a:p>
+            <a:pPr lvl="1"/>
+            <a:r>
+              <a:rPr lang="en-US" dirty="0"/>
+              <a:t>Example: chess game; is trading a Queen for a Knight good? Well, it depends on the board state</a:t>
+            </a:r>
+          </a:p>
+          <a:p>
+            <a:pPr lvl="1"/>
             <a:endParaRPr lang="en-US" dirty="0"/>
           </a:p>
-          <a:p>
-            <a:pPr lvl="1"/>
-            <a:r>
-              <a:rPr lang="en-US" dirty="0"/>
-              <a:t>AlphaGo uses a mix of symbolic exploration an NN</a:t>
-            </a:r>
-          </a:p>
-          <a:p>
-            <a:pPr lvl="1"/>
-            <a:r>
-              <a:rPr lang="en-US" dirty="0" err="1"/>
-              <a:t>AlphaFold</a:t>
-            </a:r>
-            <a:r>
-              <a:rPr lang="en-US" dirty="0"/>
-              <a:t> is a mix of 30 algorithms (some Symbolic, some ML)</a:t>
-            </a:r>
-          </a:p>
-        </p:txBody>
-      </p:sp>
+        </p:txBody>
+      </p:sp>
+      <p:pic>
+        <p:nvPicPr>
+          <p:cNvPr id="1026" name="Picture 2" descr="Introduction to Reinforcement Learning for Beginners">
+            <a:extLst>
+              <a:ext uri="{FF2B5EF4-FFF2-40B4-BE49-F238E27FC236}">
+                <a16:creationId xmlns:a16="http://schemas.microsoft.com/office/drawing/2014/main" id="{504B2ECE-4EEB-48FA-A98A-B9EC535EF17C}"/>
+              </a:ext>
+            </a:extLst>
+          </p:cNvPr>
+          <p:cNvPicPr>
+            <a:picLocks noChangeAspect="1" noChangeArrowheads="1"/>
+          </p:cNvPicPr>
+          <p:nvPr/>
+        </p:nvPicPr>
+        <p:blipFill>
+          <a:blip r:embed="rId2">
+            <a:extLst>
+              <a:ext uri="{28A0092B-C50C-407E-A947-70E740481C1C}">
+                <a14:useLocalDpi xmlns:a14="http://schemas.microsoft.com/office/drawing/2010/main" val="0"/>
+              </a:ext>
+            </a:extLst>
+          </a:blip>
+          <a:srcRect/>
+          <a:stretch>
+            <a:fillRect/>
+          </a:stretch>
+        </p:blipFill>
+        <p:spPr bwMode="auto">
+          <a:xfrm>
+            <a:off x="6181725" y="3498850"/>
+            <a:ext cx="5172075" cy="2600325"/>
+          </a:xfrm>
+          <a:prstGeom prst="rect">
+            <a:avLst/>
+          </a:prstGeom>
+          <a:noFill/>
+          <a:extLst>
+            <a:ext uri="{909E8E84-426E-40DD-AFC4-6F175D3DCCD1}">
+              <a14:hiddenFill xmlns:a14="http://schemas.microsoft.com/office/drawing/2010/main">
+                <a:solidFill>
+                  <a:srgbClr val="FFFFFF"/>
+                </a:solidFill>
+              </a14:hiddenFill>
+            </a:ext>
+          </a:extLst>
+        </p:spPr>
+      </p:pic>
     </p:spTree>
     <p:extLst>
       <p:ext uri="{BB962C8B-B14F-4D97-AF65-F5344CB8AC3E}">
-        <p14:creationId xmlns:p14="http://schemas.microsoft.com/office/powerpoint/2010/main" val="3820875688"/>
+        <p14:creationId xmlns:p14="http://schemas.microsoft.com/office/powerpoint/2010/main" val="1214248259"/>
       </p:ext>
     </p:extLst>
   </p:cSld>
@@ -6440,6 +6435,180 @@
           <p:cNvPr id="2" name="Titre 1">
             <a:extLst>
               <a:ext uri="{FF2B5EF4-FFF2-40B4-BE49-F238E27FC236}">
+                <a16:creationId xmlns:a16="http://schemas.microsoft.com/office/drawing/2014/main" id="{40A95C8A-6E61-4586-AE10-B5D51600B4B0}"/>
+              </a:ext>
+            </a:extLst>
+          </p:cNvPr>
+          <p:cNvSpPr>
+            <a:spLocks noGrp="1"/>
+          </p:cNvSpPr>
+          <p:nvPr>
+            <p:ph type="title"/>
+          </p:nvPr>
+        </p:nvSpPr>
+        <p:spPr/>
+        <p:txBody>
+          <a:bodyPr/>
+          <a:lstStyle/>
+          <a:p>
+            <a:r>
+              <a:rPr lang="en-US" dirty="0"/>
+              <a:t>Neuro-symbolic AI (</a:t>
+            </a:r>
+            <a:r>
+              <a:rPr lang="en-US" dirty="0" err="1"/>
+              <a:t>NeSy</a:t>
+            </a:r>
+            <a:r>
+              <a:rPr lang="en-US" dirty="0"/>
+              <a:t>)</a:t>
+            </a:r>
+          </a:p>
+        </p:txBody>
+      </p:sp>
+      <p:sp>
+        <p:nvSpPr>
+          <p:cNvPr id="3" name="Espace réservé du texte 2">
+            <a:extLst>
+              <a:ext uri="{FF2B5EF4-FFF2-40B4-BE49-F238E27FC236}">
+                <a16:creationId xmlns:a16="http://schemas.microsoft.com/office/drawing/2014/main" id="{DD173D4B-1221-4D29-96A0-68CF7052176D}"/>
+              </a:ext>
+            </a:extLst>
+          </p:cNvPr>
+          <p:cNvSpPr>
+            <a:spLocks noGrp="1"/>
+          </p:cNvSpPr>
+          <p:nvPr>
+            <p:ph type="body" sz="quarter" idx="10"/>
+          </p:nvPr>
+        </p:nvSpPr>
+        <p:spPr/>
+        <p:txBody>
+          <a:bodyPr/>
+          <a:lstStyle/>
+          <a:p>
+            <a:r>
+              <a:rPr lang="en-US" dirty="0"/>
+              <a:t>Might look complex, but the general idea is intuitive</a:t>
+            </a:r>
+          </a:p>
+          <a:p>
+            <a:pPr lvl="1"/>
+            <a:r>
+              <a:rPr lang="en-US" dirty="0"/>
+              <a:t>Use neural/ML approach to map from data to symbols</a:t>
+            </a:r>
+          </a:p>
+          <a:p>
+            <a:pPr lvl="1"/>
+            <a:r>
+              <a:rPr lang="en-US" dirty="0"/>
+              <a:t>Use symbolic AI to reason on symbols</a:t>
+            </a:r>
+          </a:p>
+          <a:p>
+            <a:pPr lvl="1"/>
+            <a:r>
+              <a:rPr lang="en-US" dirty="0"/>
+              <a:t>(possibly) Go back to data using another neural/ML approach</a:t>
+            </a:r>
+          </a:p>
+          <a:p>
+            <a:pPr lvl="1"/>
+            <a:r>
+              <a:rPr lang="en-US" dirty="0"/>
+              <a:t>Promise: </a:t>
+            </a:r>
+            <a:r>
+              <a:rPr lang="en-US" b="1" dirty="0"/>
+              <a:t>Effectiveness</a:t>
+            </a:r>
+            <a:r>
+              <a:rPr lang="en-US" dirty="0"/>
+              <a:t> (ML) + </a:t>
+            </a:r>
+            <a:r>
+              <a:rPr lang="en-US" b="1" dirty="0" err="1"/>
+              <a:t>Explainability</a:t>
+            </a:r>
+            <a:r>
+              <a:rPr lang="en-US" dirty="0"/>
+              <a:t> (Symbolic AI)</a:t>
+            </a:r>
+          </a:p>
+          <a:p>
+            <a:pPr lvl="1"/>
+            <a:r>
+              <a:rPr lang="en-US" dirty="0"/>
+              <a:t>However, it’s pretty hard to do, and problem-specific</a:t>
+            </a:r>
+          </a:p>
+          <a:p>
+            <a:r>
+              <a:rPr lang="en-US" dirty="0"/>
+              <a:t>Interestingly, some of the biggest ML successes are </a:t>
+            </a:r>
+            <a:r>
+              <a:rPr lang="en-US" dirty="0" err="1"/>
+              <a:t>NeSy</a:t>
+            </a:r>
+            <a:endParaRPr lang="en-US" dirty="0"/>
+          </a:p>
+          <a:p>
+            <a:pPr lvl="1"/>
+            <a:r>
+              <a:rPr lang="en-US" dirty="0"/>
+              <a:t>AlphaGo uses a mix of symbolic exploration an NN</a:t>
+            </a:r>
+          </a:p>
+          <a:p>
+            <a:pPr lvl="1"/>
+            <a:r>
+              <a:rPr lang="en-US" dirty="0" err="1"/>
+              <a:t>AlphaFold</a:t>
+            </a:r>
+            <a:r>
+              <a:rPr lang="en-US" dirty="0"/>
+              <a:t> is a mix of 30 algorithms (some Symbolic, some ML)</a:t>
+            </a:r>
+          </a:p>
+        </p:txBody>
+      </p:sp>
+    </p:spTree>
+    <p:extLst>
+      <p:ext uri="{BB962C8B-B14F-4D97-AF65-F5344CB8AC3E}">
+        <p14:creationId xmlns:p14="http://schemas.microsoft.com/office/powerpoint/2010/main" val="3820875688"/>
+      </p:ext>
+    </p:extLst>
+  </p:cSld>
+  <p:clrMapOvr>
+    <a:masterClrMapping/>
+  </p:clrMapOvr>
+</p:sld>
+</file>
+
+<file path=ppt/slides/slide25.xml><?xml version="1.0" encoding="utf-8"?>
+<p:sld xmlns:a="http://schemas.openxmlformats.org/drawingml/2006/main" xmlns:r="http://schemas.openxmlformats.org/officeDocument/2006/relationships" xmlns:p="http://schemas.openxmlformats.org/presentationml/2006/main">
+  <p:cSld>
+    <p:spTree>
+      <p:nvGrpSpPr>
+        <p:cNvPr id="1" name=""/>
+        <p:cNvGrpSpPr/>
+        <p:nvPr/>
+      </p:nvGrpSpPr>
+      <p:grpSpPr>
+        <a:xfrm>
+          <a:off x="0" y="0"/>
+          <a:ext cx="0" cy="0"/>
+          <a:chOff x="0" y="0"/>
+          <a:chExt cx="0" cy="0"/>
+        </a:xfrm>
+      </p:grpSpPr>
+      <p:sp>
+        <p:nvSpPr>
+          <p:cNvPr id="2" name="Titre 1">
+            <a:extLst>
+              <a:ext uri="{FF2B5EF4-FFF2-40B4-BE49-F238E27FC236}">
                 <a16:creationId xmlns:a16="http://schemas.microsoft.com/office/drawing/2014/main" id="{B707CEDE-7FA4-4ED4-93BB-5C912FFFA40A}"/>
               </a:ext>
             </a:extLst>
@@ -6570,7 +6739,7 @@
 </p:sld>
 </file>
 
-<file path=ppt/slides/slide25.xml><?xml version="1.0" encoding="utf-8"?>
+<file path=ppt/slides/slide26.xml><?xml version="1.0" encoding="utf-8"?>
 <p:sld xmlns:a="http://schemas.openxmlformats.org/drawingml/2006/main" xmlns:r="http://schemas.openxmlformats.org/officeDocument/2006/relationships" xmlns:p="http://schemas.openxmlformats.org/presentationml/2006/main">
   <p:cSld>
     <p:spTree>
@@ -6717,148 +6886,6 @@
 </p:sld>
 </file>
 
-<file path=ppt/slides/slide26.xml><?xml version="1.0" encoding="utf-8"?>
-<p:sld xmlns:a="http://schemas.openxmlformats.org/drawingml/2006/main" xmlns:r="http://schemas.openxmlformats.org/officeDocument/2006/relationships" xmlns:p="http://schemas.openxmlformats.org/presentationml/2006/main">
-  <p:cSld>
-    <p:spTree>
-      <p:nvGrpSpPr>
-        <p:cNvPr id="1" name=""/>
-        <p:cNvGrpSpPr/>
-        <p:nvPr/>
-      </p:nvGrpSpPr>
-      <p:grpSpPr>
-        <a:xfrm>
-          <a:off x="0" y="0"/>
-          <a:ext cx="0" cy="0"/>
-          <a:chOff x="0" y="0"/>
-          <a:chExt cx="0" cy="0"/>
-        </a:xfrm>
-      </p:grpSpPr>
-      <p:sp>
-        <p:nvSpPr>
-          <p:cNvPr id="2" name="Titre 1">
-            <a:extLst>
-              <a:ext uri="{FF2B5EF4-FFF2-40B4-BE49-F238E27FC236}">
-                <a16:creationId xmlns:a16="http://schemas.microsoft.com/office/drawing/2014/main" id="{ECECB326-6D55-4011-BF4F-AD05E1FB780C}"/>
-              </a:ext>
-            </a:extLst>
-          </p:cNvPr>
-          <p:cNvSpPr>
-            <a:spLocks noGrp="1"/>
-          </p:cNvSpPr>
-          <p:nvPr>
-            <p:ph type="title"/>
-          </p:nvPr>
-        </p:nvSpPr>
-        <p:spPr/>
-        <p:txBody>
-          <a:bodyPr>
-            <a:normAutofit/>
-          </a:bodyPr>
-          <a:lstStyle/>
-          <a:p>
-            <a:r>
-              <a:rPr lang="it-IT" dirty="0"/>
-              <a:t>Relationship between AI and optimization?</a:t>
-            </a:r>
-          </a:p>
-        </p:txBody>
-      </p:sp>
-      <p:sp>
-        <p:nvSpPr>
-          <p:cNvPr id="3" name="Espace réservé du texte 2">
-            <a:extLst>
-              <a:ext uri="{FF2B5EF4-FFF2-40B4-BE49-F238E27FC236}">
-                <a16:creationId xmlns:a16="http://schemas.microsoft.com/office/drawing/2014/main" id="{2B8B208A-023A-4A17-A5C6-0D8B4915411E}"/>
-              </a:ext>
-            </a:extLst>
-          </p:cNvPr>
-          <p:cNvSpPr>
-            <a:spLocks noGrp="1"/>
-          </p:cNvSpPr>
-          <p:nvPr>
-            <p:ph type="body" sz="quarter" idx="10"/>
-          </p:nvPr>
-        </p:nvSpPr>
-        <p:spPr/>
-        <p:txBody>
-          <a:bodyPr/>
-          <a:lstStyle/>
-          <a:p>
-            <a:r>
-              <a:rPr lang="en-US" dirty="0"/>
-              <a:t>Most “Intelligence” requires making </a:t>
-            </a:r>
-            <a:r>
-              <a:rPr lang="en-US" u="sng" dirty="0"/>
-              <a:t>good choices</a:t>
-            </a:r>
-          </a:p>
-          <a:p>
-            <a:pPr lvl="1"/>
-            <a:r>
-              <a:rPr lang="en-US" dirty="0"/>
-              <a:t>Predict the next value in a time series, as precisely as possible</a:t>
-            </a:r>
-          </a:p>
-          <a:p>
-            <a:pPr lvl="1"/>
-            <a:r>
-              <a:rPr lang="en-US" dirty="0"/>
-              <a:t>Correctly identify the human poses in a video</a:t>
-            </a:r>
-          </a:p>
-          <a:p>
-            <a:pPr lvl="1"/>
-            <a:r>
-              <a:rPr lang="en-US" dirty="0"/>
-              <a:t>Make the best possible chess move, given the situation</a:t>
-            </a:r>
-          </a:p>
-          <a:p>
-            <a:pPr lvl="1"/>
-            <a:r>
-              <a:rPr lang="en-US" dirty="0"/>
-              <a:t>Maximize your score in Super Mario</a:t>
-            </a:r>
-          </a:p>
-          <a:p>
-            <a:pPr lvl="1"/>
-            <a:r>
-              <a:rPr lang="en-US" dirty="0"/>
-              <a:t>Generate a sequence of words that best follows the input</a:t>
-            </a:r>
-          </a:p>
-          <a:p>
-            <a:pPr lvl="1"/>
-            <a:r>
-              <a:rPr lang="en-US" dirty="0"/>
-              <a:t>Create the painting that best corresponds to a written prompt</a:t>
-            </a:r>
-          </a:p>
-          <a:p>
-            <a:pPr lvl="1"/>
-            <a:endParaRPr lang="en-US" dirty="0"/>
-          </a:p>
-          <a:p>
-            <a:pPr lvl="1"/>
-            <a:endParaRPr lang="en-US" dirty="0"/>
-          </a:p>
-        </p:txBody>
-      </p:sp>
-    </p:spTree>
-    <p:extLst>
-      <p:ext uri="{BB962C8B-B14F-4D97-AF65-F5344CB8AC3E}">
-        <p14:creationId xmlns:p14="http://schemas.microsoft.com/office/powerpoint/2010/main" val="1571733551"/>
-      </p:ext>
-    </p:extLst>
-  </p:cSld>
-  <p:clrMapOvr>
-    <a:masterClrMapping/>
-  </p:clrMapOvr>
-</p:sld>
-</file>
-
 <file path=ppt/slides/slide27.xml><?xml version="1.0" encoding="utf-8"?>
 <p:sld xmlns:a="http://schemas.openxmlformats.org/drawingml/2006/main" xmlns:r="http://schemas.openxmlformats.org/officeDocument/2006/relationships" xmlns:p="http://schemas.openxmlformats.org/presentationml/2006/main">
   <p:cSld>
@@ -6940,74 +6967,42 @@
             <a:pPr lvl="1"/>
             <a:r>
               <a:rPr lang="en-US" dirty="0"/>
-              <a:t>Predict the next value in a time series, </a:t>
-            </a:r>
-            <a:r>
-              <a:rPr lang="en-US" b="1" dirty="0"/>
-              <a:t>as precisely as possible</a:t>
-            </a:r>
-          </a:p>
-          <a:p>
-            <a:pPr lvl="1"/>
-            <a:r>
-              <a:rPr lang="en-US" b="1" dirty="0"/>
-              <a:t>Correctly</a:t>
-            </a:r>
-            <a:r>
-              <a:rPr lang="en-US" dirty="0"/>
-              <a:t> identify the human poses in a video</a:t>
-            </a:r>
-          </a:p>
-          <a:p>
-            <a:pPr lvl="1"/>
-            <a:r>
-              <a:rPr lang="en-US" dirty="0"/>
-              <a:t>Make the </a:t>
-            </a:r>
-            <a:r>
-              <a:rPr lang="en-US" b="1" dirty="0"/>
-              <a:t>best possible</a:t>
-            </a:r>
-            <a:r>
-              <a:rPr lang="en-US" dirty="0"/>
-              <a:t> chess move, given the situation</a:t>
-            </a:r>
-          </a:p>
-          <a:p>
-            <a:pPr lvl="1"/>
-            <a:r>
-              <a:rPr lang="en-US" b="1" dirty="0"/>
-              <a:t>Maximize</a:t>
-            </a:r>
-            <a:r>
-              <a:rPr lang="en-US" dirty="0"/>
-              <a:t> your score in Super Mario</a:t>
-            </a:r>
-          </a:p>
-          <a:p>
-            <a:pPr lvl="1"/>
-            <a:r>
-              <a:rPr lang="en-US" dirty="0"/>
-              <a:t>Generate a sequence of words that </a:t>
-            </a:r>
-            <a:r>
-              <a:rPr lang="en-US" b="1" dirty="0"/>
-              <a:t>best follows the input</a:t>
-            </a:r>
-          </a:p>
-          <a:p>
-            <a:pPr lvl="1"/>
-            <a:r>
-              <a:rPr lang="en-US" dirty="0"/>
-              <a:t>Create the painting that </a:t>
-            </a:r>
-            <a:r>
-              <a:rPr lang="en-US" b="1" dirty="0"/>
-              <a:t>best corresponds</a:t>
-            </a:r>
-            <a:r>
-              <a:rPr lang="en-US" dirty="0"/>
-              <a:t> to a written prompt</a:t>
+              <a:t>Predict the next value in a time series, as precisely as possible</a:t>
+            </a:r>
+          </a:p>
+          <a:p>
+            <a:pPr lvl="1"/>
+            <a:r>
+              <a:rPr lang="en-US" dirty="0"/>
+              <a:t>Correctly identify the human poses in a video</a:t>
+            </a:r>
+          </a:p>
+          <a:p>
+            <a:pPr lvl="1"/>
+            <a:r>
+              <a:rPr lang="en-US" dirty="0"/>
+              <a:t>Make the best possible chess move, given the situation</a:t>
+            </a:r>
+          </a:p>
+          <a:p>
+            <a:pPr lvl="1"/>
+            <a:r>
+              <a:rPr lang="en-US" dirty="0"/>
+              <a:t>Maximize your score in Super Mario</a:t>
+            </a:r>
+          </a:p>
+          <a:p>
+            <a:pPr lvl="1"/>
+            <a:r>
+              <a:rPr lang="en-US" dirty="0"/>
+              <a:t>Generate a sequence of words that best follows the input</a:t>
+            </a:r>
+          </a:p>
+          <a:p>
+            <a:pPr lvl="1"/>
+            <a:r>
+              <a:rPr lang="en-US" dirty="0"/>
+              <a:t>Create the painting that best corresponds to a written prompt</a:t>
             </a:r>
           </a:p>
           <a:p>
@@ -7023,7 +7018,7 @@
     </p:spTree>
     <p:extLst>
       <p:ext uri="{BB962C8B-B14F-4D97-AF65-F5344CB8AC3E}">
-        <p14:creationId xmlns:p14="http://schemas.microsoft.com/office/powerpoint/2010/main" val="2060198537"/>
+        <p14:creationId xmlns:p14="http://schemas.microsoft.com/office/powerpoint/2010/main" val="1571733551"/>
       </p:ext>
     </p:extLst>
   </p:cSld>
@@ -7055,7 +7050,7 @@
           <p:cNvPr id="2" name="Titre 1">
             <a:extLst>
               <a:ext uri="{FF2B5EF4-FFF2-40B4-BE49-F238E27FC236}">
-                <a16:creationId xmlns:a16="http://schemas.microsoft.com/office/drawing/2014/main" id="{0AD7C835-BCBB-4CDE-A4B9-CBD6867DA959}"/>
+                <a16:creationId xmlns:a16="http://schemas.microsoft.com/office/drawing/2014/main" id="{ECECB326-6D55-4011-BF4F-AD05E1FB780C}"/>
               </a:ext>
             </a:extLst>
           </p:cNvPr>
@@ -7068,11 +7063,13 @@
         </p:nvSpPr>
         <p:spPr/>
         <p:txBody>
-          <a:bodyPr/>
+          <a:bodyPr>
+            <a:normAutofit/>
+          </a:bodyPr>
           <a:lstStyle/>
           <a:p>
             <a:r>
-              <a:rPr lang="en-US" dirty="0"/>
+              <a:rPr lang="it-IT" dirty="0"/>
               <a:t>Relationship between AI and optimization?</a:t>
             </a:r>
           </a:p>
@@ -7083,7 +7080,7 @@
           <p:cNvPr id="3" name="Espace réservé du texte 2">
             <a:extLst>
               <a:ext uri="{FF2B5EF4-FFF2-40B4-BE49-F238E27FC236}">
-                <a16:creationId xmlns:a16="http://schemas.microsoft.com/office/drawing/2014/main" id="{3586AAC0-F49F-42BD-B72C-328EDEAC1CF5}"/>
+                <a16:creationId xmlns:a16="http://schemas.microsoft.com/office/drawing/2014/main" id="{2B8B208A-023A-4A17-A5C6-0D8B4915411E}"/>
               </a:ext>
             </a:extLst>
           </p:cNvPr>
@@ -7101,47 +7098,101 @@
           <a:p>
             <a:r>
               <a:rPr lang="en-US" dirty="0"/>
-              <a:t>AI: from many (many!!!) possible choices, pick the best</a:t>
-            </a:r>
-          </a:p>
-          <a:p>
-            <a:r>
-              <a:rPr lang="en-US" dirty="0"/>
-              <a:t>If you can evaluate your choices, you can optimize</a:t>
-            </a:r>
-          </a:p>
-          <a:p>
-            <a:r>
-              <a:rPr lang="en-US" dirty="0"/>
-              <a:t>(</a:t>
-            </a:r>
-            <a:r>
-              <a:rPr lang="en-US" b="1" dirty="0">
-                <a:solidFill>
-                  <a:srgbClr val="FF0000"/>
-                </a:solidFill>
-              </a:rPr>
-              <a:t>AFAIK</a:t>
-            </a:r>
-            <a:r>
-              <a:rPr lang="en-US" dirty="0"/>
-              <a:t>) </a:t>
+              <a:t>Most “Intelligence” requires making </a:t>
+            </a:r>
+            <a:r>
+              <a:rPr lang="en-US" u="sng" dirty="0"/>
+              <a:t>good choices</a:t>
+            </a:r>
+          </a:p>
+          <a:p>
+            <a:pPr lvl="1"/>
+            <a:r>
+              <a:rPr lang="en-US" dirty="0"/>
+              <a:t>Predict the next value in a time series, </a:t>
             </a:r>
             <a:r>
               <a:rPr lang="en-US" b="1" dirty="0"/>
-              <a:t>All AI systems</a:t>
-            </a:r>
-            <a:r>
-              <a:rPr lang="en-US" dirty="0"/>
-              <a:t> include some type of optimization</a:t>
-            </a:r>
+              <a:t>as precisely as possible</a:t>
+            </a:r>
+          </a:p>
+          <a:p>
+            <a:pPr lvl="1"/>
+            <a:r>
+              <a:rPr lang="en-US" b="1" dirty="0"/>
+              <a:t>Correctly</a:t>
+            </a:r>
+            <a:r>
+              <a:rPr lang="en-US" dirty="0"/>
+              <a:t> identify the human poses in a video</a:t>
+            </a:r>
+          </a:p>
+          <a:p>
+            <a:pPr lvl="1"/>
+            <a:r>
+              <a:rPr lang="en-US" dirty="0"/>
+              <a:t>Make the </a:t>
+            </a:r>
+            <a:r>
+              <a:rPr lang="en-US" b="1" dirty="0"/>
+              <a:t>best possible</a:t>
+            </a:r>
+            <a:r>
+              <a:rPr lang="en-US" dirty="0"/>
+              <a:t> chess move, given the situation</a:t>
+            </a:r>
+          </a:p>
+          <a:p>
+            <a:pPr lvl="1"/>
+            <a:r>
+              <a:rPr lang="en-US" b="1" dirty="0"/>
+              <a:t>Maximize</a:t>
+            </a:r>
+            <a:r>
+              <a:rPr lang="en-US" dirty="0"/>
+              <a:t> your score in Super Mario</a:t>
+            </a:r>
+          </a:p>
+          <a:p>
+            <a:pPr lvl="1"/>
+            <a:r>
+              <a:rPr lang="en-US" dirty="0"/>
+              <a:t>Generate a sequence of words that </a:t>
+            </a:r>
+            <a:r>
+              <a:rPr lang="en-US" b="1" dirty="0"/>
+              <a:t>best follows the input</a:t>
+            </a:r>
+          </a:p>
+          <a:p>
+            <a:pPr lvl="1"/>
+            <a:r>
+              <a:rPr lang="en-US" dirty="0"/>
+              <a:t>Create the painting that </a:t>
+            </a:r>
+            <a:r>
+              <a:rPr lang="en-US" b="1" dirty="0"/>
+              <a:t>best corresponds</a:t>
+            </a:r>
+            <a:r>
+              <a:rPr lang="en-US" dirty="0"/>
+              <a:t> to a written prompt</a:t>
+            </a:r>
+          </a:p>
+          <a:p>
+            <a:pPr lvl="1"/>
+            <a:endParaRPr lang="en-US" dirty="0"/>
+          </a:p>
+          <a:p>
+            <a:pPr lvl="1"/>
+            <a:endParaRPr lang="en-US" dirty="0"/>
           </a:p>
         </p:txBody>
       </p:sp>
     </p:spTree>
     <p:extLst>
       <p:ext uri="{BB962C8B-B14F-4D97-AF65-F5344CB8AC3E}">
-        <p14:creationId xmlns:p14="http://schemas.microsoft.com/office/powerpoint/2010/main" val="3233463855"/>
+        <p14:creationId xmlns:p14="http://schemas.microsoft.com/office/powerpoint/2010/main" val="2060198537"/>
       </p:ext>
     </p:extLst>
   </p:cSld>
@@ -7173,6 +7224,271 @@
           <p:cNvPr id="2" name="Titre 1">
             <a:extLst>
               <a:ext uri="{FF2B5EF4-FFF2-40B4-BE49-F238E27FC236}">
+                <a16:creationId xmlns:a16="http://schemas.microsoft.com/office/drawing/2014/main" id="{0AD7C835-BCBB-4CDE-A4B9-CBD6867DA959}"/>
+              </a:ext>
+            </a:extLst>
+          </p:cNvPr>
+          <p:cNvSpPr>
+            <a:spLocks noGrp="1"/>
+          </p:cNvSpPr>
+          <p:nvPr>
+            <p:ph type="title"/>
+          </p:nvPr>
+        </p:nvSpPr>
+        <p:spPr/>
+        <p:txBody>
+          <a:bodyPr/>
+          <a:lstStyle/>
+          <a:p>
+            <a:r>
+              <a:rPr lang="en-US" dirty="0"/>
+              <a:t>Relationship between AI and optimization?</a:t>
+            </a:r>
+          </a:p>
+        </p:txBody>
+      </p:sp>
+      <p:sp>
+        <p:nvSpPr>
+          <p:cNvPr id="3" name="Espace réservé du texte 2">
+            <a:extLst>
+              <a:ext uri="{FF2B5EF4-FFF2-40B4-BE49-F238E27FC236}">
+                <a16:creationId xmlns:a16="http://schemas.microsoft.com/office/drawing/2014/main" id="{3586AAC0-F49F-42BD-B72C-328EDEAC1CF5}"/>
+              </a:ext>
+            </a:extLst>
+          </p:cNvPr>
+          <p:cNvSpPr>
+            <a:spLocks noGrp="1"/>
+          </p:cNvSpPr>
+          <p:nvPr>
+            <p:ph type="body" sz="quarter" idx="10"/>
+          </p:nvPr>
+        </p:nvSpPr>
+        <p:spPr/>
+        <p:txBody>
+          <a:bodyPr/>
+          <a:lstStyle/>
+          <a:p>
+            <a:r>
+              <a:rPr lang="en-US" dirty="0"/>
+              <a:t>AI: from many (many!!!) possible choices, pick the best</a:t>
+            </a:r>
+          </a:p>
+          <a:p>
+            <a:r>
+              <a:rPr lang="en-US" dirty="0"/>
+              <a:t>If you can evaluate your choices, you can optimize</a:t>
+            </a:r>
+          </a:p>
+          <a:p>
+            <a:r>
+              <a:rPr lang="en-US" dirty="0"/>
+              <a:t>(</a:t>
+            </a:r>
+            <a:r>
+              <a:rPr lang="en-US" b="1" dirty="0">
+                <a:solidFill>
+                  <a:srgbClr val="FF0000"/>
+                </a:solidFill>
+              </a:rPr>
+              <a:t>AFAIK</a:t>
+            </a:r>
+            <a:r>
+              <a:rPr lang="en-US" dirty="0"/>
+              <a:t>) </a:t>
+            </a:r>
+            <a:r>
+              <a:rPr lang="en-US" b="1" dirty="0"/>
+              <a:t>All AI systems</a:t>
+            </a:r>
+            <a:r>
+              <a:rPr lang="en-US" dirty="0"/>
+              <a:t> include some type of optimization, with the possible exception of hand-crafted ones</a:t>
+            </a:r>
+          </a:p>
+        </p:txBody>
+      </p:sp>
+    </p:spTree>
+    <p:extLst>
+      <p:ext uri="{BB962C8B-B14F-4D97-AF65-F5344CB8AC3E}">
+        <p14:creationId xmlns:p14="http://schemas.microsoft.com/office/powerpoint/2010/main" val="3233463855"/>
+      </p:ext>
+    </p:extLst>
+  </p:cSld>
+  <p:clrMapOvr>
+    <a:masterClrMapping/>
+  </p:clrMapOvr>
+</p:sld>
+</file>
+
+<file path=ppt/slides/slide3.xml><?xml version="1.0" encoding="utf-8"?>
+<p:sld xmlns:a="http://schemas.openxmlformats.org/drawingml/2006/main" xmlns:r="http://schemas.openxmlformats.org/officeDocument/2006/relationships" xmlns:p="http://schemas.openxmlformats.org/presentationml/2006/main">
+  <p:cSld>
+    <p:spTree>
+      <p:nvGrpSpPr>
+        <p:cNvPr id="1" name=""/>
+        <p:cNvGrpSpPr/>
+        <p:nvPr/>
+      </p:nvGrpSpPr>
+      <p:grpSpPr>
+        <a:xfrm>
+          <a:off x="0" y="0"/>
+          <a:ext cx="0" cy="0"/>
+          <a:chOff x="0" y="0"/>
+          <a:chExt cx="0" cy="0"/>
+        </a:xfrm>
+      </p:grpSpPr>
+      <p:sp>
+        <p:nvSpPr>
+          <p:cNvPr id="2" name="Titre 1">
+            <a:extLst>
+              <a:ext uri="{FF2B5EF4-FFF2-40B4-BE49-F238E27FC236}">
+                <a16:creationId xmlns:a16="http://schemas.microsoft.com/office/drawing/2014/main" id="{5FC4A858-CA64-44B1-922B-4F94EAD12CCB}"/>
+              </a:ext>
+            </a:extLst>
+          </p:cNvPr>
+          <p:cNvSpPr>
+            <a:spLocks noGrp="1"/>
+          </p:cNvSpPr>
+          <p:nvPr>
+            <p:ph type="title"/>
+          </p:nvPr>
+        </p:nvSpPr>
+        <p:spPr/>
+        <p:txBody>
+          <a:bodyPr/>
+          <a:lstStyle/>
+          <a:p>
+            <a:r>
+              <a:rPr lang="it-IT" dirty="0"/>
+              <a:t>What is this class about?</a:t>
+            </a:r>
+            <a:endParaRPr lang="en-US" dirty="0"/>
+          </a:p>
+        </p:txBody>
+      </p:sp>
+      <p:sp>
+        <p:nvSpPr>
+          <p:cNvPr id="3" name="Espace réservé du texte 2">
+            <a:extLst>
+              <a:ext uri="{FF2B5EF4-FFF2-40B4-BE49-F238E27FC236}">
+                <a16:creationId xmlns:a16="http://schemas.microsoft.com/office/drawing/2014/main" id="{BB5606FD-04C9-4630-A9A9-4BAC26946C2C}"/>
+              </a:ext>
+            </a:extLst>
+          </p:cNvPr>
+          <p:cNvSpPr>
+            <a:spLocks noGrp="1"/>
+          </p:cNvSpPr>
+          <p:nvPr>
+            <p:ph type="body" sz="quarter" idx="10"/>
+          </p:nvPr>
+        </p:nvSpPr>
+        <p:spPr/>
+        <p:txBody>
+          <a:bodyPr>
+            <a:normAutofit/>
+          </a:bodyPr>
+          <a:lstStyle/>
+          <a:p>
+            <a:r>
+              <a:rPr lang="it-IT" dirty="0"/>
+              <a:t>Optimization!</a:t>
+            </a:r>
+          </a:p>
+          <a:p>
+            <a:pPr lvl="1"/>
+            <a:r>
+              <a:rPr lang="it-IT" dirty="0"/>
+              <a:t>Overview of optimization techniques, when/how to use them</a:t>
+            </a:r>
+          </a:p>
+          <a:p>
+            <a:pPr lvl="1"/>
+            <a:r>
+              <a:rPr lang="it-IT" dirty="0"/>
+              <a:t>How these techniques power modern Artificial Intelligence</a:t>
+            </a:r>
+          </a:p>
+          <a:p>
+            <a:pPr lvl="1"/>
+            <a:r>
+              <a:rPr lang="it-IT" dirty="0"/>
+              <a:t>Optimization to improve performance of AI methods</a:t>
+            </a:r>
+          </a:p>
+          <a:p>
+            <a:r>
+              <a:rPr lang="it-IT" dirty="0"/>
+              <a:t>At the end of the class, you should know</a:t>
+            </a:r>
+          </a:p>
+          <a:p>
+            <a:pPr lvl="1"/>
+            <a:r>
+              <a:rPr lang="it-IT" dirty="0"/>
+              <a:t>What techniques are more appriopriate for different problems</a:t>
+            </a:r>
+          </a:p>
+          <a:p>
+            <a:pPr lvl="1"/>
+            <a:r>
+              <a:rPr lang="it-IT" dirty="0"/>
+              <a:t>How (several) AI systems work, especially for Machine Learning</a:t>
+            </a:r>
+          </a:p>
+          <a:p>
+            <a:pPr lvl="1"/>
+            <a:r>
+              <a:rPr lang="it-IT" dirty="0"/>
+              <a:t>Hyperparameter optimization for your AI applications</a:t>
+            </a:r>
+          </a:p>
+          <a:p>
+            <a:pPr lvl="1"/>
+            <a:r>
+              <a:rPr lang="it-IT" dirty="0"/>
+              <a:t>Keywords for further research (e.g. Neuro-symbolic, AutoML)</a:t>
+            </a:r>
+          </a:p>
+          <a:p>
+            <a:endParaRPr lang="en-US" dirty="0"/>
+          </a:p>
+        </p:txBody>
+      </p:sp>
+    </p:spTree>
+    <p:extLst>
+      <p:ext uri="{BB962C8B-B14F-4D97-AF65-F5344CB8AC3E}">
+        <p14:creationId xmlns:p14="http://schemas.microsoft.com/office/powerpoint/2010/main" val="491872556"/>
+      </p:ext>
+    </p:extLst>
+  </p:cSld>
+  <p:clrMapOvr>
+    <a:masterClrMapping/>
+  </p:clrMapOvr>
+</p:sld>
+</file>
+
+<file path=ppt/slides/slide30.xml><?xml version="1.0" encoding="utf-8"?>
+<p:sld xmlns:a="http://schemas.openxmlformats.org/drawingml/2006/main" xmlns:r="http://schemas.openxmlformats.org/officeDocument/2006/relationships" xmlns:p="http://schemas.openxmlformats.org/presentationml/2006/main">
+  <p:cSld>
+    <p:spTree>
+      <p:nvGrpSpPr>
+        <p:cNvPr id="1" name=""/>
+        <p:cNvGrpSpPr/>
+        <p:nvPr/>
+      </p:nvGrpSpPr>
+      <p:grpSpPr>
+        <a:xfrm>
+          <a:off x="0" y="0"/>
+          <a:ext cx="0" cy="0"/>
+          <a:chOff x="0" y="0"/>
+          <a:chExt cx="0" cy="0"/>
+        </a:xfrm>
+      </p:grpSpPr>
+      <p:sp>
+        <p:nvSpPr>
+          <p:cNvPr id="2" name="Titre 1">
+            <a:extLst>
+              <a:ext uri="{FF2B5EF4-FFF2-40B4-BE49-F238E27FC236}">
                 <a16:creationId xmlns:a16="http://schemas.microsoft.com/office/drawing/2014/main" id="{47E0961B-7852-4B74-861E-A46668C8336A}"/>
               </a:ext>
             </a:extLst>
@@ -7317,154 +7633,7 @@
 </p:sld>
 </file>
 
-<file path=ppt/slides/slide3.xml><?xml version="1.0" encoding="utf-8"?>
-<p:sld xmlns:a="http://schemas.openxmlformats.org/drawingml/2006/main" xmlns:r="http://schemas.openxmlformats.org/officeDocument/2006/relationships" xmlns:p="http://schemas.openxmlformats.org/presentationml/2006/main">
-  <p:cSld>
-    <p:spTree>
-      <p:nvGrpSpPr>
-        <p:cNvPr id="1" name=""/>
-        <p:cNvGrpSpPr/>
-        <p:nvPr/>
-      </p:nvGrpSpPr>
-      <p:grpSpPr>
-        <a:xfrm>
-          <a:off x="0" y="0"/>
-          <a:ext cx="0" cy="0"/>
-          <a:chOff x="0" y="0"/>
-          <a:chExt cx="0" cy="0"/>
-        </a:xfrm>
-      </p:grpSpPr>
-      <p:sp>
-        <p:nvSpPr>
-          <p:cNvPr id="2" name="Titre 1">
-            <a:extLst>
-              <a:ext uri="{FF2B5EF4-FFF2-40B4-BE49-F238E27FC236}">
-                <a16:creationId xmlns:a16="http://schemas.microsoft.com/office/drawing/2014/main" id="{5FC4A858-CA64-44B1-922B-4F94EAD12CCB}"/>
-              </a:ext>
-            </a:extLst>
-          </p:cNvPr>
-          <p:cNvSpPr>
-            <a:spLocks noGrp="1"/>
-          </p:cNvSpPr>
-          <p:nvPr>
-            <p:ph type="title"/>
-          </p:nvPr>
-        </p:nvSpPr>
-        <p:spPr/>
-        <p:txBody>
-          <a:bodyPr/>
-          <a:lstStyle/>
-          <a:p>
-            <a:r>
-              <a:rPr lang="it-IT" dirty="0"/>
-              <a:t>What is this class about?</a:t>
-            </a:r>
-            <a:endParaRPr lang="en-US" dirty="0"/>
-          </a:p>
-        </p:txBody>
-      </p:sp>
-      <p:sp>
-        <p:nvSpPr>
-          <p:cNvPr id="3" name="Espace réservé du texte 2">
-            <a:extLst>
-              <a:ext uri="{FF2B5EF4-FFF2-40B4-BE49-F238E27FC236}">
-                <a16:creationId xmlns:a16="http://schemas.microsoft.com/office/drawing/2014/main" id="{BB5606FD-04C9-4630-A9A9-4BAC26946C2C}"/>
-              </a:ext>
-            </a:extLst>
-          </p:cNvPr>
-          <p:cNvSpPr>
-            <a:spLocks noGrp="1"/>
-          </p:cNvSpPr>
-          <p:nvPr>
-            <p:ph type="body" sz="quarter" idx="10"/>
-          </p:nvPr>
-        </p:nvSpPr>
-        <p:spPr/>
-        <p:txBody>
-          <a:bodyPr>
-            <a:normAutofit/>
-          </a:bodyPr>
-          <a:lstStyle/>
-          <a:p>
-            <a:r>
-              <a:rPr lang="it-IT" dirty="0"/>
-              <a:t>Optimization!</a:t>
-            </a:r>
-          </a:p>
-          <a:p>
-            <a:pPr lvl="1"/>
-            <a:r>
-              <a:rPr lang="it-IT" dirty="0"/>
-              <a:t>Overview of optimization techniques, when/how to use them</a:t>
-            </a:r>
-          </a:p>
-          <a:p>
-            <a:pPr lvl="1"/>
-            <a:r>
-              <a:rPr lang="it-IT" dirty="0"/>
-              <a:t>How these techniques power modern Artificial Intelligence</a:t>
-            </a:r>
-          </a:p>
-          <a:p>
-            <a:pPr lvl="1"/>
-            <a:r>
-              <a:rPr lang="it-IT" dirty="0"/>
-              <a:t>Optimization to improve performance of AI methods</a:t>
-            </a:r>
-          </a:p>
-          <a:p>
-            <a:r>
-              <a:rPr lang="it-IT" dirty="0"/>
-              <a:t>At the end of the class, you should know</a:t>
-            </a:r>
-          </a:p>
-          <a:p>
-            <a:pPr lvl="1"/>
-            <a:r>
-              <a:rPr lang="it-IT" dirty="0"/>
-              <a:t>What techniques are more appriopriate for different problems</a:t>
-            </a:r>
-          </a:p>
-          <a:p>
-            <a:pPr lvl="1"/>
-            <a:r>
-              <a:rPr lang="it-IT" dirty="0"/>
-              <a:t>How (several) AI systems work, especially for Machine Learning</a:t>
-            </a:r>
-          </a:p>
-          <a:p>
-            <a:pPr lvl="1"/>
-            <a:r>
-              <a:rPr lang="it-IT" dirty="0"/>
-              <a:t>Hyperparameter optimization for your AI applications</a:t>
-            </a:r>
-          </a:p>
-          <a:p>
-            <a:pPr lvl="1"/>
-            <a:r>
-              <a:rPr lang="it-IT" dirty="0"/>
-              <a:t>Keywords for further research (e.g. Neuro-symbolic, AutoML)</a:t>
-            </a:r>
-          </a:p>
-          <a:p>
-            <a:endParaRPr lang="en-US" dirty="0"/>
-          </a:p>
-        </p:txBody>
-      </p:sp>
-    </p:spTree>
-    <p:extLst>
-      <p:ext uri="{BB962C8B-B14F-4D97-AF65-F5344CB8AC3E}">
-        <p14:creationId xmlns:p14="http://schemas.microsoft.com/office/powerpoint/2010/main" val="491872556"/>
-      </p:ext>
-    </p:extLst>
-  </p:cSld>
-  <p:clrMapOvr>
-    <a:masterClrMapping/>
-  </p:clrMapOvr>
-</p:sld>
-</file>
-
-<file path=ppt/slides/slide30.xml><?xml version="1.0" encoding="utf-8"?>
+<file path=ppt/slides/slide31.xml><?xml version="1.0" encoding="utf-8"?>
 <p:sld xmlns:a="http://schemas.openxmlformats.org/drawingml/2006/main" xmlns:r="http://schemas.openxmlformats.org/officeDocument/2006/relationships" xmlns:p="http://schemas.openxmlformats.org/presentationml/2006/main">
   <p:cSld>
     <p:spTree>

</xml_diff>

<commit_message>
Small modifications to all slides, wrap up
</commit_message>
<xml_diff>
--- a/optimization-methods-for-artificial-intelligence/introduction.pptx
+++ b/optimization-methods-for-artificial-intelligence/introduction.pptx
@@ -5,7 +5,7 @@
     <p:sldMasterId id="2147483648" r:id="rId1"/>
   </p:sldMasterIdLst>
   <p:notesMasterIdLst>
-    <p:notesMasterId r:id="rId34"/>
+    <p:notesMasterId r:id="rId39"/>
   </p:notesMasterIdLst>
   <p:sldIdLst>
     <p:sldId id="257" r:id="rId2"/>
@@ -19,27 +19,32 @@
     <p:sldId id="262" r:id="rId10"/>
     <p:sldId id="263" r:id="rId11"/>
     <p:sldId id="268" r:id="rId12"/>
-    <p:sldId id="264" r:id="rId13"/>
-    <p:sldId id="267" r:id="rId14"/>
-    <p:sldId id="265" r:id="rId15"/>
-    <p:sldId id="266" r:id="rId16"/>
-    <p:sldId id="269" r:id="rId17"/>
-    <p:sldId id="285" r:id="rId18"/>
-    <p:sldId id="270" r:id="rId19"/>
-    <p:sldId id="283" r:id="rId20"/>
-    <p:sldId id="282" r:id="rId21"/>
-    <p:sldId id="286" r:id="rId22"/>
-    <p:sldId id="287" r:id="rId23"/>
-    <p:sldId id="275" r:id="rId24"/>
-    <p:sldId id="272" r:id="rId25"/>
-    <p:sldId id="271" r:id="rId26"/>
-    <p:sldId id="274" r:id="rId27"/>
-    <p:sldId id="277" r:id="rId28"/>
-    <p:sldId id="278" r:id="rId29"/>
-    <p:sldId id="279" r:id="rId30"/>
-    <p:sldId id="288" r:id="rId31"/>
-    <p:sldId id="280" r:id="rId32"/>
-    <p:sldId id="276" r:id="rId33"/>
+    <p:sldId id="289" r:id="rId13"/>
+    <p:sldId id="290" r:id="rId14"/>
+    <p:sldId id="291" r:id="rId15"/>
+    <p:sldId id="292" r:id="rId16"/>
+    <p:sldId id="293" r:id="rId17"/>
+    <p:sldId id="264" r:id="rId18"/>
+    <p:sldId id="267" r:id="rId19"/>
+    <p:sldId id="265" r:id="rId20"/>
+    <p:sldId id="266" r:id="rId21"/>
+    <p:sldId id="269" r:id="rId22"/>
+    <p:sldId id="285" r:id="rId23"/>
+    <p:sldId id="270" r:id="rId24"/>
+    <p:sldId id="283" r:id="rId25"/>
+    <p:sldId id="282" r:id="rId26"/>
+    <p:sldId id="286" r:id="rId27"/>
+    <p:sldId id="287" r:id="rId28"/>
+    <p:sldId id="275" r:id="rId29"/>
+    <p:sldId id="272" r:id="rId30"/>
+    <p:sldId id="271" r:id="rId31"/>
+    <p:sldId id="274" r:id="rId32"/>
+    <p:sldId id="277" r:id="rId33"/>
+    <p:sldId id="278" r:id="rId34"/>
+    <p:sldId id="279" r:id="rId35"/>
+    <p:sldId id="288" r:id="rId36"/>
+    <p:sldId id="280" r:id="rId37"/>
+    <p:sldId id="276" r:id="rId38"/>
   </p:sldIdLst>
   <p:sldSz cx="12192000" cy="6858000"/>
   <p:notesSz cx="6858000" cy="9144000"/>
@@ -228,7 +233,7 @@
           <a:p>
             <a:fld id="{4AAA8967-1584-49FE-8FA4-B9793DEB31AA}" type="datetimeFigureOut">
               <a:rPr lang="en-US" smtClean="0"/>
-              <a:t>9/7/2023</a:t>
+              <a:t>5/21/2024</a:t>
             </a:fld>
             <a:endParaRPr lang="en-US"/>
           </a:p>
@@ -655,7 +660,7 @@
           <a:p>
             <a:fld id="{5A4CDC94-00AE-4940-AE94-0065ADD8401E}" type="slidenum">
               <a:rPr lang="en-US" smtClean="0"/>
-              <a:t>29</a:t>
+              <a:t>34</a:t>
             </a:fld>
             <a:endParaRPr lang="en-US"/>
           </a:p>
@@ -2240,7 +2245,7 @@
             </a:r>
             <a:r>
               <a:rPr lang="fr-FR" dirty="0"/>
-              <a:t> (DR)</a:t>
+              <a:t> (DR), &lt;alberto.tonda@inrae.fr&gt;</a:t>
             </a:r>
           </a:p>
           <a:p>
@@ -3159,6 +3164,870 @@
           <p:cNvPr id="2" name="Titre 1">
             <a:extLst>
               <a:ext uri="{FF2B5EF4-FFF2-40B4-BE49-F238E27FC236}">
+                <a16:creationId xmlns:a16="http://schemas.microsoft.com/office/drawing/2014/main" id="{CCB62F9B-1EC9-4707-AADF-755555C6D1D4}"/>
+              </a:ext>
+            </a:extLst>
+          </p:cNvPr>
+          <p:cNvSpPr>
+            <a:spLocks noGrp="1"/>
+          </p:cNvSpPr>
+          <p:nvPr>
+            <p:ph type="title"/>
+          </p:nvPr>
+        </p:nvSpPr>
+        <p:spPr/>
+        <p:txBody>
+          <a:bodyPr/>
+          <a:lstStyle/>
+          <a:p>
+            <a:r>
+              <a:rPr lang="en-US" dirty="0"/>
+              <a:t>What is optimization?</a:t>
+            </a:r>
+          </a:p>
+        </p:txBody>
+      </p:sp>
+      <p:sp>
+        <p:nvSpPr>
+          <p:cNvPr id="3" name="Espace réservé du texte 2">
+            <a:extLst>
+              <a:ext uri="{FF2B5EF4-FFF2-40B4-BE49-F238E27FC236}">
+                <a16:creationId xmlns:a16="http://schemas.microsoft.com/office/drawing/2014/main" id="{D87E3672-6B70-4420-9D51-7D3B140F4793}"/>
+              </a:ext>
+            </a:extLst>
+          </p:cNvPr>
+          <p:cNvSpPr>
+            <a:spLocks noGrp="1"/>
+          </p:cNvSpPr>
+          <p:nvPr>
+            <p:ph type="body" sz="quarter" idx="10"/>
+          </p:nvPr>
+        </p:nvSpPr>
+        <p:spPr/>
+        <p:txBody>
+          <a:bodyPr/>
+          <a:lstStyle/>
+          <a:p>
+            <a:endParaRPr lang="en-US"/>
+          </a:p>
+        </p:txBody>
+      </p:sp>
+      <p:pic>
+        <p:nvPicPr>
+          <p:cNvPr id="5" name="Image 4">
+            <a:extLst>
+              <a:ext uri="{FF2B5EF4-FFF2-40B4-BE49-F238E27FC236}">
+                <a16:creationId xmlns:a16="http://schemas.microsoft.com/office/drawing/2014/main" id="{26EBA157-5A41-43D6-8D50-B4FD8054B6ED}"/>
+              </a:ext>
+            </a:extLst>
+          </p:cNvPr>
+          <p:cNvPicPr>
+            <a:picLocks noChangeAspect="1"/>
+          </p:cNvPicPr>
+          <p:nvPr/>
+        </p:nvPicPr>
+        <p:blipFill>
+          <a:blip r:embed="rId2">
+            <a:extLst>
+              <a:ext uri="{28A0092B-C50C-407E-A947-70E740481C1C}">
+                <a14:useLocalDpi xmlns:a14="http://schemas.microsoft.com/office/drawing/2010/main" val="0"/>
+              </a:ext>
+            </a:extLst>
+          </a:blip>
+          <a:stretch>
+            <a:fillRect/>
+          </a:stretch>
+        </p:blipFill>
+        <p:spPr>
+          <a:xfrm>
+            <a:off x="2221963" y="1903237"/>
+            <a:ext cx="8115499" cy="3733992"/>
+          </a:xfrm>
+          <a:prstGeom prst="rect">
+            <a:avLst/>
+          </a:prstGeom>
+        </p:spPr>
+      </p:pic>
+    </p:spTree>
+    <p:extLst>
+      <p:ext uri="{BB962C8B-B14F-4D97-AF65-F5344CB8AC3E}">
+        <p14:creationId xmlns:p14="http://schemas.microsoft.com/office/powerpoint/2010/main" val="1040218826"/>
+      </p:ext>
+    </p:extLst>
+  </p:cSld>
+  <p:clrMapOvr>
+    <a:masterClrMapping/>
+  </p:clrMapOvr>
+</p:sld>
+</file>
+
+<file path=ppt/slides/slide13.xml><?xml version="1.0" encoding="utf-8"?>
+<p:sld xmlns:a="http://schemas.openxmlformats.org/drawingml/2006/main" xmlns:r="http://schemas.openxmlformats.org/officeDocument/2006/relationships" xmlns:p="http://schemas.openxmlformats.org/presentationml/2006/main">
+  <p:cSld>
+    <p:spTree>
+      <p:nvGrpSpPr>
+        <p:cNvPr id="1" name=""/>
+        <p:cNvGrpSpPr/>
+        <p:nvPr/>
+      </p:nvGrpSpPr>
+      <p:grpSpPr>
+        <a:xfrm>
+          <a:off x="0" y="0"/>
+          <a:ext cx="0" cy="0"/>
+          <a:chOff x="0" y="0"/>
+          <a:chExt cx="0" cy="0"/>
+        </a:xfrm>
+      </p:grpSpPr>
+      <p:sp>
+        <p:nvSpPr>
+          <p:cNvPr id="2" name="Titre 1">
+            <a:extLst>
+              <a:ext uri="{FF2B5EF4-FFF2-40B4-BE49-F238E27FC236}">
+                <a16:creationId xmlns:a16="http://schemas.microsoft.com/office/drawing/2014/main" id="{1CE0D16B-541E-47ED-A6C4-36151CCE2FE0}"/>
+              </a:ext>
+            </a:extLst>
+          </p:cNvPr>
+          <p:cNvSpPr>
+            <a:spLocks noGrp="1"/>
+          </p:cNvSpPr>
+          <p:nvPr>
+            <p:ph type="title"/>
+          </p:nvPr>
+        </p:nvSpPr>
+        <p:spPr/>
+        <p:txBody>
+          <a:bodyPr/>
+          <a:lstStyle/>
+          <a:p>
+            <a:r>
+              <a:rPr lang="en-US" dirty="0"/>
+              <a:t>What is an algorithm?</a:t>
+            </a:r>
+          </a:p>
+        </p:txBody>
+      </p:sp>
+      <p:sp>
+        <p:nvSpPr>
+          <p:cNvPr id="3" name="Espace réservé du texte 2">
+            <a:extLst>
+              <a:ext uri="{FF2B5EF4-FFF2-40B4-BE49-F238E27FC236}">
+                <a16:creationId xmlns:a16="http://schemas.microsoft.com/office/drawing/2014/main" id="{D6E60829-98CF-48A9-8853-E53674A70F12}"/>
+              </a:ext>
+            </a:extLst>
+          </p:cNvPr>
+          <p:cNvSpPr>
+            <a:spLocks noGrp="1"/>
+          </p:cNvSpPr>
+          <p:nvPr>
+            <p:ph type="body" sz="quarter" idx="10"/>
+          </p:nvPr>
+        </p:nvSpPr>
+        <p:spPr/>
+        <p:txBody>
+          <a:bodyPr/>
+          <a:lstStyle/>
+          <a:p>
+            <a:endParaRPr lang="en-US"/>
+          </a:p>
+        </p:txBody>
+      </p:sp>
+    </p:spTree>
+    <p:extLst>
+      <p:ext uri="{BB962C8B-B14F-4D97-AF65-F5344CB8AC3E}">
+        <p14:creationId xmlns:p14="http://schemas.microsoft.com/office/powerpoint/2010/main" val="2655374032"/>
+      </p:ext>
+    </p:extLst>
+  </p:cSld>
+  <p:clrMapOvr>
+    <a:masterClrMapping/>
+  </p:clrMapOvr>
+</p:sld>
+</file>
+
+<file path=ppt/slides/slide14.xml><?xml version="1.0" encoding="utf-8"?>
+<p:sld xmlns:a="http://schemas.openxmlformats.org/drawingml/2006/main" xmlns:r="http://schemas.openxmlformats.org/officeDocument/2006/relationships" xmlns:p="http://schemas.openxmlformats.org/presentationml/2006/main">
+  <p:cSld>
+    <p:spTree>
+      <p:nvGrpSpPr>
+        <p:cNvPr id="1" name=""/>
+        <p:cNvGrpSpPr/>
+        <p:nvPr/>
+      </p:nvGrpSpPr>
+      <p:grpSpPr>
+        <a:xfrm>
+          <a:off x="0" y="0"/>
+          <a:ext cx="0" cy="0"/>
+          <a:chOff x="0" y="0"/>
+          <a:chExt cx="0" cy="0"/>
+        </a:xfrm>
+      </p:grpSpPr>
+      <p:sp>
+        <p:nvSpPr>
+          <p:cNvPr id="2" name="Titre 1">
+            <a:extLst>
+              <a:ext uri="{FF2B5EF4-FFF2-40B4-BE49-F238E27FC236}">
+                <a16:creationId xmlns:a16="http://schemas.microsoft.com/office/drawing/2014/main" id="{3B3A6966-5795-4FC2-A64A-32541F826784}"/>
+              </a:ext>
+            </a:extLst>
+          </p:cNvPr>
+          <p:cNvSpPr>
+            <a:spLocks noGrp="1"/>
+          </p:cNvSpPr>
+          <p:nvPr>
+            <p:ph type="title"/>
+          </p:nvPr>
+        </p:nvSpPr>
+        <p:spPr/>
+        <p:txBody>
+          <a:bodyPr/>
+          <a:lstStyle/>
+          <a:p>
+            <a:r>
+              <a:rPr lang="en-US" dirty="0"/>
+              <a:t>What is an algorithm?</a:t>
+            </a:r>
+          </a:p>
+        </p:txBody>
+      </p:sp>
+      <p:sp>
+        <p:nvSpPr>
+          <p:cNvPr id="3" name="Espace réservé du texte 2">
+            <a:extLst>
+              <a:ext uri="{FF2B5EF4-FFF2-40B4-BE49-F238E27FC236}">
+                <a16:creationId xmlns:a16="http://schemas.microsoft.com/office/drawing/2014/main" id="{7045FC48-1D05-4E9E-AEC6-F3056F0CCEFD}"/>
+              </a:ext>
+            </a:extLst>
+          </p:cNvPr>
+          <p:cNvSpPr>
+            <a:spLocks noGrp="1"/>
+          </p:cNvSpPr>
+          <p:nvPr>
+            <p:ph type="body" sz="quarter" idx="10"/>
+          </p:nvPr>
+        </p:nvSpPr>
+        <p:spPr/>
+        <p:txBody>
+          <a:bodyPr/>
+          <a:lstStyle/>
+          <a:p>
+            <a:r>
+              <a:rPr lang="en-US" dirty="0"/>
+              <a:t>Series of steps to achieve an objective</a:t>
+            </a:r>
+          </a:p>
+          <a:p>
+            <a:pPr lvl="1"/>
+            <a:r>
+              <a:rPr lang="en-US" dirty="0"/>
+              <a:t>Bake a cake</a:t>
+            </a:r>
+          </a:p>
+          <a:p>
+            <a:pPr lvl="1"/>
+            <a:r>
+              <a:rPr lang="en-US" dirty="0"/>
+              <a:t>Sort the elements inside an array, by increasing value</a:t>
+            </a:r>
+          </a:p>
+          <a:p>
+            <a:pPr lvl="1"/>
+            <a:r>
+              <a:rPr lang="en-US" dirty="0"/>
+              <a:t>Find the best possible input value for a given function</a:t>
+            </a:r>
+          </a:p>
+          <a:p>
+            <a:endParaRPr lang="en-US" dirty="0"/>
+          </a:p>
+          <a:p>
+            <a:r>
+              <a:rPr lang="en-US" dirty="0"/>
+              <a:t>Algorithmic complexity </a:t>
+            </a:r>
+          </a:p>
+          <a:p>
+            <a:pPr lvl="1"/>
+            <a:r>
+              <a:rPr lang="en-US" dirty="0"/>
+              <a:t>Time to complete objective often depends on size of input</a:t>
+            </a:r>
+          </a:p>
+          <a:p>
+            <a:pPr lvl="1"/>
+            <a:r>
+              <a:rPr lang="en-US" dirty="0"/>
+              <a:t>Baking ten cakes takes more time than baking one</a:t>
+            </a:r>
+          </a:p>
+          <a:p>
+            <a:pPr lvl="1"/>
+            <a:r>
+              <a:rPr lang="en-US" dirty="0"/>
+              <a:t>Sorting a large array takes more time than a small one</a:t>
+            </a:r>
+          </a:p>
+        </p:txBody>
+      </p:sp>
+    </p:spTree>
+    <p:extLst>
+      <p:ext uri="{BB962C8B-B14F-4D97-AF65-F5344CB8AC3E}">
+        <p14:creationId xmlns:p14="http://schemas.microsoft.com/office/powerpoint/2010/main" val="3359255656"/>
+      </p:ext>
+    </p:extLst>
+  </p:cSld>
+  <p:clrMapOvr>
+    <a:masterClrMapping/>
+  </p:clrMapOvr>
+</p:sld>
+</file>
+
+<file path=ppt/slides/slide15.xml><?xml version="1.0" encoding="utf-8"?>
+<p:sld xmlns:a="http://schemas.openxmlformats.org/drawingml/2006/main" xmlns:r="http://schemas.openxmlformats.org/officeDocument/2006/relationships" xmlns:p="http://schemas.openxmlformats.org/presentationml/2006/main">
+  <p:cSld>
+    <p:spTree>
+      <p:nvGrpSpPr>
+        <p:cNvPr id="1" name=""/>
+        <p:cNvGrpSpPr/>
+        <p:nvPr/>
+      </p:nvGrpSpPr>
+      <p:grpSpPr>
+        <a:xfrm>
+          <a:off x="0" y="0"/>
+          <a:ext cx="0" cy="0"/>
+          <a:chOff x="0" y="0"/>
+          <a:chExt cx="0" cy="0"/>
+        </a:xfrm>
+      </p:grpSpPr>
+      <p:sp>
+        <p:nvSpPr>
+          <p:cNvPr id="2" name="Titre 1">
+            <a:extLst>
+              <a:ext uri="{FF2B5EF4-FFF2-40B4-BE49-F238E27FC236}">
+                <a16:creationId xmlns:a16="http://schemas.microsoft.com/office/drawing/2014/main" id="{D185B53C-10C2-4E59-B269-B7FF0006C627}"/>
+              </a:ext>
+            </a:extLst>
+          </p:cNvPr>
+          <p:cNvSpPr>
+            <a:spLocks noGrp="1"/>
+          </p:cNvSpPr>
+          <p:nvPr>
+            <p:ph type="title"/>
+          </p:nvPr>
+        </p:nvSpPr>
+        <p:spPr/>
+        <p:txBody>
+          <a:bodyPr/>
+          <a:lstStyle/>
+          <a:p>
+            <a:r>
+              <a:rPr lang="en-US" dirty="0"/>
+              <a:t>What is an algorithm?</a:t>
+            </a:r>
+          </a:p>
+        </p:txBody>
+      </p:sp>
+      <mc:AlternateContent xmlns:mc="http://schemas.openxmlformats.org/markup-compatibility/2006" xmlns:a14="http://schemas.microsoft.com/office/drawing/2010/main">
+        <mc:Choice Requires="a14">
+          <p:sp>
+            <p:nvSpPr>
+              <p:cNvPr id="3" name="Espace réservé du texte 2">
+                <a:extLst>
+                  <a:ext uri="{FF2B5EF4-FFF2-40B4-BE49-F238E27FC236}">
+                    <a16:creationId xmlns:a16="http://schemas.microsoft.com/office/drawing/2014/main" id="{B9BC5048-3FE8-43C3-A9F9-09B8FC78A69E}"/>
+                  </a:ext>
+                </a:extLst>
+              </p:cNvPr>
+              <p:cNvSpPr>
+                <a:spLocks noGrp="1"/>
+              </p:cNvSpPr>
+              <p:nvPr>
+                <p:ph type="body" sz="quarter" idx="10"/>
+              </p:nvPr>
+            </p:nvSpPr>
+            <p:spPr/>
+            <p:txBody>
+              <a:bodyPr/>
+              <a:lstStyle/>
+              <a:p>
+                <a:r>
+                  <a:rPr lang="en-US" dirty="0"/>
+                  <a:t>Algorithmic complexity is important for </a:t>
+                </a:r>
+                <a:r>
+                  <a:rPr lang="en-US" b="1" dirty="0"/>
+                  <a:t>expectations</a:t>
+                </a:r>
+              </a:p>
+              <a:p>
+                <a:pPr lvl="1"/>
+                <a:r>
+                  <a:rPr lang="en-US" dirty="0"/>
+                  <a:t>In particular, worst-case scenario (upper bound)</a:t>
+                </a:r>
+              </a:p>
+              <a:p>
+                <a:pPr lvl="1"/>
+                <a:r>
+                  <a:rPr lang="en-US" dirty="0"/>
+                  <a:t>Notation: </a:t>
+                </a:r>
+                <a14:m>
+                  <m:oMath xmlns:m="http://schemas.openxmlformats.org/officeDocument/2006/math">
+                    <m:r>
+                      <a:rPr lang="it-IT" b="0" i="1" smtClean="0">
+                        <a:latin typeface="Cambria Math" panose="02040503050406030204" pitchFamily="18" charset="0"/>
+                      </a:rPr>
+                      <m:t>𝑂</m:t>
+                    </m:r>
+                    <m:r>
+                      <a:rPr lang="it-IT" b="0" i="1" smtClean="0">
+                        <a:latin typeface="Cambria Math" panose="02040503050406030204" pitchFamily="18" charset="0"/>
+                      </a:rPr>
+                      <m:t>(</m:t>
+                    </m:r>
+                    <m:r>
+                      <a:rPr lang="it-IT" b="0" i="1" smtClean="0">
+                        <a:latin typeface="Cambria Math" panose="02040503050406030204" pitchFamily="18" charset="0"/>
+                      </a:rPr>
+                      <m:t>𝑓</m:t>
+                    </m:r>
+                    <m:d>
+                      <m:dPr>
+                        <m:ctrlPr>
+                          <a:rPr lang="it-IT" b="0" i="1" smtClean="0">
+                            <a:latin typeface="Cambria Math" panose="02040503050406030204" pitchFamily="18" charset="0"/>
+                          </a:rPr>
+                        </m:ctrlPr>
+                      </m:dPr>
+                      <m:e>
+                        <m:r>
+                          <a:rPr lang="it-IT" b="0" i="1" smtClean="0">
+                            <a:latin typeface="Cambria Math" panose="02040503050406030204" pitchFamily="18" charset="0"/>
+                          </a:rPr>
+                          <m:t>𝑛</m:t>
+                        </m:r>
+                      </m:e>
+                    </m:d>
+                    <m:r>
+                      <a:rPr lang="it-IT" b="0" i="1" smtClean="0">
+                        <a:latin typeface="Cambria Math" panose="02040503050406030204" pitchFamily="18" charset="0"/>
+                      </a:rPr>
+                      <m:t>)</m:t>
+                    </m:r>
+                  </m:oMath>
+                </a14:m>
+                <a:r>
+                  <a:rPr lang="en-US" dirty="0"/>
+                  <a:t> where </a:t>
+                </a:r>
+                <a14:m>
+                  <m:oMath xmlns:m="http://schemas.openxmlformats.org/officeDocument/2006/math">
+                    <m:r>
+                      <a:rPr lang="it-IT" b="0" i="1" smtClean="0">
+                        <a:latin typeface="Cambria Math" panose="02040503050406030204" pitchFamily="18" charset="0"/>
+                      </a:rPr>
+                      <m:t>𝑛</m:t>
+                    </m:r>
+                  </m:oMath>
+                </a14:m>
+                <a:r>
+                  <a:rPr lang="en-US" dirty="0"/>
+                  <a:t> is the size of the input</a:t>
+                </a:r>
+              </a:p>
+              <a:p>
+                <a:endParaRPr lang="en-US" dirty="0"/>
+              </a:p>
+              <a:p>
+                <a:r>
+                  <a:rPr lang="en-US" dirty="0"/>
+                  <a:t>Polynomial time vs Super-polynomial time</a:t>
+                </a:r>
+              </a:p>
+              <a:p>
+                <a:pPr lvl="1"/>
+                <a14:m>
+                  <m:oMath xmlns:m="http://schemas.openxmlformats.org/officeDocument/2006/math">
+                    <m:r>
+                      <a:rPr lang="it-IT" b="0" i="1" smtClean="0">
+                        <a:latin typeface="Cambria Math" panose="02040503050406030204" pitchFamily="18" charset="0"/>
+                      </a:rPr>
+                      <m:t>𝑂</m:t>
+                    </m:r>
+                    <m:d>
+                      <m:dPr>
+                        <m:ctrlPr>
+                          <a:rPr lang="it-IT" b="0" i="1" smtClean="0">
+                            <a:latin typeface="Cambria Math" panose="02040503050406030204" pitchFamily="18" charset="0"/>
+                          </a:rPr>
+                        </m:ctrlPr>
+                      </m:dPr>
+                      <m:e>
+                        <m:sSup>
+                          <m:sSupPr>
+                            <m:ctrlPr>
+                              <a:rPr lang="it-IT" b="0" i="1" smtClean="0">
+                                <a:latin typeface="Cambria Math" panose="02040503050406030204" pitchFamily="18" charset="0"/>
+                              </a:rPr>
+                            </m:ctrlPr>
+                          </m:sSupPr>
+                          <m:e>
+                            <m:r>
+                              <a:rPr lang="it-IT" b="0" i="1" smtClean="0">
+                                <a:latin typeface="Cambria Math" panose="02040503050406030204" pitchFamily="18" charset="0"/>
+                              </a:rPr>
+                              <m:t>𝑛</m:t>
+                            </m:r>
+                          </m:e>
+                          <m:sup>
+                            <m:r>
+                              <a:rPr lang="it-IT" b="0" i="1" smtClean="0">
+                                <a:latin typeface="Cambria Math" panose="02040503050406030204" pitchFamily="18" charset="0"/>
+                              </a:rPr>
+                              <m:t>𝑘</m:t>
+                            </m:r>
+                          </m:sup>
+                        </m:sSup>
+                      </m:e>
+                    </m:d>
+                  </m:oMath>
+                </a14:m>
+                <a:r>
+                  <a:rPr lang="en-US" dirty="0"/>
+                  <a:t> vs </a:t>
+                </a:r>
+                <a14:m>
+                  <m:oMath xmlns:m="http://schemas.openxmlformats.org/officeDocument/2006/math">
+                    <m:r>
+                      <a:rPr lang="it-IT" b="0" i="1" smtClean="0">
+                        <a:latin typeface="Cambria Math" panose="02040503050406030204" pitchFamily="18" charset="0"/>
+                      </a:rPr>
+                      <m:t>𝑂</m:t>
+                    </m:r>
+                    <m:r>
+                      <a:rPr lang="it-IT" b="0" i="1" smtClean="0">
+                        <a:latin typeface="Cambria Math" panose="02040503050406030204" pitchFamily="18" charset="0"/>
+                      </a:rPr>
+                      <m:t>(</m:t>
+                    </m:r>
+                    <m:sSup>
+                      <m:sSupPr>
+                        <m:ctrlPr>
+                          <a:rPr lang="it-IT" b="0" i="1" smtClean="0">
+                            <a:latin typeface="Cambria Math" panose="02040503050406030204" pitchFamily="18" charset="0"/>
+                          </a:rPr>
+                        </m:ctrlPr>
+                      </m:sSupPr>
+                      <m:e>
+                        <m:r>
+                          <a:rPr lang="it-IT" b="0" i="1" smtClean="0">
+                            <a:latin typeface="Cambria Math" panose="02040503050406030204" pitchFamily="18" charset="0"/>
+                          </a:rPr>
+                          <m:t>2</m:t>
+                        </m:r>
+                      </m:e>
+                      <m:sup>
+                        <m:sSup>
+                          <m:sSupPr>
+                            <m:ctrlPr>
+                              <a:rPr lang="it-IT" b="0" i="1" smtClean="0">
+                                <a:latin typeface="Cambria Math" panose="02040503050406030204" pitchFamily="18" charset="0"/>
+                              </a:rPr>
+                            </m:ctrlPr>
+                          </m:sSupPr>
+                          <m:e>
+                            <m:r>
+                              <a:rPr lang="it-IT" b="0" i="1" smtClean="0">
+                                <a:latin typeface="Cambria Math" panose="02040503050406030204" pitchFamily="18" charset="0"/>
+                              </a:rPr>
+                              <m:t>𝑛</m:t>
+                            </m:r>
+                          </m:e>
+                          <m:sup>
+                            <m:r>
+                              <a:rPr lang="it-IT" b="0" i="1" smtClean="0">
+                                <a:latin typeface="Cambria Math" panose="02040503050406030204" pitchFamily="18" charset="0"/>
+                              </a:rPr>
+                              <m:t>𝑘</m:t>
+                            </m:r>
+                          </m:sup>
+                        </m:sSup>
+                      </m:sup>
+                    </m:sSup>
+                    <m:r>
+                      <a:rPr lang="it-IT" b="0" i="1" smtClean="0">
+                        <a:latin typeface="Cambria Math" panose="02040503050406030204" pitchFamily="18" charset="0"/>
+                      </a:rPr>
+                      <m:t>)</m:t>
+                    </m:r>
+                  </m:oMath>
+                </a14:m>
+                <a:r>
+                  <a:rPr lang="en-US" dirty="0"/>
+                  <a:t> or </a:t>
+                </a:r>
+                <a14:m>
+                  <m:oMath xmlns:m="http://schemas.openxmlformats.org/officeDocument/2006/math">
+                    <m:r>
+                      <a:rPr lang="it-IT" b="0" i="1" smtClean="0">
+                        <a:latin typeface="Cambria Math" panose="02040503050406030204" pitchFamily="18" charset="0"/>
+                      </a:rPr>
+                      <m:t>𝑂</m:t>
+                    </m:r>
+                    <m:r>
+                      <a:rPr lang="it-IT" b="0" i="1" smtClean="0">
+                        <a:latin typeface="Cambria Math" panose="02040503050406030204" pitchFamily="18" charset="0"/>
+                      </a:rPr>
+                      <m:t>(</m:t>
+                    </m:r>
+                    <m:r>
+                      <a:rPr lang="it-IT" b="0" i="1" smtClean="0">
+                        <a:latin typeface="Cambria Math" panose="02040503050406030204" pitchFamily="18" charset="0"/>
+                      </a:rPr>
+                      <m:t>𝑛</m:t>
+                    </m:r>
+                    <m:r>
+                      <a:rPr lang="it-IT" b="0" i="1" smtClean="0">
+                        <a:latin typeface="Cambria Math" panose="02040503050406030204" pitchFamily="18" charset="0"/>
+                      </a:rPr>
+                      <m:t>!)</m:t>
+                    </m:r>
+                  </m:oMath>
+                </a14:m>
+                <a:r>
+                  <a:rPr lang="en-US" dirty="0"/>
+                  <a:t>, “easy” vs “difficult”</a:t>
+                </a:r>
+              </a:p>
+              <a:p>
+                <a:pPr lvl="1"/>
+                <a:r>
+                  <a:rPr lang="en-US" dirty="0"/>
+                  <a:t>In practice, polynomial time can be used for large instances</a:t>
+                </a:r>
+              </a:p>
+              <a:p>
+                <a:pPr lvl="1"/>
+                <a:r>
+                  <a:rPr lang="en-US" dirty="0"/>
+                  <a:t>Super-polynomial time can only be used for small input size</a:t>
+                </a:r>
+              </a:p>
+              <a:p>
+                <a:pPr lvl="1"/>
+                <a:endParaRPr lang="en-US" dirty="0"/>
+              </a:p>
+              <a:p>
+                <a:pPr lvl="1"/>
+                <a:endParaRPr lang="en-US" dirty="0"/>
+              </a:p>
+            </p:txBody>
+          </p:sp>
+        </mc:Choice>
+        <mc:Fallback xmlns="">
+          <p:sp>
+            <p:nvSpPr>
+              <p:cNvPr id="3" name="Espace réservé du texte 2">
+                <a:extLst>
+                  <a:ext uri="{FF2B5EF4-FFF2-40B4-BE49-F238E27FC236}">
+                    <a16:creationId xmlns:a16="http://schemas.microsoft.com/office/drawing/2014/main" id="{B9BC5048-3FE8-43C3-A9F9-09B8FC78A69E}"/>
+                  </a:ext>
+                </a:extLst>
+              </p:cNvPr>
+              <p:cNvSpPr>
+                <a:spLocks noGrp="1" noRot="1" noChangeAspect="1" noMove="1" noResize="1" noEditPoints="1" noAdjustHandles="1" noChangeArrowheads="1" noChangeShapeType="1" noTextEdit="1"/>
+              </p:cNvSpPr>
+              <p:nvPr>
+                <p:ph type="body" sz="quarter" idx="10"/>
+              </p:nvPr>
+            </p:nvSpPr>
+            <p:spPr>
+              <a:blipFill>
+                <a:blip r:embed="rId2"/>
+                <a:stretch>
+                  <a:fillRect l="-1333" t="-2734"/>
+                </a:stretch>
+              </a:blipFill>
+            </p:spPr>
+            <p:txBody>
+              <a:bodyPr/>
+              <a:lstStyle/>
+              <a:p>
+                <a:r>
+                  <a:rPr lang="en-US">
+                    <a:noFill/>
+                  </a:rPr>
+                  <a:t> </a:t>
+                </a:r>
+              </a:p>
+            </p:txBody>
+          </p:sp>
+        </mc:Fallback>
+      </mc:AlternateContent>
+    </p:spTree>
+    <p:extLst>
+      <p:ext uri="{BB962C8B-B14F-4D97-AF65-F5344CB8AC3E}">
+        <p14:creationId xmlns:p14="http://schemas.microsoft.com/office/powerpoint/2010/main" val="2834907008"/>
+      </p:ext>
+    </p:extLst>
+  </p:cSld>
+  <p:clrMapOvr>
+    <a:masterClrMapping/>
+  </p:clrMapOvr>
+</p:sld>
+</file>
+
+<file path=ppt/slides/slide16.xml><?xml version="1.0" encoding="utf-8"?>
+<p:sld xmlns:a="http://schemas.openxmlformats.org/drawingml/2006/main" xmlns:r="http://schemas.openxmlformats.org/officeDocument/2006/relationships" xmlns:p="http://schemas.openxmlformats.org/presentationml/2006/main">
+  <p:cSld>
+    <p:spTree>
+      <p:nvGrpSpPr>
+        <p:cNvPr id="1" name=""/>
+        <p:cNvGrpSpPr/>
+        <p:nvPr/>
+      </p:nvGrpSpPr>
+      <p:grpSpPr>
+        <a:xfrm>
+          <a:off x="0" y="0"/>
+          <a:ext cx="0" cy="0"/>
+          <a:chOff x="0" y="0"/>
+          <a:chExt cx="0" cy="0"/>
+        </a:xfrm>
+      </p:grpSpPr>
+      <p:sp>
+        <p:nvSpPr>
+          <p:cNvPr id="2" name="Titre 1">
+            <a:extLst>
+              <a:ext uri="{FF2B5EF4-FFF2-40B4-BE49-F238E27FC236}">
+                <a16:creationId xmlns:a16="http://schemas.microsoft.com/office/drawing/2014/main" id="{FED3CE36-3AA9-44C8-8809-E57D3DFAB212}"/>
+              </a:ext>
+            </a:extLst>
+          </p:cNvPr>
+          <p:cNvSpPr>
+            <a:spLocks noGrp="1"/>
+          </p:cNvSpPr>
+          <p:nvPr>
+            <p:ph type="title"/>
+          </p:nvPr>
+        </p:nvSpPr>
+        <p:spPr/>
+        <p:txBody>
+          <a:bodyPr/>
+          <a:lstStyle/>
+          <a:p>
+            <a:r>
+              <a:rPr lang="en-US" dirty="0"/>
+              <a:t>What is an algorithm?</a:t>
+            </a:r>
+          </a:p>
+        </p:txBody>
+      </p:sp>
+      <p:sp>
+        <p:nvSpPr>
+          <p:cNvPr id="3" name="Espace réservé du texte 2">
+            <a:extLst>
+              <a:ext uri="{FF2B5EF4-FFF2-40B4-BE49-F238E27FC236}">
+                <a16:creationId xmlns:a16="http://schemas.microsoft.com/office/drawing/2014/main" id="{09316A3D-CD52-4617-B863-4F10F67E9E5F}"/>
+              </a:ext>
+            </a:extLst>
+          </p:cNvPr>
+          <p:cNvSpPr>
+            <a:spLocks noGrp="1"/>
+          </p:cNvSpPr>
+          <p:nvPr>
+            <p:ph type="body" sz="quarter" idx="10"/>
+          </p:nvPr>
+        </p:nvSpPr>
+        <p:spPr/>
+        <p:txBody>
+          <a:bodyPr/>
+          <a:lstStyle/>
+          <a:p>
+            <a:r>
+              <a:rPr lang="en-US" dirty="0"/>
+              <a:t>Computer scientists often look at worst-case scenario</a:t>
+            </a:r>
+          </a:p>
+          <a:p>
+            <a:pPr lvl="1"/>
+            <a:r>
+              <a:rPr lang="en-US" dirty="0"/>
+              <a:t>In some cases, average-case scenario might be better</a:t>
+            </a:r>
+          </a:p>
+          <a:p>
+            <a:pPr lvl="1"/>
+            <a:r>
+              <a:rPr lang="en-US" dirty="0"/>
+              <a:t>E.g. worst-case scenario exponential time, average polynomial</a:t>
+            </a:r>
+          </a:p>
+          <a:p>
+            <a:pPr lvl="1"/>
+            <a:endParaRPr lang="en-US" dirty="0"/>
+          </a:p>
+          <a:p>
+            <a:r>
+              <a:rPr lang="en-US" dirty="0"/>
+              <a:t>Most real-world problems are Nondeterministic Polynomial</a:t>
+            </a:r>
+          </a:p>
+          <a:p>
+            <a:pPr lvl="1"/>
+            <a:r>
+              <a:rPr lang="en-US" dirty="0"/>
+              <a:t>Checking if a solution is correct in polynomial time</a:t>
+            </a:r>
+          </a:p>
+          <a:p>
+            <a:pPr lvl="1"/>
+            <a:r>
+              <a:rPr lang="en-US" dirty="0"/>
+              <a:t>Finding the best solution takes </a:t>
+            </a:r>
+            <a:r>
+              <a:rPr lang="en-US"/>
+              <a:t>super-polynomial time</a:t>
+            </a:r>
+            <a:endParaRPr lang="en-US" dirty="0"/>
+          </a:p>
+        </p:txBody>
+      </p:sp>
+    </p:spTree>
+    <p:extLst>
+      <p:ext uri="{BB962C8B-B14F-4D97-AF65-F5344CB8AC3E}">
+        <p14:creationId xmlns:p14="http://schemas.microsoft.com/office/powerpoint/2010/main" val="95797203"/>
+      </p:ext>
+    </p:extLst>
+  </p:cSld>
+  <p:clrMapOvr>
+    <a:masterClrMapping/>
+  </p:clrMapOvr>
+</p:sld>
+</file>
+
+<file path=ppt/slides/slide17.xml><?xml version="1.0" encoding="utf-8"?>
+<p:sld xmlns:a="http://schemas.openxmlformats.org/drawingml/2006/main" xmlns:r="http://schemas.openxmlformats.org/officeDocument/2006/relationships" xmlns:p="http://schemas.openxmlformats.org/presentationml/2006/main">
+  <p:cSld>
+    <p:spTree>
+      <p:nvGrpSpPr>
+        <p:cNvPr id="1" name=""/>
+        <p:cNvGrpSpPr/>
+        <p:nvPr/>
+      </p:nvGrpSpPr>
+      <p:grpSpPr>
+        <a:xfrm>
+          <a:off x="0" y="0"/>
+          <a:ext cx="0" cy="0"/>
+          <a:chOff x="0" y="0"/>
+          <a:chExt cx="0" cy="0"/>
+        </a:xfrm>
+      </p:grpSpPr>
+      <p:sp>
+        <p:nvSpPr>
+          <p:cNvPr id="2" name="Titre 1">
+            <a:extLst>
+              <a:ext uri="{FF2B5EF4-FFF2-40B4-BE49-F238E27FC236}">
                 <a16:creationId xmlns:a16="http://schemas.microsoft.com/office/drawing/2014/main" id="{D8D4BB81-C1DD-432E-93C3-887461AA44D9}"/>
               </a:ext>
             </a:extLst>
@@ -3300,7 +4169,7 @@
 </p:sld>
 </file>
 
-<file path=ppt/slides/slide13.xml><?xml version="1.0" encoding="utf-8"?>
+<file path=ppt/slides/slide18.xml><?xml version="1.0" encoding="utf-8"?>
 <p:sld xmlns:a="http://schemas.openxmlformats.org/drawingml/2006/main" xmlns:r="http://schemas.openxmlformats.org/officeDocument/2006/relationships" xmlns:p="http://schemas.openxmlformats.org/presentationml/2006/main">
   <p:cSld>
     <p:spTree>
@@ -3725,7 +4594,7 @@
 </p:sld>
 </file>
 
-<file path=ppt/slides/slide14.xml><?xml version="1.0" encoding="utf-8"?>
+<file path=ppt/slides/slide19.xml><?xml version="1.0" encoding="utf-8"?>
 <p:sld xmlns:a="http://schemas.openxmlformats.org/drawingml/2006/main" xmlns:r="http://schemas.openxmlformats.org/officeDocument/2006/relationships" xmlns:p="http://schemas.openxmlformats.org/presentationml/2006/main">
   <p:cSld>
     <p:spTree>
@@ -3920,7 +4789,7 @@
 </p:sld>
 </file>
 
-<file path=ppt/slides/slide15.xml><?xml version="1.0" encoding="utf-8"?>
+<file path=ppt/slides/slide2.xml><?xml version="1.0" encoding="utf-8"?>
 <p:sld xmlns:a="http://schemas.openxmlformats.org/drawingml/2006/main" xmlns:r="http://schemas.openxmlformats.org/officeDocument/2006/relationships" xmlns:p="http://schemas.openxmlformats.org/presentationml/2006/main">
   <p:cSld>
     <p:spTree>
@@ -3939,6 +4808,136 @@
       </p:grpSpPr>
       <p:sp>
         <p:nvSpPr>
+          <p:cNvPr id="4" name="Titre 3"/>
+          <p:cNvSpPr>
+            <a:spLocks noGrp="1"/>
+          </p:cNvSpPr>
+          <p:nvPr>
+            <p:ph type="title"/>
+          </p:nvPr>
+        </p:nvSpPr>
+        <p:spPr/>
+        <p:txBody>
+          <a:bodyPr/>
+          <a:lstStyle/>
+          <a:p>
+            <a:r>
+              <a:rPr lang="fr-FR" dirty="0" err="1"/>
+              <a:t>Outline</a:t>
+            </a:r>
+            <a:endParaRPr lang="fr-FR" dirty="0"/>
+          </a:p>
+        </p:txBody>
+      </p:sp>
+      <p:sp>
+        <p:nvSpPr>
+          <p:cNvPr id="5" name="Espace réservé du texte 4"/>
+          <p:cNvSpPr>
+            <a:spLocks noGrp="1"/>
+          </p:cNvSpPr>
+          <p:nvPr>
+            <p:ph type="body" sz="quarter" idx="10"/>
+          </p:nvPr>
+        </p:nvSpPr>
+        <p:spPr/>
+        <p:txBody>
+          <a:bodyPr>
+            <a:noAutofit/>
+          </a:bodyPr>
+          <a:lstStyle/>
+          <a:p>
+            <a:r>
+              <a:rPr lang="it-IT" dirty="0"/>
+              <a:t>What is this class about?</a:t>
+            </a:r>
+          </a:p>
+          <a:p>
+            <a:r>
+              <a:rPr lang="it-IT" dirty="0"/>
+              <a:t>Who am I?</a:t>
+            </a:r>
+          </a:p>
+          <a:p>
+            <a:r>
+              <a:rPr lang="it-IT" dirty="0"/>
+              <a:t>What is optimization?</a:t>
+            </a:r>
+          </a:p>
+          <a:p>
+            <a:r>
+              <a:rPr lang="it-IT" dirty="0"/>
+              <a:t>What is Artificial Intelligence?</a:t>
+            </a:r>
+          </a:p>
+          <a:p>
+            <a:r>
+              <a:rPr lang="it-IT" dirty="0"/>
+              <a:t>Is optimization a kind of Artificial Intelligence?</a:t>
+            </a:r>
+          </a:p>
+          <a:p>
+            <a:r>
+              <a:rPr lang="it-IT" dirty="0"/>
+              <a:t>What is the relationship between AI and optimization?</a:t>
+            </a:r>
+          </a:p>
+          <a:p>
+            <a:r>
+              <a:rPr lang="it-IT" dirty="0"/>
+              <a:t>Why are we still here? </a:t>
+            </a:r>
+            <a:r>
+              <a:rPr lang="it-IT" i="1" dirty="0"/>
+              <a:t>Just to suffer? </a:t>
+            </a:r>
+            <a:r>
+              <a:rPr lang="en-US" i="1" dirty="0"/>
+              <a:t>Every night, I can feel my leg... And my arm... even my fingers... The body I've lost... the comrades I've lost... won't stop hurting... It's like they're all still there. You feel it, too, don't you? I'm </a:t>
+            </a:r>
+            <a:r>
+              <a:rPr lang="en-US" i="1" dirty="0" err="1"/>
+              <a:t>gonna</a:t>
+            </a:r>
+            <a:r>
+              <a:rPr lang="en-US" i="1" dirty="0"/>
+              <a:t> make them give back our past!</a:t>
+            </a:r>
+            <a:endParaRPr lang="it-IT" i="1" dirty="0"/>
+          </a:p>
+        </p:txBody>
+      </p:sp>
+    </p:spTree>
+    <p:extLst>
+      <p:ext uri="{BB962C8B-B14F-4D97-AF65-F5344CB8AC3E}">
+        <p14:creationId xmlns:p14="http://schemas.microsoft.com/office/powerpoint/2010/main" val="454349701"/>
+      </p:ext>
+    </p:extLst>
+  </p:cSld>
+  <p:clrMapOvr>
+    <a:masterClrMapping/>
+  </p:clrMapOvr>
+</p:sld>
+</file>
+
+<file path=ppt/slides/slide20.xml><?xml version="1.0" encoding="utf-8"?>
+<p:sld xmlns:a="http://schemas.openxmlformats.org/drawingml/2006/main" xmlns:r="http://schemas.openxmlformats.org/officeDocument/2006/relationships" xmlns:p="http://schemas.openxmlformats.org/presentationml/2006/main">
+  <p:cSld>
+    <p:spTree>
+      <p:nvGrpSpPr>
+        <p:cNvPr id="1" name=""/>
+        <p:cNvGrpSpPr/>
+        <p:nvPr/>
+      </p:nvGrpSpPr>
+      <p:grpSpPr>
+        <a:xfrm>
+          <a:off x="0" y="0"/>
+          <a:ext cx="0" cy="0"/>
+          <a:chOff x="0" y="0"/>
+          <a:chExt cx="0" cy="0"/>
+        </a:xfrm>
+      </p:grpSpPr>
+      <p:sp>
+        <p:nvSpPr>
           <p:cNvPr id="2" name="Titre 1">
             <a:extLst>
               <a:ext uri="{FF2B5EF4-FFF2-40B4-BE49-F238E27FC236}">
@@ -4074,7 +5073,7 @@
 </p:sld>
 </file>
 
-<file path=ppt/slides/slide16.xml><?xml version="1.0" encoding="utf-8"?>
+<file path=ppt/slides/slide21.xml><?xml version="1.0" encoding="utf-8"?>
 <p:sld xmlns:a="http://schemas.openxmlformats.org/drawingml/2006/main" xmlns:r="http://schemas.openxmlformats.org/officeDocument/2006/relationships" xmlns:p="http://schemas.openxmlformats.org/presentationml/2006/main">
   <p:cSld>
     <p:spTree>
@@ -4253,7 +5252,7 @@
 </p:sld>
 </file>
 
-<file path=ppt/slides/slide17.xml><?xml version="1.0" encoding="utf-8"?>
+<file path=ppt/slides/slide22.xml><?xml version="1.0" encoding="utf-8"?>
 <p:sld xmlns:a="http://schemas.openxmlformats.org/drawingml/2006/main" xmlns:r="http://schemas.openxmlformats.org/officeDocument/2006/relationships" xmlns:p="http://schemas.openxmlformats.org/presentationml/2006/main">
   <p:cSld>
     <p:spTree>
@@ -4383,7 +5382,7 @@
 </p:sld>
 </file>
 
-<file path=ppt/slides/slide18.xml><?xml version="1.0" encoding="utf-8"?>
+<file path=ppt/slides/slide23.xml><?xml version="1.0" encoding="utf-8"?>
 <p:sld xmlns:a="http://schemas.openxmlformats.org/drawingml/2006/main" xmlns:r="http://schemas.openxmlformats.org/officeDocument/2006/relationships" xmlns:p="http://schemas.openxmlformats.org/presentationml/2006/main">
   <p:cSld>
     <p:spTree>
@@ -4753,7 +5752,7 @@
 </p:sld>
 </file>
 
-<file path=ppt/slides/slide19.xml><?xml version="1.0" encoding="utf-8"?>
+<file path=ppt/slides/slide24.xml><?xml version="1.0" encoding="utf-8"?>
 <p:sld xmlns:a="http://schemas.openxmlformats.org/drawingml/2006/main" xmlns:r="http://schemas.openxmlformats.org/officeDocument/2006/relationships" xmlns:p="http://schemas.openxmlformats.org/presentationml/2006/main">
   <p:cSld>
     <p:spTree>
@@ -5707,7 +6706,7 @@
 </p:sld>
 </file>
 
-<file path=ppt/slides/slide2.xml><?xml version="1.0" encoding="utf-8"?>
+<file path=ppt/slides/slide25.xml><?xml version="1.0" encoding="utf-8"?>
 <p:sld xmlns:a="http://schemas.openxmlformats.org/drawingml/2006/main" xmlns:r="http://schemas.openxmlformats.org/officeDocument/2006/relationships" xmlns:p="http://schemas.openxmlformats.org/presentationml/2006/main">
   <p:cSld>
     <p:spTree>
@@ -5726,7 +6725,13 @@
       </p:grpSpPr>
       <p:sp>
         <p:nvSpPr>
-          <p:cNvPr id="4" name="Titre 3"/>
+          <p:cNvPr id="2" name="Titre 1">
+            <a:extLst>
+              <a:ext uri="{FF2B5EF4-FFF2-40B4-BE49-F238E27FC236}">
+                <a16:creationId xmlns:a16="http://schemas.microsoft.com/office/drawing/2014/main" id="{B32FF59C-468F-45B7-8590-1E54FBF357D4}"/>
+              </a:ext>
+            </a:extLst>
+          </p:cNvPr>
           <p:cNvSpPr>
             <a:spLocks noGrp="1"/>
           </p:cNvSpPr>
@@ -5740,16 +6745,22 @@
           <a:lstStyle/>
           <a:p>
             <a:r>
-              <a:rPr lang="fr-FR" dirty="0" err="1"/>
-              <a:t>Outline</a:t>
-            </a:r>
-            <a:endParaRPr lang="fr-FR" dirty="0"/>
-          </a:p>
-        </p:txBody>
-      </p:sp>
-      <p:sp>
-        <p:nvSpPr>
-          <p:cNvPr id="5" name="Espace réservé du texte 4"/>
+              <a:rPr lang="it-IT" dirty="0"/>
+              <a:t>Machine learning</a:t>
+            </a:r>
+            <a:endParaRPr lang="en-US" dirty="0"/>
+          </a:p>
+        </p:txBody>
+      </p:sp>
+      <p:sp>
+        <p:nvSpPr>
+          <p:cNvPr id="3" name="Espace réservé du texte 2">
+            <a:extLst>
+              <a:ext uri="{FF2B5EF4-FFF2-40B4-BE49-F238E27FC236}">
+                <a16:creationId xmlns:a16="http://schemas.microsoft.com/office/drawing/2014/main" id="{D4620115-7A3D-4E1B-A396-6F1EBC385B33}"/>
+              </a:ext>
+            </a:extLst>
+          </p:cNvPr>
           <p:cNvSpPr>
             <a:spLocks noGrp="1"/>
           </p:cNvSpPr>
@@ -5760,74 +6771,85 @@
         <p:spPr/>
         <p:txBody>
           <a:bodyPr>
-            <a:noAutofit/>
+            <a:normAutofit/>
           </a:bodyPr>
           <a:lstStyle/>
           <a:p>
             <a:r>
-              <a:rPr lang="it-IT" dirty="0"/>
-              <a:t>What is this class about?</a:t>
-            </a:r>
-          </a:p>
-          <a:p>
-            <a:r>
-              <a:rPr lang="it-IT" dirty="0"/>
-              <a:t>Who am I?</a:t>
-            </a:r>
-          </a:p>
-          <a:p>
-            <a:r>
-              <a:rPr lang="it-IT" dirty="0"/>
-              <a:t>What is optimization?</a:t>
-            </a:r>
-          </a:p>
-          <a:p>
-            <a:r>
-              <a:rPr lang="it-IT" dirty="0"/>
-              <a:t>What is Artificial Intelligence?</a:t>
-            </a:r>
-          </a:p>
-          <a:p>
-            <a:r>
-              <a:rPr lang="it-IT" dirty="0"/>
-              <a:t>Is optimization a kind of Artificial Intelligence?</a:t>
-            </a:r>
-          </a:p>
-          <a:p>
-            <a:r>
-              <a:rPr lang="it-IT" dirty="0"/>
-              <a:t>What is the relationship between AI and optimization?</a:t>
-            </a:r>
-          </a:p>
-          <a:p>
-            <a:r>
-              <a:rPr lang="it-IT" dirty="0"/>
-              <a:t>Why are we still here? </a:t>
-            </a:r>
-            <a:r>
-              <a:rPr lang="it-IT" i="1" dirty="0"/>
-              <a:t>Just to suffer? </a:t>
-            </a:r>
-            <a:r>
-              <a:rPr lang="en-US" i="1" dirty="0"/>
-              <a:t>Every night, I can feel my leg... And my arm... even my fingers... The body I've lost... the comrades I've lost... won't stop hurting... It's like they're all still there. You feel it, too, don't you? I'm </a:t>
-            </a:r>
-            <a:r>
-              <a:rPr lang="en-US" i="1" dirty="0" err="1"/>
-              <a:t>gonna</a:t>
-            </a:r>
-            <a:r>
-              <a:rPr lang="en-US" i="1" dirty="0"/>
-              <a:t> make them give back our past!</a:t>
-            </a:r>
-            <a:endParaRPr lang="it-IT" i="1" dirty="0"/>
+              <a:rPr lang="en-US" dirty="0"/>
+              <a:t>Dominant paradigm since the 90s</a:t>
+            </a:r>
+          </a:p>
+          <a:p>
+            <a:pPr lvl="1"/>
+            <a:r>
+              <a:rPr lang="en-US" dirty="0"/>
+              <a:t>First, artificial neural networks (ANNs or NNs)</a:t>
+            </a:r>
+          </a:p>
+          <a:p>
+            <a:pPr lvl="1"/>
+            <a:r>
+              <a:rPr lang="en-US" dirty="0"/>
+              <a:t>Then, statistical learning algorithms</a:t>
+            </a:r>
+          </a:p>
+          <a:p>
+            <a:pPr lvl="1"/>
+            <a:r>
+              <a:rPr lang="en-US" dirty="0"/>
+              <a:t>Decision trees (and ensembles of) and polynomial models</a:t>
+            </a:r>
+          </a:p>
+          <a:p>
+            <a:r>
+              <a:rPr lang="en-US" dirty="0"/>
+              <a:t>Feature engineering</a:t>
+            </a:r>
+          </a:p>
+          <a:p>
+            <a:pPr lvl="1"/>
+            <a:r>
+              <a:rPr lang="en-US" dirty="0"/>
+              <a:t>Works (still) well for </a:t>
+            </a:r>
+            <a:r>
+              <a:rPr lang="en-US" b="1" dirty="0"/>
+              <a:t>tabular data</a:t>
+            </a:r>
+            <a:r>
+              <a:rPr lang="en-US" dirty="0"/>
+              <a:t> (e.g. Excel spreadsheet)</a:t>
+            </a:r>
+          </a:p>
+          <a:p>
+            <a:pPr lvl="1"/>
+            <a:r>
+              <a:rPr lang="en-US" dirty="0"/>
+              <a:t>Huge issues with </a:t>
+            </a:r>
+            <a:r>
+              <a:rPr lang="en-US" b="1" dirty="0"/>
+              <a:t>structured data</a:t>
+            </a:r>
+            <a:r>
+              <a:rPr lang="en-US" dirty="0"/>
+              <a:t> (e.g. images, text, sound…)</a:t>
+            </a:r>
+          </a:p>
+          <a:p>
+            <a:pPr lvl="1"/>
+            <a:r>
+              <a:rPr lang="en-US" dirty="0"/>
+              <a:t>Hand-crafted features (not very successful)</a:t>
+            </a:r>
           </a:p>
         </p:txBody>
       </p:sp>
     </p:spTree>
     <p:extLst>
       <p:ext uri="{BB962C8B-B14F-4D97-AF65-F5344CB8AC3E}">
-        <p14:creationId xmlns:p14="http://schemas.microsoft.com/office/powerpoint/2010/main" val="454349701"/>
+        <p14:creationId xmlns:p14="http://schemas.microsoft.com/office/powerpoint/2010/main" val="3127305854"/>
       </p:ext>
     </p:extLst>
   </p:cSld>
@@ -5837,7 +6859,7 @@
 </p:sld>
 </file>
 
-<file path=ppt/slides/slide20.xml><?xml version="1.0" encoding="utf-8"?>
+<file path=ppt/slides/slide26.xml><?xml version="1.0" encoding="utf-8"?>
 <p:sld xmlns:a="http://schemas.openxmlformats.org/drawingml/2006/main" xmlns:r="http://schemas.openxmlformats.org/officeDocument/2006/relationships" xmlns:p="http://schemas.openxmlformats.org/presentationml/2006/main">
   <p:cSld>
     <p:spTree>
@@ -5908,159 +6930,6 @@
           <a:p>
             <a:r>
               <a:rPr lang="en-US" dirty="0"/>
-              <a:t>Dominant paradigm since the 90s</a:t>
-            </a:r>
-          </a:p>
-          <a:p>
-            <a:pPr lvl="1"/>
-            <a:r>
-              <a:rPr lang="en-US" dirty="0"/>
-              <a:t>First, artificial neural networks (ANNs or NNs)</a:t>
-            </a:r>
-          </a:p>
-          <a:p>
-            <a:pPr lvl="1"/>
-            <a:r>
-              <a:rPr lang="en-US" dirty="0"/>
-              <a:t>Then, statistical learning algorithms</a:t>
-            </a:r>
-          </a:p>
-          <a:p>
-            <a:pPr lvl="1"/>
-            <a:r>
-              <a:rPr lang="en-US" dirty="0"/>
-              <a:t>Decision trees (and ensembles of) and polynomial models</a:t>
-            </a:r>
-          </a:p>
-          <a:p>
-            <a:r>
-              <a:rPr lang="en-US" dirty="0"/>
-              <a:t>Feature engineering</a:t>
-            </a:r>
-          </a:p>
-          <a:p>
-            <a:pPr lvl="1"/>
-            <a:r>
-              <a:rPr lang="en-US" dirty="0"/>
-              <a:t>Works (still) well for </a:t>
-            </a:r>
-            <a:r>
-              <a:rPr lang="en-US" b="1" dirty="0"/>
-              <a:t>tabular data</a:t>
-            </a:r>
-            <a:r>
-              <a:rPr lang="en-US" dirty="0"/>
-              <a:t> (e.g. Excel spreadsheet)</a:t>
-            </a:r>
-          </a:p>
-          <a:p>
-            <a:pPr lvl="1"/>
-            <a:r>
-              <a:rPr lang="en-US" dirty="0"/>
-              <a:t>Huge issues with </a:t>
-            </a:r>
-            <a:r>
-              <a:rPr lang="en-US" b="1" dirty="0"/>
-              <a:t>structured data</a:t>
-            </a:r>
-            <a:r>
-              <a:rPr lang="en-US" dirty="0"/>
-              <a:t> (e.g. images, text, sound…)</a:t>
-            </a:r>
-          </a:p>
-          <a:p>
-            <a:pPr lvl="1"/>
-            <a:r>
-              <a:rPr lang="en-US" dirty="0"/>
-              <a:t>Hand-crafted features (not very successful)</a:t>
-            </a:r>
-          </a:p>
-        </p:txBody>
-      </p:sp>
-    </p:spTree>
-    <p:extLst>
-      <p:ext uri="{BB962C8B-B14F-4D97-AF65-F5344CB8AC3E}">
-        <p14:creationId xmlns:p14="http://schemas.microsoft.com/office/powerpoint/2010/main" val="3127305854"/>
-      </p:ext>
-    </p:extLst>
-  </p:cSld>
-  <p:clrMapOvr>
-    <a:masterClrMapping/>
-  </p:clrMapOvr>
-</p:sld>
-</file>
-
-<file path=ppt/slides/slide21.xml><?xml version="1.0" encoding="utf-8"?>
-<p:sld xmlns:a="http://schemas.openxmlformats.org/drawingml/2006/main" xmlns:r="http://schemas.openxmlformats.org/officeDocument/2006/relationships" xmlns:p="http://schemas.openxmlformats.org/presentationml/2006/main">
-  <p:cSld>
-    <p:spTree>
-      <p:nvGrpSpPr>
-        <p:cNvPr id="1" name=""/>
-        <p:cNvGrpSpPr/>
-        <p:nvPr/>
-      </p:nvGrpSpPr>
-      <p:grpSpPr>
-        <a:xfrm>
-          <a:off x="0" y="0"/>
-          <a:ext cx="0" cy="0"/>
-          <a:chOff x="0" y="0"/>
-          <a:chExt cx="0" cy="0"/>
-        </a:xfrm>
-      </p:grpSpPr>
-      <p:sp>
-        <p:nvSpPr>
-          <p:cNvPr id="2" name="Titre 1">
-            <a:extLst>
-              <a:ext uri="{FF2B5EF4-FFF2-40B4-BE49-F238E27FC236}">
-                <a16:creationId xmlns:a16="http://schemas.microsoft.com/office/drawing/2014/main" id="{B32FF59C-468F-45B7-8590-1E54FBF357D4}"/>
-              </a:ext>
-            </a:extLst>
-          </p:cNvPr>
-          <p:cNvSpPr>
-            <a:spLocks noGrp="1"/>
-          </p:cNvSpPr>
-          <p:nvPr>
-            <p:ph type="title"/>
-          </p:nvPr>
-        </p:nvSpPr>
-        <p:spPr/>
-        <p:txBody>
-          <a:bodyPr/>
-          <a:lstStyle/>
-          <a:p>
-            <a:r>
-              <a:rPr lang="it-IT" dirty="0"/>
-              <a:t>Machine learning</a:t>
-            </a:r>
-            <a:endParaRPr lang="en-US" dirty="0"/>
-          </a:p>
-        </p:txBody>
-      </p:sp>
-      <p:sp>
-        <p:nvSpPr>
-          <p:cNvPr id="3" name="Espace réservé du texte 2">
-            <a:extLst>
-              <a:ext uri="{FF2B5EF4-FFF2-40B4-BE49-F238E27FC236}">
-                <a16:creationId xmlns:a16="http://schemas.microsoft.com/office/drawing/2014/main" id="{D4620115-7A3D-4E1B-A396-6F1EBC385B33}"/>
-              </a:ext>
-            </a:extLst>
-          </p:cNvPr>
-          <p:cNvSpPr>
-            <a:spLocks noGrp="1"/>
-          </p:cNvSpPr>
-          <p:nvPr>
-            <p:ph type="body" sz="quarter" idx="10"/>
-          </p:nvPr>
-        </p:nvSpPr>
-        <p:spPr/>
-        <p:txBody>
-          <a:bodyPr>
-            <a:normAutofit/>
-          </a:bodyPr>
-          <a:lstStyle/>
-          <a:p>
-            <a:r>
-              <a:rPr lang="en-US" dirty="0"/>
               <a:t>Trade-off effectiveness/interpretability (black-box effect)</a:t>
             </a:r>
           </a:p>
@@ -6139,7 +7008,7 @@
 </p:sld>
 </file>
 
-<file path=ppt/slides/slide22.xml><?xml version="1.0" encoding="utf-8"?>
+<file path=ppt/slides/slide27.xml><?xml version="1.0" encoding="utf-8"?>
 <p:sld xmlns:a="http://schemas.openxmlformats.org/drawingml/2006/main" xmlns:r="http://schemas.openxmlformats.org/officeDocument/2006/relationships" xmlns:p="http://schemas.openxmlformats.org/presentationml/2006/main">
   <p:cSld>
     <p:spTree>
@@ -6252,7 +7121,7 @@
 </p:sld>
 </file>
 
-<file path=ppt/slides/slide23.xml><?xml version="1.0" encoding="utf-8"?>
+<file path=ppt/slides/slide28.xml><?xml version="1.0" encoding="utf-8"?>
 <p:sld xmlns:a="http://schemas.openxmlformats.org/drawingml/2006/main" xmlns:r="http://schemas.openxmlformats.org/officeDocument/2006/relationships" xmlns:p="http://schemas.openxmlformats.org/presentationml/2006/main">
   <p:cSld>
     <p:spTree>
@@ -6327,7 +7196,15 @@
             <a:pPr lvl="1"/>
             <a:r>
               <a:rPr lang="en-US" dirty="0"/>
-              <a:t>No value associated to a single decision</a:t>
+              <a:t>No value associated to a </a:t>
+            </a:r>
+            <a:r>
+              <a:rPr lang="en-US" i="1" dirty="0"/>
+              <a:t>single</a:t>
+            </a:r>
+            <a:r>
+              <a:rPr lang="en-US" dirty="0"/>
+              <a:t> decision</a:t>
             </a:r>
           </a:p>
           <a:p>
@@ -6418,7 +7295,7 @@
 </p:sld>
 </file>
 
-<file path=ppt/slides/slide24.xml><?xml version="1.0" encoding="utf-8"?>
+<file path=ppt/slides/slide29.xml><?xml version="1.0" encoding="utf-8"?>
 <p:sld xmlns:a="http://schemas.openxmlformats.org/drawingml/2006/main" xmlns:r="http://schemas.openxmlformats.org/officeDocument/2006/relationships" xmlns:p="http://schemas.openxmlformats.org/presentationml/2006/main">
   <p:cSld>
     <p:spTree>
@@ -6592,7 +7469,7 @@
 </p:sld>
 </file>
 
-<file path=ppt/slides/slide25.xml><?xml version="1.0" encoding="utf-8"?>
+<file path=ppt/slides/slide3.xml><?xml version="1.0" encoding="utf-8"?>
 <p:sld xmlns:a="http://schemas.openxmlformats.org/drawingml/2006/main" xmlns:r="http://schemas.openxmlformats.org/officeDocument/2006/relationships" xmlns:p="http://schemas.openxmlformats.org/presentationml/2006/main">
   <p:cSld>
     <p:spTree>
@@ -6614,6 +7491,153 @@
           <p:cNvPr id="2" name="Titre 1">
             <a:extLst>
               <a:ext uri="{FF2B5EF4-FFF2-40B4-BE49-F238E27FC236}">
+                <a16:creationId xmlns:a16="http://schemas.microsoft.com/office/drawing/2014/main" id="{5FC4A858-CA64-44B1-922B-4F94EAD12CCB}"/>
+              </a:ext>
+            </a:extLst>
+          </p:cNvPr>
+          <p:cNvSpPr>
+            <a:spLocks noGrp="1"/>
+          </p:cNvSpPr>
+          <p:nvPr>
+            <p:ph type="title"/>
+          </p:nvPr>
+        </p:nvSpPr>
+        <p:spPr/>
+        <p:txBody>
+          <a:bodyPr/>
+          <a:lstStyle/>
+          <a:p>
+            <a:r>
+              <a:rPr lang="it-IT" dirty="0"/>
+              <a:t>What is this class about?</a:t>
+            </a:r>
+            <a:endParaRPr lang="en-US" dirty="0"/>
+          </a:p>
+        </p:txBody>
+      </p:sp>
+      <p:sp>
+        <p:nvSpPr>
+          <p:cNvPr id="3" name="Espace réservé du texte 2">
+            <a:extLst>
+              <a:ext uri="{FF2B5EF4-FFF2-40B4-BE49-F238E27FC236}">
+                <a16:creationId xmlns:a16="http://schemas.microsoft.com/office/drawing/2014/main" id="{BB5606FD-04C9-4630-A9A9-4BAC26946C2C}"/>
+              </a:ext>
+            </a:extLst>
+          </p:cNvPr>
+          <p:cNvSpPr>
+            <a:spLocks noGrp="1"/>
+          </p:cNvSpPr>
+          <p:nvPr>
+            <p:ph type="body" sz="quarter" idx="10"/>
+          </p:nvPr>
+        </p:nvSpPr>
+        <p:spPr/>
+        <p:txBody>
+          <a:bodyPr>
+            <a:normAutofit/>
+          </a:bodyPr>
+          <a:lstStyle/>
+          <a:p>
+            <a:r>
+              <a:rPr lang="it-IT" dirty="0"/>
+              <a:t>Optimization!</a:t>
+            </a:r>
+          </a:p>
+          <a:p>
+            <a:pPr lvl="1"/>
+            <a:r>
+              <a:rPr lang="it-IT" dirty="0"/>
+              <a:t>Overview of optimization techniques, when/how to use them</a:t>
+            </a:r>
+          </a:p>
+          <a:p>
+            <a:pPr lvl="1"/>
+            <a:r>
+              <a:rPr lang="it-IT" dirty="0"/>
+              <a:t>How these techniques power modern Artificial Intelligence</a:t>
+            </a:r>
+          </a:p>
+          <a:p>
+            <a:pPr lvl="1"/>
+            <a:r>
+              <a:rPr lang="it-IT" dirty="0"/>
+              <a:t>Optimization to improve performance of AI methods</a:t>
+            </a:r>
+          </a:p>
+          <a:p>
+            <a:r>
+              <a:rPr lang="it-IT" dirty="0"/>
+              <a:t>At the end of the class, you should know</a:t>
+            </a:r>
+          </a:p>
+          <a:p>
+            <a:pPr lvl="1"/>
+            <a:r>
+              <a:rPr lang="it-IT" dirty="0"/>
+              <a:t>What techniques are more appriopriate for different problems</a:t>
+            </a:r>
+          </a:p>
+          <a:p>
+            <a:pPr lvl="1"/>
+            <a:r>
+              <a:rPr lang="it-IT" dirty="0"/>
+              <a:t>How (several) AI systems work, especially for Machine Learning</a:t>
+            </a:r>
+          </a:p>
+          <a:p>
+            <a:pPr lvl="1"/>
+            <a:r>
+              <a:rPr lang="it-IT" dirty="0"/>
+              <a:t>Hyperparameter optimization for your AI applications</a:t>
+            </a:r>
+          </a:p>
+          <a:p>
+            <a:pPr lvl="1"/>
+            <a:r>
+              <a:rPr lang="it-IT" dirty="0"/>
+              <a:t>Keywords for further research (e.g. Neuro-symbolic, AutoML)</a:t>
+            </a:r>
+          </a:p>
+          <a:p>
+            <a:endParaRPr lang="en-US" dirty="0"/>
+          </a:p>
+        </p:txBody>
+      </p:sp>
+    </p:spTree>
+    <p:extLst>
+      <p:ext uri="{BB962C8B-B14F-4D97-AF65-F5344CB8AC3E}">
+        <p14:creationId xmlns:p14="http://schemas.microsoft.com/office/powerpoint/2010/main" val="491872556"/>
+      </p:ext>
+    </p:extLst>
+  </p:cSld>
+  <p:clrMapOvr>
+    <a:masterClrMapping/>
+  </p:clrMapOvr>
+</p:sld>
+</file>
+
+<file path=ppt/slides/slide30.xml><?xml version="1.0" encoding="utf-8"?>
+<p:sld xmlns:a="http://schemas.openxmlformats.org/drawingml/2006/main" xmlns:r="http://schemas.openxmlformats.org/officeDocument/2006/relationships" xmlns:p="http://schemas.openxmlformats.org/presentationml/2006/main">
+  <p:cSld>
+    <p:spTree>
+      <p:nvGrpSpPr>
+        <p:cNvPr id="1" name=""/>
+        <p:cNvGrpSpPr/>
+        <p:nvPr/>
+      </p:nvGrpSpPr>
+      <p:grpSpPr>
+        <a:xfrm>
+          <a:off x="0" y="0"/>
+          <a:ext cx="0" cy="0"/>
+          <a:chOff x="0" y="0"/>
+          <a:chExt cx="0" cy="0"/>
+        </a:xfrm>
+      </p:grpSpPr>
+      <p:sp>
+        <p:nvSpPr>
+          <p:cNvPr id="2" name="Titre 1">
+            <a:extLst>
+              <a:ext uri="{FF2B5EF4-FFF2-40B4-BE49-F238E27FC236}">
                 <a16:creationId xmlns:a16="http://schemas.microsoft.com/office/drawing/2014/main" id="{B707CEDE-7FA4-4ED4-93BB-5C912FFFA40A}"/>
               </a:ext>
             </a:extLst>
@@ -6744,7 +7768,7 @@
 </p:sld>
 </file>
 
-<file path=ppt/slides/slide26.xml><?xml version="1.0" encoding="utf-8"?>
+<file path=ppt/slides/slide31.xml><?xml version="1.0" encoding="utf-8"?>
 <p:sld xmlns:a="http://schemas.openxmlformats.org/drawingml/2006/main" xmlns:r="http://schemas.openxmlformats.org/officeDocument/2006/relationships" xmlns:p="http://schemas.openxmlformats.org/presentationml/2006/main">
   <p:cSld>
     <p:spTree>
@@ -6891,7 +7915,7 @@
 </p:sld>
 </file>
 
-<file path=ppt/slides/slide27.xml><?xml version="1.0" encoding="utf-8"?>
+<file path=ppt/slides/slide32.xml><?xml version="1.0" encoding="utf-8"?>
 <p:sld xmlns:a="http://schemas.openxmlformats.org/drawingml/2006/main" xmlns:r="http://schemas.openxmlformats.org/officeDocument/2006/relationships" xmlns:p="http://schemas.openxmlformats.org/presentationml/2006/main">
   <p:cSld>
     <p:spTree>
@@ -7033,7 +8057,7 @@
 </p:sld>
 </file>
 
-<file path=ppt/slides/slide28.xml><?xml version="1.0" encoding="utf-8"?>
+<file path=ppt/slides/slide33.xml><?xml version="1.0" encoding="utf-8"?>
 <p:sld xmlns:a="http://schemas.openxmlformats.org/drawingml/2006/main" xmlns:r="http://schemas.openxmlformats.org/officeDocument/2006/relationships" xmlns:p="http://schemas.openxmlformats.org/presentationml/2006/main">
   <p:cSld>
     <p:spTree>
@@ -7207,7 +8231,7 @@
 </p:sld>
 </file>
 
-<file path=ppt/slides/slide29.xml><?xml version="1.0" encoding="utf-8"?>
+<file path=ppt/slides/slide34.xml><?xml version="1.0" encoding="utf-8"?>
 <p:sld xmlns:a="http://schemas.openxmlformats.org/drawingml/2006/main" xmlns:r="http://schemas.openxmlformats.org/officeDocument/2006/relationships" xmlns:p="http://schemas.openxmlformats.org/presentationml/2006/main">
   <p:cSld>
     <p:spTree>
@@ -7325,7 +8349,7 @@
 </p:sld>
 </file>
 
-<file path=ppt/slides/slide3.xml><?xml version="1.0" encoding="utf-8"?>
+<file path=ppt/slides/slide35.xml><?xml version="1.0" encoding="utf-8"?>
 <p:sld xmlns:a="http://schemas.openxmlformats.org/drawingml/2006/main" xmlns:r="http://schemas.openxmlformats.org/officeDocument/2006/relationships" xmlns:p="http://schemas.openxmlformats.org/presentationml/2006/main">
   <p:cSld>
     <p:spTree>
@@ -7347,7 +8371,7 @@
           <p:cNvPr id="2" name="Titre 1">
             <a:extLst>
               <a:ext uri="{FF2B5EF4-FFF2-40B4-BE49-F238E27FC236}">
-                <a16:creationId xmlns:a16="http://schemas.microsoft.com/office/drawing/2014/main" id="{5FC4A858-CA64-44B1-922B-4F94EAD12CCB}"/>
+                <a16:creationId xmlns:a16="http://schemas.microsoft.com/office/drawing/2014/main" id="{65117985-33BC-4597-80E0-639F9666714B}"/>
               </a:ext>
             </a:extLst>
           </p:cNvPr>
@@ -7364,10 +8388,9 @@
           <a:lstStyle/>
           <a:p>
             <a:r>
-              <a:rPr lang="it-IT" dirty="0"/>
-              <a:t>What is this class about?</a:t>
-            </a:r>
-            <a:endParaRPr lang="en-US" dirty="0"/>
+              <a:rPr lang="en-US" dirty="0"/>
+              <a:t>Is it always good to optimize?</a:t>
+            </a:r>
           </a:p>
         </p:txBody>
       </p:sp>
@@ -7376,7 +8399,7 @@
           <p:cNvPr id="3" name="Espace réservé du texte 2">
             <a:extLst>
               <a:ext uri="{FF2B5EF4-FFF2-40B4-BE49-F238E27FC236}">
-                <a16:creationId xmlns:a16="http://schemas.microsoft.com/office/drawing/2014/main" id="{BB5606FD-04C9-4630-A9A9-4BAC26946C2C}"/>
+                <a16:creationId xmlns:a16="http://schemas.microsoft.com/office/drawing/2014/main" id="{4670C080-769C-481F-9BA4-EF951F79C841}"/>
               </a:ext>
             </a:extLst>
           </p:cNvPr>
@@ -7389,157 +8412,11 @@
         </p:nvSpPr>
         <p:spPr/>
         <p:txBody>
-          <a:bodyPr>
-            <a:normAutofit/>
-          </a:bodyPr>
-          <a:lstStyle/>
-          <a:p>
-            <a:r>
-              <a:rPr lang="it-IT" dirty="0"/>
-              <a:t>Optimization!</a:t>
-            </a:r>
-          </a:p>
-          <a:p>
-            <a:pPr lvl="1"/>
-            <a:r>
-              <a:rPr lang="it-IT" dirty="0"/>
-              <a:t>Overview of optimization techniques, when/how to use them</a:t>
-            </a:r>
-          </a:p>
-          <a:p>
-            <a:pPr lvl="1"/>
-            <a:r>
-              <a:rPr lang="it-IT" dirty="0"/>
-              <a:t>How these techniques power modern Artificial Intelligence</a:t>
-            </a:r>
-          </a:p>
-          <a:p>
-            <a:pPr lvl="1"/>
-            <a:r>
-              <a:rPr lang="it-IT" dirty="0"/>
-              <a:t>Optimization to improve performance of AI methods</a:t>
-            </a:r>
-          </a:p>
-          <a:p>
-            <a:r>
-              <a:rPr lang="it-IT" dirty="0"/>
-              <a:t>At the end of the class, you should know</a:t>
-            </a:r>
-          </a:p>
-          <a:p>
-            <a:pPr lvl="1"/>
-            <a:r>
-              <a:rPr lang="it-IT" dirty="0"/>
-              <a:t>What techniques are more appriopriate for different problems</a:t>
-            </a:r>
-          </a:p>
-          <a:p>
-            <a:pPr lvl="1"/>
-            <a:r>
-              <a:rPr lang="it-IT" dirty="0"/>
-              <a:t>How (several) AI systems work, especially for Machine Learning</a:t>
-            </a:r>
-          </a:p>
-          <a:p>
-            <a:pPr lvl="1"/>
-            <a:r>
-              <a:rPr lang="it-IT" dirty="0"/>
-              <a:t>Hyperparameter optimization for your AI applications</a:t>
-            </a:r>
-          </a:p>
-          <a:p>
-            <a:pPr lvl="1"/>
-            <a:r>
-              <a:rPr lang="it-IT" dirty="0"/>
-              <a:t>Keywords for further research (e.g. Neuro-symbolic, AutoML)</a:t>
-            </a:r>
-          </a:p>
-          <a:p>
-            <a:endParaRPr lang="en-US" dirty="0"/>
-          </a:p>
-        </p:txBody>
-      </p:sp>
-    </p:spTree>
-    <p:extLst>
-      <p:ext uri="{BB962C8B-B14F-4D97-AF65-F5344CB8AC3E}">
-        <p14:creationId xmlns:p14="http://schemas.microsoft.com/office/powerpoint/2010/main" val="491872556"/>
-      </p:ext>
-    </p:extLst>
-  </p:cSld>
-  <p:clrMapOvr>
-    <a:masterClrMapping/>
-  </p:clrMapOvr>
-</p:sld>
-</file>
-
-<file path=ppt/slides/slide30.xml><?xml version="1.0" encoding="utf-8"?>
-<p:sld xmlns:a="http://schemas.openxmlformats.org/drawingml/2006/main" xmlns:r="http://schemas.openxmlformats.org/officeDocument/2006/relationships" xmlns:p="http://schemas.openxmlformats.org/presentationml/2006/main">
-  <p:cSld>
-    <p:spTree>
-      <p:nvGrpSpPr>
-        <p:cNvPr id="1" name=""/>
-        <p:cNvGrpSpPr/>
-        <p:nvPr/>
-      </p:nvGrpSpPr>
-      <p:grpSpPr>
-        <a:xfrm>
-          <a:off x="0" y="0"/>
-          <a:ext cx="0" cy="0"/>
-          <a:chOff x="0" y="0"/>
-          <a:chExt cx="0" cy="0"/>
-        </a:xfrm>
-      </p:grpSpPr>
-      <p:sp>
-        <p:nvSpPr>
-          <p:cNvPr id="2" name="Titre 1">
-            <a:extLst>
-              <a:ext uri="{FF2B5EF4-FFF2-40B4-BE49-F238E27FC236}">
-                <a16:creationId xmlns:a16="http://schemas.microsoft.com/office/drawing/2014/main" id="{65117985-33BC-4597-80E0-639F9666714B}"/>
-              </a:ext>
-            </a:extLst>
-          </p:cNvPr>
-          <p:cNvSpPr>
-            <a:spLocks noGrp="1"/>
-          </p:cNvSpPr>
-          <p:nvPr>
-            <p:ph type="title"/>
-          </p:nvPr>
-        </p:nvSpPr>
-        <p:spPr/>
-        <p:txBody>
           <a:bodyPr/>
           <a:lstStyle/>
           <a:p>
             <a:r>
               <a:rPr lang="en-US" dirty="0"/>
-              <a:t>Is it always good to optimize?</a:t>
-            </a:r>
-          </a:p>
-        </p:txBody>
-      </p:sp>
-      <p:sp>
-        <p:nvSpPr>
-          <p:cNvPr id="3" name="Espace réservé du texte 2">
-            <a:extLst>
-              <a:ext uri="{FF2B5EF4-FFF2-40B4-BE49-F238E27FC236}">
-                <a16:creationId xmlns:a16="http://schemas.microsoft.com/office/drawing/2014/main" id="{4670C080-769C-481F-9BA4-EF951F79C841}"/>
-              </a:ext>
-            </a:extLst>
-          </p:cNvPr>
-          <p:cNvSpPr>
-            <a:spLocks noGrp="1"/>
-          </p:cNvSpPr>
-          <p:nvPr>
-            <p:ph type="body" sz="quarter" idx="10"/>
-          </p:nvPr>
-        </p:nvSpPr>
-        <p:spPr/>
-        <p:txBody>
-          <a:bodyPr/>
-          <a:lstStyle/>
-          <a:p>
-            <a:r>
-              <a:rPr lang="en-US" dirty="0"/>
               <a:t>Optimizing one objective might lead to undesired outcomes</a:t>
             </a:r>
           </a:p>
@@ -7559,13 +8436,17 @@
             <a:pPr lvl="1"/>
             <a:r>
               <a:rPr lang="en-US" dirty="0"/>
-              <a:t>“Robust optimization” </a:t>
-            </a:r>
-            <a:r>
-              <a:rPr lang="en-US"/>
-              <a:t>considers perturbations, but how big?</a:t>
-            </a:r>
+              <a:t>“Robust optimization” considers perturbations, but how big?</a:t>
+            </a:r>
+          </a:p>
+          <a:p>
             <a:endParaRPr lang="en-US" dirty="0"/>
+          </a:p>
+          <a:p>
+            <a:r>
+              <a:rPr lang="en-US" dirty="0"/>
+              <a:t>Multi-objective optimization can be helpful</a:t>
+            </a:r>
           </a:p>
         </p:txBody>
       </p:sp>
@@ -7582,7 +8463,7 @@
 </p:sld>
 </file>
 
-<file path=ppt/slides/slide31.xml><?xml version="1.0" encoding="utf-8"?>
+<file path=ppt/slides/slide36.xml><?xml version="1.0" encoding="utf-8"?>
 <p:sld xmlns:a="http://schemas.openxmlformats.org/drawingml/2006/main" xmlns:r="http://schemas.openxmlformats.org/officeDocument/2006/relationships" xmlns:p="http://schemas.openxmlformats.org/presentationml/2006/main">
   <p:cSld>
     <p:spTree>
@@ -7748,7 +8629,7 @@
 </p:sld>
 </file>
 
-<file path=ppt/slides/slide32.xml><?xml version="1.0" encoding="utf-8"?>
+<file path=ppt/slides/slide37.xml><?xml version="1.0" encoding="utf-8"?>
 <p:sld xmlns:a="http://schemas.openxmlformats.org/drawingml/2006/main" xmlns:r="http://schemas.openxmlformats.org/officeDocument/2006/relationships" xmlns:p="http://schemas.openxmlformats.org/presentationml/2006/main">
   <p:cSld>
     <p:spTree>
@@ -8238,14 +9119,14 @@
           <p:nvPr>
             <p:extLst>
               <p:ext uri="{D42A27DB-BD31-4B8C-83A1-F6EECF244321}">
-                <p14:modId xmlns:p14="http://schemas.microsoft.com/office/powerpoint/2010/main" val="2355023283"/>
+                <p14:modId xmlns:p14="http://schemas.microsoft.com/office/powerpoint/2010/main" val="50586641"/>
               </p:ext>
             </p:extLst>
           </p:nvPr>
         </p:nvGraphicFramePr>
         <p:xfrm>
           <a:off x="838200" y="1423358"/>
-          <a:ext cx="3265864" cy="4053840"/>
+          <a:ext cx="3265864" cy="2468880"/>
         </p:xfrm>
         <a:graphic>
           <a:graphicData uri="http://schemas.openxmlformats.org/drawingml/2006/table">
@@ -8336,46 +9217,6 @@
                     <a:p>
                       <a:r>
                         <a:rPr lang="en-US" sz="2000" dirty="0"/>
-                        <a:t>- Discrete optimization</a:t>
-                      </a:r>
-                    </a:p>
-                  </a:txBody>
-                  <a:tcPr/>
-                </a:tc>
-                <a:extLst>
-                  <a:ext uri="{0D108BD9-81ED-4DB2-BD59-A6C34878D82A}">
-                    <a16:rowId xmlns:a16="http://schemas.microsoft.com/office/drawing/2014/main" val="1880656135"/>
-                  </a:ext>
-                </a:extLst>
-              </a:tr>
-              <a:tr h="370840">
-                <a:tc>
-                  <a:txBody>
-                    <a:bodyPr/>
-                    <a:lstStyle/>
-                    <a:p>
-                      <a:r>
-                        <a:rPr lang="en-US" sz="2000" dirty="0"/>
-                        <a:t>Exercises</a:t>
-                      </a:r>
-                    </a:p>
-                  </a:txBody>
-                  <a:tcPr/>
-                </a:tc>
-                <a:extLst>
-                  <a:ext uri="{0D108BD9-81ED-4DB2-BD59-A6C34878D82A}">
-                    <a16:rowId xmlns:a16="http://schemas.microsoft.com/office/drawing/2014/main" val="421479458"/>
-                  </a:ext>
-                </a:extLst>
-              </a:tr>
-              <a:tr h="370840">
-                <a:tc>
-                  <a:txBody>
-                    <a:bodyPr/>
-                    <a:lstStyle/>
-                    <a:p>
-                      <a:r>
-                        <a:rPr lang="en-US" sz="2000" dirty="0"/>
                         <a:t>- Multi-objective optimization</a:t>
                       </a:r>
                     </a:p>
@@ -8408,46 +9249,6 @@
                   </a:ext>
                 </a:extLst>
               </a:tr>
-              <a:tr h="370840">
-                <a:tc>
-                  <a:txBody>
-                    <a:bodyPr/>
-                    <a:lstStyle/>
-                    <a:p>
-                      <a:r>
-                        <a:rPr lang="en-US" sz="2000" dirty="0"/>
-                        <a:t>- Optimizing structures</a:t>
-                      </a:r>
-                    </a:p>
-                  </a:txBody>
-                  <a:tcPr/>
-                </a:tc>
-                <a:extLst>
-                  <a:ext uri="{0D108BD9-81ED-4DB2-BD59-A6C34878D82A}">
-                    <a16:rowId xmlns:a16="http://schemas.microsoft.com/office/drawing/2014/main" val="1487472631"/>
-                  </a:ext>
-                </a:extLst>
-              </a:tr>
-              <a:tr h="370840">
-                <a:tc>
-                  <a:txBody>
-                    <a:bodyPr/>
-                    <a:lstStyle/>
-                    <a:p>
-                      <a:r>
-                        <a:rPr lang="en-US" sz="2000" dirty="0"/>
-                        <a:t>Exercises</a:t>
-                      </a:r>
-                    </a:p>
-                  </a:txBody>
-                  <a:tcPr/>
-                </a:tc>
-                <a:extLst>
-                  <a:ext uri="{0D108BD9-81ED-4DB2-BD59-A6C34878D82A}">
-                    <a16:rowId xmlns:a16="http://schemas.microsoft.com/office/drawing/2014/main" val="3402187916"/>
-                  </a:ext>
-                </a:extLst>
-              </a:tr>
             </a:tbl>
           </a:graphicData>
         </a:graphic>
@@ -8467,14 +9268,14 @@
           <p:nvPr>
             <p:extLst>
               <p:ext uri="{D42A27DB-BD31-4B8C-83A1-F6EECF244321}">
-                <p14:modId xmlns:p14="http://schemas.microsoft.com/office/powerpoint/2010/main" val="2044803039"/>
+                <p14:modId xmlns:p14="http://schemas.microsoft.com/office/powerpoint/2010/main" val="1375629143"/>
               </p:ext>
             </p:extLst>
           </p:nvPr>
         </p:nvGraphicFramePr>
         <p:xfrm>
           <a:off x="4463068" y="1423358"/>
-          <a:ext cx="3265864" cy="3261360"/>
+          <a:ext cx="3265864" cy="3352800"/>
         </p:xfrm>
         <a:graphic>
           <a:graphicData uri="http://schemas.openxmlformats.org/drawingml/2006/table">
@@ -8519,6 +9320,140 @@
                     <a:p>
                       <a:r>
                         <a:rPr lang="en-US" sz="2000" dirty="0"/>
+                        <a:t>- Linear programming</a:t>
+                      </a:r>
+                    </a:p>
+                  </a:txBody>
+                  <a:tcPr/>
+                </a:tc>
+                <a:extLst>
+                  <a:ext uri="{0D108BD9-81ED-4DB2-BD59-A6C34878D82A}">
+                    <a16:rowId xmlns:a16="http://schemas.microsoft.com/office/drawing/2014/main" val="2997754878"/>
+                  </a:ext>
+                </a:extLst>
+              </a:tr>
+              <a:tr h="370840">
+                <a:tc>
+                  <a:txBody>
+                    <a:bodyPr/>
+                    <a:lstStyle/>
+                    <a:p>
+                      <a:pPr marL="0" marR="0" lvl="0" indent="0" algn="l" defTabSz="914400" rtl="0" eaLnBrk="1" fontAlgn="auto" latinLnBrk="0" hangingPunct="1">
+                        <a:lnSpc>
+                          <a:spcPct val="100000"/>
+                        </a:lnSpc>
+                        <a:spcBef>
+                          <a:spcPts val="0"/>
+                        </a:spcBef>
+                        <a:spcAft>
+                          <a:spcPts val="0"/>
+                        </a:spcAft>
+                        <a:buClrTx/>
+                        <a:buSzTx/>
+                        <a:buFontTx/>
+                        <a:buNone/>
+                        <a:tabLst/>
+                        <a:defRPr/>
+                      </a:pPr>
+                      <a:r>
+                        <a:rPr lang="en-US" sz="2000" dirty="0"/>
+                        <a:t>- Discrete optimization</a:t>
+                      </a:r>
+                    </a:p>
+                  </a:txBody>
+                  <a:tcPr/>
+                </a:tc>
+                <a:extLst>
+                  <a:ext uri="{0D108BD9-81ED-4DB2-BD59-A6C34878D82A}">
+                    <a16:rowId xmlns:a16="http://schemas.microsoft.com/office/drawing/2014/main" val="3178717176"/>
+                  </a:ext>
+                </a:extLst>
+              </a:tr>
+              <a:tr h="370840">
+                <a:tc>
+                  <a:txBody>
+                    <a:bodyPr/>
+                    <a:lstStyle/>
+                    <a:p>
+                      <a:pPr marL="0" marR="0" lvl="0" indent="0" algn="l" defTabSz="914400" rtl="0" eaLnBrk="1" fontAlgn="auto" latinLnBrk="0" hangingPunct="1">
+                        <a:lnSpc>
+                          <a:spcPct val="100000"/>
+                        </a:lnSpc>
+                        <a:spcBef>
+                          <a:spcPts val="0"/>
+                        </a:spcBef>
+                        <a:spcAft>
+                          <a:spcPts val="0"/>
+                        </a:spcAft>
+                        <a:buClrTx/>
+                        <a:buSzTx/>
+                        <a:buFontTx/>
+                        <a:buNone/>
+                        <a:tabLst/>
+                        <a:defRPr/>
+                      </a:pPr>
+                      <a:r>
+                        <a:rPr lang="en-US" sz="2000" dirty="0"/>
+                        <a:t>Exercises</a:t>
+                      </a:r>
+                    </a:p>
+                  </a:txBody>
+                  <a:tcPr/>
+                </a:tc>
+                <a:extLst>
+                  <a:ext uri="{0D108BD9-81ED-4DB2-BD59-A6C34878D82A}">
+                    <a16:rowId xmlns:a16="http://schemas.microsoft.com/office/drawing/2014/main" val="4017585940"/>
+                  </a:ext>
+                </a:extLst>
+              </a:tr>
+              <a:tr h="370840">
+                <a:tc>
+                  <a:txBody>
+                    <a:bodyPr/>
+                    <a:lstStyle/>
+                    <a:p>
+                      <a:r>
+                        <a:rPr lang="en-US" sz="2000" dirty="0"/>
+                        <a:t>- Optimizing structures</a:t>
+                      </a:r>
+                    </a:p>
+                  </a:txBody>
+                  <a:tcPr/>
+                </a:tc>
+                <a:extLst>
+                  <a:ext uri="{0D108BD9-81ED-4DB2-BD59-A6C34878D82A}">
+                    <a16:rowId xmlns:a16="http://schemas.microsoft.com/office/drawing/2014/main" val="400040881"/>
+                  </a:ext>
+                </a:extLst>
+              </a:tr>
+              <a:tr h="370840">
+                <a:tc>
+                  <a:txBody>
+                    <a:bodyPr/>
+                    <a:lstStyle/>
+                    <a:p>
+                      <a:r>
+                        <a:rPr lang="en-US" sz="2000" dirty="0"/>
+                        <a:t>Exercises</a:t>
+                      </a:r>
+                    </a:p>
+                  </a:txBody>
+                  <a:tcPr/>
+                </a:tc>
+                <a:extLst>
+                  <a:ext uri="{0D108BD9-81ED-4DB2-BD59-A6C34878D82A}">
+                    <a16:rowId xmlns:a16="http://schemas.microsoft.com/office/drawing/2014/main" val="4160223534"/>
+                  </a:ext>
+                </a:extLst>
+              </a:tr>
+              <a:tr h="370840">
+                <a:tc>
+                  <a:txBody>
+                    <a:bodyPr/>
+                    <a:lstStyle/>
+                    <a:p>
+                      <a:r>
+                        <a:rPr lang="en-US" sz="2000" dirty="0"/>
                         <a:t>- Optimization in ML</a:t>
                       </a:r>
                     </a:p>
@@ -8548,86 +9483,6 @@
                 <a:extLst>
                   <a:ext uri="{0D108BD9-81ED-4DB2-BD59-A6C34878D82A}">
                     <a16:rowId xmlns:a16="http://schemas.microsoft.com/office/drawing/2014/main" val="2589486238"/>
-                  </a:ext>
-                </a:extLst>
-              </a:tr>
-              <a:tr h="370840">
-                <a:tc>
-                  <a:txBody>
-                    <a:bodyPr/>
-                    <a:lstStyle/>
-                    <a:p>
-                      <a:r>
-                        <a:rPr lang="en-US" sz="2000" dirty="0"/>
-                        <a:t>- Optimization in symbolic AI</a:t>
-                      </a:r>
-                    </a:p>
-                  </a:txBody>
-                  <a:tcPr/>
-                </a:tc>
-                <a:extLst>
-                  <a:ext uri="{0D108BD9-81ED-4DB2-BD59-A6C34878D82A}">
-                    <a16:rowId xmlns:a16="http://schemas.microsoft.com/office/drawing/2014/main" val="1880656135"/>
-                  </a:ext>
-                </a:extLst>
-              </a:tr>
-              <a:tr h="370840">
-                <a:tc>
-                  <a:txBody>
-                    <a:bodyPr/>
-                    <a:lstStyle/>
-                    <a:p>
-                      <a:r>
-                        <a:rPr lang="en-US" sz="2000" dirty="0"/>
-                        <a:t>Exercises</a:t>
-                      </a:r>
-                    </a:p>
-                  </a:txBody>
-                  <a:tcPr/>
-                </a:tc>
-                <a:extLst>
-                  <a:ext uri="{0D108BD9-81ED-4DB2-BD59-A6C34878D82A}">
-                    <a16:rowId xmlns:a16="http://schemas.microsoft.com/office/drawing/2014/main" val="421479458"/>
-                  </a:ext>
-                </a:extLst>
-              </a:tr>
-              <a:tr h="370840">
-                <a:tc>
-                  <a:txBody>
-                    <a:bodyPr/>
-                    <a:lstStyle/>
-                    <a:p>
-                      <a:r>
-                        <a:rPr lang="en-US" sz="2000" dirty="0"/>
-                        <a:t>- Optimization in neuro-symbolic AI</a:t>
-                      </a:r>
-                    </a:p>
-                  </a:txBody>
-                  <a:tcPr/>
-                </a:tc>
-                <a:extLst>
-                  <a:ext uri="{0D108BD9-81ED-4DB2-BD59-A6C34878D82A}">
-                    <a16:rowId xmlns:a16="http://schemas.microsoft.com/office/drawing/2014/main" val="3792733092"/>
-                  </a:ext>
-                </a:extLst>
-              </a:tr>
-              <a:tr h="370840">
-                <a:tc>
-                  <a:txBody>
-                    <a:bodyPr/>
-                    <a:lstStyle/>
-                    <a:p>
-                      <a:r>
-                        <a:rPr lang="en-US" sz="2000" dirty="0"/>
-                        <a:t>Exercises (?)</a:t>
-                      </a:r>
-                    </a:p>
-                  </a:txBody>
-                  <a:tcPr/>
-                </a:tc>
-                <a:extLst>
-                  <a:ext uri="{0D108BD9-81ED-4DB2-BD59-A6C34878D82A}">
-                    <a16:rowId xmlns:a16="http://schemas.microsoft.com/office/drawing/2014/main" val="1641919525"/>
                   </a:ext>
                 </a:extLst>
               </a:tr>
@@ -8753,14 +9608,14 @@
           <p:nvPr>
             <p:extLst>
               <p:ext uri="{D42A27DB-BD31-4B8C-83A1-F6EECF244321}">
-                <p14:modId xmlns:p14="http://schemas.microsoft.com/office/powerpoint/2010/main" val="1581025270"/>
+                <p14:modId xmlns:p14="http://schemas.microsoft.com/office/powerpoint/2010/main" val="591240994"/>
               </p:ext>
             </p:extLst>
           </p:nvPr>
         </p:nvGraphicFramePr>
         <p:xfrm>
           <a:off x="8087936" y="3289538"/>
-          <a:ext cx="3265864" cy="975360"/>
+          <a:ext cx="3265864" cy="1371600"/>
         </p:xfrm>
         <a:graphic>
           <a:graphicData uri="http://schemas.openxmlformats.org/drawingml/2006/table">
@@ -8805,7 +9660,27 @@
                     <a:p>
                       <a:r>
                         <a:rPr lang="en-US" sz="2000" dirty="0"/>
-                        <a:t>Project</a:t>
+                        <a:t>Discussion</a:t>
+                      </a:r>
+                    </a:p>
+                  </a:txBody>
+                  <a:tcPr/>
+                </a:tc>
+                <a:extLst>
+                  <a:ext uri="{0D108BD9-81ED-4DB2-BD59-A6C34878D82A}">
+                    <a16:rowId xmlns:a16="http://schemas.microsoft.com/office/drawing/2014/main" val="3931945244"/>
+                  </a:ext>
+                </a:extLst>
+              </a:tr>
+              <a:tr h="370840">
+                <a:tc>
+                  <a:txBody>
+                    <a:bodyPr/>
+                    <a:lstStyle/>
+                    <a:p>
+                      <a:r>
+                        <a:rPr lang="en-US" sz="2000" dirty="0"/>
+                        <a:t>- Recent developments</a:t>
                       </a:r>
                     </a:p>
                   </a:txBody>

</xml_diff>

<commit_message>
Minor adjustments to powerpoint files
</commit_message>
<xml_diff>
--- a/optimization-methods-for-artificial-intelligence/introduction.pptx
+++ b/optimization-methods-for-artificial-intelligence/introduction.pptx
@@ -233,7 +233,7 @@
           <a:p>
             <a:fld id="{4AAA8967-1584-49FE-8FA4-B9793DEB31AA}" type="datetimeFigureOut">
               <a:rPr lang="en-US" smtClean="0"/>
-              <a:t>5/21/2024</a:t>
+              <a:t>3/29/2025</a:t>
             </a:fld>
             <a:endParaRPr lang="en-US"/>
           </a:p>
@@ -6830,7 +6830,7 @@
             </a:r>
             <a:r>
               <a:rPr lang="en-US" b="1" dirty="0"/>
-              <a:t>structured data</a:t>
+              <a:t>relational data</a:t>
             </a:r>
             <a:r>
               <a:rPr lang="en-US" dirty="0"/>
@@ -7196,7 +7196,7 @@
             <a:pPr lvl="1"/>
             <a:r>
               <a:rPr lang="en-US" dirty="0"/>
-              <a:t>No value associated to a </a:t>
+              <a:t>No value for a </a:t>
             </a:r>
             <a:r>
               <a:rPr lang="en-US" i="1" dirty="0"/>
@@ -7204,14 +7204,7 @@
             </a:r>
             <a:r>
               <a:rPr lang="en-US" dirty="0"/>
-              <a:t> decision</a:t>
-            </a:r>
-          </a:p>
-          <a:p>
-            <a:pPr lvl="1"/>
-            <a:r>
-              <a:rPr lang="en-US" dirty="0"/>
-              <a:t>Reward is consequence of a </a:t>
+              <a:t> decision; reward after </a:t>
             </a:r>
             <a:r>
               <a:rPr lang="en-US" i="1" dirty="0"/>
@@ -7226,7 +7219,34 @@
             <a:pPr lvl="1"/>
             <a:r>
               <a:rPr lang="en-US" dirty="0"/>
-              <a:t>Example: chess game; is trading a Queen for a Knight good? Well, it depends on the board state</a:t>
+              <a:t>Learn a </a:t>
+            </a:r>
+            <a:r>
+              <a:rPr lang="en-US" b="1" dirty="0"/>
+              <a:t>policy</a:t>
+            </a:r>
+            <a:r>
+              <a:rPr lang="en-US" dirty="0"/>
+              <a:t> which tells you what to do from the </a:t>
+            </a:r>
+            <a:r>
+              <a:rPr lang="en-US" b="1" dirty="0"/>
+              <a:t>state</a:t>
+            </a:r>
+            <a:r>
+              <a:rPr lang="en-US" dirty="0"/>
+              <a:t> you are in</a:t>
+            </a:r>
+          </a:p>
+          <a:p>
+            <a:pPr lvl="1"/>
+            <a:r>
+              <a:rPr lang="en-US" dirty="0"/>
+              <a:t>Example: chess game; is trading a Queen for a Knight good? Well, it depends on the board </a:t>
+            </a:r>
+            <a:r>
+              <a:rPr lang="en-US" b="1" dirty="0"/>
+              <a:t>state</a:t>
             </a:r>
           </a:p>
           <a:p>
@@ -7851,6 +7871,12 @@
             <a:r>
               <a:rPr lang="en-US" dirty="0"/>
               <a:t> of AI</a:t>
+            </a:r>
+          </a:p>
+          <a:p>
+            <a:r>
+              <a:rPr lang="en-US" dirty="0"/>
+              <a:t>…this is almost sure for ML</a:t>
             </a:r>
           </a:p>
         </p:txBody>

</xml_diff>